<commit_message>
Präsentation um Annahmen und Diagramme ergänzt, FPS hinzugefügt, Parameter hinzugefügt
</commit_message>
<xml_diff>
--- a/Präsentationen/Meilenstein_2.pptx
+++ b/Präsentationen/Meilenstein_2.pptx
@@ -12,7 +12,10 @@
     <p:sldId id="259" r:id="rId6"/>
     <p:sldId id="264" r:id="rId7"/>
     <p:sldId id="261" r:id="rId8"/>
-    <p:sldId id="262" r:id="rId9"/>
+    <p:sldId id="269" r:id="rId9"/>
+    <p:sldId id="262" r:id="rId10"/>
+    <p:sldId id="270" r:id="rId11"/>
+    <p:sldId id="271" r:id="rId12"/>
   </p:sldIdLst>
   <p:sldSz cx="12192000" cy="6858000"/>
   <p:notesSz cx="6858000" cy="9144000"/>
@@ -111,7 +114,1077 @@
       </a:defRPr>
     </a:lvl9pPr>
   </p:defaultTextStyle>
+  <p:extLst>
+    <p:ext uri="{EFAFB233-063F-42B5-8137-9DF3F51BA10A}">
+      <p15:sldGuideLst xmlns:p15="http://schemas.microsoft.com/office/powerpoint/2012/main"/>
+    </p:ext>
+  </p:extLst>
 </p:presentation>
+</file>
+
+<file path=ppt/charts/chart1.xml><?xml version="1.0" encoding="utf-8"?>
+<c:chartSpace xmlns:c="http://schemas.openxmlformats.org/drawingml/2006/chart" xmlns:a="http://schemas.openxmlformats.org/drawingml/2006/main" xmlns:r="http://schemas.openxmlformats.org/officeDocument/2006/relationships" xmlns:c16r2="http://schemas.microsoft.com/office/drawing/2015/06/chart">
+  <c:date1904 val="0"/>
+  <c:lang val="de-DE"/>
+  <c:roundedCorners val="0"/>
+  <mc:AlternateContent xmlns:mc="http://schemas.openxmlformats.org/markup-compatibility/2006">
+    <mc:Choice xmlns:c14="http://schemas.microsoft.com/office/drawing/2007/8/2/chart" Requires="c14">
+      <c14:style val="102"/>
+    </mc:Choice>
+    <mc:Fallback>
+      <c:style val="2"/>
+    </mc:Fallback>
+  </mc:AlternateContent>
+  <c:chart>
+    <c:autoTitleDeleted val="0"/>
+    <c:plotArea>
+      <c:layout/>
+      <c:barChart>
+        <c:barDir val="col"/>
+        <c:grouping val="clustered"/>
+        <c:varyColors val="0"/>
+        <c:ser>
+          <c:idx val="0"/>
+          <c:order val="0"/>
+          <c:tx>
+            <c:strRef>
+              <c:f>Tabelle1!$B$1</c:f>
+              <c:strCache>
+                <c:ptCount val="1"/>
+                <c:pt idx="0">
+                  <c:v>Min FPS</c:v>
+                </c:pt>
+              </c:strCache>
+            </c:strRef>
+          </c:tx>
+          <c:spPr>
+            <a:solidFill>
+              <a:schemeClr val="accent2">
+                <a:lumMod val="75000"/>
+              </a:schemeClr>
+            </a:solidFill>
+            <a:ln>
+              <a:noFill/>
+            </a:ln>
+            <a:effectLst/>
+          </c:spPr>
+          <c:invertIfNegative val="0"/>
+          <c:cat>
+            <c:strRef>
+              <c:f>Tabelle1!$A$2:$A$9</c:f>
+              <c:strCache>
+                <c:ptCount val="7"/>
+                <c:pt idx="0">
+                  <c:v>MOG2</c:v>
+                </c:pt>
+                <c:pt idx="1">
+                  <c:v>KNN</c:v>
+                </c:pt>
+                <c:pt idx="2">
+                  <c:v>MOG</c:v>
+                </c:pt>
+                <c:pt idx="3">
+                  <c:v>CNT</c:v>
+                </c:pt>
+                <c:pt idx="4">
+                  <c:v>GMG</c:v>
+                </c:pt>
+                <c:pt idx="5">
+                  <c:v>GSOC</c:v>
+                </c:pt>
+                <c:pt idx="6">
+                  <c:v>LSBP</c:v>
+                </c:pt>
+              </c:strCache>
+            </c:strRef>
+          </c:cat>
+          <c:val>
+            <c:numRef>
+              <c:f>Tabelle1!$B$2:$B$9</c:f>
+              <c:numCache>
+                <c:formatCode>General</c:formatCode>
+                <c:ptCount val="8"/>
+                <c:pt idx="0">
+                  <c:v>200</c:v>
+                </c:pt>
+                <c:pt idx="1">
+                  <c:v>126</c:v>
+                </c:pt>
+                <c:pt idx="2">
+                  <c:v>81</c:v>
+                </c:pt>
+                <c:pt idx="3">
+                  <c:v>368</c:v>
+                </c:pt>
+                <c:pt idx="4">
+                  <c:v>49</c:v>
+                </c:pt>
+                <c:pt idx="5">
+                  <c:v>10</c:v>
+                </c:pt>
+                <c:pt idx="6">
+                  <c:v>10</c:v>
+                </c:pt>
+              </c:numCache>
+            </c:numRef>
+          </c:val>
+          <c:extLst>
+            <c:ext xmlns:c16="http://schemas.microsoft.com/office/drawing/2014/chart" uri="{C3380CC4-5D6E-409C-BE32-E72D297353CC}">
+              <c16:uniqueId val="{00000000-9B36-4E39-98E8-3C4154745F3C}"/>
+            </c:ext>
+          </c:extLst>
+        </c:ser>
+        <c:ser>
+          <c:idx val="1"/>
+          <c:order val="1"/>
+          <c:tx>
+            <c:strRef>
+              <c:f>Tabelle1!$C$1</c:f>
+              <c:strCache>
+                <c:ptCount val="1"/>
+                <c:pt idx="0">
+                  <c:v>Spalte1</c:v>
+                </c:pt>
+              </c:strCache>
+            </c:strRef>
+          </c:tx>
+          <c:spPr>
+            <a:solidFill>
+              <a:schemeClr val="accent2"/>
+            </a:solidFill>
+            <a:ln>
+              <a:noFill/>
+            </a:ln>
+            <a:effectLst/>
+          </c:spPr>
+          <c:invertIfNegative val="0"/>
+          <c:cat>
+            <c:strRef>
+              <c:f>Tabelle1!$A$2:$A$9</c:f>
+              <c:strCache>
+                <c:ptCount val="7"/>
+                <c:pt idx="0">
+                  <c:v>MOG2</c:v>
+                </c:pt>
+                <c:pt idx="1">
+                  <c:v>KNN</c:v>
+                </c:pt>
+                <c:pt idx="2">
+                  <c:v>MOG</c:v>
+                </c:pt>
+                <c:pt idx="3">
+                  <c:v>CNT</c:v>
+                </c:pt>
+                <c:pt idx="4">
+                  <c:v>GMG</c:v>
+                </c:pt>
+                <c:pt idx="5">
+                  <c:v>GSOC</c:v>
+                </c:pt>
+                <c:pt idx="6">
+                  <c:v>LSBP</c:v>
+                </c:pt>
+              </c:strCache>
+            </c:strRef>
+          </c:cat>
+          <c:val>
+            <c:numRef>
+              <c:f>Tabelle1!$C$2:$C$9</c:f>
+            </c:numRef>
+          </c:val>
+          <c:extLst>
+            <c:ext xmlns:c16="http://schemas.microsoft.com/office/drawing/2014/chart" uri="{C3380CC4-5D6E-409C-BE32-E72D297353CC}">
+              <c16:uniqueId val="{00000001-9B36-4E39-98E8-3C4154745F3C}"/>
+            </c:ext>
+          </c:extLst>
+        </c:ser>
+        <c:ser>
+          <c:idx val="2"/>
+          <c:order val="2"/>
+          <c:tx>
+            <c:strRef>
+              <c:f>Tabelle1!$D$1</c:f>
+              <c:strCache>
+                <c:ptCount val="1"/>
+                <c:pt idx="0">
+                  <c:v>Spalte2</c:v>
+                </c:pt>
+              </c:strCache>
+            </c:strRef>
+          </c:tx>
+          <c:spPr>
+            <a:solidFill>
+              <a:schemeClr val="accent3"/>
+            </a:solidFill>
+            <a:ln>
+              <a:noFill/>
+            </a:ln>
+            <a:effectLst/>
+          </c:spPr>
+          <c:invertIfNegative val="0"/>
+          <c:cat>
+            <c:strRef>
+              <c:f>Tabelle1!$A$2:$A$9</c:f>
+              <c:strCache>
+                <c:ptCount val="7"/>
+                <c:pt idx="0">
+                  <c:v>MOG2</c:v>
+                </c:pt>
+                <c:pt idx="1">
+                  <c:v>KNN</c:v>
+                </c:pt>
+                <c:pt idx="2">
+                  <c:v>MOG</c:v>
+                </c:pt>
+                <c:pt idx="3">
+                  <c:v>CNT</c:v>
+                </c:pt>
+                <c:pt idx="4">
+                  <c:v>GMG</c:v>
+                </c:pt>
+                <c:pt idx="5">
+                  <c:v>GSOC</c:v>
+                </c:pt>
+                <c:pt idx="6">
+                  <c:v>LSBP</c:v>
+                </c:pt>
+              </c:strCache>
+            </c:strRef>
+          </c:cat>
+          <c:val>
+            <c:numRef>
+              <c:f>Tabelle1!$D$2:$D$9</c:f>
+            </c:numRef>
+          </c:val>
+          <c:extLst>
+            <c:ext xmlns:c16="http://schemas.microsoft.com/office/drawing/2014/chart" uri="{C3380CC4-5D6E-409C-BE32-E72D297353CC}">
+              <c16:uniqueId val="{00000002-9B36-4E39-98E8-3C4154745F3C}"/>
+            </c:ext>
+          </c:extLst>
+        </c:ser>
+        <c:ser>
+          <c:idx val="3"/>
+          <c:order val="3"/>
+          <c:tx>
+            <c:strRef>
+              <c:f>Tabelle1!$E$1</c:f>
+              <c:strCache>
+                <c:ptCount val="1"/>
+                <c:pt idx="0">
+                  <c:v>Max FPS</c:v>
+                </c:pt>
+              </c:strCache>
+            </c:strRef>
+          </c:tx>
+          <c:spPr>
+            <a:solidFill>
+              <a:schemeClr val="bg2"/>
+            </a:solidFill>
+            <a:ln>
+              <a:noFill/>
+            </a:ln>
+            <a:effectLst/>
+          </c:spPr>
+          <c:invertIfNegative val="0"/>
+          <c:cat>
+            <c:strRef>
+              <c:f>Tabelle1!$A$2:$A$9</c:f>
+              <c:strCache>
+                <c:ptCount val="7"/>
+                <c:pt idx="0">
+                  <c:v>MOG2</c:v>
+                </c:pt>
+                <c:pt idx="1">
+                  <c:v>KNN</c:v>
+                </c:pt>
+                <c:pt idx="2">
+                  <c:v>MOG</c:v>
+                </c:pt>
+                <c:pt idx="3">
+                  <c:v>CNT</c:v>
+                </c:pt>
+                <c:pt idx="4">
+                  <c:v>GMG</c:v>
+                </c:pt>
+                <c:pt idx="5">
+                  <c:v>GSOC</c:v>
+                </c:pt>
+                <c:pt idx="6">
+                  <c:v>LSBP</c:v>
+                </c:pt>
+              </c:strCache>
+            </c:strRef>
+          </c:cat>
+          <c:val>
+            <c:numRef>
+              <c:f>Tabelle1!$E$2:$E$9</c:f>
+              <c:numCache>
+                <c:formatCode>General</c:formatCode>
+                <c:ptCount val="8"/>
+                <c:pt idx="0">
+                  <c:v>315</c:v>
+                </c:pt>
+                <c:pt idx="1">
+                  <c:v>322</c:v>
+                </c:pt>
+                <c:pt idx="2">
+                  <c:v>116</c:v>
+                </c:pt>
+                <c:pt idx="3">
+                  <c:v>513</c:v>
+                </c:pt>
+                <c:pt idx="4">
+                  <c:v>60</c:v>
+                </c:pt>
+                <c:pt idx="5">
+                  <c:v>12</c:v>
+                </c:pt>
+                <c:pt idx="6">
+                  <c:v>11</c:v>
+                </c:pt>
+              </c:numCache>
+            </c:numRef>
+          </c:val>
+          <c:extLst>
+            <c:ext xmlns:c16="http://schemas.microsoft.com/office/drawing/2014/chart" uri="{C3380CC4-5D6E-409C-BE32-E72D297353CC}">
+              <c16:uniqueId val="{00000003-9B36-4E39-98E8-3C4154745F3C}"/>
+            </c:ext>
+          </c:extLst>
+        </c:ser>
+        <c:dLbls>
+          <c:showLegendKey val="0"/>
+          <c:showVal val="0"/>
+          <c:showCatName val="0"/>
+          <c:showSerName val="0"/>
+          <c:showPercent val="0"/>
+          <c:showBubbleSize val="0"/>
+        </c:dLbls>
+        <c:gapWidth val="219"/>
+        <c:overlap val="-27"/>
+        <c:axId val="1228191024"/>
+        <c:axId val="1228197744"/>
+      </c:barChart>
+      <c:catAx>
+        <c:axId val="1228191024"/>
+        <c:scaling>
+          <c:orientation val="minMax"/>
+        </c:scaling>
+        <c:delete val="0"/>
+        <c:axPos val="b"/>
+        <c:numFmt formatCode="General" sourceLinked="1"/>
+        <c:majorTickMark val="none"/>
+        <c:minorTickMark val="none"/>
+        <c:tickLblPos val="nextTo"/>
+        <c:spPr>
+          <a:noFill/>
+          <a:ln w="9525" cap="flat" cmpd="sng" algn="ctr">
+            <a:solidFill>
+              <a:schemeClr val="tx1">
+                <a:lumMod val="15000"/>
+                <a:lumOff val="85000"/>
+              </a:schemeClr>
+            </a:solidFill>
+            <a:round/>
+          </a:ln>
+          <a:effectLst/>
+        </c:spPr>
+        <c:txPr>
+          <a:bodyPr rot="-60000000" spcFirstLastPara="1" vertOverflow="ellipsis" vert="horz" wrap="square" anchor="ctr" anchorCtr="1"/>
+          <a:lstStyle/>
+          <a:p>
+            <a:pPr>
+              <a:defRPr sz="1197" b="0" i="0" u="none" strike="noStrike" kern="1200" baseline="0">
+                <a:solidFill>
+                  <a:schemeClr val="tx1">
+                    <a:lumMod val="65000"/>
+                    <a:lumOff val="35000"/>
+                  </a:schemeClr>
+                </a:solidFill>
+                <a:latin typeface="+mn-lt"/>
+                <a:ea typeface="+mn-ea"/>
+                <a:cs typeface="+mn-cs"/>
+              </a:defRPr>
+            </a:pPr>
+            <a:endParaRPr lang="de-DE"/>
+          </a:p>
+        </c:txPr>
+        <c:crossAx val="1228197744"/>
+        <c:crosses val="autoZero"/>
+        <c:auto val="1"/>
+        <c:lblAlgn val="ctr"/>
+        <c:lblOffset val="100"/>
+        <c:noMultiLvlLbl val="0"/>
+      </c:catAx>
+      <c:valAx>
+        <c:axId val="1228197744"/>
+        <c:scaling>
+          <c:orientation val="minMax"/>
+        </c:scaling>
+        <c:delete val="0"/>
+        <c:axPos val="l"/>
+        <c:majorGridlines>
+          <c:spPr>
+            <a:ln w="9525" cap="flat" cmpd="sng" algn="ctr">
+              <a:solidFill>
+                <a:schemeClr val="tx1">
+                  <a:lumMod val="15000"/>
+                  <a:lumOff val="85000"/>
+                </a:schemeClr>
+              </a:solidFill>
+              <a:round/>
+            </a:ln>
+            <a:effectLst/>
+          </c:spPr>
+        </c:majorGridlines>
+        <c:numFmt formatCode="General" sourceLinked="1"/>
+        <c:majorTickMark val="none"/>
+        <c:minorTickMark val="none"/>
+        <c:tickLblPos val="nextTo"/>
+        <c:spPr>
+          <a:noFill/>
+          <a:ln>
+            <a:noFill/>
+          </a:ln>
+          <a:effectLst/>
+        </c:spPr>
+        <c:txPr>
+          <a:bodyPr rot="-60000000" spcFirstLastPara="1" vertOverflow="ellipsis" vert="horz" wrap="square" anchor="ctr" anchorCtr="1"/>
+          <a:lstStyle/>
+          <a:p>
+            <a:pPr>
+              <a:defRPr sz="1197" b="0" i="0" u="none" strike="noStrike" kern="1200" baseline="0">
+                <a:solidFill>
+                  <a:schemeClr val="tx1">
+                    <a:lumMod val="65000"/>
+                    <a:lumOff val="35000"/>
+                  </a:schemeClr>
+                </a:solidFill>
+                <a:latin typeface="+mn-lt"/>
+                <a:ea typeface="+mn-ea"/>
+                <a:cs typeface="+mn-cs"/>
+              </a:defRPr>
+            </a:pPr>
+            <a:endParaRPr lang="de-DE"/>
+          </a:p>
+        </c:txPr>
+        <c:crossAx val="1228191024"/>
+        <c:crosses val="autoZero"/>
+        <c:crossBetween val="between"/>
+      </c:valAx>
+      <c:spPr>
+        <a:noFill/>
+        <a:ln>
+          <a:noFill/>
+        </a:ln>
+        <a:effectLst/>
+      </c:spPr>
+    </c:plotArea>
+    <c:legend>
+      <c:legendPos val="b"/>
+      <c:overlay val="0"/>
+      <c:spPr>
+        <a:noFill/>
+        <a:ln>
+          <a:noFill/>
+        </a:ln>
+        <a:effectLst/>
+      </c:spPr>
+      <c:txPr>
+        <a:bodyPr rot="0" spcFirstLastPara="1" vertOverflow="ellipsis" vert="horz" wrap="square" anchor="ctr" anchorCtr="1"/>
+        <a:lstStyle/>
+        <a:p>
+          <a:pPr>
+            <a:defRPr sz="1197" b="0" i="0" u="none" strike="noStrike" kern="1200" baseline="0">
+              <a:solidFill>
+                <a:schemeClr val="tx1">
+                  <a:lumMod val="65000"/>
+                  <a:lumOff val="35000"/>
+                </a:schemeClr>
+              </a:solidFill>
+              <a:latin typeface="+mn-lt"/>
+              <a:ea typeface="+mn-ea"/>
+              <a:cs typeface="+mn-cs"/>
+            </a:defRPr>
+          </a:pPr>
+          <a:endParaRPr lang="de-DE"/>
+        </a:p>
+      </c:txPr>
+    </c:legend>
+    <c:plotVisOnly val="1"/>
+    <c:dispBlanksAs val="gap"/>
+    <c:extLst>
+      <c:ext xmlns:c16r3="http://schemas.microsoft.com/office/drawing/2017/03/chart" uri="{56B9EC1D-385E-4148-901F-78D8002777C0}">
+        <c16r3:dataDisplayOptions16>
+          <c16r3:dispNaAsBlank val="1"/>
+        </c16r3:dataDisplayOptions16>
+      </c:ext>
+    </c:extLst>
+    <c:showDLblsOverMax val="0"/>
+  </c:chart>
+  <c:spPr>
+    <a:noFill/>
+    <a:ln>
+      <a:noFill/>
+    </a:ln>
+    <a:effectLst/>
+  </c:spPr>
+  <c:txPr>
+    <a:bodyPr/>
+    <a:lstStyle/>
+    <a:p>
+      <a:pPr>
+        <a:defRPr/>
+      </a:pPr>
+      <a:endParaRPr lang="de-DE"/>
+    </a:p>
+  </c:txPr>
+  <c:externalData r:id="rId3">
+    <c:autoUpdate val="0"/>
+  </c:externalData>
+</c:chartSpace>
+</file>
+
+<file path=ppt/charts/colors1.xml><?xml version="1.0" encoding="utf-8"?>
+<cs:colorStyle xmlns:cs="http://schemas.microsoft.com/office/drawing/2012/chartStyle" xmlns:a="http://schemas.openxmlformats.org/drawingml/2006/main" meth="cycle" id="10">
+  <a:schemeClr val="accent1"/>
+  <a:schemeClr val="accent2"/>
+  <a:schemeClr val="accent3"/>
+  <a:schemeClr val="accent4"/>
+  <a:schemeClr val="accent5"/>
+  <a:schemeClr val="accent6"/>
+  <cs:variation/>
+  <cs:variation>
+    <a:lumMod val="60000"/>
+  </cs:variation>
+  <cs:variation>
+    <a:lumMod val="80000"/>
+    <a:lumOff val="20000"/>
+  </cs:variation>
+  <cs:variation>
+    <a:lumMod val="80000"/>
+  </cs:variation>
+  <cs:variation>
+    <a:lumMod val="60000"/>
+    <a:lumOff val="40000"/>
+  </cs:variation>
+  <cs:variation>
+    <a:lumMod val="50000"/>
+  </cs:variation>
+  <cs:variation>
+    <a:lumMod val="70000"/>
+    <a:lumOff val="30000"/>
+  </cs:variation>
+  <cs:variation>
+    <a:lumMod val="70000"/>
+  </cs:variation>
+  <cs:variation>
+    <a:lumMod val="50000"/>
+    <a:lumOff val="50000"/>
+  </cs:variation>
+</cs:colorStyle>
+</file>
+
+<file path=ppt/charts/style1.xml><?xml version="1.0" encoding="utf-8"?>
+<cs:chartStyle xmlns:cs="http://schemas.microsoft.com/office/drawing/2012/chartStyle" xmlns:a="http://schemas.openxmlformats.org/drawingml/2006/main" id="201">
+  <cs:axisTitle>
+    <cs:lnRef idx="0"/>
+    <cs:fillRef idx="0"/>
+    <cs:effectRef idx="0"/>
+    <cs:fontRef idx="minor">
+      <a:schemeClr val="tx1">
+        <a:lumMod val="65000"/>
+        <a:lumOff val="35000"/>
+      </a:schemeClr>
+    </cs:fontRef>
+    <cs:defRPr sz="1330" kern="1200"/>
+  </cs:axisTitle>
+  <cs:categoryAxis>
+    <cs:lnRef idx="0"/>
+    <cs:fillRef idx="0"/>
+    <cs:effectRef idx="0"/>
+    <cs:fontRef idx="minor">
+      <a:schemeClr val="tx1">
+        <a:lumMod val="65000"/>
+        <a:lumOff val="35000"/>
+      </a:schemeClr>
+    </cs:fontRef>
+    <cs:spPr>
+      <a:ln w="9525" cap="flat" cmpd="sng" algn="ctr">
+        <a:solidFill>
+          <a:schemeClr val="tx1">
+            <a:lumMod val="15000"/>
+            <a:lumOff val="85000"/>
+          </a:schemeClr>
+        </a:solidFill>
+        <a:round/>
+      </a:ln>
+    </cs:spPr>
+    <cs:defRPr sz="1197" kern="1200"/>
+  </cs:categoryAxis>
+  <cs:chartArea mods="allowNoFillOverride allowNoLineOverride">
+    <cs:lnRef idx="0"/>
+    <cs:fillRef idx="0"/>
+    <cs:effectRef idx="0"/>
+    <cs:fontRef idx="minor">
+      <a:schemeClr val="tx1"/>
+    </cs:fontRef>
+    <cs:spPr>
+      <a:solidFill>
+        <a:schemeClr val="bg1"/>
+      </a:solidFill>
+      <a:ln w="9525" cap="flat" cmpd="sng" algn="ctr">
+        <a:solidFill>
+          <a:schemeClr val="tx1">
+            <a:lumMod val="15000"/>
+            <a:lumOff val="85000"/>
+          </a:schemeClr>
+        </a:solidFill>
+        <a:round/>
+      </a:ln>
+    </cs:spPr>
+    <cs:defRPr sz="1330" kern="1200"/>
+  </cs:chartArea>
+  <cs:dataLabel>
+    <cs:lnRef idx="0"/>
+    <cs:fillRef idx="0"/>
+    <cs:effectRef idx="0"/>
+    <cs:fontRef idx="minor">
+      <a:schemeClr val="tx1">
+        <a:lumMod val="75000"/>
+        <a:lumOff val="25000"/>
+      </a:schemeClr>
+    </cs:fontRef>
+    <cs:defRPr sz="1197" kern="1200"/>
+  </cs:dataLabel>
+  <cs:dataLabelCallout>
+    <cs:lnRef idx="0"/>
+    <cs:fillRef idx="0"/>
+    <cs:effectRef idx="0"/>
+    <cs:fontRef idx="minor">
+      <a:schemeClr val="dk1">
+        <a:lumMod val="65000"/>
+        <a:lumOff val="35000"/>
+      </a:schemeClr>
+    </cs:fontRef>
+    <cs:spPr>
+      <a:solidFill>
+        <a:schemeClr val="lt1"/>
+      </a:solidFill>
+      <a:ln>
+        <a:solidFill>
+          <a:schemeClr val="dk1">
+            <a:lumMod val="25000"/>
+            <a:lumOff val="75000"/>
+          </a:schemeClr>
+        </a:solidFill>
+      </a:ln>
+    </cs:spPr>
+    <cs:defRPr sz="1197" kern="1200"/>
+    <cs:bodyPr rot="0" spcFirstLastPara="1" vertOverflow="clip" horzOverflow="clip" vert="horz" wrap="square" lIns="36576" tIns="18288" rIns="36576" bIns="18288" anchor="ctr" anchorCtr="1">
+      <a:spAutoFit/>
+    </cs:bodyPr>
+  </cs:dataLabelCallout>
+  <cs:dataPoint>
+    <cs:lnRef idx="0"/>
+    <cs:fillRef idx="1">
+      <cs:styleClr val="auto"/>
+    </cs:fillRef>
+    <cs:effectRef idx="0"/>
+    <cs:fontRef idx="minor">
+      <a:schemeClr val="tx1"/>
+    </cs:fontRef>
+  </cs:dataPoint>
+  <cs:dataPoint3D>
+    <cs:lnRef idx="0"/>
+    <cs:fillRef idx="1">
+      <cs:styleClr val="auto"/>
+    </cs:fillRef>
+    <cs:effectRef idx="0"/>
+    <cs:fontRef idx="minor">
+      <a:schemeClr val="tx1"/>
+    </cs:fontRef>
+  </cs:dataPoint3D>
+  <cs:dataPointLine>
+    <cs:lnRef idx="0">
+      <cs:styleClr val="auto"/>
+    </cs:lnRef>
+    <cs:fillRef idx="1"/>
+    <cs:effectRef idx="0"/>
+    <cs:fontRef idx="minor">
+      <a:schemeClr val="tx1"/>
+    </cs:fontRef>
+    <cs:spPr>
+      <a:ln w="28575" cap="rnd">
+        <a:solidFill>
+          <a:schemeClr val="phClr"/>
+        </a:solidFill>
+        <a:round/>
+      </a:ln>
+    </cs:spPr>
+  </cs:dataPointLine>
+  <cs:dataPointMarker>
+    <cs:lnRef idx="0">
+      <cs:styleClr val="auto"/>
+    </cs:lnRef>
+    <cs:fillRef idx="1">
+      <cs:styleClr val="auto"/>
+    </cs:fillRef>
+    <cs:effectRef idx="0"/>
+    <cs:fontRef idx="minor">
+      <a:schemeClr val="tx1"/>
+    </cs:fontRef>
+    <cs:spPr>
+      <a:ln w="9525">
+        <a:solidFill>
+          <a:schemeClr val="phClr"/>
+        </a:solidFill>
+      </a:ln>
+    </cs:spPr>
+  </cs:dataPointMarker>
+  <cs:dataPointMarkerLayout symbol="circle" size="5"/>
+  <cs:dataPointWireframe>
+    <cs:lnRef idx="0">
+      <cs:styleClr val="auto"/>
+    </cs:lnRef>
+    <cs:fillRef idx="1"/>
+    <cs:effectRef idx="0"/>
+    <cs:fontRef idx="minor">
+      <a:schemeClr val="tx1"/>
+    </cs:fontRef>
+    <cs:spPr>
+      <a:ln w="9525" cap="rnd">
+        <a:solidFill>
+          <a:schemeClr val="phClr"/>
+        </a:solidFill>
+        <a:round/>
+      </a:ln>
+    </cs:spPr>
+  </cs:dataPointWireframe>
+  <cs:dataTable>
+    <cs:lnRef idx="0"/>
+    <cs:fillRef idx="0"/>
+    <cs:effectRef idx="0"/>
+    <cs:fontRef idx="minor">
+      <a:schemeClr val="tx1">
+        <a:lumMod val="65000"/>
+        <a:lumOff val="35000"/>
+      </a:schemeClr>
+    </cs:fontRef>
+    <cs:spPr>
+      <a:noFill/>
+      <a:ln w="9525" cap="flat" cmpd="sng" algn="ctr">
+        <a:solidFill>
+          <a:schemeClr val="tx1">
+            <a:lumMod val="15000"/>
+            <a:lumOff val="85000"/>
+          </a:schemeClr>
+        </a:solidFill>
+        <a:round/>
+      </a:ln>
+    </cs:spPr>
+    <cs:defRPr sz="1197" kern="1200"/>
+  </cs:dataTable>
+  <cs:downBar>
+    <cs:lnRef idx="0"/>
+    <cs:fillRef idx="0"/>
+    <cs:effectRef idx="0"/>
+    <cs:fontRef idx="minor">
+      <a:schemeClr val="dk1"/>
+    </cs:fontRef>
+    <cs:spPr>
+      <a:solidFill>
+        <a:schemeClr val="dk1">
+          <a:lumMod val="65000"/>
+          <a:lumOff val="35000"/>
+        </a:schemeClr>
+      </a:solidFill>
+      <a:ln w="9525">
+        <a:solidFill>
+          <a:schemeClr val="tx1">
+            <a:lumMod val="65000"/>
+            <a:lumOff val="35000"/>
+          </a:schemeClr>
+        </a:solidFill>
+      </a:ln>
+    </cs:spPr>
+  </cs:downBar>
+  <cs:dropLine>
+    <cs:lnRef idx="0"/>
+    <cs:fillRef idx="0"/>
+    <cs:effectRef idx="0"/>
+    <cs:fontRef idx="minor">
+      <a:schemeClr val="tx1"/>
+    </cs:fontRef>
+    <cs:spPr>
+      <a:ln w="9525" cap="flat" cmpd="sng" algn="ctr">
+        <a:solidFill>
+          <a:schemeClr val="tx1">
+            <a:lumMod val="35000"/>
+            <a:lumOff val="65000"/>
+          </a:schemeClr>
+        </a:solidFill>
+        <a:round/>
+      </a:ln>
+    </cs:spPr>
+  </cs:dropLine>
+  <cs:errorBar>
+    <cs:lnRef idx="0"/>
+    <cs:fillRef idx="0"/>
+    <cs:effectRef idx="0"/>
+    <cs:fontRef idx="minor">
+      <a:schemeClr val="tx1"/>
+    </cs:fontRef>
+    <cs:spPr>
+      <a:ln w="9525" cap="flat" cmpd="sng" algn="ctr">
+        <a:solidFill>
+          <a:schemeClr val="tx1">
+            <a:lumMod val="65000"/>
+            <a:lumOff val="35000"/>
+          </a:schemeClr>
+        </a:solidFill>
+        <a:round/>
+      </a:ln>
+    </cs:spPr>
+  </cs:errorBar>
+  <cs:floor>
+    <cs:lnRef idx="0"/>
+    <cs:fillRef idx="0"/>
+    <cs:effectRef idx="0"/>
+    <cs:fontRef idx="minor">
+      <a:schemeClr val="tx1"/>
+    </cs:fontRef>
+    <cs:spPr>
+      <a:noFill/>
+      <a:ln>
+        <a:noFill/>
+      </a:ln>
+    </cs:spPr>
+  </cs:floor>
+  <cs:gridlineMajor>
+    <cs:lnRef idx="0"/>
+    <cs:fillRef idx="0"/>
+    <cs:effectRef idx="0"/>
+    <cs:fontRef idx="minor">
+      <a:schemeClr val="tx1"/>
+    </cs:fontRef>
+    <cs:spPr>
+      <a:ln w="9525" cap="flat" cmpd="sng" algn="ctr">
+        <a:solidFill>
+          <a:schemeClr val="tx1">
+            <a:lumMod val="15000"/>
+            <a:lumOff val="85000"/>
+          </a:schemeClr>
+        </a:solidFill>
+        <a:round/>
+      </a:ln>
+    </cs:spPr>
+  </cs:gridlineMajor>
+  <cs:gridlineMinor>
+    <cs:lnRef idx="0"/>
+    <cs:fillRef idx="0"/>
+    <cs:effectRef idx="0"/>
+    <cs:fontRef idx="minor">
+      <a:schemeClr val="tx1"/>
+    </cs:fontRef>
+    <cs:spPr>
+      <a:ln w="9525" cap="flat" cmpd="sng" algn="ctr">
+        <a:solidFill>
+          <a:schemeClr val="tx1">
+            <a:lumMod val="5000"/>
+            <a:lumOff val="95000"/>
+          </a:schemeClr>
+        </a:solidFill>
+        <a:round/>
+      </a:ln>
+    </cs:spPr>
+  </cs:gridlineMinor>
+  <cs:hiLoLine>
+    <cs:lnRef idx="0"/>
+    <cs:fillRef idx="0"/>
+    <cs:effectRef idx="0"/>
+    <cs:fontRef idx="minor">
+      <a:schemeClr val="tx1"/>
+    </cs:fontRef>
+    <cs:spPr>
+      <a:ln w="9525" cap="flat" cmpd="sng" algn="ctr">
+        <a:solidFill>
+          <a:schemeClr val="tx1">
+            <a:lumMod val="75000"/>
+            <a:lumOff val="25000"/>
+          </a:schemeClr>
+        </a:solidFill>
+        <a:round/>
+      </a:ln>
+    </cs:spPr>
+  </cs:hiLoLine>
+  <cs:leaderLine>
+    <cs:lnRef idx="0"/>
+    <cs:fillRef idx="0"/>
+    <cs:effectRef idx="0"/>
+    <cs:fontRef idx="minor">
+      <a:schemeClr val="tx1"/>
+    </cs:fontRef>
+    <cs:spPr>
+      <a:ln w="9525" cap="flat" cmpd="sng" algn="ctr">
+        <a:solidFill>
+          <a:schemeClr val="tx1">
+            <a:lumMod val="35000"/>
+            <a:lumOff val="65000"/>
+          </a:schemeClr>
+        </a:solidFill>
+        <a:round/>
+      </a:ln>
+    </cs:spPr>
+  </cs:leaderLine>
+  <cs:legend>
+    <cs:lnRef idx="0"/>
+    <cs:fillRef idx="0"/>
+    <cs:effectRef idx="0"/>
+    <cs:fontRef idx="minor">
+      <a:schemeClr val="tx1">
+        <a:lumMod val="65000"/>
+        <a:lumOff val="35000"/>
+      </a:schemeClr>
+    </cs:fontRef>
+    <cs:defRPr sz="1197" kern="1200"/>
+  </cs:legend>
+  <cs:plotArea mods="allowNoFillOverride allowNoLineOverride">
+    <cs:lnRef idx="0"/>
+    <cs:fillRef idx="0"/>
+    <cs:effectRef idx="0"/>
+    <cs:fontRef idx="minor">
+      <a:schemeClr val="tx1"/>
+    </cs:fontRef>
+  </cs:plotArea>
+  <cs:plotArea3D mods="allowNoFillOverride allowNoLineOverride">
+    <cs:lnRef idx="0"/>
+    <cs:fillRef idx="0"/>
+    <cs:effectRef idx="0"/>
+    <cs:fontRef idx="minor">
+      <a:schemeClr val="tx1"/>
+    </cs:fontRef>
+  </cs:plotArea3D>
+  <cs:seriesAxis>
+    <cs:lnRef idx="0"/>
+    <cs:fillRef idx="0"/>
+    <cs:effectRef idx="0"/>
+    <cs:fontRef idx="minor">
+      <a:schemeClr val="tx1">
+        <a:lumMod val="65000"/>
+        <a:lumOff val="35000"/>
+      </a:schemeClr>
+    </cs:fontRef>
+    <cs:defRPr sz="1197" kern="1200"/>
+  </cs:seriesAxis>
+  <cs:seriesLine>
+    <cs:lnRef idx="0"/>
+    <cs:fillRef idx="0"/>
+    <cs:effectRef idx="0"/>
+    <cs:fontRef idx="minor">
+      <a:schemeClr val="tx1"/>
+    </cs:fontRef>
+    <cs:spPr>
+      <a:ln w="9525" cap="flat" cmpd="sng" algn="ctr">
+        <a:solidFill>
+          <a:schemeClr val="tx1">
+            <a:lumMod val="35000"/>
+            <a:lumOff val="65000"/>
+          </a:schemeClr>
+        </a:solidFill>
+        <a:round/>
+      </a:ln>
+    </cs:spPr>
+  </cs:seriesLine>
+  <cs:title>
+    <cs:lnRef idx="0"/>
+    <cs:fillRef idx="0"/>
+    <cs:effectRef idx="0"/>
+    <cs:fontRef idx="minor">
+      <a:schemeClr val="tx1">
+        <a:lumMod val="65000"/>
+        <a:lumOff val="35000"/>
+      </a:schemeClr>
+    </cs:fontRef>
+    <cs:defRPr sz="1862" b="0" kern="1200" spc="0" baseline="0"/>
+  </cs:title>
+  <cs:trendline>
+    <cs:lnRef idx="0">
+      <cs:styleClr val="auto"/>
+    </cs:lnRef>
+    <cs:fillRef idx="0"/>
+    <cs:effectRef idx="0"/>
+    <cs:fontRef idx="minor">
+      <a:schemeClr val="tx1"/>
+    </cs:fontRef>
+    <cs:spPr>
+      <a:ln w="19050" cap="rnd">
+        <a:solidFill>
+          <a:schemeClr val="phClr"/>
+        </a:solidFill>
+        <a:prstDash val="sysDot"/>
+      </a:ln>
+    </cs:spPr>
+  </cs:trendline>
+  <cs:trendlineLabel>
+    <cs:lnRef idx="0"/>
+    <cs:fillRef idx="0"/>
+    <cs:effectRef idx="0"/>
+    <cs:fontRef idx="minor">
+      <a:schemeClr val="tx1">
+        <a:lumMod val="65000"/>
+        <a:lumOff val="35000"/>
+      </a:schemeClr>
+    </cs:fontRef>
+    <cs:defRPr sz="1197" kern="1200"/>
+  </cs:trendlineLabel>
+  <cs:upBar>
+    <cs:lnRef idx="0"/>
+    <cs:fillRef idx="0"/>
+    <cs:effectRef idx="0"/>
+    <cs:fontRef idx="minor">
+      <a:schemeClr val="dk1"/>
+    </cs:fontRef>
+    <cs:spPr>
+      <a:solidFill>
+        <a:schemeClr val="lt1"/>
+      </a:solidFill>
+      <a:ln w="9525">
+        <a:solidFill>
+          <a:schemeClr val="tx1">
+            <a:lumMod val="15000"/>
+            <a:lumOff val="85000"/>
+          </a:schemeClr>
+        </a:solidFill>
+      </a:ln>
+    </cs:spPr>
+  </cs:upBar>
+  <cs:valueAxis>
+    <cs:lnRef idx="0"/>
+    <cs:fillRef idx="0"/>
+    <cs:effectRef idx="0"/>
+    <cs:fontRef idx="minor">
+      <a:schemeClr val="tx1">
+        <a:lumMod val="65000"/>
+        <a:lumOff val="35000"/>
+      </a:schemeClr>
+    </cs:fontRef>
+    <cs:defRPr sz="1197" kern="1200"/>
+  </cs:valueAxis>
+  <cs:wall>
+    <cs:lnRef idx="0"/>
+    <cs:fillRef idx="0"/>
+    <cs:effectRef idx="0"/>
+    <cs:fontRef idx="minor">
+      <a:schemeClr val="tx1"/>
+    </cs:fontRef>
+    <cs:spPr>
+      <a:noFill/>
+      <a:ln>
+        <a:noFill/>
+      </a:ln>
+    </cs:spPr>
+  </cs:wall>
+</cs:chartStyle>
 </file>
 
 <file path=ppt/slideLayouts/slideLayout1.xml><?xml version="1.0" encoding="utf-8"?>
@@ -261,7 +1334,7 @@
           <a:p>
             <a:fld id="{07F3CF67-C4D4-4073-9E88-4C8232DDB3C3}" type="datetimeFigureOut">
               <a:rPr lang="de-DE" smtClean="0"/>
-              <a:t>08.11.2024</a:t>
+              <a:t>10.11.2024</a:t>
             </a:fld>
             <a:endParaRPr lang="de-DE"/>
           </a:p>
@@ -459,7 +1532,7 @@
           <a:p>
             <a:fld id="{07F3CF67-C4D4-4073-9E88-4C8232DDB3C3}" type="datetimeFigureOut">
               <a:rPr lang="de-DE" smtClean="0"/>
-              <a:t>08.11.2024</a:t>
+              <a:t>10.11.2024</a:t>
             </a:fld>
             <a:endParaRPr lang="de-DE"/>
           </a:p>
@@ -667,7 +1740,7 @@
           <a:p>
             <a:fld id="{07F3CF67-C4D4-4073-9E88-4C8232DDB3C3}" type="datetimeFigureOut">
               <a:rPr lang="de-DE" smtClean="0"/>
-              <a:t>08.11.2024</a:t>
+              <a:t>10.11.2024</a:t>
             </a:fld>
             <a:endParaRPr lang="de-DE"/>
           </a:p>
@@ -865,7 +1938,7 @@
           <a:p>
             <a:fld id="{07F3CF67-C4D4-4073-9E88-4C8232DDB3C3}" type="datetimeFigureOut">
               <a:rPr lang="de-DE" smtClean="0"/>
-              <a:t>08.11.2024</a:t>
+              <a:t>10.11.2024</a:t>
             </a:fld>
             <a:endParaRPr lang="de-DE"/>
           </a:p>
@@ -1140,7 +2213,7 @@
           <a:p>
             <a:fld id="{07F3CF67-C4D4-4073-9E88-4C8232DDB3C3}" type="datetimeFigureOut">
               <a:rPr lang="de-DE" smtClean="0"/>
-              <a:t>08.11.2024</a:t>
+              <a:t>10.11.2024</a:t>
             </a:fld>
             <a:endParaRPr lang="de-DE"/>
           </a:p>
@@ -1405,7 +2478,7 @@
           <a:p>
             <a:fld id="{07F3CF67-C4D4-4073-9E88-4C8232DDB3C3}" type="datetimeFigureOut">
               <a:rPr lang="de-DE" smtClean="0"/>
-              <a:t>08.11.2024</a:t>
+              <a:t>10.11.2024</a:t>
             </a:fld>
             <a:endParaRPr lang="de-DE"/>
           </a:p>
@@ -1817,7 +2890,7 @@
           <a:p>
             <a:fld id="{07F3CF67-C4D4-4073-9E88-4C8232DDB3C3}" type="datetimeFigureOut">
               <a:rPr lang="de-DE" smtClean="0"/>
-              <a:t>08.11.2024</a:t>
+              <a:t>10.11.2024</a:t>
             </a:fld>
             <a:endParaRPr lang="de-DE"/>
           </a:p>
@@ -1958,7 +3031,7 @@
           <a:p>
             <a:fld id="{07F3CF67-C4D4-4073-9E88-4C8232DDB3C3}" type="datetimeFigureOut">
               <a:rPr lang="de-DE" smtClean="0"/>
-              <a:t>08.11.2024</a:t>
+              <a:t>10.11.2024</a:t>
             </a:fld>
             <a:endParaRPr lang="de-DE"/>
           </a:p>
@@ -2071,7 +3144,7 @@
           <a:p>
             <a:fld id="{07F3CF67-C4D4-4073-9E88-4C8232DDB3C3}" type="datetimeFigureOut">
               <a:rPr lang="de-DE" smtClean="0"/>
-              <a:t>08.11.2024</a:t>
+              <a:t>10.11.2024</a:t>
             </a:fld>
             <a:endParaRPr lang="de-DE"/>
           </a:p>
@@ -2382,7 +3455,7 @@
           <a:p>
             <a:fld id="{07F3CF67-C4D4-4073-9E88-4C8232DDB3C3}" type="datetimeFigureOut">
               <a:rPr lang="de-DE" smtClean="0"/>
-              <a:t>08.11.2024</a:t>
+              <a:t>10.11.2024</a:t>
             </a:fld>
             <a:endParaRPr lang="de-DE"/>
           </a:p>
@@ -2670,7 +3743,7 @@
           <a:p>
             <a:fld id="{07F3CF67-C4D4-4073-9E88-4C8232DDB3C3}" type="datetimeFigureOut">
               <a:rPr lang="de-DE" smtClean="0"/>
-              <a:t>08.11.2024</a:t>
+              <a:t>10.11.2024</a:t>
             </a:fld>
             <a:endParaRPr lang="de-DE"/>
           </a:p>
@@ -2911,7 +3984,7 @@
           <a:p>
             <a:fld id="{07F3CF67-C4D4-4073-9E88-4C8232DDB3C3}" type="datetimeFigureOut">
               <a:rPr lang="de-DE" smtClean="0"/>
-              <a:t>08.11.2024</a:t>
+              <a:t>10.11.2024</a:t>
             </a:fld>
             <a:endParaRPr lang="de-DE"/>
           </a:p>
@@ -3511,41 +4584,21 @@
           <a:lstStyle/>
           <a:p>
             <a:r>
-              <a:rPr lang="de-DE" sz="3200" dirty="0">
-                <a:solidFill>
-                  <a:srgbClr val="595959"/>
-                </a:solidFill>
-              </a:rPr>
+              <a:rPr lang="de-DE" sz="3200" dirty="0"/>
               <a:t>Computer Vision</a:t>
             </a:r>
             <a:br>
-              <a:rPr lang="de-DE" sz="3200" dirty="0">
-                <a:solidFill>
-                  <a:srgbClr val="595959"/>
-                </a:solidFill>
-              </a:rPr>
+              <a:rPr lang="de-DE" sz="3200" dirty="0"/>
             </a:br>
             <a:r>
-              <a:rPr lang="de-DE" sz="3200" dirty="0">
-                <a:solidFill>
-                  <a:srgbClr val="595959"/>
-                </a:solidFill>
-              </a:rPr>
+              <a:rPr lang="de-DE" sz="3200" dirty="0"/>
               <a:t>Background </a:t>
             </a:r>
             <a:r>
-              <a:rPr lang="de-DE" sz="3200" dirty="0" err="1">
-                <a:solidFill>
-                  <a:srgbClr val="595959"/>
-                </a:solidFill>
-              </a:rPr>
+              <a:rPr lang="de-DE" sz="3200" dirty="0" err="1"/>
               <a:t>Subtraction</a:t>
             </a:r>
-            <a:endParaRPr lang="de-DE" sz="3200" dirty="0">
-              <a:solidFill>
-                <a:srgbClr val="595959"/>
-              </a:solidFill>
-            </a:endParaRPr>
+            <a:endParaRPr lang="de-DE" sz="3200" dirty="0"/>
           </a:p>
         </p:txBody>
       </p:sp>
@@ -3616,8 +4669,8 @@
         </p:blipFill>
         <p:spPr>
           <a:xfrm>
-            <a:off x="6810935" y="3017110"/>
-            <a:ext cx="4018430" cy="823780"/>
+            <a:off x="7692023" y="3106181"/>
+            <a:ext cx="3027369" cy="620612"/>
           </a:xfrm>
           <a:prstGeom prst="rect">
             <a:avLst/>
@@ -3628,6 +4681,694 @@
     <p:extLst>
       <p:ext uri="{BB962C8B-B14F-4D97-AF65-F5344CB8AC3E}">
         <p14:creationId xmlns:p14="http://schemas.microsoft.com/office/powerpoint/2010/main" val="4241017807"/>
+      </p:ext>
+    </p:extLst>
+  </p:cSld>
+  <p:clrMapOvr>
+    <a:masterClrMapping/>
+  </p:clrMapOvr>
+</p:sld>
+</file>
+
+<file path=ppt/slides/slide10.xml><?xml version="1.0" encoding="utf-8"?>
+<p:sld xmlns:a="http://schemas.openxmlformats.org/drawingml/2006/main" xmlns:r="http://schemas.openxmlformats.org/officeDocument/2006/relationships" xmlns:p="http://schemas.openxmlformats.org/presentationml/2006/main">
+  <p:cSld>
+    <p:bg>
+      <p:bgPr>
+        <a:solidFill>
+          <a:schemeClr val="bg1"/>
+        </a:solidFill>
+        <a:effectLst/>
+      </p:bgPr>
+    </p:bg>
+    <p:spTree>
+      <p:nvGrpSpPr>
+        <p:cNvPr id="1" name="">
+          <a:extLst>
+            <a:ext uri="{FF2B5EF4-FFF2-40B4-BE49-F238E27FC236}">
+              <a16:creationId xmlns:a16="http://schemas.microsoft.com/office/drawing/2014/main" id="{0F2B80D0-E442-81AE-4F21-3C8BC7EB3D6B}"/>
+            </a:ext>
+          </a:extLst>
+        </p:cNvPr>
+        <p:cNvGrpSpPr/>
+        <p:nvPr/>
+      </p:nvGrpSpPr>
+      <p:grpSpPr>
+        <a:xfrm>
+          <a:off x="0" y="0"/>
+          <a:ext cx="0" cy="0"/>
+          <a:chOff x="0" y="0"/>
+          <a:chExt cx="0" cy="0"/>
+        </a:xfrm>
+      </p:grpSpPr>
+      <p:sp useBgFill="1">
+        <p:nvSpPr>
+          <p:cNvPr id="9" name="Rectangle 8">
+            <a:extLst>
+              <a:ext uri="{FF2B5EF4-FFF2-40B4-BE49-F238E27FC236}">
+                <a16:creationId xmlns:a16="http://schemas.microsoft.com/office/drawing/2014/main" id="{606C3D53-BA0C-1A67-BB31-0478C940321B}"/>
+              </a:ext>
+              <a:ext uri="{C183D7F6-B498-43B3-948B-1728B52AA6E4}">
+                <adec:decorative xmlns:adec="http://schemas.microsoft.com/office/drawing/2017/decorative" val="1"/>
+              </a:ext>
+            </a:extLst>
+          </p:cNvPr>
+          <p:cNvSpPr>
+            <a:spLocks noGrp="1" noRot="1" noChangeAspect="1" noMove="1" noResize="1" noEditPoints="1" noAdjustHandles="1" noChangeArrowheads="1" noChangeShapeType="1" noTextEdit="1"/>
+          </p:cNvSpPr>
+          <p:nvPr>
+            <p:extLst>
+              <p:ext uri="{386F3935-93C4-4BCD-93E2-E3B085C9AB24}">
+                <p16:designElem xmlns:p16="http://schemas.microsoft.com/office/powerpoint/2015/main" val="1"/>
+              </p:ext>
+            </p:extLst>
+          </p:nvPr>
+        </p:nvSpPr>
+        <p:spPr>
+          <a:xfrm>
+            <a:off x="0" y="0"/>
+            <a:ext cx="12192000" cy="6858000"/>
+          </a:xfrm>
+          <a:prstGeom prst="rect">
+            <a:avLst/>
+          </a:prstGeom>
+          <a:ln>
+            <a:noFill/>
+          </a:ln>
+        </p:spPr>
+        <p:style>
+          <a:lnRef idx="2">
+            <a:schemeClr val="accent1">
+              <a:shade val="50000"/>
+            </a:schemeClr>
+          </a:lnRef>
+          <a:fillRef idx="1">
+            <a:schemeClr val="accent1"/>
+          </a:fillRef>
+          <a:effectRef idx="0">
+            <a:schemeClr val="accent1"/>
+          </a:effectRef>
+          <a:fontRef idx="minor">
+            <a:schemeClr val="lt1"/>
+          </a:fontRef>
+        </p:style>
+        <p:txBody>
+          <a:bodyPr rtlCol="0" anchor="ctr"/>
+          <a:lstStyle/>
+          <a:p>
+            <a:pPr algn="ctr"/>
+            <a:endParaRPr lang="en-US"/>
+          </a:p>
+        </p:txBody>
+      </p:sp>
+      <p:sp>
+        <p:nvSpPr>
+          <p:cNvPr id="2" name="Titel 1">
+            <a:extLst>
+              <a:ext uri="{FF2B5EF4-FFF2-40B4-BE49-F238E27FC236}">
+                <a16:creationId xmlns:a16="http://schemas.microsoft.com/office/drawing/2014/main" id="{B226E8EF-5DBA-8EAA-18C5-9A666D9DC7A6}"/>
+              </a:ext>
+            </a:extLst>
+          </p:cNvPr>
+          <p:cNvSpPr>
+            <a:spLocks noGrp="1"/>
+          </p:cNvSpPr>
+          <p:nvPr>
+            <p:ph type="title"/>
+          </p:nvPr>
+        </p:nvSpPr>
+        <p:spPr>
+          <a:xfrm>
+            <a:off x="411480" y="991443"/>
+            <a:ext cx="4443154" cy="1087819"/>
+          </a:xfrm>
+        </p:spPr>
+        <p:txBody>
+          <a:bodyPr anchor="b">
+            <a:normAutofit/>
+          </a:bodyPr>
+          <a:lstStyle/>
+          <a:p>
+            <a:r>
+              <a:rPr lang="de-DE" sz="3400" dirty="0"/>
+              <a:t>Performance</a:t>
+            </a:r>
+          </a:p>
+        </p:txBody>
+      </p:sp>
+      <p:sp>
+        <p:nvSpPr>
+          <p:cNvPr id="11" name="Rectangle 10">
+            <a:extLst>
+              <a:ext uri="{FF2B5EF4-FFF2-40B4-BE49-F238E27FC236}">
+                <a16:creationId xmlns:a16="http://schemas.microsoft.com/office/drawing/2014/main" id="{D9D642C8-3556-EF7E-8EB3-85CA924D97DA}"/>
+              </a:ext>
+              <a:ext uri="{C183D7F6-B498-43B3-948B-1728B52AA6E4}">
+                <adec:decorative xmlns:adec="http://schemas.microsoft.com/office/drawing/2017/decorative" val="1"/>
+              </a:ext>
+            </a:extLst>
+          </p:cNvPr>
+          <p:cNvSpPr>
+            <a:spLocks noGrp="1" noRot="1" noChangeAspect="1" noMove="1" noResize="1" noEditPoints="1" noAdjustHandles="1" noChangeArrowheads="1" noChangeShapeType="1" noTextEdit="1"/>
+          </p:cNvSpPr>
+          <p:nvPr>
+            <p:extLst>
+              <p:ext uri="{386F3935-93C4-4BCD-93E2-E3B085C9AB24}">
+                <p16:designElem xmlns:p16="http://schemas.microsoft.com/office/powerpoint/2015/main" val="1"/>
+              </p:ext>
+            </p:extLst>
+          </p:nvPr>
+        </p:nvSpPr>
+        <p:spPr>
+          <a:xfrm rot="5400000">
+            <a:off x="649223" y="387939"/>
+            <a:ext cx="73152" cy="548640"/>
+          </a:xfrm>
+          <a:prstGeom prst="rect">
+            <a:avLst/>
+          </a:prstGeom>
+          <a:solidFill>
+            <a:schemeClr val="accent2"/>
+          </a:solidFill>
+          <a:ln>
+            <a:noFill/>
+          </a:ln>
+        </p:spPr>
+        <p:style>
+          <a:lnRef idx="2">
+            <a:schemeClr val="accent1">
+              <a:shade val="50000"/>
+            </a:schemeClr>
+          </a:lnRef>
+          <a:fillRef idx="1">
+            <a:schemeClr val="accent1"/>
+          </a:fillRef>
+          <a:effectRef idx="0">
+            <a:schemeClr val="accent1"/>
+          </a:effectRef>
+          <a:fontRef idx="minor">
+            <a:schemeClr val="lt1"/>
+          </a:fontRef>
+        </p:style>
+        <p:txBody>
+          <a:bodyPr rtlCol="0" anchor="ctr"/>
+          <a:lstStyle/>
+          <a:p>
+            <a:pPr algn="ctr"/>
+            <a:endParaRPr lang="en-US">
+              <a:solidFill>
+                <a:prstClr val="white"/>
+              </a:solidFill>
+              <a:latin typeface="Calibri" panose="020F0502020204030204"/>
+            </a:endParaRPr>
+          </a:p>
+        </p:txBody>
+      </p:sp>
+      <p:sp>
+        <p:nvSpPr>
+          <p:cNvPr id="13" name="Rectangle 12">
+            <a:extLst>
+              <a:ext uri="{FF2B5EF4-FFF2-40B4-BE49-F238E27FC236}">
+                <a16:creationId xmlns:a16="http://schemas.microsoft.com/office/drawing/2014/main" id="{609E63CE-2895-D50E-9D21-310E6C4629DD}"/>
+              </a:ext>
+              <a:ext uri="{C183D7F6-B498-43B3-948B-1728B52AA6E4}">
+                <adec:decorative xmlns:adec="http://schemas.microsoft.com/office/drawing/2017/decorative" val="1"/>
+              </a:ext>
+            </a:extLst>
+          </p:cNvPr>
+          <p:cNvSpPr>
+            <a:spLocks noGrp="1" noRot="1" noChangeAspect="1" noMove="1" noResize="1" noEditPoints="1" noAdjustHandles="1" noChangeArrowheads="1" noChangeShapeType="1" noTextEdit="1"/>
+          </p:cNvSpPr>
+          <p:nvPr>
+            <p:extLst>
+              <p:ext uri="{386F3935-93C4-4BCD-93E2-E3B085C9AB24}">
+                <p16:designElem xmlns:p16="http://schemas.microsoft.com/office/powerpoint/2015/main" val="1"/>
+              </p:ext>
+            </p:extLst>
+          </p:nvPr>
+        </p:nvSpPr>
+        <p:spPr>
+          <a:xfrm>
+            <a:off x="411480" y="2285541"/>
+            <a:ext cx="4389120" cy="18288"/>
+          </a:xfrm>
+          <a:prstGeom prst="rect">
+            <a:avLst/>
+          </a:prstGeom>
+          <a:solidFill>
+            <a:srgbClr val="D5D5D5"/>
+          </a:solidFill>
+          <a:ln w="3175">
+            <a:noFill/>
+          </a:ln>
+          <a:effectLst/>
+        </p:spPr>
+        <p:style>
+          <a:lnRef idx="2">
+            <a:schemeClr val="accent1">
+              <a:shade val="50000"/>
+            </a:schemeClr>
+          </a:lnRef>
+          <a:fillRef idx="1">
+            <a:schemeClr val="accent1"/>
+          </a:fillRef>
+          <a:effectRef idx="0">
+            <a:schemeClr val="accent1"/>
+          </a:effectRef>
+          <a:fontRef idx="minor">
+            <a:schemeClr val="lt1"/>
+          </a:fontRef>
+        </p:style>
+        <p:txBody>
+          <a:bodyPr rtlCol="0" anchor="ctr"/>
+          <a:lstStyle/>
+          <a:p>
+            <a:pPr algn="ctr"/>
+            <a:endParaRPr lang="en-US">
+              <a:solidFill>
+                <a:prstClr val="white"/>
+              </a:solidFill>
+              <a:latin typeface="Calibri" panose="020F0502020204030204"/>
+            </a:endParaRPr>
+          </a:p>
+        </p:txBody>
+      </p:sp>
+      <p:graphicFrame>
+        <p:nvGraphicFramePr>
+          <p:cNvPr id="4" name="Inhaltsplatzhalter 5">
+            <a:extLst>
+              <a:ext uri="{FF2B5EF4-FFF2-40B4-BE49-F238E27FC236}">
+                <a16:creationId xmlns:a16="http://schemas.microsoft.com/office/drawing/2014/main" id="{DAC58118-636D-F1FA-CB87-55D8C3AC6AFB}"/>
+              </a:ext>
+            </a:extLst>
+          </p:cNvPr>
+          <p:cNvGraphicFramePr>
+            <a:graphicFrameLocks noGrp="1"/>
+          </p:cNvGraphicFramePr>
+          <p:nvPr>
+            <p:ph idx="1"/>
+            <p:extLst>
+              <p:ext uri="{D42A27DB-BD31-4B8C-83A1-F6EECF244321}">
+                <p14:modId xmlns:p14="http://schemas.microsoft.com/office/powerpoint/2010/main" val="4094620823"/>
+              </p:ext>
+            </p:extLst>
+          </p:nvPr>
+        </p:nvGraphicFramePr>
+        <p:xfrm>
+          <a:off x="411163" y="2684463"/>
+          <a:ext cx="5081587" cy="3492500"/>
+        </p:xfrm>
+        <a:graphic>
+          <a:graphicData uri="http://schemas.openxmlformats.org/drawingml/2006/chart">
+            <c:chart xmlns:c="http://schemas.openxmlformats.org/drawingml/2006/chart" xmlns:r="http://schemas.openxmlformats.org/officeDocument/2006/relationships" r:id="rId2"/>
+          </a:graphicData>
+        </a:graphic>
+      </p:graphicFrame>
+      <p:sp>
+        <p:nvSpPr>
+          <p:cNvPr id="5" name="Textfeld 4">
+            <a:extLst>
+              <a:ext uri="{FF2B5EF4-FFF2-40B4-BE49-F238E27FC236}">
+                <a16:creationId xmlns:a16="http://schemas.microsoft.com/office/drawing/2014/main" id="{F6E544A6-3F1A-CF06-3447-01D20EC5D8B2}"/>
+              </a:ext>
+            </a:extLst>
+          </p:cNvPr>
+          <p:cNvSpPr txBox="1"/>
+          <p:nvPr/>
+        </p:nvSpPr>
+        <p:spPr>
+          <a:xfrm>
+            <a:off x="6539948" y="2684463"/>
+            <a:ext cx="4389120" cy="1754326"/>
+          </a:xfrm>
+          <a:prstGeom prst="rect">
+            <a:avLst/>
+          </a:prstGeom>
+          <a:noFill/>
+        </p:spPr>
+        <p:txBody>
+          <a:bodyPr wrap="square" rtlCol="0">
+            <a:spAutoFit/>
+          </a:bodyPr>
+          <a:lstStyle/>
+          <a:p>
+            <a:pPr marL="285750" indent="-285750">
+              <a:buFont typeface="Arial" panose="020B0604020202020204" pitchFamily="34" charset="0"/>
+              <a:buChar char="•"/>
+            </a:pPr>
+            <a:r>
+              <a:rPr lang="de-DE" dirty="0"/>
+              <a:t>Durchschnittlich 2-3 Parameter</a:t>
+            </a:r>
+          </a:p>
+          <a:p>
+            <a:pPr marL="285750" indent="-285750">
+              <a:buFont typeface="Arial" panose="020B0604020202020204" pitchFamily="34" charset="0"/>
+              <a:buChar char="•"/>
+            </a:pPr>
+            <a:r>
+              <a:rPr lang="de-DE" dirty="0"/>
+              <a:t>TODO: Parameter anpassen</a:t>
+            </a:r>
+          </a:p>
+          <a:p>
+            <a:pPr marL="285750" indent="-285750">
+              <a:buFont typeface="Arial" panose="020B0604020202020204" pitchFamily="34" charset="0"/>
+              <a:buChar char="•"/>
+            </a:pPr>
+            <a:r>
+              <a:rPr lang="de-DE" dirty="0"/>
+              <a:t>TODO: Diagramm anpassen/überarbeiten</a:t>
+            </a:r>
+            <a:br>
+              <a:rPr lang="de-DE" dirty="0"/>
+            </a:br>
+            <a:r>
+              <a:rPr lang="de-DE" dirty="0"/>
+              <a:t>TODO: FPS auf 60 drosseln</a:t>
+            </a:r>
+          </a:p>
+          <a:p>
+            <a:pPr marL="285750" indent="-285750">
+              <a:buFont typeface="Arial" panose="020B0604020202020204" pitchFamily="34" charset="0"/>
+              <a:buChar char="•"/>
+            </a:pPr>
+            <a:endParaRPr lang="de-DE" dirty="0"/>
+          </a:p>
+        </p:txBody>
+      </p:sp>
+    </p:spTree>
+    <p:extLst>
+      <p:ext uri="{BB962C8B-B14F-4D97-AF65-F5344CB8AC3E}">
+        <p14:creationId xmlns:p14="http://schemas.microsoft.com/office/powerpoint/2010/main" val="2418747682"/>
+      </p:ext>
+    </p:extLst>
+  </p:cSld>
+  <p:clrMapOvr>
+    <a:masterClrMapping/>
+  </p:clrMapOvr>
+</p:sld>
+</file>
+
+<file path=ppt/slides/slide11.xml><?xml version="1.0" encoding="utf-8"?>
+<p:sld xmlns:a="http://schemas.openxmlformats.org/drawingml/2006/main" xmlns:r="http://schemas.openxmlformats.org/officeDocument/2006/relationships" xmlns:p="http://schemas.openxmlformats.org/presentationml/2006/main">
+  <p:cSld>
+    <p:bg>
+      <p:bgPr>
+        <a:solidFill>
+          <a:schemeClr val="bg1"/>
+        </a:solidFill>
+        <a:effectLst/>
+      </p:bgPr>
+    </p:bg>
+    <p:spTree>
+      <p:nvGrpSpPr>
+        <p:cNvPr id="1" name="">
+          <a:extLst>
+            <a:ext uri="{FF2B5EF4-FFF2-40B4-BE49-F238E27FC236}">
+              <a16:creationId xmlns:a16="http://schemas.microsoft.com/office/drawing/2014/main" id="{C0DC2677-306B-9F87-30D7-4045B9484D32}"/>
+            </a:ext>
+          </a:extLst>
+        </p:cNvPr>
+        <p:cNvGrpSpPr/>
+        <p:nvPr/>
+      </p:nvGrpSpPr>
+      <p:grpSpPr>
+        <a:xfrm>
+          <a:off x="0" y="0"/>
+          <a:ext cx="0" cy="0"/>
+          <a:chOff x="0" y="0"/>
+          <a:chExt cx="0" cy="0"/>
+        </a:xfrm>
+      </p:grpSpPr>
+      <p:sp useBgFill="1">
+        <p:nvSpPr>
+          <p:cNvPr id="9" name="Rectangle 8">
+            <a:extLst>
+              <a:ext uri="{FF2B5EF4-FFF2-40B4-BE49-F238E27FC236}">
+                <a16:creationId xmlns:a16="http://schemas.microsoft.com/office/drawing/2014/main" id="{3E85D859-F71A-69BF-B75E-98A6E76970BE}"/>
+              </a:ext>
+              <a:ext uri="{C183D7F6-B498-43B3-948B-1728B52AA6E4}">
+                <adec:decorative xmlns:adec="http://schemas.microsoft.com/office/drawing/2017/decorative" val="1"/>
+              </a:ext>
+            </a:extLst>
+          </p:cNvPr>
+          <p:cNvSpPr>
+            <a:spLocks noGrp="1" noRot="1" noChangeAspect="1" noMove="1" noResize="1" noEditPoints="1" noAdjustHandles="1" noChangeArrowheads="1" noChangeShapeType="1" noTextEdit="1"/>
+          </p:cNvSpPr>
+          <p:nvPr>
+            <p:extLst>
+              <p:ext uri="{386F3935-93C4-4BCD-93E2-E3B085C9AB24}">
+                <p16:designElem xmlns:p16="http://schemas.microsoft.com/office/powerpoint/2015/main" val="1"/>
+              </p:ext>
+            </p:extLst>
+          </p:nvPr>
+        </p:nvSpPr>
+        <p:spPr>
+          <a:xfrm>
+            <a:off x="0" y="0"/>
+            <a:ext cx="12192000" cy="6858000"/>
+          </a:xfrm>
+          <a:prstGeom prst="rect">
+            <a:avLst/>
+          </a:prstGeom>
+          <a:ln>
+            <a:noFill/>
+          </a:ln>
+        </p:spPr>
+        <p:style>
+          <a:lnRef idx="2">
+            <a:schemeClr val="accent1">
+              <a:shade val="50000"/>
+            </a:schemeClr>
+          </a:lnRef>
+          <a:fillRef idx="1">
+            <a:schemeClr val="accent1"/>
+          </a:fillRef>
+          <a:effectRef idx="0">
+            <a:schemeClr val="accent1"/>
+          </a:effectRef>
+          <a:fontRef idx="minor">
+            <a:schemeClr val="lt1"/>
+          </a:fontRef>
+        </p:style>
+        <p:txBody>
+          <a:bodyPr rtlCol="0" anchor="ctr"/>
+          <a:lstStyle/>
+          <a:p>
+            <a:pPr algn="ctr"/>
+            <a:endParaRPr lang="en-US"/>
+          </a:p>
+        </p:txBody>
+      </p:sp>
+      <p:sp>
+        <p:nvSpPr>
+          <p:cNvPr id="2" name="Titel 1">
+            <a:extLst>
+              <a:ext uri="{FF2B5EF4-FFF2-40B4-BE49-F238E27FC236}">
+                <a16:creationId xmlns:a16="http://schemas.microsoft.com/office/drawing/2014/main" id="{BB1CA8FC-801F-E2BE-C05B-E44C3347112B}"/>
+              </a:ext>
+            </a:extLst>
+          </p:cNvPr>
+          <p:cNvSpPr>
+            <a:spLocks noGrp="1"/>
+          </p:cNvSpPr>
+          <p:nvPr>
+            <p:ph type="title"/>
+          </p:nvPr>
+        </p:nvSpPr>
+        <p:spPr>
+          <a:xfrm>
+            <a:off x="411480" y="991443"/>
+            <a:ext cx="4443154" cy="1087819"/>
+          </a:xfrm>
+        </p:spPr>
+        <p:txBody>
+          <a:bodyPr anchor="b">
+            <a:normAutofit/>
+          </a:bodyPr>
+          <a:lstStyle/>
+          <a:p>
+            <a:r>
+              <a:rPr lang="de-DE" sz="3400" dirty="0"/>
+              <a:t>Rauschfreiheit	</a:t>
+            </a:r>
+          </a:p>
+        </p:txBody>
+      </p:sp>
+      <p:sp>
+        <p:nvSpPr>
+          <p:cNvPr id="11" name="Rectangle 10">
+            <a:extLst>
+              <a:ext uri="{FF2B5EF4-FFF2-40B4-BE49-F238E27FC236}">
+                <a16:creationId xmlns:a16="http://schemas.microsoft.com/office/drawing/2014/main" id="{2CD09708-A401-B222-FC30-D777D92F4BE2}"/>
+              </a:ext>
+              <a:ext uri="{C183D7F6-B498-43B3-948B-1728B52AA6E4}">
+                <adec:decorative xmlns:adec="http://schemas.microsoft.com/office/drawing/2017/decorative" val="1"/>
+              </a:ext>
+            </a:extLst>
+          </p:cNvPr>
+          <p:cNvSpPr>
+            <a:spLocks noGrp="1" noRot="1" noChangeAspect="1" noMove="1" noResize="1" noEditPoints="1" noAdjustHandles="1" noChangeArrowheads="1" noChangeShapeType="1" noTextEdit="1"/>
+          </p:cNvSpPr>
+          <p:nvPr>
+            <p:extLst>
+              <p:ext uri="{386F3935-93C4-4BCD-93E2-E3B085C9AB24}">
+                <p16:designElem xmlns:p16="http://schemas.microsoft.com/office/powerpoint/2015/main" val="1"/>
+              </p:ext>
+            </p:extLst>
+          </p:nvPr>
+        </p:nvSpPr>
+        <p:spPr>
+          <a:xfrm rot="5400000">
+            <a:off x="649223" y="387939"/>
+            <a:ext cx="73152" cy="548640"/>
+          </a:xfrm>
+          <a:prstGeom prst="rect">
+            <a:avLst/>
+          </a:prstGeom>
+          <a:solidFill>
+            <a:schemeClr val="accent2"/>
+          </a:solidFill>
+          <a:ln>
+            <a:noFill/>
+          </a:ln>
+        </p:spPr>
+        <p:style>
+          <a:lnRef idx="2">
+            <a:schemeClr val="accent1">
+              <a:shade val="50000"/>
+            </a:schemeClr>
+          </a:lnRef>
+          <a:fillRef idx="1">
+            <a:schemeClr val="accent1"/>
+          </a:fillRef>
+          <a:effectRef idx="0">
+            <a:schemeClr val="accent1"/>
+          </a:effectRef>
+          <a:fontRef idx="minor">
+            <a:schemeClr val="lt1"/>
+          </a:fontRef>
+        </p:style>
+        <p:txBody>
+          <a:bodyPr rtlCol="0" anchor="ctr"/>
+          <a:lstStyle/>
+          <a:p>
+            <a:pPr algn="ctr"/>
+            <a:endParaRPr lang="en-US">
+              <a:solidFill>
+                <a:prstClr val="white"/>
+              </a:solidFill>
+              <a:latin typeface="Calibri" panose="020F0502020204030204"/>
+            </a:endParaRPr>
+          </a:p>
+        </p:txBody>
+      </p:sp>
+      <p:sp>
+        <p:nvSpPr>
+          <p:cNvPr id="13" name="Rectangle 12">
+            <a:extLst>
+              <a:ext uri="{FF2B5EF4-FFF2-40B4-BE49-F238E27FC236}">
+                <a16:creationId xmlns:a16="http://schemas.microsoft.com/office/drawing/2014/main" id="{CFD56D35-84C8-3D4D-60ED-3BCC8EF44DCC}"/>
+              </a:ext>
+              <a:ext uri="{C183D7F6-B498-43B3-948B-1728B52AA6E4}">
+                <adec:decorative xmlns:adec="http://schemas.microsoft.com/office/drawing/2017/decorative" val="1"/>
+              </a:ext>
+            </a:extLst>
+          </p:cNvPr>
+          <p:cNvSpPr>
+            <a:spLocks noGrp="1" noRot="1" noChangeAspect="1" noMove="1" noResize="1" noEditPoints="1" noAdjustHandles="1" noChangeArrowheads="1" noChangeShapeType="1" noTextEdit="1"/>
+          </p:cNvSpPr>
+          <p:nvPr>
+            <p:extLst>
+              <p:ext uri="{386F3935-93C4-4BCD-93E2-E3B085C9AB24}">
+                <p16:designElem xmlns:p16="http://schemas.microsoft.com/office/powerpoint/2015/main" val="1"/>
+              </p:ext>
+            </p:extLst>
+          </p:nvPr>
+        </p:nvSpPr>
+        <p:spPr>
+          <a:xfrm>
+            <a:off x="411480" y="2285541"/>
+            <a:ext cx="4389120" cy="18288"/>
+          </a:xfrm>
+          <a:prstGeom prst="rect">
+            <a:avLst/>
+          </a:prstGeom>
+          <a:solidFill>
+            <a:srgbClr val="D5D5D5"/>
+          </a:solidFill>
+          <a:ln w="3175">
+            <a:noFill/>
+          </a:ln>
+          <a:effectLst/>
+        </p:spPr>
+        <p:style>
+          <a:lnRef idx="2">
+            <a:schemeClr val="accent1">
+              <a:shade val="50000"/>
+            </a:schemeClr>
+          </a:lnRef>
+          <a:fillRef idx="1">
+            <a:schemeClr val="accent1"/>
+          </a:fillRef>
+          <a:effectRef idx="0">
+            <a:schemeClr val="accent1"/>
+          </a:effectRef>
+          <a:fontRef idx="minor">
+            <a:schemeClr val="lt1"/>
+          </a:fontRef>
+        </p:style>
+        <p:txBody>
+          <a:bodyPr rtlCol="0" anchor="ctr"/>
+          <a:lstStyle/>
+          <a:p>
+            <a:pPr algn="ctr"/>
+            <a:endParaRPr lang="en-US">
+              <a:solidFill>
+                <a:prstClr val="white"/>
+              </a:solidFill>
+              <a:latin typeface="Calibri" panose="020F0502020204030204"/>
+            </a:endParaRPr>
+          </a:p>
+        </p:txBody>
+      </p:sp>
+      <p:sp>
+        <p:nvSpPr>
+          <p:cNvPr id="3" name="Inhaltsplatzhalter 2">
+            <a:extLst>
+              <a:ext uri="{FF2B5EF4-FFF2-40B4-BE49-F238E27FC236}">
+                <a16:creationId xmlns:a16="http://schemas.microsoft.com/office/drawing/2014/main" id="{2B45612E-19D6-092D-FFBE-A59EAA3E300B}"/>
+              </a:ext>
+            </a:extLst>
+          </p:cNvPr>
+          <p:cNvSpPr>
+            <a:spLocks noGrp="1"/>
+          </p:cNvSpPr>
+          <p:nvPr>
+            <p:ph idx="1"/>
+          </p:nvPr>
+        </p:nvSpPr>
+        <p:spPr>
+          <a:xfrm>
+            <a:off x="411480" y="2684095"/>
+            <a:ext cx="5081270" cy="3492868"/>
+          </a:xfrm>
+        </p:spPr>
+        <p:txBody>
+          <a:bodyPr>
+            <a:normAutofit/>
+          </a:bodyPr>
+          <a:lstStyle/>
+          <a:p>
+            <a:endParaRPr lang="de-DE" sz="1800" dirty="0"/>
+          </a:p>
+        </p:txBody>
+      </p:sp>
+    </p:spTree>
+    <p:extLst>
+      <p:ext uri="{BB962C8B-B14F-4D97-AF65-F5344CB8AC3E}">
+        <p14:creationId xmlns:p14="http://schemas.microsoft.com/office/powerpoint/2010/main" val="1548224523"/>
       </p:ext>
     </p:extLst>
   </p:cSld>
@@ -3952,10 +5693,10 @@
       </p:sp>
       <p:pic>
         <p:nvPicPr>
-          <p:cNvPr id="5" name="Grafik 4" descr="Ein Bild, das Schwarz, Dunkelheit enthält.&#10;&#10;Automatisch generierte Beschreibung">
-            <a:extLst>
-              <a:ext uri="{FF2B5EF4-FFF2-40B4-BE49-F238E27FC236}">
-                <a16:creationId xmlns:a16="http://schemas.microsoft.com/office/drawing/2014/main" id="{888FD6FD-486C-9B6C-86B0-378393BBE11F}"/>
+          <p:cNvPr id="4" name="Grafik 3" descr="Ein Bild, das Schwarz, Dunkelheit enthält.&#10;&#10;Automatisch generierte Beschreibung">
+            <a:extLst>
+              <a:ext uri="{FF2B5EF4-FFF2-40B4-BE49-F238E27FC236}">
+                <a16:creationId xmlns:a16="http://schemas.microsoft.com/office/drawing/2014/main" id="{5B119CA5-05FB-6606-C694-3FEE76D74532}"/>
               </a:ext>
             </a:extLst>
           </p:cNvPr>
@@ -3978,8 +5719,8 @@
         </p:blipFill>
         <p:spPr>
           <a:xfrm>
-            <a:off x="6810935" y="3017110"/>
-            <a:ext cx="4018430" cy="823780"/>
+            <a:off x="7692023" y="3106181"/>
+            <a:ext cx="3027369" cy="620612"/>
           </a:xfrm>
           <a:prstGeom prst="rect">
             <a:avLst/>
@@ -4212,11 +5953,7 @@
               </a:rPr>
             </a:br>
             <a:r>
-              <a:rPr lang="de-DE" sz="3200" dirty="0">
-                <a:solidFill>
-                  <a:srgbClr val="595959"/>
-                </a:solidFill>
-              </a:rPr>
+              <a:rPr lang="de-DE" sz="3200" dirty="0"/>
               <a:t>Datenmaterial</a:t>
             </a:r>
           </a:p>
@@ -4260,10 +5997,10 @@
       </p:sp>
       <p:pic>
         <p:nvPicPr>
-          <p:cNvPr id="5" name="Grafik 4" descr="Ein Bild, das Schwarz, Dunkelheit enthält.&#10;&#10;Automatisch generierte Beschreibung">
-            <a:extLst>
-              <a:ext uri="{FF2B5EF4-FFF2-40B4-BE49-F238E27FC236}">
-                <a16:creationId xmlns:a16="http://schemas.microsoft.com/office/drawing/2014/main" id="{97AA9BA2-889A-F2B9-9D67-AB9414F748E3}"/>
+          <p:cNvPr id="4" name="Grafik 3" descr="Ein Bild, das Schwarz, Dunkelheit enthält.&#10;&#10;Automatisch generierte Beschreibung">
+            <a:extLst>
+              <a:ext uri="{FF2B5EF4-FFF2-40B4-BE49-F238E27FC236}">
+                <a16:creationId xmlns:a16="http://schemas.microsoft.com/office/drawing/2014/main" id="{322E8CED-E301-B9C0-3C7E-58D7DA3BAD6A}"/>
               </a:ext>
             </a:extLst>
           </p:cNvPr>
@@ -4286,8 +6023,8 @@
         </p:blipFill>
         <p:spPr>
           <a:xfrm>
-            <a:off x="6810935" y="3017110"/>
-            <a:ext cx="4018430" cy="823780"/>
+            <a:off x="7692023" y="3106181"/>
+            <a:ext cx="3027369" cy="620612"/>
           </a:xfrm>
           <a:prstGeom prst="rect">
             <a:avLst/>
@@ -4882,11 +6619,7 @@
               </a:rPr>
             </a:br>
             <a:r>
-              <a:rPr lang="de-DE" sz="3200" dirty="0">
-                <a:solidFill>
-                  <a:srgbClr val="595959"/>
-                </a:solidFill>
-              </a:rPr>
+              <a:rPr lang="de-DE" sz="3200" dirty="0"/>
               <a:t>Anforderungen</a:t>
             </a:r>
           </a:p>
@@ -4930,10 +6663,10 @@
       </p:sp>
       <p:pic>
         <p:nvPicPr>
-          <p:cNvPr id="5" name="Grafik 4" descr="Ein Bild, das Schwarz, Dunkelheit enthält.&#10;&#10;Automatisch generierte Beschreibung">
-            <a:extLst>
-              <a:ext uri="{FF2B5EF4-FFF2-40B4-BE49-F238E27FC236}">
-                <a16:creationId xmlns:a16="http://schemas.microsoft.com/office/drawing/2014/main" id="{2AAF29B5-70C7-7C39-DF0A-362043953FD0}"/>
+          <p:cNvPr id="4" name="Grafik 3" descr="Ein Bild, das Schwarz, Dunkelheit enthält.&#10;&#10;Automatisch generierte Beschreibung">
+            <a:extLst>
+              <a:ext uri="{FF2B5EF4-FFF2-40B4-BE49-F238E27FC236}">
+                <a16:creationId xmlns:a16="http://schemas.microsoft.com/office/drawing/2014/main" id="{29BF6DBE-5A01-16DD-51E4-65FDA949611D}"/>
               </a:ext>
             </a:extLst>
           </p:cNvPr>
@@ -4956,8 +6689,8 @@
         </p:blipFill>
         <p:spPr>
           <a:xfrm>
-            <a:off x="6810935" y="3017110"/>
-            <a:ext cx="4018430" cy="823780"/>
+            <a:off x="7692023" y="3106181"/>
+            <a:ext cx="3027369" cy="620612"/>
           </a:xfrm>
           <a:prstGeom prst="rect">
             <a:avLst/>
@@ -5270,35 +7003,32 @@
           <a:p>
             <a:r>
               <a:rPr lang="de-DE" sz="1800" dirty="0"/>
-              <a:t>Rauschfrei</a:t>
+              <a:t>Rauscharm </a:t>
             </a:r>
           </a:p>
           <a:p>
             <a:r>
               <a:rPr lang="de-DE" sz="1800" dirty="0"/>
-              <a:t>klare Konturen</a:t>
+              <a:t>Scharfe Konturen</a:t>
             </a:r>
           </a:p>
           <a:p>
             <a:r>
               <a:rPr lang="de-DE" sz="1800" dirty="0"/>
-              <a:t>Kleidung entspricht Hintergrundfarbe</a:t>
+              <a:t>Flexibilität des Hintergrunds</a:t>
             </a:r>
           </a:p>
           <a:p>
             <a:r>
               <a:rPr lang="de-DE" sz="1800" dirty="0"/>
-              <a:t>Kontrastreicher Hintergrund vgl. Vordergrund</a:t>
-            </a:r>
-          </a:p>
-          <a:p>
-            <a:endParaRPr lang="de-DE" sz="1800" dirty="0"/>
-          </a:p>
-          <a:p>
-            <a:pPr marL="0" indent="0">
-              <a:buNone/>
-            </a:pPr>
-            <a:endParaRPr lang="de-DE" sz="1800" dirty="0"/>
+              <a:t>Effiziente Leistung</a:t>
+            </a:r>
+          </a:p>
+          <a:p>
+            <a:r>
+              <a:rPr lang="de-DE" sz="1800" dirty="0"/>
+              <a:t>Schattenerkennung</a:t>
+            </a:r>
           </a:p>
           <a:p>
             <a:endParaRPr lang="de-DE" sz="1800" dirty="0"/>
@@ -5537,11 +7267,7 @@
               </a:rPr>
             </a:br>
             <a:r>
-              <a:rPr lang="de-DE" sz="3200" dirty="0">
-                <a:solidFill>
-                  <a:srgbClr val="595959"/>
-                </a:solidFill>
-              </a:rPr>
+              <a:rPr lang="de-DE" sz="3200" dirty="0"/>
               <a:t>Annahmen</a:t>
             </a:r>
           </a:p>
@@ -5585,10 +7311,10 @@
       </p:sp>
       <p:pic>
         <p:nvPicPr>
-          <p:cNvPr id="5" name="Grafik 4" descr="Ein Bild, das Schwarz, Dunkelheit enthält.&#10;&#10;Automatisch generierte Beschreibung">
-            <a:extLst>
-              <a:ext uri="{FF2B5EF4-FFF2-40B4-BE49-F238E27FC236}">
-                <a16:creationId xmlns:a16="http://schemas.microsoft.com/office/drawing/2014/main" id="{5301CEFA-6216-A827-BC83-4F32812299F7}"/>
+          <p:cNvPr id="4" name="Grafik 3" descr="Ein Bild, das Schwarz, Dunkelheit enthält.&#10;&#10;Automatisch generierte Beschreibung">
+            <a:extLst>
+              <a:ext uri="{FF2B5EF4-FFF2-40B4-BE49-F238E27FC236}">
+                <a16:creationId xmlns:a16="http://schemas.microsoft.com/office/drawing/2014/main" id="{3B0ADD21-2DC9-187D-3671-5E420BF61980}"/>
               </a:ext>
             </a:extLst>
           </p:cNvPr>
@@ -5611,8 +7337,8 @@
         </p:blipFill>
         <p:spPr>
           <a:xfrm>
-            <a:off x="6810935" y="3017110"/>
-            <a:ext cx="4018430" cy="823780"/>
+            <a:off x="7692023" y="3106181"/>
+            <a:ext cx="3027369" cy="620612"/>
           </a:xfrm>
           <a:prstGeom prst="rect">
             <a:avLst/>
@@ -5633,6 +7359,349 @@
 </file>
 
 <file path=ppt/slides/slide8.xml><?xml version="1.0" encoding="utf-8"?>
+<p:sld xmlns:a="http://schemas.openxmlformats.org/drawingml/2006/main" xmlns:r="http://schemas.openxmlformats.org/officeDocument/2006/relationships" xmlns:p="http://schemas.openxmlformats.org/presentationml/2006/main">
+  <p:cSld>
+    <p:bg>
+      <p:bgPr>
+        <a:solidFill>
+          <a:schemeClr val="bg1"/>
+        </a:solidFill>
+        <a:effectLst/>
+      </p:bgPr>
+    </p:bg>
+    <p:spTree>
+      <p:nvGrpSpPr>
+        <p:cNvPr id="1" name="">
+          <a:extLst>
+            <a:ext uri="{FF2B5EF4-FFF2-40B4-BE49-F238E27FC236}">
+              <a16:creationId xmlns:a16="http://schemas.microsoft.com/office/drawing/2014/main" id="{306E5ECF-F687-5B18-54A1-8EFA556B4D5F}"/>
+            </a:ext>
+          </a:extLst>
+        </p:cNvPr>
+        <p:cNvGrpSpPr/>
+        <p:nvPr/>
+      </p:nvGrpSpPr>
+      <p:grpSpPr>
+        <a:xfrm>
+          <a:off x="0" y="0"/>
+          <a:ext cx="0" cy="0"/>
+          <a:chOff x="0" y="0"/>
+          <a:chExt cx="0" cy="0"/>
+        </a:xfrm>
+      </p:grpSpPr>
+      <p:sp useBgFill="1">
+        <p:nvSpPr>
+          <p:cNvPr id="9" name="Rectangle 8">
+            <a:extLst>
+              <a:ext uri="{FF2B5EF4-FFF2-40B4-BE49-F238E27FC236}">
+                <a16:creationId xmlns:a16="http://schemas.microsoft.com/office/drawing/2014/main" id="{CDA9EFE5-215F-37A9-E74A-0D19D2A7836D}"/>
+              </a:ext>
+              <a:ext uri="{C183D7F6-B498-43B3-948B-1728B52AA6E4}">
+                <adec:decorative xmlns:adec="http://schemas.microsoft.com/office/drawing/2017/decorative" val="1"/>
+              </a:ext>
+            </a:extLst>
+          </p:cNvPr>
+          <p:cNvSpPr>
+            <a:spLocks noGrp="1" noRot="1" noChangeAspect="1" noMove="1" noResize="1" noEditPoints="1" noAdjustHandles="1" noChangeArrowheads="1" noChangeShapeType="1" noTextEdit="1"/>
+          </p:cNvSpPr>
+          <p:nvPr>
+            <p:extLst>
+              <p:ext uri="{386F3935-93C4-4BCD-93E2-E3B085C9AB24}">
+                <p16:designElem xmlns:p16="http://schemas.microsoft.com/office/powerpoint/2015/main" val="1"/>
+              </p:ext>
+            </p:extLst>
+          </p:nvPr>
+        </p:nvSpPr>
+        <p:spPr>
+          <a:xfrm>
+            <a:off x="0" y="0"/>
+            <a:ext cx="12192000" cy="6858000"/>
+          </a:xfrm>
+          <a:prstGeom prst="rect">
+            <a:avLst/>
+          </a:prstGeom>
+          <a:ln>
+            <a:noFill/>
+          </a:ln>
+        </p:spPr>
+        <p:style>
+          <a:lnRef idx="2">
+            <a:schemeClr val="accent1">
+              <a:shade val="50000"/>
+            </a:schemeClr>
+          </a:lnRef>
+          <a:fillRef idx="1">
+            <a:schemeClr val="accent1"/>
+          </a:fillRef>
+          <a:effectRef idx="0">
+            <a:schemeClr val="accent1"/>
+          </a:effectRef>
+          <a:fontRef idx="minor">
+            <a:schemeClr val="lt1"/>
+          </a:fontRef>
+        </p:style>
+        <p:txBody>
+          <a:bodyPr rtlCol="0" anchor="ctr"/>
+          <a:lstStyle/>
+          <a:p>
+            <a:pPr algn="ctr"/>
+            <a:endParaRPr lang="en-US"/>
+          </a:p>
+        </p:txBody>
+      </p:sp>
+      <p:sp>
+        <p:nvSpPr>
+          <p:cNvPr id="2" name="Titel 1">
+            <a:extLst>
+              <a:ext uri="{FF2B5EF4-FFF2-40B4-BE49-F238E27FC236}">
+                <a16:creationId xmlns:a16="http://schemas.microsoft.com/office/drawing/2014/main" id="{615654FB-13A1-ADE7-2901-15D80EB21A28}"/>
+              </a:ext>
+            </a:extLst>
+          </p:cNvPr>
+          <p:cNvSpPr>
+            <a:spLocks noGrp="1"/>
+          </p:cNvSpPr>
+          <p:nvPr>
+            <p:ph type="title"/>
+          </p:nvPr>
+        </p:nvSpPr>
+        <p:spPr>
+          <a:xfrm>
+            <a:off x="411480" y="991443"/>
+            <a:ext cx="4443154" cy="1087819"/>
+          </a:xfrm>
+        </p:spPr>
+        <p:txBody>
+          <a:bodyPr anchor="b">
+            <a:normAutofit/>
+          </a:bodyPr>
+          <a:lstStyle/>
+          <a:p>
+            <a:r>
+              <a:rPr lang="de-DE" sz="3400" dirty="0"/>
+              <a:t>Annahmen</a:t>
+            </a:r>
+          </a:p>
+        </p:txBody>
+      </p:sp>
+      <p:sp>
+        <p:nvSpPr>
+          <p:cNvPr id="11" name="Rectangle 10">
+            <a:extLst>
+              <a:ext uri="{FF2B5EF4-FFF2-40B4-BE49-F238E27FC236}">
+                <a16:creationId xmlns:a16="http://schemas.microsoft.com/office/drawing/2014/main" id="{8D153A2B-CC60-D4B4-3590-BE9AF935C67B}"/>
+              </a:ext>
+              <a:ext uri="{C183D7F6-B498-43B3-948B-1728B52AA6E4}">
+                <adec:decorative xmlns:adec="http://schemas.microsoft.com/office/drawing/2017/decorative" val="1"/>
+              </a:ext>
+            </a:extLst>
+          </p:cNvPr>
+          <p:cNvSpPr>
+            <a:spLocks noGrp="1" noRot="1" noChangeAspect="1" noMove="1" noResize="1" noEditPoints="1" noAdjustHandles="1" noChangeArrowheads="1" noChangeShapeType="1" noTextEdit="1"/>
+          </p:cNvSpPr>
+          <p:nvPr>
+            <p:extLst>
+              <p:ext uri="{386F3935-93C4-4BCD-93E2-E3B085C9AB24}">
+                <p16:designElem xmlns:p16="http://schemas.microsoft.com/office/powerpoint/2015/main" val="1"/>
+              </p:ext>
+            </p:extLst>
+          </p:nvPr>
+        </p:nvSpPr>
+        <p:spPr>
+          <a:xfrm rot="5400000">
+            <a:off x="649223" y="387939"/>
+            <a:ext cx="73152" cy="548640"/>
+          </a:xfrm>
+          <a:prstGeom prst="rect">
+            <a:avLst/>
+          </a:prstGeom>
+          <a:solidFill>
+            <a:schemeClr val="accent2"/>
+          </a:solidFill>
+          <a:ln>
+            <a:noFill/>
+          </a:ln>
+        </p:spPr>
+        <p:style>
+          <a:lnRef idx="2">
+            <a:schemeClr val="accent1">
+              <a:shade val="50000"/>
+            </a:schemeClr>
+          </a:lnRef>
+          <a:fillRef idx="1">
+            <a:schemeClr val="accent1"/>
+          </a:fillRef>
+          <a:effectRef idx="0">
+            <a:schemeClr val="accent1"/>
+          </a:effectRef>
+          <a:fontRef idx="minor">
+            <a:schemeClr val="lt1"/>
+          </a:fontRef>
+        </p:style>
+        <p:txBody>
+          <a:bodyPr rtlCol="0" anchor="ctr"/>
+          <a:lstStyle/>
+          <a:p>
+            <a:pPr algn="ctr"/>
+            <a:endParaRPr lang="en-US">
+              <a:solidFill>
+                <a:prstClr val="white"/>
+              </a:solidFill>
+              <a:latin typeface="Calibri" panose="020F0502020204030204"/>
+            </a:endParaRPr>
+          </a:p>
+        </p:txBody>
+      </p:sp>
+      <p:sp>
+        <p:nvSpPr>
+          <p:cNvPr id="13" name="Rectangle 12">
+            <a:extLst>
+              <a:ext uri="{FF2B5EF4-FFF2-40B4-BE49-F238E27FC236}">
+                <a16:creationId xmlns:a16="http://schemas.microsoft.com/office/drawing/2014/main" id="{52D41A54-5083-F8B6-BA92-6F708C39208B}"/>
+              </a:ext>
+              <a:ext uri="{C183D7F6-B498-43B3-948B-1728B52AA6E4}">
+                <adec:decorative xmlns:adec="http://schemas.microsoft.com/office/drawing/2017/decorative" val="1"/>
+              </a:ext>
+            </a:extLst>
+          </p:cNvPr>
+          <p:cNvSpPr>
+            <a:spLocks noGrp="1" noRot="1" noChangeAspect="1" noMove="1" noResize="1" noEditPoints="1" noAdjustHandles="1" noChangeArrowheads="1" noChangeShapeType="1" noTextEdit="1"/>
+          </p:cNvSpPr>
+          <p:nvPr>
+            <p:extLst>
+              <p:ext uri="{386F3935-93C4-4BCD-93E2-E3B085C9AB24}">
+                <p16:designElem xmlns:p16="http://schemas.microsoft.com/office/powerpoint/2015/main" val="1"/>
+              </p:ext>
+            </p:extLst>
+          </p:nvPr>
+        </p:nvSpPr>
+        <p:spPr>
+          <a:xfrm>
+            <a:off x="411480" y="2285541"/>
+            <a:ext cx="4389120" cy="18288"/>
+          </a:xfrm>
+          <a:prstGeom prst="rect">
+            <a:avLst/>
+          </a:prstGeom>
+          <a:solidFill>
+            <a:srgbClr val="D5D5D5"/>
+          </a:solidFill>
+          <a:ln w="3175">
+            <a:noFill/>
+          </a:ln>
+          <a:effectLst/>
+        </p:spPr>
+        <p:style>
+          <a:lnRef idx="2">
+            <a:schemeClr val="accent1">
+              <a:shade val="50000"/>
+            </a:schemeClr>
+          </a:lnRef>
+          <a:fillRef idx="1">
+            <a:schemeClr val="accent1"/>
+          </a:fillRef>
+          <a:effectRef idx="0">
+            <a:schemeClr val="accent1"/>
+          </a:effectRef>
+          <a:fontRef idx="minor">
+            <a:schemeClr val="lt1"/>
+          </a:fontRef>
+        </p:style>
+        <p:txBody>
+          <a:bodyPr rtlCol="0" anchor="ctr"/>
+          <a:lstStyle/>
+          <a:p>
+            <a:pPr algn="ctr"/>
+            <a:endParaRPr lang="en-US">
+              <a:solidFill>
+                <a:prstClr val="white"/>
+              </a:solidFill>
+              <a:latin typeface="Calibri" panose="020F0502020204030204"/>
+            </a:endParaRPr>
+          </a:p>
+        </p:txBody>
+      </p:sp>
+      <p:sp>
+        <p:nvSpPr>
+          <p:cNvPr id="3" name="Inhaltsplatzhalter 2">
+            <a:extLst>
+              <a:ext uri="{FF2B5EF4-FFF2-40B4-BE49-F238E27FC236}">
+                <a16:creationId xmlns:a16="http://schemas.microsoft.com/office/drawing/2014/main" id="{435B059D-0E83-6FE1-E8F0-84F2CF36660B}"/>
+              </a:ext>
+            </a:extLst>
+          </p:cNvPr>
+          <p:cNvSpPr>
+            <a:spLocks noGrp="1"/>
+          </p:cNvSpPr>
+          <p:nvPr>
+            <p:ph idx="1"/>
+          </p:nvPr>
+        </p:nvSpPr>
+        <p:spPr>
+          <a:xfrm>
+            <a:off x="411480" y="2684095"/>
+            <a:ext cx="5081270" cy="3492868"/>
+          </a:xfrm>
+        </p:spPr>
+        <p:txBody>
+          <a:bodyPr>
+            <a:normAutofit/>
+          </a:bodyPr>
+          <a:lstStyle/>
+          <a:p>
+            <a:r>
+              <a:rPr lang="de-DE" sz="1800" dirty="0"/>
+              <a:t>Stabile Kamera</a:t>
+            </a:r>
+          </a:p>
+          <a:p>
+            <a:r>
+              <a:rPr lang="de-DE" sz="1800" dirty="0"/>
+              <a:t>Abstand zur Kamera großenteils gleich</a:t>
+            </a:r>
+          </a:p>
+          <a:p>
+            <a:r>
+              <a:rPr lang="de-DE" sz="1800" dirty="0" err="1"/>
+              <a:t>Vllt</a:t>
+            </a:r>
+            <a:r>
+              <a:rPr lang="de-DE" sz="1800" dirty="0"/>
+              <a:t> Keine Bewegung = gehört zum Hintergrund</a:t>
+            </a:r>
+          </a:p>
+          <a:p>
+            <a:r>
+              <a:rPr lang="de-DE" sz="1800" dirty="0" err="1"/>
+              <a:t>Vllt</a:t>
+            </a:r>
+            <a:r>
+              <a:rPr lang="de-DE" sz="1800" dirty="0"/>
+              <a:t> kein schnelle Lichtänderungen</a:t>
+            </a:r>
+          </a:p>
+          <a:p>
+            <a:endParaRPr lang="de-DE" sz="1800" dirty="0"/>
+          </a:p>
+          <a:p>
+            <a:endParaRPr lang="de-DE" sz="1800" dirty="0"/>
+          </a:p>
+        </p:txBody>
+      </p:sp>
+    </p:spTree>
+    <p:extLst>
+      <p:ext uri="{BB962C8B-B14F-4D97-AF65-F5344CB8AC3E}">
+        <p14:creationId xmlns:p14="http://schemas.microsoft.com/office/powerpoint/2010/main" val="2221845038"/>
+      </p:ext>
+    </p:extLst>
+  </p:cSld>
+  <p:clrMapOvr>
+    <a:masterClrMapping/>
+  </p:clrMapOvr>
+</p:sld>
+</file>
+
+<file path=ppt/slides/slide9.xml><?xml version="1.0" encoding="utf-8"?>
 <p:sld xmlns:a="http://schemas.openxmlformats.org/drawingml/2006/main" xmlns:r="http://schemas.openxmlformats.org/officeDocument/2006/relationships" xmlns:p="http://schemas.openxmlformats.org/presentationml/2006/main">
   <p:cSld>
     <p:bg>
@@ -5838,18 +7907,10 @@
           <a:lstStyle/>
           <a:p>
             <a:br>
-              <a:rPr lang="de-DE" sz="3200" dirty="0">
-                <a:solidFill>
-                  <a:srgbClr val="595959"/>
-                </a:solidFill>
-              </a:rPr>
+              <a:rPr lang="de-DE" sz="3200" dirty="0"/>
             </a:br>
             <a:r>
-              <a:rPr lang="de-DE" sz="3200" dirty="0">
-                <a:solidFill>
-                  <a:srgbClr val="595959"/>
-                </a:solidFill>
-              </a:rPr>
+              <a:rPr lang="de-DE" sz="3200" dirty="0"/>
               <a:t>Bewertung der Ergebnisse</a:t>
             </a:r>
           </a:p>
@@ -5893,10 +7954,10 @@
       </p:sp>
       <p:pic>
         <p:nvPicPr>
-          <p:cNvPr id="5" name="Grafik 4" descr="Ein Bild, das Schwarz, Dunkelheit enthält.&#10;&#10;Automatisch generierte Beschreibung">
-            <a:extLst>
-              <a:ext uri="{FF2B5EF4-FFF2-40B4-BE49-F238E27FC236}">
-                <a16:creationId xmlns:a16="http://schemas.microsoft.com/office/drawing/2014/main" id="{6EF436DC-349D-A9E9-489E-C314FE0B37C5}"/>
+          <p:cNvPr id="4" name="Grafik 3" descr="Ein Bild, das Schwarz, Dunkelheit enthält.&#10;&#10;Automatisch generierte Beschreibung">
+            <a:extLst>
+              <a:ext uri="{FF2B5EF4-FFF2-40B4-BE49-F238E27FC236}">
+                <a16:creationId xmlns:a16="http://schemas.microsoft.com/office/drawing/2014/main" id="{5F57A6AB-AABD-2A13-53C1-B04BA15FB40F}"/>
               </a:ext>
             </a:extLst>
           </p:cNvPr>
@@ -5919,8 +7980,8 @@
         </p:blipFill>
         <p:spPr>
           <a:xfrm>
-            <a:off x="6810935" y="3017110"/>
-            <a:ext cx="4018430" cy="823780"/>
+            <a:off x="7692023" y="3106181"/>
+            <a:ext cx="3027369" cy="620612"/>
           </a:xfrm>
           <a:prstGeom prst="rect">
             <a:avLst/>

</xml_diff>

<commit_message>
Anorderungen überarbeitet, neue Folien, Parameter angepasst
</commit_message>
<xml_diff>
--- a/Präsentationen/Meilenstein_2.pptx
+++ b/Präsentationen/Meilenstein_2.pptx
@@ -13,9 +13,16 @@
     <p:sldId id="264" r:id="rId7"/>
     <p:sldId id="261" r:id="rId8"/>
     <p:sldId id="269" r:id="rId9"/>
-    <p:sldId id="262" r:id="rId10"/>
-    <p:sldId id="270" r:id="rId11"/>
-    <p:sldId id="271" r:id="rId12"/>
+    <p:sldId id="272" r:id="rId10"/>
+    <p:sldId id="273" r:id="rId11"/>
+    <p:sldId id="262" r:id="rId12"/>
+    <p:sldId id="270" r:id="rId13"/>
+    <p:sldId id="275" r:id="rId14"/>
+    <p:sldId id="276" r:id="rId15"/>
+    <p:sldId id="277" r:id="rId16"/>
+    <p:sldId id="278" r:id="rId17"/>
+    <p:sldId id="279" r:id="rId18"/>
+    <p:sldId id="274" r:id="rId19"/>
   </p:sldIdLst>
   <p:sldSz cx="12192000" cy="6858000"/>
   <p:notesSz cx="6858000" cy="9144000"/>
@@ -173,7 +180,7 @@
             <c:strRef>
               <c:f>Tabelle1!$A$2:$A$9</c:f>
               <c:strCache>
-                <c:ptCount val="7"/>
+                <c:ptCount val="6"/>
                 <c:pt idx="0">
                   <c:v>MOG2</c:v>
                 </c:pt>
@@ -181,18 +188,15 @@
                   <c:v>KNN</c:v>
                 </c:pt>
                 <c:pt idx="2">
-                  <c:v>MOG</c:v>
+                  <c:v>CNT</c:v>
                 </c:pt>
                 <c:pt idx="3">
-                  <c:v>CNT</c:v>
+                  <c:v>GMG</c:v>
                 </c:pt>
                 <c:pt idx="4">
-                  <c:v>GMG</c:v>
+                  <c:v>GSOC</c:v>
                 </c:pt>
                 <c:pt idx="5">
-                  <c:v>GSOC</c:v>
-                </c:pt>
-                <c:pt idx="6">
                   <c:v>LSBP</c:v>
                 </c:pt>
               </c:strCache>
@@ -211,18 +215,15 @@
                   <c:v>126</c:v>
                 </c:pt>
                 <c:pt idx="2">
-                  <c:v>81</c:v>
+                  <c:v>368</c:v>
                 </c:pt>
                 <c:pt idx="3">
-                  <c:v>368</c:v>
+                  <c:v>49</c:v>
                 </c:pt>
                 <c:pt idx="4">
-                  <c:v>49</c:v>
+                  <c:v>10</c:v>
                 </c:pt>
                 <c:pt idx="5">
-                  <c:v>10</c:v>
-                </c:pt>
-                <c:pt idx="6">
                   <c:v>10</c:v>
                 </c:pt>
               </c:numCache>
@@ -262,7 +263,7 @@
             <c:strRef>
               <c:f>Tabelle1!$A$2:$A$9</c:f>
               <c:strCache>
-                <c:ptCount val="7"/>
+                <c:ptCount val="6"/>
                 <c:pt idx="0">
                   <c:v>MOG2</c:v>
                 </c:pt>
@@ -270,18 +271,15 @@
                   <c:v>KNN</c:v>
                 </c:pt>
                 <c:pt idx="2">
-                  <c:v>MOG</c:v>
+                  <c:v>CNT</c:v>
                 </c:pt>
                 <c:pt idx="3">
-                  <c:v>CNT</c:v>
+                  <c:v>GMG</c:v>
                 </c:pt>
                 <c:pt idx="4">
-                  <c:v>GMG</c:v>
+                  <c:v>GSOC</c:v>
                 </c:pt>
                 <c:pt idx="5">
-                  <c:v>GSOC</c:v>
-                </c:pt>
-                <c:pt idx="6">
                   <c:v>LSBP</c:v>
                 </c:pt>
               </c:strCache>
@@ -326,7 +324,7 @@
             <c:strRef>
               <c:f>Tabelle1!$A$2:$A$9</c:f>
               <c:strCache>
-                <c:ptCount val="7"/>
+                <c:ptCount val="6"/>
                 <c:pt idx="0">
                   <c:v>MOG2</c:v>
                 </c:pt>
@@ -334,18 +332,15 @@
                   <c:v>KNN</c:v>
                 </c:pt>
                 <c:pt idx="2">
-                  <c:v>MOG</c:v>
+                  <c:v>CNT</c:v>
                 </c:pt>
                 <c:pt idx="3">
-                  <c:v>CNT</c:v>
+                  <c:v>GMG</c:v>
                 </c:pt>
                 <c:pt idx="4">
-                  <c:v>GMG</c:v>
+                  <c:v>GSOC</c:v>
                 </c:pt>
                 <c:pt idx="5">
-                  <c:v>GSOC</c:v>
-                </c:pt>
-                <c:pt idx="6">
                   <c:v>LSBP</c:v>
                 </c:pt>
               </c:strCache>
@@ -390,7 +385,7 @@
             <c:strRef>
               <c:f>Tabelle1!$A$2:$A$9</c:f>
               <c:strCache>
-                <c:ptCount val="7"/>
+                <c:ptCount val="6"/>
                 <c:pt idx="0">
                   <c:v>MOG2</c:v>
                 </c:pt>
@@ -398,18 +393,15 @@
                   <c:v>KNN</c:v>
                 </c:pt>
                 <c:pt idx="2">
-                  <c:v>MOG</c:v>
+                  <c:v>CNT</c:v>
                 </c:pt>
                 <c:pt idx="3">
-                  <c:v>CNT</c:v>
+                  <c:v>GMG</c:v>
                 </c:pt>
                 <c:pt idx="4">
-                  <c:v>GMG</c:v>
+                  <c:v>GSOC</c:v>
                 </c:pt>
                 <c:pt idx="5">
-                  <c:v>GSOC</c:v>
-                </c:pt>
-                <c:pt idx="6">
                   <c:v>LSBP</c:v>
                 </c:pt>
               </c:strCache>
@@ -428,18 +420,15 @@
                   <c:v>322</c:v>
                 </c:pt>
                 <c:pt idx="2">
-                  <c:v>116</c:v>
+                  <c:v>513</c:v>
                 </c:pt>
                 <c:pt idx="3">
-                  <c:v>513</c:v>
+                  <c:v>60</c:v>
                 </c:pt>
                 <c:pt idx="4">
-                  <c:v>60</c:v>
+                  <c:v>12</c:v>
                 </c:pt>
                 <c:pt idx="5">
-                  <c:v>12</c:v>
-                </c:pt>
-                <c:pt idx="6">
                   <c:v>11</c:v>
                 </c:pt>
               </c:numCache>
@@ -1334,7 +1323,7 @@
           <a:p>
             <a:fld id="{07F3CF67-C4D4-4073-9E88-4C8232DDB3C3}" type="datetimeFigureOut">
               <a:rPr lang="de-DE" smtClean="0"/>
-              <a:t>10.11.2024</a:t>
+              <a:t>11.11.2024</a:t>
             </a:fld>
             <a:endParaRPr lang="de-DE"/>
           </a:p>
@@ -1532,7 +1521,7 @@
           <a:p>
             <a:fld id="{07F3CF67-C4D4-4073-9E88-4C8232DDB3C3}" type="datetimeFigureOut">
               <a:rPr lang="de-DE" smtClean="0"/>
-              <a:t>10.11.2024</a:t>
+              <a:t>11.11.2024</a:t>
             </a:fld>
             <a:endParaRPr lang="de-DE"/>
           </a:p>
@@ -1740,7 +1729,7 @@
           <a:p>
             <a:fld id="{07F3CF67-C4D4-4073-9E88-4C8232DDB3C3}" type="datetimeFigureOut">
               <a:rPr lang="de-DE" smtClean="0"/>
-              <a:t>10.11.2024</a:t>
+              <a:t>11.11.2024</a:t>
             </a:fld>
             <a:endParaRPr lang="de-DE"/>
           </a:p>
@@ -1938,7 +1927,7 @@
           <a:p>
             <a:fld id="{07F3CF67-C4D4-4073-9E88-4C8232DDB3C3}" type="datetimeFigureOut">
               <a:rPr lang="de-DE" smtClean="0"/>
-              <a:t>10.11.2024</a:t>
+              <a:t>11.11.2024</a:t>
             </a:fld>
             <a:endParaRPr lang="de-DE"/>
           </a:p>
@@ -2213,7 +2202,7 @@
           <a:p>
             <a:fld id="{07F3CF67-C4D4-4073-9E88-4C8232DDB3C3}" type="datetimeFigureOut">
               <a:rPr lang="de-DE" smtClean="0"/>
-              <a:t>10.11.2024</a:t>
+              <a:t>11.11.2024</a:t>
             </a:fld>
             <a:endParaRPr lang="de-DE"/>
           </a:p>
@@ -2478,7 +2467,7 @@
           <a:p>
             <a:fld id="{07F3CF67-C4D4-4073-9E88-4C8232DDB3C3}" type="datetimeFigureOut">
               <a:rPr lang="de-DE" smtClean="0"/>
-              <a:t>10.11.2024</a:t>
+              <a:t>11.11.2024</a:t>
             </a:fld>
             <a:endParaRPr lang="de-DE"/>
           </a:p>
@@ -2890,7 +2879,7 @@
           <a:p>
             <a:fld id="{07F3CF67-C4D4-4073-9E88-4C8232DDB3C3}" type="datetimeFigureOut">
               <a:rPr lang="de-DE" smtClean="0"/>
-              <a:t>10.11.2024</a:t>
+              <a:t>11.11.2024</a:t>
             </a:fld>
             <a:endParaRPr lang="de-DE"/>
           </a:p>
@@ -3031,7 +3020,7 @@
           <a:p>
             <a:fld id="{07F3CF67-C4D4-4073-9E88-4C8232DDB3C3}" type="datetimeFigureOut">
               <a:rPr lang="de-DE" smtClean="0"/>
-              <a:t>10.11.2024</a:t>
+              <a:t>11.11.2024</a:t>
             </a:fld>
             <a:endParaRPr lang="de-DE"/>
           </a:p>
@@ -3144,7 +3133,7 @@
           <a:p>
             <a:fld id="{07F3CF67-C4D4-4073-9E88-4C8232DDB3C3}" type="datetimeFigureOut">
               <a:rPr lang="de-DE" smtClean="0"/>
-              <a:t>10.11.2024</a:t>
+              <a:t>11.11.2024</a:t>
             </a:fld>
             <a:endParaRPr lang="de-DE"/>
           </a:p>
@@ -3455,7 +3444,7 @@
           <a:p>
             <a:fld id="{07F3CF67-C4D4-4073-9E88-4C8232DDB3C3}" type="datetimeFigureOut">
               <a:rPr lang="de-DE" smtClean="0"/>
-              <a:t>10.11.2024</a:t>
+              <a:t>11.11.2024</a:t>
             </a:fld>
             <a:endParaRPr lang="de-DE"/>
           </a:p>
@@ -3743,7 +3732,7 @@
           <a:p>
             <a:fld id="{07F3CF67-C4D4-4073-9E88-4C8232DDB3C3}" type="datetimeFigureOut">
               <a:rPr lang="de-DE" smtClean="0"/>
-              <a:t>10.11.2024</a:t>
+              <a:t>11.11.2024</a:t>
             </a:fld>
             <a:endParaRPr lang="de-DE"/>
           </a:p>
@@ -3984,7 +3973,7 @@
           <a:p>
             <a:fld id="{07F3CF67-C4D4-4073-9E88-4C8232DDB3C3}" type="datetimeFigureOut">
               <a:rPr lang="de-DE" smtClean="0"/>
-              <a:t>10.11.2024</a:t>
+              <a:t>11.11.2024</a:t>
             </a:fld>
             <a:endParaRPr lang="de-DE"/>
           </a:p>
@@ -4706,7 +4695,7 @@
         <p:cNvPr id="1" name="">
           <a:extLst>
             <a:ext uri="{FF2B5EF4-FFF2-40B4-BE49-F238E27FC236}">
-              <a16:creationId xmlns:a16="http://schemas.microsoft.com/office/drawing/2014/main" id="{0F2B80D0-E442-81AE-4F21-3C8BC7EB3D6B}"/>
+              <a16:creationId xmlns:a16="http://schemas.microsoft.com/office/drawing/2014/main" id="{C1F0A11C-C0C4-09B6-C8DD-AD400CE86B7A}"/>
             </a:ext>
           </a:extLst>
         </p:cNvPr>
@@ -4726,7 +4715,7 @@
           <p:cNvPr id="9" name="Rectangle 8">
             <a:extLst>
               <a:ext uri="{FF2B5EF4-FFF2-40B4-BE49-F238E27FC236}">
-                <a16:creationId xmlns:a16="http://schemas.microsoft.com/office/drawing/2014/main" id="{606C3D53-BA0C-1A67-BB31-0478C940321B}"/>
+                <a16:creationId xmlns:a16="http://schemas.microsoft.com/office/drawing/2014/main" id="{1E77B070-9351-F706-63B9-3EB00E03B161}"/>
               </a:ext>
               <a:ext uri="{C183D7F6-B498-43B3-948B-1728B52AA6E4}">
                 <adec:decorative xmlns:adec="http://schemas.microsoft.com/office/drawing/2017/decorative" val="1"/>
@@ -4786,7 +4775,7 @@
           <p:cNvPr id="2" name="Titel 1">
             <a:extLst>
               <a:ext uri="{FF2B5EF4-FFF2-40B4-BE49-F238E27FC236}">
-                <a16:creationId xmlns:a16="http://schemas.microsoft.com/office/drawing/2014/main" id="{B226E8EF-5DBA-8EAA-18C5-9A666D9DC7A6}"/>
+                <a16:creationId xmlns:a16="http://schemas.microsoft.com/office/drawing/2014/main" id="{1755C315-F24F-E293-2451-9D14D9BD7B22}"/>
               </a:ext>
             </a:extLst>
           </p:cNvPr>
@@ -4810,9 +4799,10 @@
           <a:lstStyle/>
           <a:p>
             <a:r>
-              <a:rPr lang="de-DE" sz="3400" dirty="0"/>
-              <a:t>Performance</a:t>
+              <a:rPr lang="de-DE" sz="3600" dirty="0"/>
+              <a:t>Parametrisierung</a:t>
             </a:r>
+            <a:endParaRPr lang="de-DE" sz="3400" dirty="0"/>
           </a:p>
         </p:txBody>
       </p:sp>
@@ -4821,7 +4811,7 @@
           <p:cNvPr id="11" name="Rectangle 10">
             <a:extLst>
               <a:ext uri="{FF2B5EF4-FFF2-40B4-BE49-F238E27FC236}">
-                <a16:creationId xmlns:a16="http://schemas.microsoft.com/office/drawing/2014/main" id="{D9D642C8-3556-EF7E-8EB3-85CA924D97DA}"/>
+                <a16:creationId xmlns:a16="http://schemas.microsoft.com/office/drawing/2014/main" id="{43070B2E-706D-2C25-C296-2E200CD90352}"/>
               </a:ext>
               <a:ext uri="{C183D7F6-B498-43B3-948B-1728B52AA6E4}">
                 <adec:decorative xmlns:adec="http://schemas.microsoft.com/office/drawing/2017/decorative" val="1"/>
@@ -4889,7 +4879,7 @@
           <p:cNvPr id="13" name="Rectangle 12">
             <a:extLst>
               <a:ext uri="{FF2B5EF4-FFF2-40B4-BE49-F238E27FC236}">
-                <a16:creationId xmlns:a16="http://schemas.microsoft.com/office/drawing/2014/main" id="{609E63CE-2895-D50E-9D21-310E6C4629DD}"/>
+                <a16:creationId xmlns:a16="http://schemas.microsoft.com/office/drawing/2014/main" id="{B6ADAD13-B707-27B3-22E3-B92EC4356F78}"/>
               </a:ext>
               <a:ext uri="{C183D7F6-B498-43B3-948B-1728B52AA6E4}">
                 <adec:decorative xmlns:adec="http://schemas.microsoft.com/office/drawing/2017/decorative" val="1"/>
@@ -4955,10 +4945,10 @@
       </p:sp>
       <p:graphicFrame>
         <p:nvGraphicFramePr>
-          <p:cNvPr id="4" name="Inhaltsplatzhalter 5">
-            <a:extLst>
-              <a:ext uri="{FF2B5EF4-FFF2-40B4-BE49-F238E27FC236}">
-                <a16:creationId xmlns:a16="http://schemas.microsoft.com/office/drawing/2014/main" id="{DAC58118-636D-F1FA-CB87-55D8C3AC6AFB}"/>
+          <p:cNvPr id="4" name="Inhaltsplatzhalter 3">
+            <a:extLst>
+              <a:ext uri="{FF2B5EF4-FFF2-40B4-BE49-F238E27FC236}">
+                <a16:creationId xmlns:a16="http://schemas.microsoft.com/office/drawing/2014/main" id="{733E2D3C-617D-E0C3-35EB-A10F2CB9D0EF}"/>
               </a:ext>
             </a:extLst>
           </p:cNvPr>
@@ -4969,98 +4959,1470 @@
             <p:ph idx="1"/>
             <p:extLst>
               <p:ext uri="{D42A27DB-BD31-4B8C-83A1-F6EECF244321}">
-                <p14:modId xmlns:p14="http://schemas.microsoft.com/office/powerpoint/2010/main" val="4094620823"/>
+                <p14:modId xmlns:p14="http://schemas.microsoft.com/office/powerpoint/2010/main" val="2759472956"/>
               </p:ext>
             </p:extLst>
           </p:nvPr>
         </p:nvGraphicFramePr>
         <p:xfrm>
-          <a:off x="411163" y="2684463"/>
-          <a:ext cx="5081587" cy="3492500"/>
+          <a:off x="419100" y="2393689"/>
+          <a:ext cx="10883900" cy="4206154"/>
         </p:xfrm>
         <a:graphic>
-          <a:graphicData uri="http://schemas.openxmlformats.org/drawingml/2006/chart">
-            <c:chart xmlns:c="http://schemas.openxmlformats.org/drawingml/2006/chart" xmlns:r="http://schemas.openxmlformats.org/officeDocument/2006/relationships" r:id="rId2"/>
+          <a:graphicData uri="http://schemas.openxmlformats.org/drawingml/2006/table">
+            <a:tbl>
+              <a:tblPr firstRow="1" bandRow="1">
+                <a:tableStyleId>{5DA37D80-6434-44D0-A028-1B22A696006F}</a:tableStyleId>
+              </a:tblPr>
+              <a:tblGrid>
+                <a:gridCol w="4876800">
+                  <a:extLst>
+                    <a:ext uri="{9D8B030D-6E8A-4147-A177-3AD203B41FA5}">
+                      <a16:colId xmlns:a16="http://schemas.microsoft.com/office/drawing/2014/main" val="2880296848"/>
+                    </a:ext>
+                  </a:extLst>
+                </a:gridCol>
+                <a:gridCol w="6007100">
+                  <a:extLst>
+                    <a:ext uri="{9D8B030D-6E8A-4147-A177-3AD203B41FA5}">
+                      <a16:colId xmlns:a16="http://schemas.microsoft.com/office/drawing/2014/main" val="2452408960"/>
+                    </a:ext>
+                  </a:extLst>
+                </a:gridCol>
+              </a:tblGrid>
+              <a:tr h="344886">
+                <a:tc>
+                  <a:txBody>
+                    <a:bodyPr/>
+                    <a:lstStyle/>
+                    <a:p>
+                      <a:r>
+                        <a:rPr lang="de-DE" sz="1400" dirty="0"/>
+                        <a:t>Methode</a:t>
+                      </a:r>
+                    </a:p>
+                  </a:txBody>
+                  <a:tcPr/>
+                </a:tc>
+                <a:tc>
+                  <a:txBody>
+                    <a:bodyPr/>
+                    <a:lstStyle/>
+                    <a:p>
+                      <a:r>
+                        <a:rPr lang="de-DE" sz="1400" dirty="0"/>
+                        <a:t>Parameter</a:t>
+                      </a:r>
+                    </a:p>
+                  </a:txBody>
+                  <a:tcPr/>
+                </a:tc>
+                <a:extLst>
+                  <a:ext uri="{0D108BD9-81ED-4DB2-BD59-A6C34878D82A}">
+                    <a16:rowId xmlns:a16="http://schemas.microsoft.com/office/drawing/2014/main" val="2954306062"/>
+                  </a:ext>
+                </a:extLst>
+              </a:tr>
+              <a:tr h="461825">
+                <a:tc>
+                  <a:txBody>
+                    <a:bodyPr/>
+                    <a:lstStyle/>
+                    <a:p>
+                      <a:r>
+                        <a:rPr lang="de-DE" sz="1400" dirty="0"/>
+                        <a:t>MOG2 (</a:t>
+                      </a:r>
+                      <a:r>
+                        <a:rPr lang="de-DE" sz="1400" dirty="0" err="1"/>
+                        <a:t>Mixture</a:t>
+                      </a:r>
+                      <a:r>
+                        <a:rPr lang="de-DE" sz="1400" dirty="0"/>
+                        <a:t> of </a:t>
+                      </a:r>
+                      <a:r>
+                        <a:rPr lang="de-DE" sz="1400" dirty="0" err="1"/>
+                        <a:t>Gaussians</a:t>
+                      </a:r>
+                      <a:r>
+                        <a:rPr lang="de-DE" sz="1400" dirty="0"/>
+                        <a:t> 2)</a:t>
+                      </a:r>
+                    </a:p>
+                  </a:txBody>
+                  <a:tcPr/>
+                </a:tc>
+                <a:tc>
+                  <a:txBody>
+                    <a:bodyPr/>
+                    <a:lstStyle/>
+                    <a:p>
+                      <a:pPr marL="0" marR="0" lvl="0" indent="0" algn="l" defTabSz="914400" rtl="0" eaLnBrk="1" fontAlgn="auto" latinLnBrk="0" hangingPunct="1">
+                        <a:lnSpc>
+                          <a:spcPct val="100000"/>
+                        </a:lnSpc>
+                        <a:spcBef>
+                          <a:spcPts val="0"/>
+                        </a:spcBef>
+                        <a:spcAft>
+                          <a:spcPts val="0"/>
+                        </a:spcAft>
+                        <a:buClrTx/>
+                        <a:buSzTx/>
+                        <a:buFontTx/>
+                        <a:buNone/>
+                        <a:tabLst/>
+                        <a:defRPr/>
+                      </a:pPr>
+                      <a:r>
+                        <a:rPr lang="de-DE" sz="1400" kern="1200" dirty="0" err="1">
+                          <a:solidFill>
+                            <a:schemeClr val="tx1"/>
+                          </a:solidFill>
+                          <a:effectLst/>
+                          <a:latin typeface="+mn-lt"/>
+                          <a:ea typeface="+mn-ea"/>
+                          <a:cs typeface="+mn-cs"/>
+                        </a:rPr>
+                        <a:t>history</a:t>
+                      </a:r>
+                      <a:r>
+                        <a:rPr lang="de-DE" sz="1400" kern="1200" dirty="0">
+                          <a:solidFill>
+                            <a:schemeClr val="tx1"/>
+                          </a:solidFill>
+                          <a:effectLst/>
+                          <a:latin typeface="+mn-lt"/>
+                          <a:ea typeface="+mn-ea"/>
+                          <a:cs typeface="+mn-cs"/>
+                        </a:rPr>
+                        <a:t>=</a:t>
+                      </a:r>
+                      <a:r>
+                        <a:rPr lang="de-DE" sz="1400" b="1" kern="1200" dirty="0">
+                          <a:solidFill>
+                            <a:schemeClr val="tx1"/>
+                          </a:solidFill>
+                          <a:effectLst/>
+                          <a:latin typeface="+mn-lt"/>
+                          <a:ea typeface="+mn-ea"/>
+                          <a:cs typeface="+mn-cs"/>
+                        </a:rPr>
+                        <a:t>170</a:t>
+                      </a:r>
+                      <a:r>
+                        <a:rPr lang="de-DE" sz="1400" dirty="0"/>
+                        <a:t>, </a:t>
+                      </a:r>
+                      <a:r>
+                        <a:rPr lang="de-DE" sz="1400" kern="1200" dirty="0" err="1">
+                          <a:solidFill>
+                            <a:schemeClr val="tx1"/>
+                          </a:solidFill>
+                          <a:effectLst/>
+                          <a:latin typeface="+mn-lt"/>
+                          <a:ea typeface="+mn-ea"/>
+                          <a:cs typeface="+mn-cs"/>
+                        </a:rPr>
+                        <a:t>varThreshold</a:t>
+                      </a:r>
+                      <a:r>
+                        <a:rPr lang="de-DE" sz="1400" kern="1200" dirty="0">
+                          <a:solidFill>
+                            <a:schemeClr val="tx1"/>
+                          </a:solidFill>
+                          <a:effectLst/>
+                          <a:latin typeface="+mn-lt"/>
+                          <a:ea typeface="+mn-ea"/>
+                          <a:cs typeface="+mn-cs"/>
+                        </a:rPr>
+                        <a:t>=</a:t>
+                      </a:r>
+                      <a:r>
+                        <a:rPr lang="de-DE" sz="1400" b="1" kern="1200" dirty="0">
+                          <a:solidFill>
+                            <a:schemeClr val="tx1"/>
+                          </a:solidFill>
+                          <a:effectLst/>
+                          <a:latin typeface="+mn-lt"/>
+                          <a:ea typeface="+mn-ea"/>
+                          <a:cs typeface="+mn-cs"/>
+                        </a:rPr>
+                        <a:t>95</a:t>
+                      </a:r>
+                      <a:r>
+                        <a:rPr lang="de-DE" sz="1400" kern="1200" dirty="0">
+                          <a:solidFill>
+                            <a:schemeClr val="tx1"/>
+                          </a:solidFill>
+                          <a:effectLst/>
+                          <a:latin typeface="+mn-lt"/>
+                          <a:ea typeface="+mn-ea"/>
+                          <a:cs typeface="+mn-cs"/>
+                        </a:rPr>
+                        <a:t>, </a:t>
+                      </a:r>
+                      <a:r>
+                        <a:rPr lang="de-DE" sz="1400" kern="1200" dirty="0" err="1">
+                          <a:solidFill>
+                            <a:schemeClr val="tx1"/>
+                          </a:solidFill>
+                          <a:effectLst/>
+                          <a:latin typeface="+mn-lt"/>
+                          <a:ea typeface="+mn-ea"/>
+                          <a:cs typeface="+mn-cs"/>
+                        </a:rPr>
+                        <a:t>detectShadows</a:t>
+                      </a:r>
+                      <a:r>
+                        <a:rPr lang="de-DE" sz="1400" kern="1200" dirty="0">
+                          <a:solidFill>
+                            <a:schemeClr val="tx1"/>
+                          </a:solidFill>
+                          <a:effectLst/>
+                          <a:latin typeface="+mn-lt"/>
+                          <a:ea typeface="+mn-ea"/>
+                          <a:cs typeface="+mn-cs"/>
+                        </a:rPr>
+                        <a:t>=</a:t>
+                      </a:r>
+                      <a:r>
+                        <a:rPr lang="de-DE" sz="1400" b="1" kern="1200" dirty="0" err="1">
+                          <a:solidFill>
+                            <a:schemeClr val="tx1"/>
+                          </a:solidFill>
+                          <a:effectLst/>
+                          <a:latin typeface="+mn-lt"/>
+                          <a:ea typeface="+mn-ea"/>
+                          <a:cs typeface="+mn-cs"/>
+                        </a:rPr>
+                        <a:t>False</a:t>
+                      </a:r>
+                      <a:r>
+                        <a:rPr lang="de-DE" sz="1400" dirty="0"/>
+                        <a:t> </a:t>
+                      </a:r>
+                    </a:p>
+                  </a:txBody>
+                  <a:tcPr/>
+                </a:tc>
+                <a:extLst>
+                  <a:ext uri="{0D108BD9-81ED-4DB2-BD59-A6C34878D82A}">
+                    <a16:rowId xmlns:a16="http://schemas.microsoft.com/office/drawing/2014/main" val="1069761896"/>
+                  </a:ext>
+                </a:extLst>
+              </a:tr>
+              <a:tr h="482600">
+                <a:tc>
+                  <a:txBody>
+                    <a:bodyPr/>
+                    <a:lstStyle/>
+                    <a:p>
+                      <a:r>
+                        <a:rPr lang="de-DE" sz="1400" dirty="0"/>
+                        <a:t>MOG </a:t>
+                      </a:r>
+                      <a:br>
+                        <a:rPr lang="de-DE" sz="1400" dirty="0"/>
+                      </a:br>
+                      <a:r>
+                        <a:rPr lang="de-DE" sz="1400" dirty="0"/>
+                        <a:t>(</a:t>
+                      </a:r>
+                      <a:r>
+                        <a:rPr lang="de-DE" sz="1400" dirty="0" err="1"/>
+                        <a:t>Mixture</a:t>
+                      </a:r>
+                      <a:r>
+                        <a:rPr lang="de-DE" sz="1400" dirty="0"/>
+                        <a:t> of </a:t>
+                      </a:r>
+                      <a:r>
+                        <a:rPr lang="de-DE" sz="1400" dirty="0" err="1"/>
+                        <a:t>Gaussians</a:t>
+                      </a:r>
+                      <a:r>
+                        <a:rPr lang="de-DE" sz="1400" dirty="0"/>
+                        <a:t>)</a:t>
+                      </a:r>
+                    </a:p>
+                  </a:txBody>
+                  <a:tcPr/>
+                </a:tc>
+                <a:tc>
+                  <a:txBody>
+                    <a:bodyPr/>
+                    <a:lstStyle/>
+                    <a:p>
+                      <a:pPr marL="0" marR="0" lvl="0" indent="0" algn="l" defTabSz="914400" rtl="0" eaLnBrk="1" fontAlgn="auto" latinLnBrk="0" hangingPunct="1">
+                        <a:lnSpc>
+                          <a:spcPct val="100000"/>
+                        </a:lnSpc>
+                        <a:spcBef>
+                          <a:spcPts val="0"/>
+                        </a:spcBef>
+                        <a:spcAft>
+                          <a:spcPts val="0"/>
+                        </a:spcAft>
+                        <a:buClrTx/>
+                        <a:buSzTx/>
+                        <a:buFontTx/>
+                        <a:buNone/>
+                        <a:tabLst/>
+                        <a:defRPr/>
+                      </a:pPr>
+                      <a:r>
+                        <a:rPr lang="en-US" sz="1400" kern="1200" dirty="0">
+                          <a:solidFill>
+                            <a:schemeClr val="tx1"/>
+                          </a:solidFill>
+                          <a:effectLst/>
+                          <a:latin typeface="+mn-lt"/>
+                          <a:ea typeface="+mn-ea"/>
+                          <a:cs typeface="+mn-cs"/>
+                        </a:rPr>
+                        <a:t>history=</a:t>
+                      </a:r>
+                      <a:r>
+                        <a:rPr lang="en-US" sz="1400" b="1" kern="1200" dirty="0">
+                          <a:solidFill>
+                            <a:schemeClr val="tx1"/>
+                          </a:solidFill>
+                          <a:effectLst/>
+                          <a:latin typeface="+mn-lt"/>
+                          <a:ea typeface="+mn-ea"/>
+                          <a:cs typeface="+mn-cs"/>
+                        </a:rPr>
+                        <a:t>170</a:t>
+                      </a:r>
+                      <a:r>
+                        <a:rPr lang="en-US" sz="1400" kern="1200" dirty="0">
+                          <a:solidFill>
+                            <a:schemeClr val="tx1"/>
+                          </a:solidFill>
+                          <a:effectLst/>
+                          <a:latin typeface="+mn-lt"/>
+                          <a:ea typeface="+mn-ea"/>
+                          <a:cs typeface="+mn-cs"/>
+                        </a:rPr>
+                        <a:t>, </a:t>
+                      </a:r>
+                      <a:r>
+                        <a:rPr lang="en-US" sz="1400" kern="1200" dirty="0" err="1">
+                          <a:solidFill>
+                            <a:schemeClr val="tx1"/>
+                          </a:solidFill>
+                          <a:effectLst/>
+                          <a:latin typeface="+mn-lt"/>
+                          <a:ea typeface="+mn-ea"/>
+                          <a:cs typeface="+mn-cs"/>
+                        </a:rPr>
+                        <a:t>nmixtures</a:t>
+                      </a:r>
+                      <a:r>
+                        <a:rPr lang="en-US" sz="1400" kern="1200" dirty="0">
+                          <a:solidFill>
+                            <a:schemeClr val="tx1"/>
+                          </a:solidFill>
+                          <a:effectLst/>
+                          <a:latin typeface="+mn-lt"/>
+                          <a:ea typeface="+mn-ea"/>
+                          <a:cs typeface="+mn-cs"/>
+                        </a:rPr>
+                        <a:t>=</a:t>
+                      </a:r>
+                      <a:r>
+                        <a:rPr lang="en-US" sz="1400" b="1" kern="1200" dirty="0">
+                          <a:solidFill>
+                            <a:schemeClr val="tx1"/>
+                          </a:solidFill>
+                          <a:effectLst/>
+                          <a:latin typeface="+mn-lt"/>
+                          <a:ea typeface="+mn-ea"/>
+                          <a:cs typeface="+mn-cs"/>
+                        </a:rPr>
+                        <a:t>5</a:t>
+                      </a:r>
+                      <a:r>
+                        <a:rPr lang="en-US" sz="1400" kern="1200" dirty="0">
+                          <a:solidFill>
+                            <a:schemeClr val="tx1"/>
+                          </a:solidFill>
+                          <a:effectLst/>
+                          <a:latin typeface="+mn-lt"/>
+                          <a:ea typeface="+mn-ea"/>
+                          <a:cs typeface="+mn-cs"/>
+                        </a:rPr>
+                        <a:t>, </a:t>
+                      </a:r>
+                      <a:r>
+                        <a:rPr lang="en-US" sz="1400" kern="1200" dirty="0" err="1">
+                          <a:solidFill>
+                            <a:schemeClr val="tx1"/>
+                          </a:solidFill>
+                          <a:effectLst/>
+                          <a:latin typeface="+mn-lt"/>
+                          <a:ea typeface="+mn-ea"/>
+                          <a:cs typeface="+mn-cs"/>
+                        </a:rPr>
+                        <a:t>backgroundRatio</a:t>
+                      </a:r>
+                      <a:r>
+                        <a:rPr lang="en-US" sz="1400" kern="1200" dirty="0">
+                          <a:solidFill>
+                            <a:schemeClr val="tx1"/>
+                          </a:solidFill>
+                          <a:effectLst/>
+                          <a:latin typeface="+mn-lt"/>
+                          <a:ea typeface="+mn-ea"/>
+                          <a:cs typeface="+mn-cs"/>
+                        </a:rPr>
+                        <a:t>=</a:t>
+                      </a:r>
+                      <a:r>
+                        <a:rPr lang="en-US" sz="1400" b="1" kern="1200" dirty="0">
+                          <a:solidFill>
+                            <a:schemeClr val="tx1"/>
+                          </a:solidFill>
+                          <a:effectLst/>
+                          <a:latin typeface="+mn-lt"/>
+                          <a:ea typeface="+mn-ea"/>
+                          <a:cs typeface="+mn-cs"/>
+                        </a:rPr>
+                        <a:t>0.5</a:t>
+                      </a:r>
+                      <a:r>
+                        <a:rPr lang="en-US" sz="1400" kern="1200" dirty="0">
+                          <a:solidFill>
+                            <a:schemeClr val="tx1"/>
+                          </a:solidFill>
+                          <a:effectLst/>
+                          <a:latin typeface="+mn-lt"/>
+                          <a:ea typeface="+mn-ea"/>
+                          <a:cs typeface="+mn-cs"/>
+                        </a:rPr>
+                        <a:t>, </a:t>
+                      </a:r>
+                      <a:r>
+                        <a:rPr lang="en-US" sz="1400" kern="1200" dirty="0" err="1">
+                          <a:solidFill>
+                            <a:schemeClr val="tx1"/>
+                          </a:solidFill>
+                          <a:effectLst/>
+                          <a:latin typeface="+mn-lt"/>
+                          <a:ea typeface="+mn-ea"/>
+                          <a:cs typeface="+mn-cs"/>
+                        </a:rPr>
+                        <a:t>noiseSigma</a:t>
+                      </a:r>
+                      <a:r>
+                        <a:rPr lang="en-US" sz="1400" kern="1200" dirty="0">
+                          <a:solidFill>
+                            <a:schemeClr val="tx1"/>
+                          </a:solidFill>
+                          <a:effectLst/>
+                          <a:latin typeface="+mn-lt"/>
+                          <a:ea typeface="+mn-ea"/>
+                          <a:cs typeface="+mn-cs"/>
+                        </a:rPr>
+                        <a:t>=</a:t>
+                      </a:r>
+                      <a:r>
+                        <a:rPr lang="en-US" sz="1400" b="1" kern="1200" dirty="0">
+                          <a:solidFill>
+                            <a:schemeClr val="tx1"/>
+                          </a:solidFill>
+                          <a:effectLst/>
+                          <a:latin typeface="+mn-lt"/>
+                          <a:ea typeface="+mn-ea"/>
+                          <a:cs typeface="+mn-cs"/>
+                        </a:rPr>
+                        <a:t>1.5</a:t>
+                      </a:r>
+                    </a:p>
+                    <a:p>
+                      <a:endParaRPr lang="de-DE" sz="1400" dirty="0"/>
+                    </a:p>
+                  </a:txBody>
+                  <a:tcPr/>
+                </a:tc>
+                <a:extLst>
+                  <a:ext uri="{0D108BD9-81ED-4DB2-BD59-A6C34878D82A}">
+                    <a16:rowId xmlns:a16="http://schemas.microsoft.com/office/drawing/2014/main" val="4114695107"/>
+                  </a:ext>
+                </a:extLst>
+              </a:tr>
+              <a:tr h="439420">
+                <a:tc>
+                  <a:txBody>
+                    <a:bodyPr/>
+                    <a:lstStyle/>
+                    <a:p>
+                      <a:r>
+                        <a:rPr lang="de-DE" sz="1400" dirty="0"/>
+                        <a:t>KNN </a:t>
+                      </a:r>
+                      <a:br>
+                        <a:rPr lang="de-DE" sz="1400" dirty="0"/>
+                      </a:br>
+                      <a:r>
+                        <a:rPr lang="de-DE" sz="1400" dirty="0"/>
+                        <a:t>(K-</a:t>
+                      </a:r>
+                      <a:r>
+                        <a:rPr lang="de-DE" sz="1400" dirty="0" err="1"/>
+                        <a:t>Nearest</a:t>
+                      </a:r>
+                      <a:r>
+                        <a:rPr lang="de-DE" sz="1400" dirty="0"/>
+                        <a:t> </a:t>
+                      </a:r>
+                      <a:r>
+                        <a:rPr lang="de-DE" sz="1400" dirty="0" err="1"/>
+                        <a:t>Neighbors</a:t>
+                      </a:r>
+                      <a:r>
+                        <a:rPr lang="de-DE" sz="1400" dirty="0"/>
+                        <a:t>)</a:t>
+                      </a:r>
+                    </a:p>
+                  </a:txBody>
+                  <a:tcPr/>
+                </a:tc>
+                <a:tc>
+                  <a:txBody>
+                    <a:bodyPr/>
+                    <a:lstStyle/>
+                    <a:p>
+                      <a:pPr marL="0" marR="0" lvl="0" indent="0" algn="l" defTabSz="914400" rtl="0" eaLnBrk="1" fontAlgn="auto" latinLnBrk="0" hangingPunct="1">
+                        <a:lnSpc>
+                          <a:spcPct val="100000"/>
+                        </a:lnSpc>
+                        <a:spcBef>
+                          <a:spcPts val="0"/>
+                        </a:spcBef>
+                        <a:spcAft>
+                          <a:spcPts val="0"/>
+                        </a:spcAft>
+                        <a:buClrTx/>
+                        <a:buSzTx/>
+                        <a:buFontTx/>
+                        <a:buNone/>
+                        <a:tabLst/>
+                        <a:defRPr/>
+                      </a:pPr>
+                      <a:r>
+                        <a:rPr lang="en-US" sz="1400" kern="1200" dirty="0">
+                          <a:solidFill>
+                            <a:schemeClr val="tx1"/>
+                          </a:solidFill>
+                          <a:effectLst/>
+                          <a:latin typeface="+mn-lt"/>
+                          <a:ea typeface="+mn-ea"/>
+                          <a:cs typeface="+mn-cs"/>
+                        </a:rPr>
+                        <a:t>history=</a:t>
+                      </a:r>
+                      <a:r>
+                        <a:rPr lang="en-US" sz="1400" b="1" kern="1200" dirty="0">
+                          <a:solidFill>
+                            <a:schemeClr val="tx1"/>
+                          </a:solidFill>
+                          <a:effectLst/>
+                          <a:latin typeface="+mn-lt"/>
+                          <a:ea typeface="+mn-ea"/>
+                          <a:cs typeface="+mn-cs"/>
+                        </a:rPr>
+                        <a:t>500</a:t>
+                      </a:r>
+                      <a:r>
+                        <a:rPr lang="en-US" sz="1400" kern="1200" dirty="0">
+                          <a:solidFill>
+                            <a:schemeClr val="tx1"/>
+                          </a:solidFill>
+                          <a:effectLst/>
+                          <a:latin typeface="+mn-lt"/>
+                          <a:ea typeface="+mn-ea"/>
+                          <a:cs typeface="+mn-cs"/>
+                        </a:rPr>
+                        <a:t>, dist2Threshold=</a:t>
+                      </a:r>
+                      <a:r>
+                        <a:rPr lang="en-US" sz="1400" b="1" kern="1200" dirty="0">
+                          <a:solidFill>
+                            <a:schemeClr val="tx1"/>
+                          </a:solidFill>
+                          <a:effectLst/>
+                          <a:latin typeface="+mn-lt"/>
+                          <a:ea typeface="+mn-ea"/>
+                          <a:cs typeface="+mn-cs"/>
+                        </a:rPr>
+                        <a:t>400</a:t>
+                      </a:r>
+                      <a:r>
+                        <a:rPr lang="en-US" sz="1400" kern="1200" dirty="0">
+                          <a:solidFill>
+                            <a:schemeClr val="tx1"/>
+                          </a:solidFill>
+                          <a:effectLst/>
+                          <a:latin typeface="+mn-lt"/>
+                          <a:ea typeface="+mn-ea"/>
+                          <a:cs typeface="+mn-cs"/>
+                        </a:rPr>
+                        <a:t>, </a:t>
+                      </a:r>
+                      <a:r>
+                        <a:rPr lang="en-US" sz="1400" kern="1200" dirty="0" err="1">
+                          <a:solidFill>
+                            <a:schemeClr val="tx1"/>
+                          </a:solidFill>
+                          <a:effectLst/>
+                          <a:latin typeface="+mn-lt"/>
+                          <a:ea typeface="+mn-ea"/>
+                          <a:cs typeface="+mn-cs"/>
+                        </a:rPr>
+                        <a:t>detectShadows</a:t>
+                      </a:r>
+                      <a:r>
+                        <a:rPr lang="en-US" sz="1400" kern="1200" dirty="0">
+                          <a:solidFill>
+                            <a:schemeClr val="tx1"/>
+                          </a:solidFill>
+                          <a:effectLst/>
+                          <a:latin typeface="+mn-lt"/>
+                          <a:ea typeface="+mn-ea"/>
+                          <a:cs typeface="+mn-cs"/>
+                        </a:rPr>
+                        <a:t>=</a:t>
+                      </a:r>
+                      <a:r>
+                        <a:rPr lang="de-DE" sz="1400" b="1" kern="1200" dirty="0" err="1">
+                          <a:solidFill>
+                            <a:schemeClr val="tx1"/>
+                          </a:solidFill>
+                          <a:effectLst/>
+                          <a:latin typeface="+mn-lt"/>
+                          <a:ea typeface="+mn-ea"/>
+                          <a:cs typeface="+mn-cs"/>
+                        </a:rPr>
+                        <a:t>False</a:t>
+                      </a:r>
+                      <a:endParaRPr lang="en-US" sz="1400" b="1" kern="1200" dirty="0">
+                        <a:solidFill>
+                          <a:schemeClr val="tx1"/>
+                        </a:solidFill>
+                        <a:effectLst/>
+                        <a:latin typeface="+mn-lt"/>
+                        <a:ea typeface="+mn-ea"/>
+                        <a:cs typeface="+mn-cs"/>
+                      </a:endParaRPr>
+                    </a:p>
+                    <a:p>
+                      <a:endParaRPr lang="de-DE" sz="1400" dirty="0"/>
+                    </a:p>
+                  </a:txBody>
+                  <a:tcPr/>
+                </a:tc>
+                <a:extLst>
+                  <a:ext uri="{0D108BD9-81ED-4DB2-BD59-A6C34878D82A}">
+                    <a16:rowId xmlns:a16="http://schemas.microsoft.com/office/drawing/2014/main" val="1824794857"/>
+                  </a:ext>
+                </a:extLst>
+              </a:tr>
+              <a:tr h="440690">
+                <a:tc>
+                  <a:txBody>
+                    <a:bodyPr/>
+                    <a:lstStyle/>
+                    <a:p>
+                      <a:r>
+                        <a:rPr lang="de-DE" sz="1400" dirty="0"/>
+                        <a:t>CNT </a:t>
+                      </a:r>
+                      <a:br>
+                        <a:rPr lang="de-DE" sz="1400" dirty="0"/>
+                      </a:br>
+                      <a:r>
+                        <a:rPr lang="de-DE" sz="1400" dirty="0"/>
+                        <a:t>(</a:t>
+                      </a:r>
+                      <a:r>
+                        <a:rPr lang="de-DE" sz="1400" dirty="0" err="1"/>
+                        <a:t>Continuous</a:t>
+                      </a:r>
+                      <a:r>
+                        <a:rPr lang="de-DE" sz="1400" dirty="0"/>
+                        <a:t> Background </a:t>
+                      </a:r>
+                      <a:r>
+                        <a:rPr lang="de-DE" sz="1400" dirty="0" err="1"/>
+                        <a:t>Subtraction</a:t>
+                      </a:r>
+                      <a:r>
+                        <a:rPr lang="de-DE" sz="1400" dirty="0"/>
+                        <a:t>)</a:t>
+                      </a:r>
+                    </a:p>
+                  </a:txBody>
+                  <a:tcPr/>
+                </a:tc>
+                <a:tc>
+                  <a:txBody>
+                    <a:bodyPr/>
+                    <a:lstStyle/>
+                    <a:p>
+                      <a:pPr marL="0" marR="0" lvl="0" indent="0" algn="l" defTabSz="914400" rtl="0" eaLnBrk="1" fontAlgn="auto" latinLnBrk="0" hangingPunct="1">
+                        <a:lnSpc>
+                          <a:spcPct val="100000"/>
+                        </a:lnSpc>
+                        <a:spcBef>
+                          <a:spcPts val="0"/>
+                        </a:spcBef>
+                        <a:spcAft>
+                          <a:spcPts val="0"/>
+                        </a:spcAft>
+                        <a:buClrTx/>
+                        <a:buSzTx/>
+                        <a:buFontTx/>
+                        <a:buNone/>
+                        <a:tabLst/>
+                        <a:defRPr/>
+                      </a:pPr>
+                      <a:r>
+                        <a:rPr lang="de-DE" sz="1400" kern="1200" dirty="0" err="1">
+                          <a:solidFill>
+                            <a:schemeClr val="tx1"/>
+                          </a:solidFill>
+                          <a:effectLst/>
+                          <a:latin typeface="+mn-lt"/>
+                          <a:ea typeface="+mn-ea"/>
+                          <a:cs typeface="+mn-cs"/>
+                        </a:rPr>
+                        <a:t>minPixelStability</a:t>
+                      </a:r>
+                      <a:r>
+                        <a:rPr lang="de-DE" sz="1400" kern="1200" dirty="0">
+                          <a:solidFill>
+                            <a:schemeClr val="tx1"/>
+                          </a:solidFill>
+                          <a:effectLst/>
+                          <a:latin typeface="+mn-lt"/>
+                          <a:ea typeface="+mn-ea"/>
+                          <a:cs typeface="+mn-cs"/>
+                        </a:rPr>
+                        <a:t>=</a:t>
+                      </a:r>
+                      <a:r>
+                        <a:rPr lang="de-DE" sz="1400" b="1" kern="1200" dirty="0">
+                          <a:solidFill>
+                            <a:schemeClr val="tx1"/>
+                          </a:solidFill>
+                          <a:effectLst/>
+                          <a:latin typeface="+mn-lt"/>
+                          <a:ea typeface="+mn-ea"/>
+                          <a:cs typeface="+mn-cs"/>
+                        </a:rPr>
+                        <a:t>15</a:t>
+                      </a:r>
+                      <a:r>
+                        <a:rPr lang="de-DE" sz="1400" kern="1200" dirty="0">
+                          <a:solidFill>
+                            <a:schemeClr val="tx1"/>
+                          </a:solidFill>
+                          <a:effectLst/>
+                          <a:latin typeface="+mn-lt"/>
+                          <a:ea typeface="+mn-ea"/>
+                          <a:cs typeface="+mn-cs"/>
+                        </a:rPr>
+                        <a:t>, </a:t>
+                      </a:r>
+                      <a:r>
+                        <a:rPr lang="de-DE" sz="1400" kern="1200" dirty="0" err="1">
+                          <a:solidFill>
+                            <a:schemeClr val="tx1"/>
+                          </a:solidFill>
+                          <a:effectLst/>
+                          <a:latin typeface="+mn-lt"/>
+                          <a:ea typeface="+mn-ea"/>
+                          <a:cs typeface="+mn-cs"/>
+                        </a:rPr>
+                        <a:t>maxPixelStability</a:t>
+                      </a:r>
+                      <a:r>
+                        <a:rPr lang="de-DE" sz="1400" kern="1200" dirty="0">
+                          <a:solidFill>
+                            <a:schemeClr val="tx1"/>
+                          </a:solidFill>
+                          <a:effectLst/>
+                          <a:latin typeface="+mn-lt"/>
+                          <a:ea typeface="+mn-ea"/>
+                          <a:cs typeface="+mn-cs"/>
+                        </a:rPr>
+                        <a:t>=</a:t>
+                      </a:r>
+                      <a:r>
+                        <a:rPr lang="de-DE" sz="1400" b="1" kern="1200" dirty="0">
+                          <a:solidFill>
+                            <a:schemeClr val="tx1"/>
+                          </a:solidFill>
+                          <a:effectLst/>
+                          <a:latin typeface="+mn-lt"/>
+                          <a:ea typeface="+mn-ea"/>
+                          <a:cs typeface="+mn-cs"/>
+                        </a:rPr>
+                        <a:t>60</a:t>
+                      </a:r>
+                      <a:r>
+                        <a:rPr lang="de-DE" sz="1400" kern="1200" dirty="0">
+                          <a:solidFill>
+                            <a:schemeClr val="tx1"/>
+                          </a:solidFill>
+                          <a:effectLst/>
+                          <a:latin typeface="+mn-lt"/>
+                          <a:ea typeface="+mn-ea"/>
+                          <a:cs typeface="+mn-cs"/>
+                        </a:rPr>
+                        <a:t>, </a:t>
+                      </a:r>
+                      <a:r>
+                        <a:rPr lang="de-DE" sz="1400" kern="1200" dirty="0" err="1">
+                          <a:solidFill>
+                            <a:schemeClr val="tx1"/>
+                          </a:solidFill>
+                          <a:effectLst/>
+                          <a:latin typeface="+mn-lt"/>
+                          <a:ea typeface="+mn-ea"/>
+                          <a:cs typeface="+mn-cs"/>
+                        </a:rPr>
+                        <a:t>isParallel</a:t>
+                      </a:r>
+                      <a:r>
+                        <a:rPr lang="de-DE" sz="1400" kern="1200" dirty="0">
+                          <a:solidFill>
+                            <a:schemeClr val="tx1"/>
+                          </a:solidFill>
+                          <a:effectLst/>
+                          <a:latin typeface="+mn-lt"/>
+                          <a:ea typeface="+mn-ea"/>
+                          <a:cs typeface="+mn-cs"/>
+                        </a:rPr>
+                        <a:t>=</a:t>
+                      </a:r>
+                      <a:r>
+                        <a:rPr lang="de-DE" sz="1400" b="1" kern="1200" dirty="0">
+                          <a:solidFill>
+                            <a:schemeClr val="tx1"/>
+                          </a:solidFill>
+                          <a:effectLst/>
+                          <a:latin typeface="+mn-lt"/>
+                          <a:ea typeface="+mn-ea"/>
+                          <a:cs typeface="+mn-cs"/>
+                        </a:rPr>
+                        <a:t>True</a:t>
+                      </a:r>
+                    </a:p>
+                    <a:p>
+                      <a:endParaRPr lang="de-DE" sz="1400" dirty="0"/>
+                    </a:p>
+                  </a:txBody>
+                  <a:tcPr/>
+                </a:tc>
+                <a:extLst>
+                  <a:ext uri="{0D108BD9-81ED-4DB2-BD59-A6C34878D82A}">
+                    <a16:rowId xmlns:a16="http://schemas.microsoft.com/office/drawing/2014/main" val="1046297743"/>
+                  </a:ext>
+                </a:extLst>
+              </a:tr>
+              <a:tr h="441960">
+                <a:tc>
+                  <a:txBody>
+                    <a:bodyPr/>
+                    <a:lstStyle/>
+                    <a:p>
+                      <a:r>
+                        <a:rPr lang="de-DE" sz="1400" dirty="0"/>
+                        <a:t>GMG </a:t>
+                      </a:r>
+                      <a:br>
+                        <a:rPr lang="de-DE" sz="1400" dirty="0"/>
+                      </a:br>
+                      <a:r>
+                        <a:rPr lang="de-DE" sz="1400" dirty="0"/>
+                        <a:t>(</a:t>
+                      </a:r>
+                      <a:r>
+                        <a:rPr lang="en-US" sz="1400" dirty="0"/>
+                        <a:t>Gaussian Mixture-based Background/Foreground Segmentation</a:t>
+                      </a:r>
+                      <a:r>
+                        <a:rPr lang="de-DE" sz="1400" dirty="0"/>
+                        <a:t>)</a:t>
+                      </a:r>
+                    </a:p>
+                  </a:txBody>
+                  <a:tcPr/>
+                </a:tc>
+                <a:tc>
+                  <a:txBody>
+                    <a:bodyPr/>
+                    <a:lstStyle/>
+                    <a:p>
+                      <a:pPr marL="0" marR="0" lvl="0" indent="0" algn="l" defTabSz="914400" rtl="0" eaLnBrk="1" fontAlgn="auto" latinLnBrk="0" hangingPunct="1">
+                        <a:lnSpc>
+                          <a:spcPct val="100000"/>
+                        </a:lnSpc>
+                        <a:spcBef>
+                          <a:spcPts val="0"/>
+                        </a:spcBef>
+                        <a:spcAft>
+                          <a:spcPts val="0"/>
+                        </a:spcAft>
+                        <a:buClrTx/>
+                        <a:buSzTx/>
+                        <a:buFontTx/>
+                        <a:buNone/>
+                        <a:tabLst/>
+                        <a:defRPr/>
+                      </a:pPr>
+                      <a:r>
+                        <a:rPr lang="de-DE" sz="1400" kern="1200" dirty="0" err="1">
+                          <a:solidFill>
+                            <a:schemeClr val="tx1"/>
+                          </a:solidFill>
+                          <a:effectLst/>
+                          <a:latin typeface="+mn-lt"/>
+                          <a:ea typeface="+mn-ea"/>
+                          <a:cs typeface="+mn-cs"/>
+                        </a:rPr>
+                        <a:t>initializationFrames</a:t>
+                      </a:r>
+                      <a:r>
+                        <a:rPr lang="de-DE" sz="1400" kern="1200" dirty="0">
+                          <a:solidFill>
+                            <a:schemeClr val="tx1"/>
+                          </a:solidFill>
+                          <a:effectLst/>
+                          <a:latin typeface="+mn-lt"/>
+                          <a:ea typeface="+mn-ea"/>
+                          <a:cs typeface="+mn-cs"/>
+                        </a:rPr>
+                        <a:t>=</a:t>
+                      </a:r>
+                      <a:r>
+                        <a:rPr lang="de-DE" sz="1400" b="1" kern="1200" dirty="0">
+                          <a:solidFill>
+                            <a:schemeClr val="tx1"/>
+                          </a:solidFill>
+                          <a:effectLst/>
+                          <a:latin typeface="+mn-lt"/>
+                          <a:ea typeface="+mn-ea"/>
+                          <a:cs typeface="+mn-cs"/>
+                        </a:rPr>
+                        <a:t>50</a:t>
+                      </a:r>
+                      <a:r>
+                        <a:rPr lang="de-DE" sz="1400" kern="1200" dirty="0">
+                          <a:solidFill>
+                            <a:schemeClr val="tx1"/>
+                          </a:solidFill>
+                          <a:effectLst/>
+                          <a:latin typeface="+mn-lt"/>
+                          <a:ea typeface="+mn-ea"/>
+                          <a:cs typeface="+mn-cs"/>
+                        </a:rPr>
+                        <a:t>, </a:t>
+                      </a:r>
+                      <a:r>
+                        <a:rPr lang="de-DE" sz="1400" kern="1200" dirty="0" err="1">
+                          <a:solidFill>
+                            <a:schemeClr val="tx1"/>
+                          </a:solidFill>
+                          <a:effectLst/>
+                          <a:latin typeface="+mn-lt"/>
+                          <a:ea typeface="+mn-ea"/>
+                          <a:cs typeface="+mn-cs"/>
+                        </a:rPr>
+                        <a:t>decisionThreshold</a:t>
+                      </a:r>
+                      <a:r>
+                        <a:rPr lang="de-DE" sz="1400" kern="1200" dirty="0">
+                          <a:solidFill>
+                            <a:schemeClr val="tx1"/>
+                          </a:solidFill>
+                          <a:effectLst/>
+                          <a:latin typeface="+mn-lt"/>
+                          <a:ea typeface="+mn-ea"/>
+                          <a:cs typeface="+mn-cs"/>
+                        </a:rPr>
+                        <a:t>=</a:t>
+                      </a:r>
+                      <a:r>
+                        <a:rPr lang="de-DE" sz="1400" b="1" kern="1200" dirty="0">
+                          <a:solidFill>
+                            <a:schemeClr val="tx1"/>
+                          </a:solidFill>
+                          <a:effectLst/>
+                          <a:latin typeface="+mn-lt"/>
+                          <a:ea typeface="+mn-ea"/>
+                          <a:cs typeface="+mn-cs"/>
+                        </a:rPr>
+                        <a:t>0.7</a:t>
+                      </a:r>
+                    </a:p>
+                    <a:p>
+                      <a:endParaRPr lang="de-DE" sz="1400" dirty="0"/>
+                    </a:p>
+                  </a:txBody>
+                  <a:tcPr/>
+                </a:tc>
+                <a:extLst>
+                  <a:ext uri="{0D108BD9-81ED-4DB2-BD59-A6C34878D82A}">
+                    <a16:rowId xmlns:a16="http://schemas.microsoft.com/office/drawing/2014/main" val="1059716208"/>
+                  </a:ext>
+                </a:extLst>
+              </a:tr>
+              <a:tr h="133003">
+                <a:tc>
+                  <a:txBody>
+                    <a:bodyPr/>
+                    <a:lstStyle/>
+                    <a:p>
+                      <a:pPr marL="0" marR="0" lvl="0" indent="0" algn="l" defTabSz="914400" rtl="0" eaLnBrk="1" fontAlgn="auto" latinLnBrk="0" hangingPunct="1">
+                        <a:lnSpc>
+                          <a:spcPct val="100000"/>
+                        </a:lnSpc>
+                        <a:spcBef>
+                          <a:spcPts val="0"/>
+                        </a:spcBef>
+                        <a:spcAft>
+                          <a:spcPts val="0"/>
+                        </a:spcAft>
+                        <a:buClrTx/>
+                        <a:buSzTx/>
+                        <a:buFontTx/>
+                        <a:buNone/>
+                        <a:tabLst/>
+                        <a:defRPr/>
+                      </a:pPr>
+                      <a:r>
+                        <a:rPr lang="de-DE" sz="1400" kern="1200" dirty="0">
+                          <a:solidFill>
+                            <a:schemeClr val="tx1"/>
+                          </a:solidFill>
+                          <a:effectLst/>
+                          <a:latin typeface="+mn-lt"/>
+                          <a:ea typeface="+mn-ea"/>
+                          <a:cs typeface="+mn-cs"/>
+                        </a:rPr>
+                        <a:t>GSOC</a:t>
+                      </a:r>
+                    </a:p>
+                    <a:p>
+                      <a:pPr marL="0" marR="0" lvl="0" indent="0" algn="l" defTabSz="914400" rtl="0" eaLnBrk="1" fontAlgn="auto" latinLnBrk="0" hangingPunct="1">
+                        <a:lnSpc>
+                          <a:spcPct val="100000"/>
+                        </a:lnSpc>
+                        <a:spcBef>
+                          <a:spcPts val="0"/>
+                        </a:spcBef>
+                        <a:spcAft>
+                          <a:spcPts val="0"/>
+                        </a:spcAft>
+                        <a:buClrTx/>
+                        <a:buSzTx/>
+                        <a:buFontTx/>
+                        <a:buNone/>
+                        <a:tabLst/>
+                        <a:defRPr/>
+                      </a:pPr>
+                      <a:r>
+                        <a:rPr lang="de-DE" sz="1400" kern="1200" dirty="0">
+                          <a:solidFill>
+                            <a:schemeClr val="tx1"/>
+                          </a:solidFill>
+                          <a:effectLst/>
+                          <a:latin typeface="+mn-lt"/>
+                          <a:ea typeface="+mn-ea"/>
+                          <a:cs typeface="+mn-cs"/>
+                        </a:rPr>
+                        <a:t>(</a:t>
+                      </a:r>
+                      <a:r>
+                        <a:rPr lang="de-DE" sz="1400" dirty="0"/>
+                        <a:t>Gradient Segmentation </a:t>
+                      </a:r>
+                      <a:r>
+                        <a:rPr lang="de-DE" sz="1400" dirty="0" err="1"/>
+                        <a:t>for</a:t>
+                      </a:r>
+                      <a:r>
+                        <a:rPr lang="de-DE" sz="1400" dirty="0"/>
+                        <a:t> </a:t>
+                      </a:r>
+                      <a:r>
+                        <a:rPr lang="de-DE" sz="1400" dirty="0" err="1"/>
+                        <a:t>Object</a:t>
+                      </a:r>
+                      <a:r>
+                        <a:rPr lang="de-DE" sz="1400" dirty="0"/>
+                        <a:t> Classification</a:t>
+                      </a:r>
+                      <a:r>
+                        <a:rPr lang="de-DE" sz="1400" kern="1200" dirty="0">
+                          <a:solidFill>
+                            <a:schemeClr val="tx1"/>
+                          </a:solidFill>
+                          <a:effectLst/>
+                          <a:latin typeface="+mn-lt"/>
+                          <a:ea typeface="+mn-ea"/>
+                          <a:cs typeface="+mn-cs"/>
+                        </a:rPr>
+                        <a:t>)</a:t>
+                      </a:r>
+                    </a:p>
+                  </a:txBody>
+                  <a:tcPr/>
+                </a:tc>
+                <a:tc>
+                  <a:txBody>
+                    <a:bodyPr/>
+                    <a:lstStyle/>
+                    <a:p>
+                      <a:pPr marL="0" marR="0" lvl="0" indent="0" algn="l" defTabSz="914400" rtl="0" eaLnBrk="1" fontAlgn="auto" latinLnBrk="0" hangingPunct="1">
+                        <a:lnSpc>
+                          <a:spcPct val="100000"/>
+                        </a:lnSpc>
+                        <a:spcBef>
+                          <a:spcPts val="0"/>
+                        </a:spcBef>
+                        <a:spcAft>
+                          <a:spcPts val="0"/>
+                        </a:spcAft>
+                        <a:buClrTx/>
+                        <a:buSzTx/>
+                        <a:buFontTx/>
+                        <a:buNone/>
+                        <a:tabLst/>
+                        <a:defRPr/>
+                      </a:pPr>
+                      <a:r>
+                        <a:rPr lang="de-DE" sz="1400" kern="1200" dirty="0">
+                          <a:solidFill>
+                            <a:schemeClr val="tx1"/>
+                          </a:solidFill>
+                          <a:effectLst/>
+                          <a:latin typeface="+mn-lt"/>
+                          <a:ea typeface="+mn-ea"/>
+                          <a:cs typeface="+mn-cs"/>
+                        </a:rPr>
+                        <a:t>mc=</a:t>
+                      </a:r>
+                      <a:r>
+                        <a:rPr lang="de-DE" sz="1400" b="1" kern="1200" dirty="0">
+                          <a:solidFill>
+                            <a:schemeClr val="tx1"/>
+                          </a:solidFill>
+                          <a:effectLst/>
+                          <a:latin typeface="+mn-lt"/>
+                          <a:ea typeface="+mn-ea"/>
+                          <a:cs typeface="+mn-cs"/>
+                        </a:rPr>
+                        <a:t>1</a:t>
+                      </a:r>
+                      <a:r>
+                        <a:rPr lang="de-DE" sz="1400" kern="1200" dirty="0">
+                          <a:solidFill>
+                            <a:schemeClr val="tx1"/>
+                          </a:solidFill>
+                          <a:effectLst/>
+                          <a:latin typeface="+mn-lt"/>
+                          <a:ea typeface="+mn-ea"/>
+                          <a:cs typeface="+mn-cs"/>
+                        </a:rPr>
+                        <a:t>, </a:t>
+                      </a:r>
+                      <a:r>
+                        <a:rPr lang="de-DE" sz="1400" kern="1200" dirty="0" err="1">
+                          <a:solidFill>
+                            <a:schemeClr val="tx1"/>
+                          </a:solidFill>
+                          <a:effectLst/>
+                          <a:latin typeface="+mn-lt"/>
+                          <a:ea typeface="+mn-ea"/>
+                          <a:cs typeface="+mn-cs"/>
+                        </a:rPr>
+                        <a:t>nSamples</a:t>
+                      </a:r>
+                      <a:r>
+                        <a:rPr lang="de-DE" sz="1400" kern="1200" dirty="0">
+                          <a:solidFill>
+                            <a:schemeClr val="tx1"/>
+                          </a:solidFill>
+                          <a:effectLst/>
+                          <a:latin typeface="+mn-lt"/>
+                          <a:ea typeface="+mn-ea"/>
+                          <a:cs typeface="+mn-cs"/>
+                        </a:rPr>
+                        <a:t>=</a:t>
+                      </a:r>
+                      <a:r>
+                        <a:rPr lang="de-DE" sz="1400" b="1" kern="1200" dirty="0">
+                          <a:solidFill>
+                            <a:schemeClr val="tx1"/>
+                          </a:solidFill>
+                          <a:effectLst/>
+                          <a:latin typeface="+mn-lt"/>
+                          <a:ea typeface="+mn-ea"/>
+                          <a:cs typeface="+mn-cs"/>
+                        </a:rPr>
+                        <a:t>20</a:t>
+                      </a:r>
+                      <a:r>
+                        <a:rPr lang="de-DE" sz="1400" kern="1200" dirty="0">
+                          <a:solidFill>
+                            <a:schemeClr val="tx1"/>
+                          </a:solidFill>
+                          <a:effectLst/>
+                          <a:latin typeface="+mn-lt"/>
+                          <a:ea typeface="+mn-ea"/>
+                          <a:cs typeface="+mn-cs"/>
+                        </a:rPr>
+                        <a:t>, </a:t>
+                      </a:r>
+                      <a:r>
+                        <a:rPr lang="de-DE" sz="1400" kern="1200" dirty="0" err="1">
+                          <a:solidFill>
+                            <a:schemeClr val="tx1"/>
+                          </a:solidFill>
+                          <a:effectLst/>
+                          <a:latin typeface="+mn-lt"/>
+                          <a:ea typeface="+mn-ea"/>
+                          <a:cs typeface="+mn-cs"/>
+                        </a:rPr>
+                        <a:t>replaceRate</a:t>
+                      </a:r>
+                      <a:r>
+                        <a:rPr lang="de-DE" sz="1400" kern="1200" dirty="0">
+                          <a:solidFill>
+                            <a:schemeClr val="tx1"/>
+                          </a:solidFill>
+                          <a:effectLst/>
+                          <a:latin typeface="+mn-lt"/>
+                          <a:ea typeface="+mn-ea"/>
+                          <a:cs typeface="+mn-cs"/>
+                        </a:rPr>
+                        <a:t>=</a:t>
+                      </a:r>
+                      <a:r>
+                        <a:rPr lang="de-DE" sz="1400" b="1" kern="1200" dirty="0">
+                          <a:solidFill>
+                            <a:schemeClr val="tx1"/>
+                          </a:solidFill>
+                          <a:effectLst/>
+                          <a:latin typeface="+mn-lt"/>
+                          <a:ea typeface="+mn-ea"/>
+                          <a:cs typeface="+mn-cs"/>
+                        </a:rPr>
+                        <a:t>0.01</a:t>
+                      </a:r>
+                    </a:p>
+                    <a:p>
+                      <a:endParaRPr lang="de-DE" sz="1400" dirty="0"/>
+                    </a:p>
+                  </a:txBody>
+                  <a:tcPr/>
+                </a:tc>
+                <a:extLst>
+                  <a:ext uri="{0D108BD9-81ED-4DB2-BD59-A6C34878D82A}">
+                    <a16:rowId xmlns:a16="http://schemas.microsoft.com/office/drawing/2014/main" val="2804086022"/>
+                  </a:ext>
+                </a:extLst>
+              </a:tr>
+              <a:tr h="595283">
+                <a:tc>
+                  <a:txBody>
+                    <a:bodyPr/>
+                    <a:lstStyle/>
+                    <a:p>
+                      <a:r>
+                        <a:rPr lang="de-DE" sz="1400" dirty="0"/>
+                        <a:t>LSBP </a:t>
+                      </a:r>
+                      <a:br>
+                        <a:rPr lang="de-DE" sz="1400" dirty="0"/>
+                      </a:br>
+                      <a:r>
+                        <a:rPr lang="de-DE" sz="1400" dirty="0"/>
+                        <a:t>(</a:t>
+                      </a:r>
+                      <a:r>
+                        <a:rPr lang="de-DE" sz="1400" dirty="0" err="1"/>
+                        <a:t>Local</a:t>
+                      </a:r>
+                      <a:r>
+                        <a:rPr lang="de-DE" sz="1400" dirty="0"/>
+                        <a:t> </a:t>
+                      </a:r>
+                      <a:r>
+                        <a:rPr lang="de-DE" sz="1400" dirty="0" err="1"/>
+                        <a:t>Sensitivity-based</a:t>
+                      </a:r>
+                      <a:r>
+                        <a:rPr lang="de-DE" sz="1400" dirty="0"/>
+                        <a:t> Background </a:t>
+                      </a:r>
+                      <a:r>
+                        <a:rPr lang="de-DE" sz="1400" dirty="0" err="1"/>
+                        <a:t>Subtraction</a:t>
+                      </a:r>
+                      <a:r>
+                        <a:rPr lang="de-DE" sz="1400" dirty="0"/>
+                        <a:t>)</a:t>
+                      </a:r>
+                    </a:p>
+                  </a:txBody>
+                  <a:tcPr/>
+                </a:tc>
+                <a:tc>
+                  <a:txBody>
+                    <a:bodyPr/>
+                    <a:lstStyle/>
+                    <a:p>
+                      <a:pPr marL="0" marR="0" lvl="0" indent="0" algn="l" defTabSz="914400" rtl="0" eaLnBrk="1" fontAlgn="auto" latinLnBrk="0" hangingPunct="1">
+                        <a:lnSpc>
+                          <a:spcPct val="100000"/>
+                        </a:lnSpc>
+                        <a:spcBef>
+                          <a:spcPts val="0"/>
+                        </a:spcBef>
+                        <a:spcAft>
+                          <a:spcPts val="0"/>
+                        </a:spcAft>
+                        <a:buClrTx/>
+                        <a:buSzTx/>
+                        <a:buFontTx/>
+                        <a:buNone/>
+                        <a:tabLst/>
+                        <a:defRPr/>
+                      </a:pPr>
+                      <a:r>
+                        <a:rPr lang="en-US" sz="1400" kern="1200" dirty="0">
+                          <a:solidFill>
+                            <a:schemeClr val="tx1"/>
+                          </a:solidFill>
+                          <a:effectLst/>
+                          <a:latin typeface="+mn-lt"/>
+                          <a:ea typeface="+mn-ea"/>
+                          <a:cs typeface="+mn-cs"/>
+                        </a:rPr>
+                        <a:t>mc=</a:t>
+                      </a:r>
+                      <a:r>
+                        <a:rPr lang="en-US" sz="1400" b="1" kern="1200" dirty="0">
+                          <a:solidFill>
+                            <a:schemeClr val="tx1"/>
+                          </a:solidFill>
+                          <a:effectLst/>
+                          <a:latin typeface="+mn-lt"/>
+                          <a:ea typeface="+mn-ea"/>
+                          <a:cs typeface="+mn-cs"/>
+                        </a:rPr>
+                        <a:t>1</a:t>
+                      </a:r>
+                      <a:r>
+                        <a:rPr lang="en-US" sz="1400" kern="1200" dirty="0">
+                          <a:solidFill>
+                            <a:schemeClr val="tx1"/>
+                          </a:solidFill>
+                          <a:effectLst/>
+                          <a:latin typeface="+mn-lt"/>
+                          <a:ea typeface="+mn-ea"/>
+                          <a:cs typeface="+mn-cs"/>
+                        </a:rPr>
+                        <a:t>, </a:t>
+                      </a:r>
+                      <a:r>
+                        <a:rPr lang="en-US" sz="1400" kern="1200" dirty="0" err="1">
+                          <a:solidFill>
+                            <a:schemeClr val="tx1"/>
+                          </a:solidFill>
+                          <a:effectLst/>
+                          <a:latin typeface="+mn-lt"/>
+                          <a:ea typeface="+mn-ea"/>
+                          <a:cs typeface="+mn-cs"/>
+                        </a:rPr>
+                        <a:t>Tlower</a:t>
+                      </a:r>
+                      <a:r>
+                        <a:rPr lang="en-US" sz="1400" kern="1200" dirty="0">
+                          <a:solidFill>
+                            <a:schemeClr val="tx1"/>
+                          </a:solidFill>
+                          <a:effectLst/>
+                          <a:latin typeface="+mn-lt"/>
+                          <a:ea typeface="+mn-ea"/>
+                          <a:cs typeface="+mn-cs"/>
+                        </a:rPr>
+                        <a:t>=</a:t>
+                      </a:r>
+                      <a:r>
+                        <a:rPr lang="en-US" sz="1400" b="1" kern="1200" dirty="0">
+                          <a:solidFill>
+                            <a:schemeClr val="tx1"/>
+                          </a:solidFill>
+                          <a:effectLst/>
+                          <a:latin typeface="+mn-lt"/>
+                          <a:ea typeface="+mn-ea"/>
+                          <a:cs typeface="+mn-cs"/>
+                        </a:rPr>
+                        <a:t>2</a:t>
+                      </a:r>
+                      <a:r>
+                        <a:rPr lang="en-US" sz="1400" kern="1200" dirty="0">
+                          <a:solidFill>
+                            <a:schemeClr val="tx1"/>
+                          </a:solidFill>
+                          <a:effectLst/>
+                          <a:latin typeface="+mn-lt"/>
+                          <a:ea typeface="+mn-ea"/>
+                          <a:cs typeface="+mn-cs"/>
+                        </a:rPr>
+                        <a:t>, Tupper=</a:t>
+                      </a:r>
+                      <a:r>
+                        <a:rPr lang="en-US" sz="1400" b="1" kern="1200" dirty="0">
+                          <a:solidFill>
+                            <a:schemeClr val="tx1"/>
+                          </a:solidFill>
+                          <a:effectLst/>
+                          <a:latin typeface="+mn-lt"/>
+                          <a:ea typeface="+mn-ea"/>
+                          <a:cs typeface="+mn-cs"/>
+                        </a:rPr>
+                        <a:t>32</a:t>
+                      </a:r>
+                    </a:p>
+                    <a:p>
+                      <a:endParaRPr lang="de-DE" sz="1400" dirty="0"/>
+                    </a:p>
+                  </a:txBody>
+                  <a:tcPr/>
+                </a:tc>
+                <a:extLst>
+                  <a:ext uri="{0D108BD9-81ED-4DB2-BD59-A6C34878D82A}">
+                    <a16:rowId xmlns:a16="http://schemas.microsoft.com/office/drawing/2014/main" val="4056653088"/>
+                  </a:ext>
+                </a:extLst>
+              </a:tr>
+            </a:tbl>
           </a:graphicData>
         </a:graphic>
       </p:graphicFrame>
-      <p:sp>
-        <p:nvSpPr>
-          <p:cNvPr id="5" name="Textfeld 4">
-            <a:extLst>
-              <a:ext uri="{FF2B5EF4-FFF2-40B4-BE49-F238E27FC236}">
-                <a16:creationId xmlns:a16="http://schemas.microsoft.com/office/drawing/2014/main" id="{F6E544A6-3F1A-CF06-3447-01D20EC5D8B2}"/>
-              </a:ext>
-            </a:extLst>
-          </p:cNvPr>
-          <p:cNvSpPr txBox="1"/>
-          <p:nvPr/>
-        </p:nvSpPr>
-        <p:spPr>
-          <a:xfrm>
-            <a:off x="6539948" y="2684463"/>
-            <a:ext cx="4389120" cy="1754326"/>
-          </a:xfrm>
-          <a:prstGeom prst="rect">
-            <a:avLst/>
-          </a:prstGeom>
-          <a:noFill/>
-        </p:spPr>
-        <p:txBody>
-          <a:bodyPr wrap="square" rtlCol="0">
-            <a:spAutoFit/>
-          </a:bodyPr>
-          <a:lstStyle/>
-          <a:p>
-            <a:pPr marL="285750" indent="-285750">
-              <a:buFont typeface="Arial" panose="020B0604020202020204" pitchFamily="34" charset="0"/>
-              <a:buChar char="•"/>
-            </a:pPr>
-            <a:r>
-              <a:rPr lang="de-DE" dirty="0"/>
-              <a:t>Durchschnittlich 2-3 Parameter</a:t>
-            </a:r>
-          </a:p>
-          <a:p>
-            <a:pPr marL="285750" indent="-285750">
-              <a:buFont typeface="Arial" panose="020B0604020202020204" pitchFamily="34" charset="0"/>
-              <a:buChar char="•"/>
-            </a:pPr>
-            <a:r>
-              <a:rPr lang="de-DE" dirty="0"/>
-              <a:t>TODO: Parameter anpassen</a:t>
-            </a:r>
-          </a:p>
-          <a:p>
-            <a:pPr marL="285750" indent="-285750">
-              <a:buFont typeface="Arial" panose="020B0604020202020204" pitchFamily="34" charset="0"/>
-              <a:buChar char="•"/>
-            </a:pPr>
-            <a:r>
-              <a:rPr lang="de-DE" dirty="0"/>
-              <a:t>TODO: Diagramm anpassen/überarbeiten</a:t>
-            </a:r>
-            <a:br>
-              <a:rPr lang="de-DE" dirty="0"/>
-            </a:br>
-            <a:r>
-              <a:rPr lang="de-DE" dirty="0"/>
-              <a:t>TODO: FPS auf 60 drosseln</a:t>
-            </a:r>
-          </a:p>
-          <a:p>
-            <a:pPr marL="285750" indent="-285750">
-              <a:buFont typeface="Arial" panose="020B0604020202020204" pitchFamily="34" charset="0"/>
-              <a:buChar char="•"/>
-            </a:pPr>
-            <a:endParaRPr lang="de-DE" dirty="0"/>
-          </a:p>
-        </p:txBody>
-      </p:sp>
     </p:spTree>
     <p:extLst>
       <p:ext uri="{BB962C8B-B14F-4D97-AF65-F5344CB8AC3E}">
-        <p14:creationId xmlns:p14="http://schemas.microsoft.com/office/powerpoint/2010/main" val="2418747682"/>
+        <p14:creationId xmlns:p14="http://schemas.microsoft.com/office/powerpoint/2010/main" val="982619842"/>
       </p:ext>
     </p:extLst>
   </p:cSld>
@@ -5086,7 +6448,7 @@
         <p:cNvPr id="1" name="">
           <a:extLst>
             <a:ext uri="{FF2B5EF4-FFF2-40B4-BE49-F238E27FC236}">
-              <a16:creationId xmlns:a16="http://schemas.microsoft.com/office/drawing/2014/main" id="{C0DC2677-306B-9F87-30D7-4045B9484D32}"/>
+              <a16:creationId xmlns:a16="http://schemas.microsoft.com/office/drawing/2014/main" id="{5A386D71-7C01-A4AA-0401-ADF1A381B1D7}"/>
             </a:ext>
           </a:extLst>
         </p:cNvPr>
@@ -5103,10 +6465,310 @@
       </p:grpSpPr>
       <p:sp useBgFill="1">
         <p:nvSpPr>
+          <p:cNvPr id="10" name="Rectangle 9">
+            <a:extLst>
+              <a:ext uri="{FF2B5EF4-FFF2-40B4-BE49-F238E27FC236}">
+                <a16:creationId xmlns:a16="http://schemas.microsoft.com/office/drawing/2014/main" id="{C9CFB64E-AA34-C60C-3998-3CCAA9F9BB93}"/>
+              </a:ext>
+              <a:ext uri="{C183D7F6-B498-43B3-948B-1728B52AA6E4}">
+                <adec:decorative xmlns:adec="http://schemas.microsoft.com/office/drawing/2017/decorative" val="1"/>
+              </a:ext>
+            </a:extLst>
+          </p:cNvPr>
+          <p:cNvSpPr>
+            <a:spLocks noGrp="1" noRot="1" noChangeAspect="1" noMove="1" noResize="1" noEditPoints="1" noAdjustHandles="1" noChangeArrowheads="1" noChangeShapeType="1" noTextEdit="1"/>
+          </p:cNvSpPr>
+          <p:nvPr>
+            <p:extLst>
+              <p:ext uri="{386F3935-93C4-4BCD-93E2-E3B085C9AB24}">
+                <p16:designElem xmlns:p16="http://schemas.microsoft.com/office/powerpoint/2015/main" val="1"/>
+              </p:ext>
+            </p:extLst>
+          </p:nvPr>
+        </p:nvSpPr>
+        <p:spPr>
+          <a:xfrm>
+            <a:off x="0" y="0"/>
+            <a:ext cx="12192000" cy="6858000"/>
+          </a:xfrm>
+          <a:prstGeom prst="rect">
+            <a:avLst/>
+          </a:prstGeom>
+          <a:ln w="12700" cap="flat" cmpd="sng" algn="ctr">
+            <a:noFill/>
+            <a:prstDash val="solid"/>
+            <a:miter lim="800000"/>
+          </a:ln>
+          <a:effectLst/>
+          <a:extLst>
+            <a:ext uri="{91240B29-F687-4F45-9708-019B960494DF}">
+              <a14:hiddenLine xmlns:a14="http://schemas.microsoft.com/office/drawing/2010/main" w="12700" cap="flat" cmpd="sng" algn="ctr">
+                <a:solidFill>
+                  <a:schemeClr val="accent1">
+                    <a:shade val="50000"/>
+                  </a:schemeClr>
+                </a:solidFill>
+                <a:prstDash val="solid"/>
+                <a:miter lim="800000"/>
+              </a14:hiddenLine>
+            </a:ext>
+          </a:extLst>
+        </p:spPr>
+        <p:style>
+          <a:lnRef idx="2">
+            <a:schemeClr val="accent1">
+              <a:shade val="50000"/>
+            </a:schemeClr>
+          </a:lnRef>
+          <a:fillRef idx="1">
+            <a:schemeClr val="accent1"/>
+          </a:fillRef>
+          <a:effectRef idx="0">
+            <a:schemeClr val="accent1"/>
+          </a:effectRef>
+          <a:fontRef idx="minor">
+            <a:schemeClr val="lt1"/>
+          </a:fontRef>
+        </p:style>
+        <p:txBody>
+          <a:bodyPr rtlCol="0" anchor="ctr"/>
+          <a:lstStyle/>
+          <a:p>
+            <a:pPr algn="ctr"/>
+            <a:endParaRPr lang="en-US"/>
+          </a:p>
+        </p:txBody>
+      </p:sp>
+      <p:sp>
+        <p:nvSpPr>
+          <p:cNvPr id="12" name="Rectangle 11">
+            <a:extLst>
+              <a:ext uri="{FF2B5EF4-FFF2-40B4-BE49-F238E27FC236}">
+                <a16:creationId xmlns:a16="http://schemas.microsoft.com/office/drawing/2014/main" id="{70221CC7-3449-8DE1-FB17-87905E32A0B2}"/>
+              </a:ext>
+              <a:ext uri="{C183D7F6-B498-43B3-948B-1728B52AA6E4}">
+                <adec:decorative xmlns:adec="http://schemas.microsoft.com/office/drawing/2017/decorative" val="1"/>
+              </a:ext>
+            </a:extLst>
+          </p:cNvPr>
+          <p:cNvSpPr>
+            <a:spLocks noGrp="1" noRot="1" noChangeAspect="1" noMove="1" noResize="1" noEditPoints="1" noAdjustHandles="1" noChangeArrowheads="1" noChangeShapeType="1" noTextEdit="1"/>
+          </p:cNvSpPr>
+          <p:nvPr>
+            <p:extLst>
+              <p:ext uri="{386F3935-93C4-4BCD-93E2-E3B085C9AB24}">
+                <p16:designElem xmlns:p16="http://schemas.microsoft.com/office/powerpoint/2015/main" val="1"/>
+              </p:ext>
+            </p:extLst>
+          </p:nvPr>
+        </p:nvSpPr>
+        <p:spPr>
+          <a:xfrm>
+            <a:off x="685800" y="685800"/>
+            <a:ext cx="10820400" cy="5486400"/>
+          </a:xfrm>
+          <a:prstGeom prst="rect">
+            <a:avLst/>
+          </a:prstGeom>
+          <a:solidFill>
+            <a:schemeClr val="accent2">
+              <a:lumMod val="20000"/>
+              <a:lumOff val="80000"/>
+            </a:schemeClr>
+          </a:solidFill>
+          <a:ln>
+            <a:noFill/>
+          </a:ln>
+        </p:spPr>
+        <p:style>
+          <a:lnRef idx="2">
+            <a:schemeClr val="accent1">
+              <a:shade val="50000"/>
+            </a:schemeClr>
+          </a:lnRef>
+          <a:fillRef idx="1">
+            <a:schemeClr val="accent1"/>
+          </a:fillRef>
+          <a:effectRef idx="0">
+            <a:schemeClr val="accent1"/>
+          </a:effectRef>
+          <a:fontRef idx="minor">
+            <a:schemeClr val="lt1"/>
+          </a:fontRef>
+        </p:style>
+        <p:txBody>
+          <a:bodyPr rtlCol="0" anchor="ctr"/>
+          <a:lstStyle/>
+          <a:p>
+            <a:pPr algn="ctr"/>
+            <a:endParaRPr lang="en-US">
+              <a:solidFill>
+                <a:schemeClr val="bg2"/>
+              </a:solidFill>
+            </a:endParaRPr>
+          </a:p>
+        </p:txBody>
+      </p:sp>
+      <p:sp>
+        <p:nvSpPr>
+          <p:cNvPr id="2" name="Titel 1">
+            <a:extLst>
+              <a:ext uri="{FF2B5EF4-FFF2-40B4-BE49-F238E27FC236}">
+                <a16:creationId xmlns:a16="http://schemas.microsoft.com/office/drawing/2014/main" id="{D97DBF00-C1CC-D5B2-91E0-8A801A692257}"/>
+              </a:ext>
+            </a:extLst>
+          </p:cNvPr>
+          <p:cNvSpPr>
+            <a:spLocks noGrp="1"/>
+          </p:cNvSpPr>
+          <p:nvPr>
+            <p:ph type="ctrTitle"/>
+          </p:nvPr>
+        </p:nvSpPr>
+        <p:spPr>
+          <a:xfrm>
+            <a:off x="1472608" y="1380564"/>
+            <a:ext cx="4661492" cy="2346229"/>
+          </a:xfrm>
+        </p:spPr>
+        <p:txBody>
+          <a:bodyPr anchor="b">
+            <a:normAutofit/>
+          </a:bodyPr>
+          <a:lstStyle/>
+          <a:p>
+            <a:br>
+              <a:rPr lang="de-DE" sz="3200" dirty="0"/>
+            </a:br>
+            <a:r>
+              <a:rPr lang="de-DE" sz="3200" dirty="0"/>
+              <a:t>Bewertung der Ergebnisse</a:t>
+            </a:r>
+          </a:p>
+        </p:txBody>
+      </p:sp>
+      <p:sp>
+        <p:nvSpPr>
+          <p:cNvPr id="3" name="Untertitel 2">
+            <a:extLst>
+              <a:ext uri="{FF2B5EF4-FFF2-40B4-BE49-F238E27FC236}">
+                <a16:creationId xmlns:a16="http://schemas.microsoft.com/office/drawing/2014/main" id="{493C99F7-9178-E517-5720-C264596F90EF}"/>
+              </a:ext>
+            </a:extLst>
+          </p:cNvPr>
+          <p:cNvSpPr>
+            <a:spLocks noGrp="1"/>
+          </p:cNvSpPr>
+          <p:nvPr>
+            <p:ph type="subTitle" idx="1"/>
+          </p:nvPr>
+        </p:nvSpPr>
+        <p:spPr>
+          <a:xfrm>
+            <a:off x="1472608" y="4061345"/>
+            <a:ext cx="4561369" cy="1416090"/>
+          </a:xfrm>
+        </p:spPr>
+        <p:txBody>
+          <a:bodyPr anchor="t">
+            <a:normAutofit/>
+          </a:bodyPr>
+          <a:lstStyle/>
+          <a:p>
+            <a:endParaRPr lang="de-DE" sz="1400" dirty="0">
+              <a:solidFill>
+                <a:srgbClr val="595959"/>
+              </a:solidFill>
+            </a:endParaRPr>
+          </a:p>
+        </p:txBody>
+      </p:sp>
+      <p:pic>
+        <p:nvPicPr>
+          <p:cNvPr id="4" name="Grafik 3" descr="Ein Bild, das Schwarz, Dunkelheit enthält.&#10;&#10;Automatisch generierte Beschreibung">
+            <a:extLst>
+              <a:ext uri="{FF2B5EF4-FFF2-40B4-BE49-F238E27FC236}">
+                <a16:creationId xmlns:a16="http://schemas.microsoft.com/office/drawing/2014/main" id="{5F57A6AB-AABD-2A13-53C1-B04BA15FB40F}"/>
+              </a:ext>
+            </a:extLst>
+          </p:cNvPr>
+          <p:cNvPicPr>
+            <a:picLocks noChangeAspect="1"/>
+          </p:cNvPicPr>
+          <p:nvPr/>
+        </p:nvPicPr>
+        <p:blipFill>
+          <a:blip r:embed="rId2">
+            <a:extLst>
+              <a:ext uri="{28A0092B-C50C-407E-A947-70E740481C1C}">
+                <a14:useLocalDpi xmlns:a14="http://schemas.microsoft.com/office/drawing/2010/main" val="0"/>
+              </a:ext>
+            </a:extLst>
+          </a:blip>
+          <a:stretch>
+            <a:fillRect/>
+          </a:stretch>
+        </p:blipFill>
+        <p:spPr>
+          <a:xfrm>
+            <a:off x="7692023" y="3106181"/>
+            <a:ext cx="3027369" cy="620612"/>
+          </a:xfrm>
+          <a:prstGeom prst="rect">
+            <a:avLst/>
+          </a:prstGeom>
+        </p:spPr>
+      </p:pic>
+    </p:spTree>
+    <p:extLst>
+      <p:ext uri="{BB962C8B-B14F-4D97-AF65-F5344CB8AC3E}">
+        <p14:creationId xmlns:p14="http://schemas.microsoft.com/office/powerpoint/2010/main" val="205798188"/>
+      </p:ext>
+    </p:extLst>
+  </p:cSld>
+  <p:clrMapOvr>
+    <a:masterClrMapping/>
+  </p:clrMapOvr>
+</p:sld>
+</file>
+
+<file path=ppt/slides/slide12.xml><?xml version="1.0" encoding="utf-8"?>
+<p:sld xmlns:a="http://schemas.openxmlformats.org/drawingml/2006/main" xmlns:r="http://schemas.openxmlformats.org/officeDocument/2006/relationships" xmlns:p="http://schemas.openxmlformats.org/presentationml/2006/main">
+  <p:cSld>
+    <p:bg>
+      <p:bgPr>
+        <a:solidFill>
+          <a:schemeClr val="bg1"/>
+        </a:solidFill>
+        <a:effectLst/>
+      </p:bgPr>
+    </p:bg>
+    <p:spTree>
+      <p:nvGrpSpPr>
+        <p:cNvPr id="1" name="">
+          <a:extLst>
+            <a:ext uri="{FF2B5EF4-FFF2-40B4-BE49-F238E27FC236}">
+              <a16:creationId xmlns:a16="http://schemas.microsoft.com/office/drawing/2014/main" id="{0F2B80D0-E442-81AE-4F21-3C8BC7EB3D6B}"/>
+            </a:ext>
+          </a:extLst>
+        </p:cNvPr>
+        <p:cNvGrpSpPr/>
+        <p:nvPr/>
+      </p:nvGrpSpPr>
+      <p:grpSpPr>
+        <a:xfrm>
+          <a:off x="0" y="0"/>
+          <a:ext cx="0" cy="0"/>
+          <a:chOff x="0" y="0"/>
+          <a:chExt cx="0" cy="0"/>
+        </a:xfrm>
+      </p:grpSpPr>
+      <p:sp useBgFill="1">
+        <p:nvSpPr>
           <p:cNvPr id="9" name="Rectangle 8">
             <a:extLst>
               <a:ext uri="{FF2B5EF4-FFF2-40B4-BE49-F238E27FC236}">
-                <a16:creationId xmlns:a16="http://schemas.microsoft.com/office/drawing/2014/main" id="{3E85D859-F71A-69BF-B75E-98A6E76970BE}"/>
+                <a16:creationId xmlns:a16="http://schemas.microsoft.com/office/drawing/2014/main" id="{606C3D53-BA0C-1A67-BB31-0478C940321B}"/>
               </a:ext>
               <a:ext uri="{C183D7F6-B498-43B3-948B-1728B52AA6E4}">
                 <adec:decorative xmlns:adec="http://schemas.microsoft.com/office/drawing/2017/decorative" val="1"/>
@@ -5166,7 +6828,7 @@
           <p:cNvPr id="2" name="Titel 1">
             <a:extLst>
               <a:ext uri="{FF2B5EF4-FFF2-40B4-BE49-F238E27FC236}">
-                <a16:creationId xmlns:a16="http://schemas.microsoft.com/office/drawing/2014/main" id="{BB1CA8FC-801F-E2BE-C05B-E44C3347112B}"/>
+                <a16:creationId xmlns:a16="http://schemas.microsoft.com/office/drawing/2014/main" id="{B226E8EF-5DBA-8EAA-18C5-9A666D9DC7A6}"/>
               </a:ext>
             </a:extLst>
           </p:cNvPr>
@@ -5191,7 +6853,7 @@
           <a:p>
             <a:r>
               <a:rPr lang="de-DE" sz="3400" dirty="0"/>
-              <a:t>Rauschfreiheit	</a:t>
+              <a:t>Performance</a:t>
             </a:r>
           </a:p>
         </p:txBody>
@@ -5201,7 +6863,7 @@
           <p:cNvPr id="11" name="Rectangle 10">
             <a:extLst>
               <a:ext uri="{FF2B5EF4-FFF2-40B4-BE49-F238E27FC236}">
-                <a16:creationId xmlns:a16="http://schemas.microsoft.com/office/drawing/2014/main" id="{2CD09708-A401-B222-FC30-D777D92F4BE2}"/>
+                <a16:creationId xmlns:a16="http://schemas.microsoft.com/office/drawing/2014/main" id="{D9D642C8-3556-EF7E-8EB3-85CA924D97DA}"/>
               </a:ext>
               <a:ext uri="{C183D7F6-B498-43B3-948B-1728B52AA6E4}">
                 <adec:decorative xmlns:adec="http://schemas.microsoft.com/office/drawing/2017/decorative" val="1"/>
@@ -5269,7 +6931,7 @@
           <p:cNvPr id="13" name="Rectangle 12">
             <a:extLst>
               <a:ext uri="{FF2B5EF4-FFF2-40B4-BE49-F238E27FC236}">
-                <a16:creationId xmlns:a16="http://schemas.microsoft.com/office/drawing/2014/main" id="{CFD56D35-84C8-3D4D-60ED-3BCC8EF44DCC}"/>
+                <a16:creationId xmlns:a16="http://schemas.microsoft.com/office/drawing/2014/main" id="{609E63CE-2895-D50E-9D21-310E6C4629DD}"/>
               </a:ext>
               <a:ext uri="{C183D7F6-B498-43B3-948B-1728B52AA6E4}">
                 <adec:decorative xmlns:adec="http://schemas.microsoft.com/office/drawing/2017/decorative" val="1"/>
@@ -5333,42 +6995,1873 @@
           </a:p>
         </p:txBody>
       </p:sp>
-      <p:sp>
-        <p:nvSpPr>
-          <p:cNvPr id="3" name="Inhaltsplatzhalter 2">
-            <a:extLst>
-              <a:ext uri="{FF2B5EF4-FFF2-40B4-BE49-F238E27FC236}">
-                <a16:creationId xmlns:a16="http://schemas.microsoft.com/office/drawing/2014/main" id="{2B45612E-19D6-092D-FFBE-A59EAA3E300B}"/>
-              </a:ext>
-            </a:extLst>
-          </p:cNvPr>
-          <p:cNvSpPr>
-            <a:spLocks noGrp="1"/>
-          </p:cNvSpPr>
+      <p:graphicFrame>
+        <p:nvGraphicFramePr>
+          <p:cNvPr id="4" name="Inhaltsplatzhalter 5">
+            <a:extLst>
+              <a:ext uri="{FF2B5EF4-FFF2-40B4-BE49-F238E27FC236}">
+                <a16:creationId xmlns:a16="http://schemas.microsoft.com/office/drawing/2014/main" id="{DAC58118-636D-F1FA-CB87-55D8C3AC6AFB}"/>
+              </a:ext>
+            </a:extLst>
+          </p:cNvPr>
+          <p:cNvGraphicFramePr>
+            <a:graphicFrameLocks noGrp="1"/>
+          </p:cNvGraphicFramePr>
           <p:nvPr>
             <p:ph idx="1"/>
-          </p:nvPr>
-        </p:nvSpPr>
-        <p:spPr>
-          <a:xfrm>
-            <a:off x="411480" y="2684095"/>
-            <a:ext cx="5081270" cy="3492868"/>
-          </a:xfrm>
-        </p:spPr>
-        <p:txBody>
-          <a:bodyPr>
-            <a:normAutofit/>
-          </a:bodyPr>
-          <a:lstStyle/>
-          <a:p>
-            <a:endParaRPr lang="de-DE" sz="1800" dirty="0"/>
-          </a:p>
-        </p:txBody>
-      </p:sp>
+            <p:extLst>
+              <p:ext uri="{D42A27DB-BD31-4B8C-83A1-F6EECF244321}">
+                <p14:modId xmlns:p14="http://schemas.microsoft.com/office/powerpoint/2010/main" val="3445163713"/>
+              </p:ext>
+            </p:extLst>
+          </p:nvPr>
+        </p:nvGraphicFramePr>
+        <p:xfrm>
+          <a:off x="411163" y="2684463"/>
+          <a:ext cx="5081587" cy="3492500"/>
+        </p:xfrm>
+        <a:graphic>
+          <a:graphicData uri="http://schemas.openxmlformats.org/drawingml/2006/chart">
+            <c:chart xmlns:c="http://schemas.openxmlformats.org/drawingml/2006/chart" xmlns:r="http://schemas.openxmlformats.org/officeDocument/2006/relationships" r:id="rId2"/>
+          </a:graphicData>
+        </a:graphic>
+      </p:graphicFrame>
     </p:spTree>
     <p:extLst>
       <p:ext uri="{BB962C8B-B14F-4D97-AF65-F5344CB8AC3E}">
-        <p14:creationId xmlns:p14="http://schemas.microsoft.com/office/powerpoint/2010/main" val="1548224523"/>
+        <p14:creationId xmlns:p14="http://schemas.microsoft.com/office/powerpoint/2010/main" val="2418747682"/>
+      </p:ext>
+    </p:extLst>
+  </p:cSld>
+  <p:clrMapOvr>
+    <a:masterClrMapping/>
+  </p:clrMapOvr>
+</p:sld>
+</file>
+
+<file path=ppt/slides/slide13.xml><?xml version="1.0" encoding="utf-8"?>
+<p:sld xmlns:a="http://schemas.openxmlformats.org/drawingml/2006/main" xmlns:r="http://schemas.openxmlformats.org/officeDocument/2006/relationships" xmlns:p="http://schemas.openxmlformats.org/presentationml/2006/main">
+  <p:cSld>
+    <p:bg>
+      <p:bgPr>
+        <a:solidFill>
+          <a:schemeClr val="bg1"/>
+        </a:solidFill>
+        <a:effectLst/>
+      </p:bgPr>
+    </p:bg>
+    <p:spTree>
+      <p:nvGrpSpPr>
+        <p:cNvPr id="1" name="">
+          <a:extLst>
+            <a:ext uri="{FF2B5EF4-FFF2-40B4-BE49-F238E27FC236}">
+              <a16:creationId xmlns:a16="http://schemas.microsoft.com/office/drawing/2014/main" id="{F36B8DFF-6BB9-6C0A-9B08-1CFB8D394D27}"/>
+            </a:ext>
+          </a:extLst>
+        </p:cNvPr>
+        <p:cNvGrpSpPr/>
+        <p:nvPr/>
+      </p:nvGrpSpPr>
+      <p:grpSpPr>
+        <a:xfrm>
+          <a:off x="0" y="0"/>
+          <a:ext cx="0" cy="0"/>
+          <a:chOff x="0" y="0"/>
+          <a:chExt cx="0" cy="0"/>
+        </a:xfrm>
+      </p:grpSpPr>
+      <p:sp useBgFill="1">
+        <p:nvSpPr>
+          <p:cNvPr id="9" name="Rectangle 8">
+            <a:extLst>
+              <a:ext uri="{FF2B5EF4-FFF2-40B4-BE49-F238E27FC236}">
+                <a16:creationId xmlns:a16="http://schemas.microsoft.com/office/drawing/2014/main" id="{B8C37DB7-1418-E0E2-C0EF-DDEDA5F39928}"/>
+              </a:ext>
+              <a:ext uri="{C183D7F6-B498-43B3-948B-1728B52AA6E4}">
+                <adec:decorative xmlns:adec="http://schemas.microsoft.com/office/drawing/2017/decorative" val="1"/>
+              </a:ext>
+            </a:extLst>
+          </p:cNvPr>
+          <p:cNvSpPr>
+            <a:spLocks noGrp="1" noRot="1" noChangeAspect="1" noMove="1" noResize="1" noEditPoints="1" noAdjustHandles="1" noChangeArrowheads="1" noChangeShapeType="1" noTextEdit="1"/>
+          </p:cNvSpPr>
+          <p:nvPr>
+            <p:extLst>
+              <p:ext uri="{386F3935-93C4-4BCD-93E2-E3B085C9AB24}">
+                <p16:designElem xmlns:p16="http://schemas.microsoft.com/office/powerpoint/2015/main" val="1"/>
+              </p:ext>
+            </p:extLst>
+          </p:nvPr>
+        </p:nvSpPr>
+        <p:spPr>
+          <a:xfrm>
+            <a:off x="0" y="0"/>
+            <a:ext cx="12192000" cy="6858000"/>
+          </a:xfrm>
+          <a:prstGeom prst="rect">
+            <a:avLst/>
+          </a:prstGeom>
+          <a:ln>
+            <a:noFill/>
+          </a:ln>
+        </p:spPr>
+        <p:style>
+          <a:lnRef idx="2">
+            <a:schemeClr val="accent1">
+              <a:shade val="50000"/>
+            </a:schemeClr>
+          </a:lnRef>
+          <a:fillRef idx="1">
+            <a:schemeClr val="accent1"/>
+          </a:fillRef>
+          <a:effectRef idx="0">
+            <a:schemeClr val="accent1"/>
+          </a:effectRef>
+          <a:fontRef idx="minor">
+            <a:schemeClr val="lt1"/>
+          </a:fontRef>
+        </p:style>
+        <p:txBody>
+          <a:bodyPr rtlCol="0" anchor="ctr"/>
+          <a:lstStyle/>
+          <a:p>
+            <a:pPr algn="ctr"/>
+            <a:endParaRPr lang="en-US"/>
+          </a:p>
+        </p:txBody>
+      </p:sp>
+      <p:sp>
+        <p:nvSpPr>
+          <p:cNvPr id="2" name="Titel 1">
+            <a:extLst>
+              <a:ext uri="{FF2B5EF4-FFF2-40B4-BE49-F238E27FC236}">
+                <a16:creationId xmlns:a16="http://schemas.microsoft.com/office/drawing/2014/main" id="{2ED63F53-05DF-9AF9-ED9A-6ED9391183A2}"/>
+              </a:ext>
+            </a:extLst>
+          </p:cNvPr>
+          <p:cNvSpPr>
+            <a:spLocks noGrp="1"/>
+          </p:cNvSpPr>
+          <p:nvPr>
+            <p:ph type="title"/>
+          </p:nvPr>
+        </p:nvSpPr>
+        <p:spPr>
+          <a:xfrm>
+            <a:off x="411480" y="991443"/>
+            <a:ext cx="4443154" cy="1087819"/>
+          </a:xfrm>
+        </p:spPr>
+        <p:txBody>
+          <a:bodyPr anchor="b">
+            <a:normAutofit/>
+          </a:bodyPr>
+          <a:lstStyle/>
+          <a:p>
+            <a:r>
+              <a:rPr lang="de-DE" sz="3400" dirty="0"/>
+              <a:t>Rauschfreiheit</a:t>
+            </a:r>
+          </a:p>
+        </p:txBody>
+      </p:sp>
+      <p:sp>
+        <p:nvSpPr>
+          <p:cNvPr id="11" name="Rectangle 10">
+            <a:extLst>
+              <a:ext uri="{FF2B5EF4-FFF2-40B4-BE49-F238E27FC236}">
+                <a16:creationId xmlns:a16="http://schemas.microsoft.com/office/drawing/2014/main" id="{6AB90ED9-CA2B-2094-E6F1-CB67F8B5120B}"/>
+              </a:ext>
+              <a:ext uri="{C183D7F6-B498-43B3-948B-1728B52AA6E4}">
+                <adec:decorative xmlns:adec="http://schemas.microsoft.com/office/drawing/2017/decorative" val="1"/>
+              </a:ext>
+            </a:extLst>
+          </p:cNvPr>
+          <p:cNvSpPr>
+            <a:spLocks noGrp="1" noRot="1" noChangeAspect="1" noMove="1" noResize="1" noEditPoints="1" noAdjustHandles="1" noChangeArrowheads="1" noChangeShapeType="1" noTextEdit="1"/>
+          </p:cNvSpPr>
+          <p:nvPr>
+            <p:extLst>
+              <p:ext uri="{386F3935-93C4-4BCD-93E2-E3B085C9AB24}">
+                <p16:designElem xmlns:p16="http://schemas.microsoft.com/office/powerpoint/2015/main" val="1"/>
+              </p:ext>
+            </p:extLst>
+          </p:nvPr>
+        </p:nvSpPr>
+        <p:spPr>
+          <a:xfrm rot="5400000">
+            <a:off x="649223" y="387939"/>
+            <a:ext cx="73152" cy="548640"/>
+          </a:xfrm>
+          <a:prstGeom prst="rect">
+            <a:avLst/>
+          </a:prstGeom>
+          <a:solidFill>
+            <a:schemeClr val="accent2"/>
+          </a:solidFill>
+          <a:ln>
+            <a:noFill/>
+          </a:ln>
+        </p:spPr>
+        <p:style>
+          <a:lnRef idx="2">
+            <a:schemeClr val="accent1">
+              <a:shade val="50000"/>
+            </a:schemeClr>
+          </a:lnRef>
+          <a:fillRef idx="1">
+            <a:schemeClr val="accent1"/>
+          </a:fillRef>
+          <a:effectRef idx="0">
+            <a:schemeClr val="accent1"/>
+          </a:effectRef>
+          <a:fontRef idx="minor">
+            <a:schemeClr val="lt1"/>
+          </a:fontRef>
+        </p:style>
+        <p:txBody>
+          <a:bodyPr rtlCol="0" anchor="ctr"/>
+          <a:lstStyle/>
+          <a:p>
+            <a:pPr algn="ctr"/>
+            <a:endParaRPr lang="en-US">
+              <a:solidFill>
+                <a:prstClr val="white"/>
+              </a:solidFill>
+              <a:latin typeface="Calibri" panose="020F0502020204030204"/>
+            </a:endParaRPr>
+          </a:p>
+        </p:txBody>
+      </p:sp>
+      <p:sp>
+        <p:nvSpPr>
+          <p:cNvPr id="13" name="Rectangle 12">
+            <a:extLst>
+              <a:ext uri="{FF2B5EF4-FFF2-40B4-BE49-F238E27FC236}">
+                <a16:creationId xmlns:a16="http://schemas.microsoft.com/office/drawing/2014/main" id="{938D609C-6EBE-85C8-0B6C-E111137990AB}"/>
+              </a:ext>
+              <a:ext uri="{C183D7F6-B498-43B3-948B-1728B52AA6E4}">
+                <adec:decorative xmlns:adec="http://schemas.microsoft.com/office/drawing/2017/decorative" val="1"/>
+              </a:ext>
+            </a:extLst>
+          </p:cNvPr>
+          <p:cNvSpPr>
+            <a:spLocks noGrp="1" noRot="1" noChangeAspect="1" noMove="1" noResize="1" noEditPoints="1" noAdjustHandles="1" noChangeArrowheads="1" noChangeShapeType="1" noTextEdit="1"/>
+          </p:cNvSpPr>
+          <p:nvPr>
+            <p:extLst>
+              <p:ext uri="{386F3935-93C4-4BCD-93E2-E3B085C9AB24}">
+                <p16:designElem xmlns:p16="http://schemas.microsoft.com/office/powerpoint/2015/main" val="1"/>
+              </p:ext>
+            </p:extLst>
+          </p:nvPr>
+        </p:nvSpPr>
+        <p:spPr>
+          <a:xfrm>
+            <a:off x="411480" y="2285541"/>
+            <a:ext cx="4389120" cy="18288"/>
+          </a:xfrm>
+          <a:prstGeom prst="rect">
+            <a:avLst/>
+          </a:prstGeom>
+          <a:solidFill>
+            <a:srgbClr val="D5D5D5"/>
+          </a:solidFill>
+          <a:ln w="3175">
+            <a:noFill/>
+          </a:ln>
+          <a:effectLst/>
+        </p:spPr>
+        <p:style>
+          <a:lnRef idx="2">
+            <a:schemeClr val="accent1">
+              <a:shade val="50000"/>
+            </a:schemeClr>
+          </a:lnRef>
+          <a:fillRef idx="1">
+            <a:schemeClr val="accent1"/>
+          </a:fillRef>
+          <a:effectRef idx="0">
+            <a:schemeClr val="accent1"/>
+          </a:effectRef>
+          <a:fontRef idx="minor">
+            <a:schemeClr val="lt1"/>
+          </a:fontRef>
+        </p:style>
+        <p:txBody>
+          <a:bodyPr rtlCol="0" anchor="ctr"/>
+          <a:lstStyle/>
+          <a:p>
+            <a:pPr algn="ctr"/>
+            <a:endParaRPr lang="en-US">
+              <a:solidFill>
+                <a:prstClr val="white"/>
+              </a:solidFill>
+              <a:latin typeface="Calibri" panose="020F0502020204030204"/>
+            </a:endParaRPr>
+          </a:p>
+        </p:txBody>
+      </p:sp>
+      <p:sp>
+        <p:nvSpPr>
+          <p:cNvPr id="5" name="Inhaltsplatzhalter 4">
+            <a:extLst>
+              <a:ext uri="{FF2B5EF4-FFF2-40B4-BE49-F238E27FC236}">
+                <a16:creationId xmlns:a16="http://schemas.microsoft.com/office/drawing/2014/main" id="{34C731FF-70A5-3104-7CB1-B3055D66F6F5}"/>
+              </a:ext>
+            </a:extLst>
+          </p:cNvPr>
+          <p:cNvSpPr>
+            <a:spLocks noGrp="1"/>
+          </p:cNvSpPr>
+          <p:nvPr>
+            <p:ph idx="1"/>
+          </p:nvPr>
+        </p:nvSpPr>
+        <p:spPr>
+          <a:xfrm>
+            <a:off x="411479" y="2506662"/>
+            <a:ext cx="10515600" cy="4351338"/>
+          </a:xfrm>
+        </p:spPr>
+        <p:txBody>
+          <a:bodyPr/>
+          <a:lstStyle/>
+          <a:p>
+            <a:endParaRPr lang="de-DE" dirty="0"/>
+          </a:p>
+        </p:txBody>
+      </p:sp>
+    </p:spTree>
+    <p:extLst>
+      <p:ext uri="{BB962C8B-B14F-4D97-AF65-F5344CB8AC3E}">
+        <p14:creationId xmlns:p14="http://schemas.microsoft.com/office/powerpoint/2010/main" val="3555609136"/>
+      </p:ext>
+    </p:extLst>
+  </p:cSld>
+  <p:clrMapOvr>
+    <a:masterClrMapping/>
+  </p:clrMapOvr>
+</p:sld>
+</file>
+
+<file path=ppt/slides/slide14.xml><?xml version="1.0" encoding="utf-8"?>
+<p:sld xmlns:a="http://schemas.openxmlformats.org/drawingml/2006/main" xmlns:r="http://schemas.openxmlformats.org/officeDocument/2006/relationships" xmlns:p="http://schemas.openxmlformats.org/presentationml/2006/main">
+  <p:cSld>
+    <p:bg>
+      <p:bgPr>
+        <a:solidFill>
+          <a:schemeClr val="bg1"/>
+        </a:solidFill>
+        <a:effectLst/>
+      </p:bgPr>
+    </p:bg>
+    <p:spTree>
+      <p:nvGrpSpPr>
+        <p:cNvPr id="1" name="">
+          <a:extLst>
+            <a:ext uri="{FF2B5EF4-FFF2-40B4-BE49-F238E27FC236}">
+              <a16:creationId xmlns:a16="http://schemas.microsoft.com/office/drawing/2014/main" id="{F92016F5-3E88-A50C-55C0-551BF1E36CA7}"/>
+            </a:ext>
+          </a:extLst>
+        </p:cNvPr>
+        <p:cNvGrpSpPr/>
+        <p:nvPr/>
+      </p:nvGrpSpPr>
+      <p:grpSpPr>
+        <a:xfrm>
+          <a:off x="0" y="0"/>
+          <a:ext cx="0" cy="0"/>
+          <a:chOff x="0" y="0"/>
+          <a:chExt cx="0" cy="0"/>
+        </a:xfrm>
+      </p:grpSpPr>
+      <p:sp useBgFill="1">
+        <p:nvSpPr>
+          <p:cNvPr id="9" name="Rectangle 8">
+            <a:extLst>
+              <a:ext uri="{FF2B5EF4-FFF2-40B4-BE49-F238E27FC236}">
+                <a16:creationId xmlns:a16="http://schemas.microsoft.com/office/drawing/2014/main" id="{EF3AE2BD-505C-A862-D25D-C63371FE7DF1}"/>
+              </a:ext>
+              <a:ext uri="{C183D7F6-B498-43B3-948B-1728B52AA6E4}">
+                <adec:decorative xmlns:adec="http://schemas.microsoft.com/office/drawing/2017/decorative" val="1"/>
+              </a:ext>
+            </a:extLst>
+          </p:cNvPr>
+          <p:cNvSpPr>
+            <a:spLocks noGrp="1" noRot="1" noChangeAspect="1" noMove="1" noResize="1" noEditPoints="1" noAdjustHandles="1" noChangeArrowheads="1" noChangeShapeType="1" noTextEdit="1"/>
+          </p:cNvSpPr>
+          <p:nvPr>
+            <p:extLst>
+              <p:ext uri="{386F3935-93C4-4BCD-93E2-E3B085C9AB24}">
+                <p16:designElem xmlns:p16="http://schemas.microsoft.com/office/powerpoint/2015/main" val="1"/>
+              </p:ext>
+            </p:extLst>
+          </p:nvPr>
+        </p:nvSpPr>
+        <p:spPr>
+          <a:xfrm>
+            <a:off x="0" y="0"/>
+            <a:ext cx="12192000" cy="6858000"/>
+          </a:xfrm>
+          <a:prstGeom prst="rect">
+            <a:avLst/>
+          </a:prstGeom>
+          <a:ln>
+            <a:noFill/>
+          </a:ln>
+        </p:spPr>
+        <p:style>
+          <a:lnRef idx="2">
+            <a:schemeClr val="accent1">
+              <a:shade val="50000"/>
+            </a:schemeClr>
+          </a:lnRef>
+          <a:fillRef idx="1">
+            <a:schemeClr val="accent1"/>
+          </a:fillRef>
+          <a:effectRef idx="0">
+            <a:schemeClr val="accent1"/>
+          </a:effectRef>
+          <a:fontRef idx="minor">
+            <a:schemeClr val="lt1"/>
+          </a:fontRef>
+        </p:style>
+        <p:txBody>
+          <a:bodyPr rtlCol="0" anchor="ctr"/>
+          <a:lstStyle/>
+          <a:p>
+            <a:pPr algn="ctr"/>
+            <a:endParaRPr lang="en-US"/>
+          </a:p>
+        </p:txBody>
+      </p:sp>
+      <p:sp>
+        <p:nvSpPr>
+          <p:cNvPr id="2" name="Titel 1">
+            <a:extLst>
+              <a:ext uri="{FF2B5EF4-FFF2-40B4-BE49-F238E27FC236}">
+                <a16:creationId xmlns:a16="http://schemas.microsoft.com/office/drawing/2014/main" id="{79B370E4-71EA-C2C1-1970-2B32CFBEC0FB}"/>
+              </a:ext>
+            </a:extLst>
+          </p:cNvPr>
+          <p:cNvSpPr>
+            <a:spLocks noGrp="1"/>
+          </p:cNvSpPr>
+          <p:nvPr>
+            <p:ph type="title"/>
+          </p:nvPr>
+        </p:nvSpPr>
+        <p:spPr>
+          <a:xfrm>
+            <a:off x="411480" y="991443"/>
+            <a:ext cx="6363970" cy="1087819"/>
+          </a:xfrm>
+        </p:spPr>
+        <p:txBody>
+          <a:bodyPr anchor="b">
+            <a:normAutofit/>
+          </a:bodyPr>
+          <a:lstStyle/>
+          <a:p>
+            <a:r>
+              <a:rPr lang="de-DE" sz="3400" dirty="0"/>
+              <a:t>Erkennung</a:t>
+            </a:r>
+          </a:p>
+        </p:txBody>
+      </p:sp>
+      <p:sp>
+        <p:nvSpPr>
+          <p:cNvPr id="11" name="Rectangle 10">
+            <a:extLst>
+              <a:ext uri="{FF2B5EF4-FFF2-40B4-BE49-F238E27FC236}">
+                <a16:creationId xmlns:a16="http://schemas.microsoft.com/office/drawing/2014/main" id="{2F5F54A6-DFE1-B2E9-25CE-7D1ED1C05F90}"/>
+              </a:ext>
+              <a:ext uri="{C183D7F6-B498-43B3-948B-1728B52AA6E4}">
+                <adec:decorative xmlns:adec="http://schemas.microsoft.com/office/drawing/2017/decorative" val="1"/>
+              </a:ext>
+            </a:extLst>
+          </p:cNvPr>
+          <p:cNvSpPr>
+            <a:spLocks noGrp="1" noRot="1" noChangeAspect="1" noMove="1" noResize="1" noEditPoints="1" noAdjustHandles="1" noChangeArrowheads="1" noChangeShapeType="1" noTextEdit="1"/>
+          </p:cNvSpPr>
+          <p:nvPr>
+            <p:extLst>
+              <p:ext uri="{386F3935-93C4-4BCD-93E2-E3B085C9AB24}">
+                <p16:designElem xmlns:p16="http://schemas.microsoft.com/office/powerpoint/2015/main" val="1"/>
+              </p:ext>
+            </p:extLst>
+          </p:nvPr>
+        </p:nvSpPr>
+        <p:spPr>
+          <a:xfrm rot="5400000">
+            <a:off x="649223" y="387939"/>
+            <a:ext cx="73152" cy="548640"/>
+          </a:xfrm>
+          <a:prstGeom prst="rect">
+            <a:avLst/>
+          </a:prstGeom>
+          <a:solidFill>
+            <a:schemeClr val="accent2"/>
+          </a:solidFill>
+          <a:ln>
+            <a:noFill/>
+          </a:ln>
+        </p:spPr>
+        <p:style>
+          <a:lnRef idx="2">
+            <a:schemeClr val="accent1">
+              <a:shade val="50000"/>
+            </a:schemeClr>
+          </a:lnRef>
+          <a:fillRef idx="1">
+            <a:schemeClr val="accent1"/>
+          </a:fillRef>
+          <a:effectRef idx="0">
+            <a:schemeClr val="accent1"/>
+          </a:effectRef>
+          <a:fontRef idx="minor">
+            <a:schemeClr val="lt1"/>
+          </a:fontRef>
+        </p:style>
+        <p:txBody>
+          <a:bodyPr rtlCol="0" anchor="ctr"/>
+          <a:lstStyle/>
+          <a:p>
+            <a:pPr algn="ctr"/>
+            <a:endParaRPr lang="en-US">
+              <a:solidFill>
+                <a:prstClr val="white"/>
+              </a:solidFill>
+              <a:latin typeface="Calibri" panose="020F0502020204030204"/>
+            </a:endParaRPr>
+          </a:p>
+        </p:txBody>
+      </p:sp>
+      <p:sp>
+        <p:nvSpPr>
+          <p:cNvPr id="13" name="Rectangle 12">
+            <a:extLst>
+              <a:ext uri="{FF2B5EF4-FFF2-40B4-BE49-F238E27FC236}">
+                <a16:creationId xmlns:a16="http://schemas.microsoft.com/office/drawing/2014/main" id="{07C91C02-37EA-50DA-53EC-D0FB93EC874B}"/>
+              </a:ext>
+              <a:ext uri="{C183D7F6-B498-43B3-948B-1728B52AA6E4}">
+                <adec:decorative xmlns:adec="http://schemas.microsoft.com/office/drawing/2017/decorative" val="1"/>
+              </a:ext>
+            </a:extLst>
+          </p:cNvPr>
+          <p:cNvSpPr>
+            <a:spLocks noGrp="1" noRot="1" noChangeAspect="1" noMove="1" noResize="1" noEditPoints="1" noAdjustHandles="1" noChangeArrowheads="1" noChangeShapeType="1" noTextEdit="1"/>
+          </p:cNvSpPr>
+          <p:nvPr>
+            <p:extLst>
+              <p:ext uri="{386F3935-93C4-4BCD-93E2-E3B085C9AB24}">
+                <p16:designElem xmlns:p16="http://schemas.microsoft.com/office/powerpoint/2015/main" val="1"/>
+              </p:ext>
+            </p:extLst>
+          </p:nvPr>
+        </p:nvSpPr>
+        <p:spPr>
+          <a:xfrm>
+            <a:off x="411480" y="2285541"/>
+            <a:ext cx="4389120" cy="18288"/>
+          </a:xfrm>
+          <a:prstGeom prst="rect">
+            <a:avLst/>
+          </a:prstGeom>
+          <a:solidFill>
+            <a:srgbClr val="D5D5D5"/>
+          </a:solidFill>
+          <a:ln w="3175">
+            <a:noFill/>
+          </a:ln>
+          <a:effectLst/>
+        </p:spPr>
+        <p:style>
+          <a:lnRef idx="2">
+            <a:schemeClr val="accent1">
+              <a:shade val="50000"/>
+            </a:schemeClr>
+          </a:lnRef>
+          <a:fillRef idx="1">
+            <a:schemeClr val="accent1"/>
+          </a:fillRef>
+          <a:effectRef idx="0">
+            <a:schemeClr val="accent1"/>
+          </a:effectRef>
+          <a:fontRef idx="minor">
+            <a:schemeClr val="lt1"/>
+          </a:fontRef>
+        </p:style>
+        <p:txBody>
+          <a:bodyPr rtlCol="0" anchor="ctr"/>
+          <a:lstStyle/>
+          <a:p>
+            <a:pPr algn="ctr"/>
+            <a:endParaRPr lang="en-US">
+              <a:solidFill>
+                <a:prstClr val="white"/>
+              </a:solidFill>
+              <a:latin typeface="Calibri" panose="020F0502020204030204"/>
+            </a:endParaRPr>
+          </a:p>
+        </p:txBody>
+      </p:sp>
+      <p:sp>
+        <p:nvSpPr>
+          <p:cNvPr id="5" name="Inhaltsplatzhalter 4">
+            <a:extLst>
+              <a:ext uri="{FF2B5EF4-FFF2-40B4-BE49-F238E27FC236}">
+                <a16:creationId xmlns:a16="http://schemas.microsoft.com/office/drawing/2014/main" id="{7144C317-E29B-843E-2399-1502E5B1B6A3}"/>
+              </a:ext>
+            </a:extLst>
+          </p:cNvPr>
+          <p:cNvSpPr>
+            <a:spLocks noGrp="1"/>
+          </p:cNvSpPr>
+          <p:nvPr>
+            <p:ph idx="1"/>
+          </p:nvPr>
+        </p:nvSpPr>
+        <p:spPr>
+          <a:xfrm>
+            <a:off x="411479" y="2506662"/>
+            <a:ext cx="10515600" cy="4351338"/>
+          </a:xfrm>
+        </p:spPr>
+        <p:txBody>
+          <a:bodyPr/>
+          <a:lstStyle/>
+          <a:p>
+            <a:endParaRPr lang="de-DE" dirty="0"/>
+          </a:p>
+        </p:txBody>
+      </p:sp>
+    </p:spTree>
+    <p:extLst>
+      <p:ext uri="{BB962C8B-B14F-4D97-AF65-F5344CB8AC3E}">
+        <p14:creationId xmlns:p14="http://schemas.microsoft.com/office/powerpoint/2010/main" val="3710991227"/>
+      </p:ext>
+    </p:extLst>
+  </p:cSld>
+  <p:clrMapOvr>
+    <a:masterClrMapping/>
+  </p:clrMapOvr>
+</p:sld>
+</file>
+
+<file path=ppt/slides/slide15.xml><?xml version="1.0" encoding="utf-8"?>
+<p:sld xmlns:a="http://schemas.openxmlformats.org/drawingml/2006/main" xmlns:r="http://schemas.openxmlformats.org/officeDocument/2006/relationships" xmlns:p="http://schemas.openxmlformats.org/presentationml/2006/main">
+  <p:cSld>
+    <p:bg>
+      <p:bgPr>
+        <a:solidFill>
+          <a:schemeClr val="bg1"/>
+        </a:solidFill>
+        <a:effectLst/>
+      </p:bgPr>
+    </p:bg>
+    <p:spTree>
+      <p:nvGrpSpPr>
+        <p:cNvPr id="1" name="">
+          <a:extLst>
+            <a:ext uri="{FF2B5EF4-FFF2-40B4-BE49-F238E27FC236}">
+              <a16:creationId xmlns:a16="http://schemas.microsoft.com/office/drawing/2014/main" id="{66F516CB-E4E0-423A-CA5B-DEAA0E3DF7DD}"/>
+            </a:ext>
+          </a:extLst>
+        </p:cNvPr>
+        <p:cNvGrpSpPr/>
+        <p:nvPr/>
+      </p:nvGrpSpPr>
+      <p:grpSpPr>
+        <a:xfrm>
+          <a:off x="0" y="0"/>
+          <a:ext cx="0" cy="0"/>
+          <a:chOff x="0" y="0"/>
+          <a:chExt cx="0" cy="0"/>
+        </a:xfrm>
+      </p:grpSpPr>
+      <p:sp useBgFill="1">
+        <p:nvSpPr>
+          <p:cNvPr id="9" name="Rectangle 8">
+            <a:extLst>
+              <a:ext uri="{FF2B5EF4-FFF2-40B4-BE49-F238E27FC236}">
+                <a16:creationId xmlns:a16="http://schemas.microsoft.com/office/drawing/2014/main" id="{6F93E534-E7AE-43AA-1F49-846B4BFF57EA}"/>
+              </a:ext>
+              <a:ext uri="{C183D7F6-B498-43B3-948B-1728B52AA6E4}">
+                <adec:decorative xmlns:adec="http://schemas.microsoft.com/office/drawing/2017/decorative" val="1"/>
+              </a:ext>
+            </a:extLst>
+          </p:cNvPr>
+          <p:cNvSpPr>
+            <a:spLocks noGrp="1" noRot="1" noChangeAspect="1" noMove="1" noResize="1" noEditPoints="1" noAdjustHandles="1" noChangeArrowheads="1" noChangeShapeType="1" noTextEdit="1"/>
+          </p:cNvSpPr>
+          <p:nvPr>
+            <p:extLst>
+              <p:ext uri="{386F3935-93C4-4BCD-93E2-E3B085C9AB24}">
+                <p16:designElem xmlns:p16="http://schemas.microsoft.com/office/powerpoint/2015/main" val="1"/>
+              </p:ext>
+            </p:extLst>
+          </p:nvPr>
+        </p:nvSpPr>
+        <p:spPr>
+          <a:xfrm>
+            <a:off x="0" y="0"/>
+            <a:ext cx="12192000" cy="6858000"/>
+          </a:xfrm>
+          <a:prstGeom prst="rect">
+            <a:avLst/>
+          </a:prstGeom>
+          <a:ln>
+            <a:noFill/>
+          </a:ln>
+        </p:spPr>
+        <p:style>
+          <a:lnRef idx="2">
+            <a:schemeClr val="accent1">
+              <a:shade val="50000"/>
+            </a:schemeClr>
+          </a:lnRef>
+          <a:fillRef idx="1">
+            <a:schemeClr val="accent1"/>
+          </a:fillRef>
+          <a:effectRef idx="0">
+            <a:schemeClr val="accent1"/>
+          </a:effectRef>
+          <a:fontRef idx="minor">
+            <a:schemeClr val="lt1"/>
+          </a:fontRef>
+        </p:style>
+        <p:txBody>
+          <a:bodyPr rtlCol="0" anchor="ctr"/>
+          <a:lstStyle/>
+          <a:p>
+            <a:pPr algn="ctr"/>
+            <a:endParaRPr lang="en-US"/>
+          </a:p>
+        </p:txBody>
+      </p:sp>
+      <p:sp>
+        <p:nvSpPr>
+          <p:cNvPr id="2" name="Titel 1">
+            <a:extLst>
+              <a:ext uri="{FF2B5EF4-FFF2-40B4-BE49-F238E27FC236}">
+                <a16:creationId xmlns:a16="http://schemas.microsoft.com/office/drawing/2014/main" id="{056E3516-5D38-C0E9-6A13-05216340198C}"/>
+              </a:ext>
+            </a:extLst>
+          </p:cNvPr>
+          <p:cNvSpPr>
+            <a:spLocks noGrp="1"/>
+          </p:cNvSpPr>
+          <p:nvPr>
+            <p:ph type="title"/>
+          </p:nvPr>
+        </p:nvSpPr>
+        <p:spPr>
+          <a:xfrm>
+            <a:off x="411480" y="991443"/>
+            <a:ext cx="6465570" cy="1087819"/>
+          </a:xfrm>
+        </p:spPr>
+        <p:txBody>
+          <a:bodyPr anchor="b">
+            <a:normAutofit/>
+          </a:bodyPr>
+          <a:lstStyle/>
+          <a:p>
+            <a:r>
+              <a:rPr lang="de-DE" sz="3600" dirty="0"/>
+              <a:t>Anfälligkeit gegenüber Bewegung</a:t>
+            </a:r>
+            <a:endParaRPr lang="de-DE" sz="3400" dirty="0"/>
+          </a:p>
+        </p:txBody>
+      </p:sp>
+      <p:sp>
+        <p:nvSpPr>
+          <p:cNvPr id="11" name="Rectangle 10">
+            <a:extLst>
+              <a:ext uri="{FF2B5EF4-FFF2-40B4-BE49-F238E27FC236}">
+                <a16:creationId xmlns:a16="http://schemas.microsoft.com/office/drawing/2014/main" id="{FCCD3E0E-21CE-5EBC-57F1-6C01983CB260}"/>
+              </a:ext>
+              <a:ext uri="{C183D7F6-B498-43B3-948B-1728B52AA6E4}">
+                <adec:decorative xmlns:adec="http://schemas.microsoft.com/office/drawing/2017/decorative" val="1"/>
+              </a:ext>
+            </a:extLst>
+          </p:cNvPr>
+          <p:cNvSpPr>
+            <a:spLocks noGrp="1" noRot="1" noChangeAspect="1" noMove="1" noResize="1" noEditPoints="1" noAdjustHandles="1" noChangeArrowheads="1" noChangeShapeType="1" noTextEdit="1"/>
+          </p:cNvSpPr>
+          <p:nvPr>
+            <p:extLst>
+              <p:ext uri="{386F3935-93C4-4BCD-93E2-E3B085C9AB24}">
+                <p16:designElem xmlns:p16="http://schemas.microsoft.com/office/powerpoint/2015/main" val="1"/>
+              </p:ext>
+            </p:extLst>
+          </p:nvPr>
+        </p:nvSpPr>
+        <p:spPr>
+          <a:xfrm rot="5400000">
+            <a:off x="649223" y="387939"/>
+            <a:ext cx="73152" cy="548640"/>
+          </a:xfrm>
+          <a:prstGeom prst="rect">
+            <a:avLst/>
+          </a:prstGeom>
+          <a:solidFill>
+            <a:schemeClr val="accent2"/>
+          </a:solidFill>
+          <a:ln>
+            <a:noFill/>
+          </a:ln>
+        </p:spPr>
+        <p:style>
+          <a:lnRef idx="2">
+            <a:schemeClr val="accent1">
+              <a:shade val="50000"/>
+            </a:schemeClr>
+          </a:lnRef>
+          <a:fillRef idx="1">
+            <a:schemeClr val="accent1"/>
+          </a:fillRef>
+          <a:effectRef idx="0">
+            <a:schemeClr val="accent1"/>
+          </a:effectRef>
+          <a:fontRef idx="minor">
+            <a:schemeClr val="lt1"/>
+          </a:fontRef>
+        </p:style>
+        <p:txBody>
+          <a:bodyPr rtlCol="0" anchor="ctr"/>
+          <a:lstStyle/>
+          <a:p>
+            <a:pPr algn="ctr"/>
+            <a:endParaRPr lang="en-US">
+              <a:solidFill>
+                <a:prstClr val="white"/>
+              </a:solidFill>
+              <a:latin typeface="Calibri" panose="020F0502020204030204"/>
+            </a:endParaRPr>
+          </a:p>
+        </p:txBody>
+      </p:sp>
+      <p:sp>
+        <p:nvSpPr>
+          <p:cNvPr id="13" name="Rectangle 12">
+            <a:extLst>
+              <a:ext uri="{FF2B5EF4-FFF2-40B4-BE49-F238E27FC236}">
+                <a16:creationId xmlns:a16="http://schemas.microsoft.com/office/drawing/2014/main" id="{518A69E4-ED49-50FF-AD02-E37F37262064}"/>
+              </a:ext>
+              <a:ext uri="{C183D7F6-B498-43B3-948B-1728B52AA6E4}">
+                <adec:decorative xmlns:adec="http://schemas.microsoft.com/office/drawing/2017/decorative" val="1"/>
+              </a:ext>
+            </a:extLst>
+          </p:cNvPr>
+          <p:cNvSpPr>
+            <a:spLocks noGrp="1" noRot="1" noChangeAspect="1" noMove="1" noResize="1" noEditPoints="1" noAdjustHandles="1" noChangeArrowheads="1" noChangeShapeType="1" noTextEdit="1"/>
+          </p:cNvSpPr>
+          <p:nvPr>
+            <p:extLst>
+              <p:ext uri="{386F3935-93C4-4BCD-93E2-E3B085C9AB24}">
+                <p16:designElem xmlns:p16="http://schemas.microsoft.com/office/powerpoint/2015/main" val="1"/>
+              </p:ext>
+            </p:extLst>
+          </p:nvPr>
+        </p:nvSpPr>
+        <p:spPr>
+          <a:xfrm>
+            <a:off x="411480" y="2285541"/>
+            <a:ext cx="4389120" cy="18288"/>
+          </a:xfrm>
+          <a:prstGeom prst="rect">
+            <a:avLst/>
+          </a:prstGeom>
+          <a:solidFill>
+            <a:srgbClr val="D5D5D5"/>
+          </a:solidFill>
+          <a:ln w="3175">
+            <a:noFill/>
+          </a:ln>
+          <a:effectLst/>
+        </p:spPr>
+        <p:style>
+          <a:lnRef idx="2">
+            <a:schemeClr val="accent1">
+              <a:shade val="50000"/>
+            </a:schemeClr>
+          </a:lnRef>
+          <a:fillRef idx="1">
+            <a:schemeClr val="accent1"/>
+          </a:fillRef>
+          <a:effectRef idx="0">
+            <a:schemeClr val="accent1"/>
+          </a:effectRef>
+          <a:fontRef idx="minor">
+            <a:schemeClr val="lt1"/>
+          </a:fontRef>
+        </p:style>
+        <p:txBody>
+          <a:bodyPr rtlCol="0" anchor="ctr"/>
+          <a:lstStyle/>
+          <a:p>
+            <a:pPr algn="ctr"/>
+            <a:endParaRPr lang="en-US">
+              <a:solidFill>
+                <a:prstClr val="white"/>
+              </a:solidFill>
+              <a:latin typeface="Calibri" panose="020F0502020204030204"/>
+            </a:endParaRPr>
+          </a:p>
+        </p:txBody>
+      </p:sp>
+      <p:sp>
+        <p:nvSpPr>
+          <p:cNvPr id="5" name="Inhaltsplatzhalter 4">
+            <a:extLst>
+              <a:ext uri="{FF2B5EF4-FFF2-40B4-BE49-F238E27FC236}">
+                <a16:creationId xmlns:a16="http://schemas.microsoft.com/office/drawing/2014/main" id="{6619487D-DF55-6464-A258-62EAA9E268BB}"/>
+              </a:ext>
+            </a:extLst>
+          </p:cNvPr>
+          <p:cNvSpPr>
+            <a:spLocks noGrp="1"/>
+          </p:cNvSpPr>
+          <p:nvPr>
+            <p:ph idx="1"/>
+          </p:nvPr>
+        </p:nvSpPr>
+        <p:spPr>
+          <a:xfrm>
+            <a:off x="411479" y="2506662"/>
+            <a:ext cx="10515600" cy="4351338"/>
+          </a:xfrm>
+        </p:spPr>
+        <p:txBody>
+          <a:bodyPr/>
+          <a:lstStyle/>
+          <a:p>
+            <a:endParaRPr lang="de-DE" dirty="0"/>
+          </a:p>
+        </p:txBody>
+      </p:sp>
+    </p:spTree>
+    <p:extLst>
+      <p:ext uri="{BB962C8B-B14F-4D97-AF65-F5344CB8AC3E}">
+        <p14:creationId xmlns:p14="http://schemas.microsoft.com/office/powerpoint/2010/main" val="1197082413"/>
+      </p:ext>
+    </p:extLst>
+  </p:cSld>
+  <p:clrMapOvr>
+    <a:masterClrMapping/>
+  </p:clrMapOvr>
+</p:sld>
+</file>
+
+<file path=ppt/slides/slide16.xml><?xml version="1.0" encoding="utf-8"?>
+<p:sld xmlns:a="http://schemas.openxmlformats.org/drawingml/2006/main" xmlns:r="http://schemas.openxmlformats.org/officeDocument/2006/relationships" xmlns:p="http://schemas.openxmlformats.org/presentationml/2006/main">
+  <p:cSld>
+    <p:bg>
+      <p:bgPr>
+        <a:solidFill>
+          <a:schemeClr val="bg1"/>
+        </a:solidFill>
+        <a:effectLst/>
+      </p:bgPr>
+    </p:bg>
+    <p:spTree>
+      <p:nvGrpSpPr>
+        <p:cNvPr id="1" name="">
+          <a:extLst>
+            <a:ext uri="{FF2B5EF4-FFF2-40B4-BE49-F238E27FC236}">
+              <a16:creationId xmlns:a16="http://schemas.microsoft.com/office/drawing/2014/main" id="{68724011-2D47-202C-99D7-4502C279CAFA}"/>
+            </a:ext>
+          </a:extLst>
+        </p:cNvPr>
+        <p:cNvGrpSpPr/>
+        <p:nvPr/>
+      </p:nvGrpSpPr>
+      <p:grpSpPr>
+        <a:xfrm>
+          <a:off x="0" y="0"/>
+          <a:ext cx="0" cy="0"/>
+          <a:chOff x="0" y="0"/>
+          <a:chExt cx="0" cy="0"/>
+        </a:xfrm>
+      </p:grpSpPr>
+      <p:sp useBgFill="1">
+        <p:nvSpPr>
+          <p:cNvPr id="9" name="Rectangle 8">
+            <a:extLst>
+              <a:ext uri="{FF2B5EF4-FFF2-40B4-BE49-F238E27FC236}">
+                <a16:creationId xmlns:a16="http://schemas.microsoft.com/office/drawing/2014/main" id="{0B7433AD-3870-A15D-4C87-5044F01FDD1D}"/>
+              </a:ext>
+              <a:ext uri="{C183D7F6-B498-43B3-948B-1728B52AA6E4}">
+                <adec:decorative xmlns:adec="http://schemas.microsoft.com/office/drawing/2017/decorative" val="1"/>
+              </a:ext>
+            </a:extLst>
+          </p:cNvPr>
+          <p:cNvSpPr>
+            <a:spLocks noGrp="1" noRot="1" noChangeAspect="1" noMove="1" noResize="1" noEditPoints="1" noAdjustHandles="1" noChangeArrowheads="1" noChangeShapeType="1" noTextEdit="1"/>
+          </p:cNvSpPr>
+          <p:nvPr>
+            <p:extLst>
+              <p:ext uri="{386F3935-93C4-4BCD-93E2-E3B085C9AB24}">
+                <p16:designElem xmlns:p16="http://schemas.microsoft.com/office/powerpoint/2015/main" val="1"/>
+              </p:ext>
+            </p:extLst>
+          </p:nvPr>
+        </p:nvSpPr>
+        <p:spPr>
+          <a:xfrm>
+            <a:off x="0" y="0"/>
+            <a:ext cx="12192000" cy="6858000"/>
+          </a:xfrm>
+          <a:prstGeom prst="rect">
+            <a:avLst/>
+          </a:prstGeom>
+          <a:ln>
+            <a:noFill/>
+          </a:ln>
+        </p:spPr>
+        <p:style>
+          <a:lnRef idx="2">
+            <a:schemeClr val="accent1">
+              <a:shade val="50000"/>
+            </a:schemeClr>
+          </a:lnRef>
+          <a:fillRef idx="1">
+            <a:schemeClr val="accent1"/>
+          </a:fillRef>
+          <a:effectRef idx="0">
+            <a:schemeClr val="accent1"/>
+          </a:effectRef>
+          <a:fontRef idx="minor">
+            <a:schemeClr val="lt1"/>
+          </a:fontRef>
+        </p:style>
+        <p:txBody>
+          <a:bodyPr rtlCol="0" anchor="ctr"/>
+          <a:lstStyle/>
+          <a:p>
+            <a:pPr algn="ctr"/>
+            <a:endParaRPr lang="en-US"/>
+          </a:p>
+        </p:txBody>
+      </p:sp>
+      <p:sp>
+        <p:nvSpPr>
+          <p:cNvPr id="2" name="Titel 1">
+            <a:extLst>
+              <a:ext uri="{FF2B5EF4-FFF2-40B4-BE49-F238E27FC236}">
+                <a16:creationId xmlns:a16="http://schemas.microsoft.com/office/drawing/2014/main" id="{5B086FDA-3909-11D3-A732-D243353AE73E}"/>
+              </a:ext>
+            </a:extLst>
+          </p:cNvPr>
+          <p:cNvSpPr>
+            <a:spLocks noGrp="1"/>
+          </p:cNvSpPr>
+          <p:nvPr>
+            <p:ph type="title"/>
+          </p:nvPr>
+        </p:nvSpPr>
+        <p:spPr>
+          <a:xfrm>
+            <a:off x="411480" y="991443"/>
+            <a:ext cx="10243820" cy="1087819"/>
+          </a:xfrm>
+        </p:spPr>
+        <p:txBody>
+          <a:bodyPr anchor="b">
+            <a:normAutofit/>
+          </a:bodyPr>
+          <a:lstStyle/>
+          <a:p>
+            <a:r>
+              <a:rPr lang="de-DE" sz="3600" dirty="0"/>
+              <a:t>Sensitivität gegenüber verschiedenen Kontrasten</a:t>
+            </a:r>
+            <a:endParaRPr lang="de-DE" sz="3400" dirty="0"/>
+          </a:p>
+        </p:txBody>
+      </p:sp>
+      <p:sp>
+        <p:nvSpPr>
+          <p:cNvPr id="11" name="Rectangle 10">
+            <a:extLst>
+              <a:ext uri="{FF2B5EF4-FFF2-40B4-BE49-F238E27FC236}">
+                <a16:creationId xmlns:a16="http://schemas.microsoft.com/office/drawing/2014/main" id="{9372E6B5-E13A-5927-7FA2-DF70B0586240}"/>
+              </a:ext>
+              <a:ext uri="{C183D7F6-B498-43B3-948B-1728B52AA6E4}">
+                <adec:decorative xmlns:adec="http://schemas.microsoft.com/office/drawing/2017/decorative" val="1"/>
+              </a:ext>
+            </a:extLst>
+          </p:cNvPr>
+          <p:cNvSpPr>
+            <a:spLocks noGrp="1" noRot="1" noChangeAspect="1" noMove="1" noResize="1" noEditPoints="1" noAdjustHandles="1" noChangeArrowheads="1" noChangeShapeType="1" noTextEdit="1"/>
+          </p:cNvSpPr>
+          <p:nvPr>
+            <p:extLst>
+              <p:ext uri="{386F3935-93C4-4BCD-93E2-E3B085C9AB24}">
+                <p16:designElem xmlns:p16="http://schemas.microsoft.com/office/powerpoint/2015/main" val="1"/>
+              </p:ext>
+            </p:extLst>
+          </p:nvPr>
+        </p:nvSpPr>
+        <p:spPr>
+          <a:xfrm rot="5400000">
+            <a:off x="649223" y="387939"/>
+            <a:ext cx="73152" cy="548640"/>
+          </a:xfrm>
+          <a:prstGeom prst="rect">
+            <a:avLst/>
+          </a:prstGeom>
+          <a:solidFill>
+            <a:schemeClr val="accent2"/>
+          </a:solidFill>
+          <a:ln>
+            <a:noFill/>
+          </a:ln>
+        </p:spPr>
+        <p:style>
+          <a:lnRef idx="2">
+            <a:schemeClr val="accent1">
+              <a:shade val="50000"/>
+            </a:schemeClr>
+          </a:lnRef>
+          <a:fillRef idx="1">
+            <a:schemeClr val="accent1"/>
+          </a:fillRef>
+          <a:effectRef idx="0">
+            <a:schemeClr val="accent1"/>
+          </a:effectRef>
+          <a:fontRef idx="minor">
+            <a:schemeClr val="lt1"/>
+          </a:fontRef>
+        </p:style>
+        <p:txBody>
+          <a:bodyPr rtlCol="0" anchor="ctr"/>
+          <a:lstStyle/>
+          <a:p>
+            <a:pPr algn="ctr"/>
+            <a:endParaRPr lang="en-US">
+              <a:solidFill>
+                <a:prstClr val="white"/>
+              </a:solidFill>
+              <a:latin typeface="Calibri" panose="020F0502020204030204"/>
+            </a:endParaRPr>
+          </a:p>
+        </p:txBody>
+      </p:sp>
+      <p:sp>
+        <p:nvSpPr>
+          <p:cNvPr id="13" name="Rectangle 12">
+            <a:extLst>
+              <a:ext uri="{FF2B5EF4-FFF2-40B4-BE49-F238E27FC236}">
+                <a16:creationId xmlns:a16="http://schemas.microsoft.com/office/drawing/2014/main" id="{C3856885-B68D-3251-C513-04EBAADA7A9F}"/>
+              </a:ext>
+              <a:ext uri="{C183D7F6-B498-43B3-948B-1728B52AA6E4}">
+                <adec:decorative xmlns:adec="http://schemas.microsoft.com/office/drawing/2017/decorative" val="1"/>
+              </a:ext>
+            </a:extLst>
+          </p:cNvPr>
+          <p:cNvSpPr>
+            <a:spLocks noGrp="1" noRot="1" noChangeAspect="1" noMove="1" noResize="1" noEditPoints="1" noAdjustHandles="1" noChangeArrowheads="1" noChangeShapeType="1" noTextEdit="1"/>
+          </p:cNvSpPr>
+          <p:nvPr>
+            <p:extLst>
+              <p:ext uri="{386F3935-93C4-4BCD-93E2-E3B085C9AB24}">
+                <p16:designElem xmlns:p16="http://schemas.microsoft.com/office/powerpoint/2015/main" val="1"/>
+              </p:ext>
+            </p:extLst>
+          </p:nvPr>
+        </p:nvSpPr>
+        <p:spPr>
+          <a:xfrm>
+            <a:off x="411480" y="2285541"/>
+            <a:ext cx="4389120" cy="18288"/>
+          </a:xfrm>
+          <a:prstGeom prst="rect">
+            <a:avLst/>
+          </a:prstGeom>
+          <a:solidFill>
+            <a:srgbClr val="D5D5D5"/>
+          </a:solidFill>
+          <a:ln w="3175">
+            <a:noFill/>
+          </a:ln>
+          <a:effectLst/>
+        </p:spPr>
+        <p:style>
+          <a:lnRef idx="2">
+            <a:schemeClr val="accent1">
+              <a:shade val="50000"/>
+            </a:schemeClr>
+          </a:lnRef>
+          <a:fillRef idx="1">
+            <a:schemeClr val="accent1"/>
+          </a:fillRef>
+          <a:effectRef idx="0">
+            <a:schemeClr val="accent1"/>
+          </a:effectRef>
+          <a:fontRef idx="minor">
+            <a:schemeClr val="lt1"/>
+          </a:fontRef>
+        </p:style>
+        <p:txBody>
+          <a:bodyPr rtlCol="0" anchor="ctr"/>
+          <a:lstStyle/>
+          <a:p>
+            <a:pPr algn="ctr"/>
+            <a:endParaRPr lang="en-US">
+              <a:solidFill>
+                <a:prstClr val="white"/>
+              </a:solidFill>
+              <a:latin typeface="Calibri" panose="020F0502020204030204"/>
+            </a:endParaRPr>
+          </a:p>
+        </p:txBody>
+      </p:sp>
+      <p:sp>
+        <p:nvSpPr>
+          <p:cNvPr id="5" name="Inhaltsplatzhalter 4">
+            <a:extLst>
+              <a:ext uri="{FF2B5EF4-FFF2-40B4-BE49-F238E27FC236}">
+                <a16:creationId xmlns:a16="http://schemas.microsoft.com/office/drawing/2014/main" id="{3F755241-FD05-3BF9-AA6E-0D54794B8142}"/>
+              </a:ext>
+            </a:extLst>
+          </p:cNvPr>
+          <p:cNvSpPr>
+            <a:spLocks noGrp="1"/>
+          </p:cNvSpPr>
+          <p:nvPr>
+            <p:ph idx="1"/>
+          </p:nvPr>
+        </p:nvSpPr>
+        <p:spPr>
+          <a:xfrm>
+            <a:off x="411479" y="2506662"/>
+            <a:ext cx="10515600" cy="4351338"/>
+          </a:xfrm>
+        </p:spPr>
+        <p:txBody>
+          <a:bodyPr/>
+          <a:lstStyle/>
+          <a:p>
+            <a:endParaRPr lang="de-DE" dirty="0"/>
+          </a:p>
+        </p:txBody>
+      </p:sp>
+    </p:spTree>
+    <p:extLst>
+      <p:ext uri="{BB962C8B-B14F-4D97-AF65-F5344CB8AC3E}">
+        <p14:creationId xmlns:p14="http://schemas.microsoft.com/office/powerpoint/2010/main" val="1510148133"/>
+      </p:ext>
+    </p:extLst>
+  </p:cSld>
+  <p:clrMapOvr>
+    <a:masterClrMapping/>
+  </p:clrMapOvr>
+</p:sld>
+</file>
+
+<file path=ppt/slides/slide17.xml><?xml version="1.0" encoding="utf-8"?>
+<p:sld xmlns:a="http://schemas.openxmlformats.org/drawingml/2006/main" xmlns:r="http://schemas.openxmlformats.org/officeDocument/2006/relationships" xmlns:p="http://schemas.openxmlformats.org/presentationml/2006/main">
+  <p:cSld>
+    <p:bg>
+      <p:bgPr>
+        <a:solidFill>
+          <a:schemeClr val="bg1"/>
+        </a:solidFill>
+        <a:effectLst/>
+      </p:bgPr>
+    </p:bg>
+    <p:spTree>
+      <p:nvGrpSpPr>
+        <p:cNvPr id="1" name="">
+          <a:extLst>
+            <a:ext uri="{FF2B5EF4-FFF2-40B4-BE49-F238E27FC236}">
+              <a16:creationId xmlns:a16="http://schemas.microsoft.com/office/drawing/2014/main" id="{0DCDAE1F-78CC-A6AD-CD09-C9CBA43E7B32}"/>
+            </a:ext>
+          </a:extLst>
+        </p:cNvPr>
+        <p:cNvGrpSpPr/>
+        <p:nvPr/>
+      </p:nvGrpSpPr>
+      <p:grpSpPr>
+        <a:xfrm>
+          <a:off x="0" y="0"/>
+          <a:ext cx="0" cy="0"/>
+          <a:chOff x="0" y="0"/>
+          <a:chExt cx="0" cy="0"/>
+        </a:xfrm>
+      </p:grpSpPr>
+      <p:sp useBgFill="1">
+        <p:nvSpPr>
+          <p:cNvPr id="9" name="Rectangle 8">
+            <a:extLst>
+              <a:ext uri="{FF2B5EF4-FFF2-40B4-BE49-F238E27FC236}">
+                <a16:creationId xmlns:a16="http://schemas.microsoft.com/office/drawing/2014/main" id="{4A610AF2-C893-0DA0-2217-FEEF1F9A36C9}"/>
+              </a:ext>
+              <a:ext uri="{C183D7F6-B498-43B3-948B-1728B52AA6E4}">
+                <adec:decorative xmlns:adec="http://schemas.microsoft.com/office/drawing/2017/decorative" val="1"/>
+              </a:ext>
+            </a:extLst>
+          </p:cNvPr>
+          <p:cNvSpPr>
+            <a:spLocks noGrp="1" noRot="1" noChangeAspect="1" noMove="1" noResize="1" noEditPoints="1" noAdjustHandles="1" noChangeArrowheads="1" noChangeShapeType="1" noTextEdit="1"/>
+          </p:cNvSpPr>
+          <p:nvPr>
+            <p:extLst>
+              <p:ext uri="{386F3935-93C4-4BCD-93E2-E3B085C9AB24}">
+                <p16:designElem xmlns:p16="http://schemas.microsoft.com/office/powerpoint/2015/main" val="1"/>
+              </p:ext>
+            </p:extLst>
+          </p:nvPr>
+        </p:nvSpPr>
+        <p:spPr>
+          <a:xfrm>
+            <a:off x="0" y="0"/>
+            <a:ext cx="12192000" cy="6858000"/>
+          </a:xfrm>
+          <a:prstGeom prst="rect">
+            <a:avLst/>
+          </a:prstGeom>
+          <a:ln>
+            <a:noFill/>
+          </a:ln>
+        </p:spPr>
+        <p:style>
+          <a:lnRef idx="2">
+            <a:schemeClr val="accent1">
+              <a:shade val="50000"/>
+            </a:schemeClr>
+          </a:lnRef>
+          <a:fillRef idx="1">
+            <a:schemeClr val="accent1"/>
+          </a:fillRef>
+          <a:effectRef idx="0">
+            <a:schemeClr val="accent1"/>
+          </a:effectRef>
+          <a:fontRef idx="minor">
+            <a:schemeClr val="lt1"/>
+          </a:fontRef>
+        </p:style>
+        <p:txBody>
+          <a:bodyPr rtlCol="0" anchor="ctr"/>
+          <a:lstStyle/>
+          <a:p>
+            <a:pPr algn="ctr"/>
+            <a:endParaRPr lang="en-US"/>
+          </a:p>
+        </p:txBody>
+      </p:sp>
+      <p:sp>
+        <p:nvSpPr>
+          <p:cNvPr id="2" name="Titel 1">
+            <a:extLst>
+              <a:ext uri="{FF2B5EF4-FFF2-40B4-BE49-F238E27FC236}">
+                <a16:creationId xmlns:a16="http://schemas.microsoft.com/office/drawing/2014/main" id="{174A8CC5-39B8-D717-2316-9A993A917A09}"/>
+              </a:ext>
+            </a:extLst>
+          </p:cNvPr>
+          <p:cNvSpPr>
+            <a:spLocks noGrp="1"/>
+          </p:cNvSpPr>
+          <p:nvPr>
+            <p:ph type="title"/>
+          </p:nvPr>
+        </p:nvSpPr>
+        <p:spPr>
+          <a:xfrm>
+            <a:off x="411480" y="991443"/>
+            <a:ext cx="4443154" cy="1087819"/>
+          </a:xfrm>
+        </p:spPr>
+        <p:txBody>
+          <a:bodyPr anchor="b">
+            <a:normAutofit/>
+          </a:bodyPr>
+          <a:lstStyle/>
+          <a:p>
+            <a:r>
+              <a:rPr lang="de-DE" sz="3400" dirty="0"/>
+              <a:t>Schattenerkennung</a:t>
+            </a:r>
+          </a:p>
+        </p:txBody>
+      </p:sp>
+      <p:sp>
+        <p:nvSpPr>
+          <p:cNvPr id="11" name="Rectangle 10">
+            <a:extLst>
+              <a:ext uri="{FF2B5EF4-FFF2-40B4-BE49-F238E27FC236}">
+                <a16:creationId xmlns:a16="http://schemas.microsoft.com/office/drawing/2014/main" id="{4461107F-34C8-DE83-1B76-890063CB1EE6}"/>
+              </a:ext>
+              <a:ext uri="{C183D7F6-B498-43B3-948B-1728B52AA6E4}">
+                <adec:decorative xmlns:adec="http://schemas.microsoft.com/office/drawing/2017/decorative" val="1"/>
+              </a:ext>
+            </a:extLst>
+          </p:cNvPr>
+          <p:cNvSpPr>
+            <a:spLocks noGrp="1" noRot="1" noChangeAspect="1" noMove="1" noResize="1" noEditPoints="1" noAdjustHandles="1" noChangeArrowheads="1" noChangeShapeType="1" noTextEdit="1"/>
+          </p:cNvSpPr>
+          <p:nvPr>
+            <p:extLst>
+              <p:ext uri="{386F3935-93C4-4BCD-93E2-E3B085C9AB24}">
+                <p16:designElem xmlns:p16="http://schemas.microsoft.com/office/powerpoint/2015/main" val="1"/>
+              </p:ext>
+            </p:extLst>
+          </p:nvPr>
+        </p:nvSpPr>
+        <p:spPr>
+          <a:xfrm rot="5400000">
+            <a:off x="649223" y="387939"/>
+            <a:ext cx="73152" cy="548640"/>
+          </a:xfrm>
+          <a:prstGeom prst="rect">
+            <a:avLst/>
+          </a:prstGeom>
+          <a:solidFill>
+            <a:schemeClr val="accent2"/>
+          </a:solidFill>
+          <a:ln>
+            <a:noFill/>
+          </a:ln>
+        </p:spPr>
+        <p:style>
+          <a:lnRef idx="2">
+            <a:schemeClr val="accent1">
+              <a:shade val="50000"/>
+            </a:schemeClr>
+          </a:lnRef>
+          <a:fillRef idx="1">
+            <a:schemeClr val="accent1"/>
+          </a:fillRef>
+          <a:effectRef idx="0">
+            <a:schemeClr val="accent1"/>
+          </a:effectRef>
+          <a:fontRef idx="minor">
+            <a:schemeClr val="lt1"/>
+          </a:fontRef>
+        </p:style>
+        <p:txBody>
+          <a:bodyPr rtlCol="0" anchor="ctr"/>
+          <a:lstStyle/>
+          <a:p>
+            <a:pPr algn="ctr"/>
+            <a:endParaRPr lang="en-US">
+              <a:solidFill>
+                <a:prstClr val="white"/>
+              </a:solidFill>
+              <a:latin typeface="Calibri" panose="020F0502020204030204"/>
+            </a:endParaRPr>
+          </a:p>
+        </p:txBody>
+      </p:sp>
+      <p:sp>
+        <p:nvSpPr>
+          <p:cNvPr id="13" name="Rectangle 12">
+            <a:extLst>
+              <a:ext uri="{FF2B5EF4-FFF2-40B4-BE49-F238E27FC236}">
+                <a16:creationId xmlns:a16="http://schemas.microsoft.com/office/drawing/2014/main" id="{FCB335A9-E382-FB83-B341-C98FC4C08053}"/>
+              </a:ext>
+              <a:ext uri="{C183D7F6-B498-43B3-948B-1728B52AA6E4}">
+                <adec:decorative xmlns:adec="http://schemas.microsoft.com/office/drawing/2017/decorative" val="1"/>
+              </a:ext>
+            </a:extLst>
+          </p:cNvPr>
+          <p:cNvSpPr>
+            <a:spLocks noGrp="1" noRot="1" noChangeAspect="1" noMove="1" noResize="1" noEditPoints="1" noAdjustHandles="1" noChangeArrowheads="1" noChangeShapeType="1" noTextEdit="1"/>
+          </p:cNvSpPr>
+          <p:nvPr>
+            <p:extLst>
+              <p:ext uri="{386F3935-93C4-4BCD-93E2-E3B085C9AB24}">
+                <p16:designElem xmlns:p16="http://schemas.microsoft.com/office/powerpoint/2015/main" val="1"/>
+              </p:ext>
+            </p:extLst>
+          </p:nvPr>
+        </p:nvSpPr>
+        <p:spPr>
+          <a:xfrm>
+            <a:off x="411480" y="2285541"/>
+            <a:ext cx="4389120" cy="18288"/>
+          </a:xfrm>
+          <a:prstGeom prst="rect">
+            <a:avLst/>
+          </a:prstGeom>
+          <a:solidFill>
+            <a:srgbClr val="D5D5D5"/>
+          </a:solidFill>
+          <a:ln w="3175">
+            <a:noFill/>
+          </a:ln>
+          <a:effectLst/>
+        </p:spPr>
+        <p:style>
+          <a:lnRef idx="2">
+            <a:schemeClr val="accent1">
+              <a:shade val="50000"/>
+            </a:schemeClr>
+          </a:lnRef>
+          <a:fillRef idx="1">
+            <a:schemeClr val="accent1"/>
+          </a:fillRef>
+          <a:effectRef idx="0">
+            <a:schemeClr val="accent1"/>
+          </a:effectRef>
+          <a:fontRef idx="minor">
+            <a:schemeClr val="lt1"/>
+          </a:fontRef>
+        </p:style>
+        <p:txBody>
+          <a:bodyPr rtlCol="0" anchor="ctr"/>
+          <a:lstStyle/>
+          <a:p>
+            <a:pPr algn="ctr"/>
+            <a:endParaRPr lang="en-US">
+              <a:solidFill>
+                <a:prstClr val="white"/>
+              </a:solidFill>
+              <a:latin typeface="Calibri" panose="020F0502020204030204"/>
+            </a:endParaRPr>
+          </a:p>
+        </p:txBody>
+      </p:sp>
+      <p:sp>
+        <p:nvSpPr>
+          <p:cNvPr id="5" name="Inhaltsplatzhalter 4">
+            <a:extLst>
+              <a:ext uri="{FF2B5EF4-FFF2-40B4-BE49-F238E27FC236}">
+                <a16:creationId xmlns:a16="http://schemas.microsoft.com/office/drawing/2014/main" id="{B28CAE13-40F3-93A2-078D-9527410B78CB}"/>
+              </a:ext>
+            </a:extLst>
+          </p:cNvPr>
+          <p:cNvSpPr>
+            <a:spLocks noGrp="1"/>
+          </p:cNvSpPr>
+          <p:nvPr>
+            <p:ph idx="1"/>
+          </p:nvPr>
+        </p:nvSpPr>
+        <p:spPr>
+          <a:xfrm>
+            <a:off x="411479" y="2506662"/>
+            <a:ext cx="10515600" cy="4351338"/>
+          </a:xfrm>
+        </p:spPr>
+        <p:txBody>
+          <a:bodyPr/>
+          <a:lstStyle/>
+          <a:p>
+            <a:endParaRPr lang="de-DE" dirty="0"/>
+          </a:p>
+        </p:txBody>
+      </p:sp>
+    </p:spTree>
+    <p:extLst>
+      <p:ext uri="{BB962C8B-B14F-4D97-AF65-F5344CB8AC3E}">
+        <p14:creationId xmlns:p14="http://schemas.microsoft.com/office/powerpoint/2010/main" val="568619566"/>
+      </p:ext>
+    </p:extLst>
+  </p:cSld>
+  <p:clrMapOvr>
+    <a:masterClrMapping/>
+  </p:clrMapOvr>
+</p:sld>
+</file>
+
+<file path=ppt/slides/slide18.xml><?xml version="1.0" encoding="utf-8"?>
+<p:sld xmlns:a="http://schemas.openxmlformats.org/drawingml/2006/main" xmlns:r="http://schemas.openxmlformats.org/officeDocument/2006/relationships" xmlns:p="http://schemas.openxmlformats.org/presentationml/2006/main">
+  <p:cSld>
+    <p:bg>
+      <p:bgPr>
+        <a:solidFill>
+          <a:schemeClr val="bg1"/>
+        </a:solidFill>
+        <a:effectLst/>
+      </p:bgPr>
+    </p:bg>
+    <p:spTree>
+      <p:nvGrpSpPr>
+        <p:cNvPr id="1" name="">
+          <a:extLst>
+            <a:ext uri="{FF2B5EF4-FFF2-40B4-BE49-F238E27FC236}">
+              <a16:creationId xmlns:a16="http://schemas.microsoft.com/office/drawing/2014/main" id="{AEC7B0B8-8D86-F5BE-1171-F81F0E65DB1A}"/>
+            </a:ext>
+          </a:extLst>
+        </p:cNvPr>
+        <p:cNvGrpSpPr/>
+        <p:nvPr/>
+      </p:nvGrpSpPr>
+      <p:grpSpPr>
+        <a:xfrm>
+          <a:off x="0" y="0"/>
+          <a:ext cx="0" cy="0"/>
+          <a:chOff x="0" y="0"/>
+          <a:chExt cx="0" cy="0"/>
+        </a:xfrm>
+      </p:grpSpPr>
+      <p:sp useBgFill="1">
+        <p:nvSpPr>
+          <p:cNvPr id="10" name="Rectangle 9">
+            <a:extLst>
+              <a:ext uri="{FF2B5EF4-FFF2-40B4-BE49-F238E27FC236}">
+                <a16:creationId xmlns:a16="http://schemas.microsoft.com/office/drawing/2014/main" id="{5897251D-559A-94FD-0C75-A0563D32EFA2}"/>
+              </a:ext>
+              <a:ext uri="{C183D7F6-B498-43B3-948B-1728B52AA6E4}">
+                <adec:decorative xmlns:adec="http://schemas.microsoft.com/office/drawing/2017/decorative" val="1"/>
+              </a:ext>
+            </a:extLst>
+          </p:cNvPr>
+          <p:cNvSpPr>
+            <a:spLocks noGrp="1" noRot="1" noChangeAspect="1" noMove="1" noResize="1" noEditPoints="1" noAdjustHandles="1" noChangeArrowheads="1" noChangeShapeType="1" noTextEdit="1"/>
+          </p:cNvSpPr>
+          <p:nvPr>
+            <p:extLst>
+              <p:ext uri="{386F3935-93C4-4BCD-93E2-E3B085C9AB24}">
+                <p16:designElem xmlns:p16="http://schemas.microsoft.com/office/powerpoint/2015/main" val="1"/>
+              </p:ext>
+            </p:extLst>
+          </p:nvPr>
+        </p:nvSpPr>
+        <p:spPr>
+          <a:xfrm>
+            <a:off x="0" y="0"/>
+            <a:ext cx="12192000" cy="6858000"/>
+          </a:xfrm>
+          <a:prstGeom prst="rect">
+            <a:avLst/>
+          </a:prstGeom>
+          <a:ln w="12700" cap="flat" cmpd="sng" algn="ctr">
+            <a:noFill/>
+            <a:prstDash val="solid"/>
+            <a:miter lim="800000"/>
+          </a:ln>
+          <a:effectLst/>
+          <a:extLst>
+            <a:ext uri="{91240B29-F687-4F45-9708-019B960494DF}">
+              <a14:hiddenLine xmlns:a14="http://schemas.microsoft.com/office/drawing/2010/main" w="12700" cap="flat" cmpd="sng" algn="ctr">
+                <a:solidFill>
+                  <a:schemeClr val="accent1">
+                    <a:shade val="50000"/>
+                  </a:schemeClr>
+                </a:solidFill>
+                <a:prstDash val="solid"/>
+                <a:miter lim="800000"/>
+              </a14:hiddenLine>
+            </a:ext>
+          </a:extLst>
+        </p:spPr>
+        <p:style>
+          <a:lnRef idx="2">
+            <a:schemeClr val="accent1">
+              <a:shade val="50000"/>
+            </a:schemeClr>
+          </a:lnRef>
+          <a:fillRef idx="1">
+            <a:schemeClr val="accent1"/>
+          </a:fillRef>
+          <a:effectRef idx="0">
+            <a:schemeClr val="accent1"/>
+          </a:effectRef>
+          <a:fontRef idx="minor">
+            <a:schemeClr val="lt1"/>
+          </a:fontRef>
+        </p:style>
+        <p:txBody>
+          <a:bodyPr rtlCol="0" anchor="ctr"/>
+          <a:lstStyle/>
+          <a:p>
+            <a:pPr algn="ctr"/>
+            <a:endParaRPr lang="en-US"/>
+          </a:p>
+        </p:txBody>
+      </p:sp>
+      <p:sp>
+        <p:nvSpPr>
+          <p:cNvPr id="12" name="Rectangle 11">
+            <a:extLst>
+              <a:ext uri="{FF2B5EF4-FFF2-40B4-BE49-F238E27FC236}">
+                <a16:creationId xmlns:a16="http://schemas.microsoft.com/office/drawing/2014/main" id="{9A5E2789-4E05-8890-B19E-8C91F1E58BBB}"/>
+              </a:ext>
+              <a:ext uri="{C183D7F6-B498-43B3-948B-1728B52AA6E4}">
+                <adec:decorative xmlns:adec="http://schemas.microsoft.com/office/drawing/2017/decorative" val="1"/>
+              </a:ext>
+            </a:extLst>
+          </p:cNvPr>
+          <p:cNvSpPr>
+            <a:spLocks noGrp="1" noRot="1" noChangeAspect="1" noMove="1" noResize="1" noEditPoints="1" noAdjustHandles="1" noChangeArrowheads="1" noChangeShapeType="1" noTextEdit="1"/>
+          </p:cNvSpPr>
+          <p:nvPr>
+            <p:extLst>
+              <p:ext uri="{386F3935-93C4-4BCD-93E2-E3B085C9AB24}">
+                <p16:designElem xmlns:p16="http://schemas.microsoft.com/office/powerpoint/2015/main" val="1"/>
+              </p:ext>
+            </p:extLst>
+          </p:nvPr>
+        </p:nvSpPr>
+        <p:spPr>
+          <a:xfrm>
+            <a:off x="685800" y="685800"/>
+            <a:ext cx="10820400" cy="5486400"/>
+          </a:xfrm>
+          <a:prstGeom prst="rect">
+            <a:avLst/>
+          </a:prstGeom>
+          <a:solidFill>
+            <a:schemeClr val="accent2">
+              <a:lumMod val="20000"/>
+              <a:lumOff val="80000"/>
+            </a:schemeClr>
+          </a:solidFill>
+          <a:ln>
+            <a:noFill/>
+          </a:ln>
+        </p:spPr>
+        <p:style>
+          <a:lnRef idx="2">
+            <a:schemeClr val="accent1">
+              <a:shade val="50000"/>
+            </a:schemeClr>
+          </a:lnRef>
+          <a:fillRef idx="1">
+            <a:schemeClr val="accent1"/>
+          </a:fillRef>
+          <a:effectRef idx="0">
+            <a:schemeClr val="accent1"/>
+          </a:effectRef>
+          <a:fontRef idx="minor">
+            <a:schemeClr val="lt1"/>
+          </a:fontRef>
+        </p:style>
+        <p:txBody>
+          <a:bodyPr rtlCol="0" anchor="ctr"/>
+          <a:lstStyle/>
+          <a:p>
+            <a:pPr algn="ctr"/>
+            <a:endParaRPr lang="en-US">
+              <a:solidFill>
+                <a:schemeClr val="bg2"/>
+              </a:solidFill>
+            </a:endParaRPr>
+          </a:p>
+        </p:txBody>
+      </p:sp>
+      <p:sp>
+        <p:nvSpPr>
+          <p:cNvPr id="2" name="Titel 1">
+            <a:extLst>
+              <a:ext uri="{FF2B5EF4-FFF2-40B4-BE49-F238E27FC236}">
+                <a16:creationId xmlns:a16="http://schemas.microsoft.com/office/drawing/2014/main" id="{E3203C78-ABEE-C8A3-FF04-7B24DE0E30B3}"/>
+              </a:ext>
+            </a:extLst>
+          </p:cNvPr>
+          <p:cNvSpPr>
+            <a:spLocks noGrp="1"/>
+          </p:cNvSpPr>
+          <p:nvPr>
+            <p:ph type="ctrTitle"/>
+          </p:nvPr>
+        </p:nvSpPr>
+        <p:spPr>
+          <a:xfrm>
+            <a:off x="1472608" y="1380564"/>
+            <a:ext cx="4661492" cy="2346229"/>
+          </a:xfrm>
+        </p:spPr>
+        <p:txBody>
+          <a:bodyPr anchor="b">
+            <a:normAutofit/>
+          </a:bodyPr>
+          <a:lstStyle/>
+          <a:p>
+            <a:br>
+              <a:rPr lang="de-DE" sz="3200" dirty="0"/>
+            </a:br>
+            <a:r>
+              <a:rPr lang="de-DE" sz="3200" dirty="0"/>
+              <a:t>Nachverarbeitung</a:t>
+            </a:r>
+          </a:p>
+        </p:txBody>
+      </p:sp>
+      <p:sp>
+        <p:nvSpPr>
+          <p:cNvPr id="3" name="Untertitel 2">
+            <a:extLst>
+              <a:ext uri="{FF2B5EF4-FFF2-40B4-BE49-F238E27FC236}">
+                <a16:creationId xmlns:a16="http://schemas.microsoft.com/office/drawing/2014/main" id="{F49A6B0C-128F-74CC-6B06-F352302B4053}"/>
+              </a:ext>
+            </a:extLst>
+          </p:cNvPr>
+          <p:cNvSpPr>
+            <a:spLocks noGrp="1"/>
+          </p:cNvSpPr>
+          <p:nvPr>
+            <p:ph type="subTitle" idx="1"/>
+          </p:nvPr>
+        </p:nvSpPr>
+        <p:spPr>
+          <a:xfrm>
+            <a:off x="1472608" y="4061345"/>
+            <a:ext cx="4561369" cy="1416090"/>
+          </a:xfrm>
+        </p:spPr>
+        <p:txBody>
+          <a:bodyPr anchor="t">
+            <a:normAutofit/>
+          </a:bodyPr>
+          <a:lstStyle/>
+          <a:p>
+            <a:endParaRPr lang="de-DE" sz="1400" dirty="0">
+              <a:solidFill>
+                <a:srgbClr val="595959"/>
+              </a:solidFill>
+            </a:endParaRPr>
+          </a:p>
+        </p:txBody>
+      </p:sp>
+      <p:pic>
+        <p:nvPicPr>
+          <p:cNvPr id="4" name="Grafik 3" descr="Ein Bild, das Schwarz, Dunkelheit enthält.&#10;&#10;Automatisch generierte Beschreibung">
+            <a:extLst>
+              <a:ext uri="{FF2B5EF4-FFF2-40B4-BE49-F238E27FC236}">
+                <a16:creationId xmlns:a16="http://schemas.microsoft.com/office/drawing/2014/main" id="{CE60B145-DAF4-85A6-64AC-2ADD51B61CB4}"/>
+              </a:ext>
+            </a:extLst>
+          </p:cNvPr>
+          <p:cNvPicPr>
+            <a:picLocks noChangeAspect="1"/>
+          </p:cNvPicPr>
+          <p:nvPr/>
+        </p:nvPicPr>
+        <p:blipFill>
+          <a:blip r:embed="rId2">
+            <a:extLst>
+              <a:ext uri="{28A0092B-C50C-407E-A947-70E740481C1C}">
+                <a14:useLocalDpi xmlns:a14="http://schemas.microsoft.com/office/drawing/2010/main" val="0"/>
+              </a:ext>
+            </a:extLst>
+          </a:blip>
+          <a:stretch>
+            <a:fillRect/>
+          </a:stretch>
+        </p:blipFill>
+        <p:spPr>
+          <a:xfrm>
+            <a:off x="7692023" y="3106181"/>
+            <a:ext cx="3027369" cy="620612"/>
+          </a:xfrm>
+          <a:prstGeom prst="rect">
+            <a:avLst/>
+          </a:prstGeom>
+        </p:spPr>
+      </p:pic>
+    </p:spTree>
+    <p:extLst>
+      <p:ext uri="{BB962C8B-B14F-4D97-AF65-F5344CB8AC3E}">
+        <p14:creationId xmlns:p14="http://schemas.microsoft.com/office/powerpoint/2010/main" val="3707232650"/>
       </p:ext>
     </p:extLst>
   </p:cSld>
@@ -5683,7 +9176,19 @@
           <a:p>
             <a:r>
               <a:rPr lang="de-DE" sz="1800" dirty="0"/>
+              <a:t>Parametrisierung</a:t>
+            </a:r>
+          </a:p>
+          <a:p>
+            <a:r>
+              <a:rPr lang="de-DE" sz="1800" dirty="0"/>
               <a:t>Bewertung der Ergebnisse</a:t>
+            </a:r>
+          </a:p>
+          <a:p>
+            <a:r>
+              <a:rPr lang="de-DE" sz="1800" dirty="0"/>
+              <a:t>Nachverarbeitung</a:t>
             </a:r>
           </a:p>
           <a:p>
@@ -6992,7 +10497,7 @@
         <p:spPr>
           <a:xfrm>
             <a:off x="411480" y="2684095"/>
-            <a:ext cx="5081270" cy="3492868"/>
+            <a:ext cx="5944870" cy="3492868"/>
           </a:xfrm>
         </p:spPr>
         <p:txBody>
@@ -7009,13 +10514,19 @@
           <a:p>
             <a:r>
               <a:rPr lang="de-DE" sz="1800" dirty="0"/>
-              <a:t>Scharfe Konturen</a:t>
+              <a:t>Vordergrundobjekte klar erkennbar</a:t>
             </a:r>
           </a:p>
           <a:p>
             <a:r>
               <a:rPr lang="de-DE" sz="1800" dirty="0"/>
-              <a:t>Flexibilität des Hintergrunds</a:t>
+              <a:t>Anfälligkeit gegenüber Bewegung</a:t>
+            </a:r>
+          </a:p>
+          <a:p>
+            <a:r>
+              <a:rPr lang="de-DE" sz="1800" dirty="0"/>
+              <a:t>Sensitivität gegenüber verschiedenen Kontrasten</a:t>
             </a:r>
           </a:p>
           <a:p>
@@ -7027,7 +10538,7 @@
           <a:p>
             <a:r>
               <a:rPr lang="de-DE" sz="1800" dirty="0"/>
-              <a:t>Schattenerkennung</a:t>
+              <a:t>Erkennen/Ignorieren von Schatten</a:t>
             </a:r>
           </a:p>
           <a:p>
@@ -7662,22 +11173,14 @@
           </a:p>
           <a:p>
             <a:r>
-              <a:rPr lang="de-DE" sz="1800" dirty="0" err="1"/>
-              <a:t>Vllt</a:t>
+              <a:rPr lang="de-DE" sz="1800" dirty="0"/>
+              <a:t>Keine Bewegung = gehört zum Hintergrund</a:t>
             </a:r>
+          </a:p>
+          <a:p>
             <a:r>
               <a:rPr lang="de-DE" sz="1800" dirty="0"/>
-              <a:t> Keine Bewegung = gehört zum Hintergrund</a:t>
-            </a:r>
-          </a:p>
-          <a:p>
-            <a:r>
-              <a:rPr lang="de-DE" sz="1800" dirty="0" err="1"/>
-              <a:t>Vllt</a:t>
-            </a:r>
-            <a:r>
-              <a:rPr lang="de-DE" sz="1800" dirty="0"/>
-              <a:t> kein schnelle Lichtänderungen</a:t>
+              <a:t>Keine schnellen Lichtänderungen</a:t>
             </a:r>
           </a:p>
           <a:p>
@@ -7717,7 +11220,7 @@
         <p:cNvPr id="1" name="">
           <a:extLst>
             <a:ext uri="{FF2B5EF4-FFF2-40B4-BE49-F238E27FC236}">
-              <a16:creationId xmlns:a16="http://schemas.microsoft.com/office/drawing/2014/main" id="{5A386D71-7C01-A4AA-0401-ADF1A381B1D7}"/>
+              <a16:creationId xmlns:a16="http://schemas.microsoft.com/office/drawing/2014/main" id="{B3158E38-EC9E-D06A-A923-28689EBE1737}"/>
             </a:ext>
           </a:extLst>
         </p:cNvPr>
@@ -7737,7 +11240,7 @@
           <p:cNvPr id="10" name="Rectangle 9">
             <a:extLst>
               <a:ext uri="{FF2B5EF4-FFF2-40B4-BE49-F238E27FC236}">
-                <a16:creationId xmlns:a16="http://schemas.microsoft.com/office/drawing/2014/main" id="{C9CFB64E-AA34-C60C-3998-3CCAA9F9BB93}"/>
+                <a16:creationId xmlns:a16="http://schemas.microsoft.com/office/drawing/2014/main" id="{68093D54-A1B4-2969-90B0-C764EE84A1D8}"/>
               </a:ext>
               <a:ext uri="{C183D7F6-B498-43B3-948B-1728B52AA6E4}">
                 <adec:decorative xmlns:adec="http://schemas.microsoft.com/office/drawing/2017/decorative" val="1"/>
@@ -7813,7 +11316,7 @@
           <p:cNvPr id="12" name="Rectangle 11">
             <a:extLst>
               <a:ext uri="{FF2B5EF4-FFF2-40B4-BE49-F238E27FC236}">
-                <a16:creationId xmlns:a16="http://schemas.microsoft.com/office/drawing/2014/main" id="{70221CC7-3449-8DE1-FB17-87905E32A0B2}"/>
+                <a16:creationId xmlns:a16="http://schemas.microsoft.com/office/drawing/2014/main" id="{903AE685-8D2F-BCC9-4754-A1EDED126CAB}"/>
               </a:ext>
               <a:ext uri="{C183D7F6-B498-43B3-948B-1728B52AA6E4}">
                 <adec:decorative xmlns:adec="http://schemas.microsoft.com/office/drawing/2017/decorative" val="1"/>
@@ -7883,7 +11386,7 @@
           <p:cNvPr id="2" name="Titel 1">
             <a:extLst>
               <a:ext uri="{FF2B5EF4-FFF2-40B4-BE49-F238E27FC236}">
-                <a16:creationId xmlns:a16="http://schemas.microsoft.com/office/drawing/2014/main" id="{D97DBF00-C1CC-D5B2-91E0-8A801A692257}"/>
+                <a16:creationId xmlns:a16="http://schemas.microsoft.com/office/drawing/2014/main" id="{D4EA2DD8-6B80-3E67-CED3-B1664F338146}"/>
               </a:ext>
             </a:extLst>
           </p:cNvPr>
@@ -7897,7 +11400,7 @@
         <p:spPr>
           <a:xfrm>
             <a:off x="1472608" y="1380564"/>
-            <a:ext cx="4661492" cy="2346229"/>
+            <a:ext cx="4561369" cy="2346229"/>
           </a:xfrm>
         </p:spPr>
         <p:txBody>
@@ -7907,11 +11410,15 @@
           <a:lstStyle/>
           <a:p>
             <a:br>
-              <a:rPr lang="de-DE" sz="3200" dirty="0"/>
+              <a:rPr lang="de-DE" sz="3200" dirty="0">
+                <a:solidFill>
+                  <a:srgbClr val="595959"/>
+                </a:solidFill>
+              </a:rPr>
             </a:br>
             <a:r>
               <a:rPr lang="de-DE" sz="3200" dirty="0"/>
-              <a:t>Bewertung der Ergebnisse</a:t>
+              <a:t>Parametrisierung</a:t>
             </a:r>
           </a:p>
         </p:txBody>
@@ -7921,7 +11428,7 @@
           <p:cNvPr id="3" name="Untertitel 2">
             <a:extLst>
               <a:ext uri="{FF2B5EF4-FFF2-40B4-BE49-F238E27FC236}">
-                <a16:creationId xmlns:a16="http://schemas.microsoft.com/office/drawing/2014/main" id="{493C99F7-9178-E517-5720-C264596F90EF}"/>
+                <a16:creationId xmlns:a16="http://schemas.microsoft.com/office/drawing/2014/main" id="{B45C58D3-C7CA-5C0B-A968-C620A62D1827}"/>
               </a:ext>
             </a:extLst>
           </p:cNvPr>
@@ -7957,7 +11464,7 @@
           <p:cNvPr id="4" name="Grafik 3" descr="Ein Bild, das Schwarz, Dunkelheit enthält.&#10;&#10;Automatisch generierte Beschreibung">
             <a:extLst>
               <a:ext uri="{FF2B5EF4-FFF2-40B4-BE49-F238E27FC236}">
-                <a16:creationId xmlns:a16="http://schemas.microsoft.com/office/drawing/2014/main" id="{5F57A6AB-AABD-2A13-53C1-B04BA15FB40F}"/>
+                <a16:creationId xmlns:a16="http://schemas.microsoft.com/office/drawing/2014/main" id="{CC94BE5E-77F6-B9A2-81FD-5034ABF96D38}"/>
               </a:ext>
             </a:extLst>
           </p:cNvPr>
@@ -7991,7 +11498,7 @@
     </p:spTree>
     <p:extLst>
       <p:ext uri="{BB962C8B-B14F-4D97-AF65-F5344CB8AC3E}">
-        <p14:creationId xmlns:p14="http://schemas.microsoft.com/office/powerpoint/2010/main" val="205798188"/>
+        <p14:creationId xmlns:p14="http://schemas.microsoft.com/office/powerpoint/2010/main" val="4211447894"/>
       </p:ext>
     </p:extLst>
   </p:cSld>

</xml_diff>

<commit_message>
Prio eingefügt, FPS in der Performance angepasst
</commit_message>
<xml_diff>
--- a/Präsentationen/Meilenstein_2.pptx
+++ b/Präsentationen/Meilenstein_2.pptx
@@ -227,10 +227,10 @@
                   <c:v>49</c:v>
                 </c:pt>
                 <c:pt idx="5">
-                  <c:v>10</c:v>
+                  <c:v>48</c:v>
                 </c:pt>
                 <c:pt idx="6">
-                  <c:v>10</c:v>
+                  <c:v>22</c:v>
                 </c:pt>
               </c:numCache>
             </c:numRef>
@@ -444,10 +444,10 @@
                   <c:v>60</c:v>
                 </c:pt>
                 <c:pt idx="5">
-                  <c:v>12</c:v>
+                  <c:v>50</c:v>
                 </c:pt>
                 <c:pt idx="6">
-                  <c:v>11</c:v>
+                  <c:v>26</c:v>
                 </c:pt>
               </c:numCache>
             </c:numRef>
@@ -4977,7 +4977,7 @@
             <p:ph idx="1"/>
             <p:extLst>
               <p:ext uri="{D42A27DB-BD31-4B8C-83A1-F6EECF244321}">
-                <p14:modId xmlns:p14="http://schemas.microsoft.com/office/powerpoint/2010/main" val="2759472956"/>
+                <p14:modId xmlns:p14="http://schemas.microsoft.com/office/powerpoint/2010/main" val="3892554834"/>
               </p:ext>
             </p:extLst>
           </p:nvPr>
@@ -6146,7 +6146,7 @@
                           <a:ea typeface="+mn-ea"/>
                           <a:cs typeface="+mn-cs"/>
                         </a:rPr>
-                        <a:t>1</a:t>
+                        <a:t>10</a:t>
                       </a:r>
                       <a:r>
                         <a:rPr lang="de-DE" sz="1400" kern="1200" dirty="0">
@@ -6346,7 +6346,7 @@
                           <a:ea typeface="+mn-ea"/>
                           <a:cs typeface="+mn-cs"/>
                         </a:rPr>
-                        <a:t>1</a:t>
+                        <a:t>10</a:t>
                       </a:r>
                       <a:r>
                         <a:rPr lang="en-US" sz="1400" kern="1200" dirty="0">
@@ -7029,7 +7029,7 @@
             <p:ph idx="1"/>
             <p:extLst>
               <p:ext uri="{D42A27DB-BD31-4B8C-83A1-F6EECF244321}">
-                <p14:modId xmlns:p14="http://schemas.microsoft.com/office/powerpoint/2010/main" val="1700986693"/>
+                <p14:modId xmlns:p14="http://schemas.microsoft.com/office/powerpoint/2010/main" val="2078164110"/>
               </p:ext>
             </p:extLst>
           </p:nvPr>
@@ -7058,8 +7058,8 @@
         </p:nvSpPr>
         <p:spPr>
           <a:xfrm>
-            <a:off x="3942521" y="4590192"/>
-            <a:ext cx="1239079" cy="1276365"/>
+            <a:off x="4565294" y="4764520"/>
+            <a:ext cx="578679" cy="604107"/>
           </a:xfrm>
           <a:prstGeom prst="mathMultiply">
             <a:avLst/>
@@ -10582,7 +10582,7 @@
           <a:p>
             <a:r>
               <a:rPr lang="de-DE" sz="1800" dirty="0"/>
-              <a:t>Rauscharm </a:t>
+              <a:t>Effiziente Leistung</a:t>
             </a:r>
           </a:p>
           <a:p>
@@ -10594,6 +10594,12 @@
           <a:p>
             <a:r>
               <a:rPr lang="de-DE" sz="1800" dirty="0"/>
+              <a:t>Rauscharm </a:t>
+            </a:r>
+          </a:p>
+          <a:p>
+            <a:r>
+              <a:rPr lang="de-DE" sz="1800" dirty="0"/>
               <a:t>Anfälligkeit gegenüber Bewegung</a:t>
             </a:r>
           </a:p>
@@ -10606,12 +10612,6 @@
           <a:p>
             <a:r>
               <a:rPr lang="de-DE" sz="1800" dirty="0"/>
-              <a:t>Effiziente Leistung</a:t>
-            </a:r>
-          </a:p>
-          <a:p>
-            <a:r>
-              <a:rPr lang="de-DE" sz="1800" dirty="0"/>
               <a:t>Erkennen/Ignorieren von Schatten</a:t>
             </a:r>
           </a:p>
@@ -10623,6 +10623,92 @@
           </a:p>
           <a:p>
             <a:endParaRPr lang="de-DE" sz="1800" dirty="0"/>
+          </a:p>
+        </p:txBody>
+      </p:sp>
+      <p:sp>
+        <p:nvSpPr>
+          <p:cNvPr id="7" name="Pfeil: nach oben 6">
+            <a:extLst>
+              <a:ext uri="{FF2B5EF4-FFF2-40B4-BE49-F238E27FC236}">
+                <a16:creationId xmlns:a16="http://schemas.microsoft.com/office/drawing/2014/main" id="{1398D959-5E3B-030F-31E3-DCFEECE3C386}"/>
+              </a:ext>
+            </a:extLst>
+          </p:cNvPr>
+          <p:cNvSpPr/>
+          <p:nvPr/>
+        </p:nvSpPr>
+        <p:spPr>
+          <a:xfrm rot="10800000">
+            <a:off x="7391400" y="2684094"/>
+            <a:ext cx="484632" cy="2211755"/>
+          </a:xfrm>
+          <a:prstGeom prst="upArrow">
+            <a:avLst/>
+          </a:prstGeom>
+          <a:ln>
+            <a:solidFill>
+              <a:schemeClr val="accent2"/>
+            </a:solidFill>
+          </a:ln>
+        </p:spPr>
+        <p:style>
+          <a:lnRef idx="2">
+            <a:schemeClr val="accent2">
+              <a:shade val="15000"/>
+            </a:schemeClr>
+          </a:lnRef>
+          <a:fillRef idx="1">
+            <a:schemeClr val="accent2"/>
+          </a:fillRef>
+          <a:effectRef idx="0">
+            <a:schemeClr val="accent2"/>
+          </a:effectRef>
+          <a:fontRef idx="minor">
+            <a:schemeClr val="lt1"/>
+          </a:fontRef>
+        </p:style>
+        <p:txBody>
+          <a:bodyPr rtlCol="0" anchor="ctr"/>
+          <a:lstStyle/>
+          <a:p>
+            <a:pPr algn="ctr"/>
+            <a:endParaRPr lang="de-DE"/>
+          </a:p>
+        </p:txBody>
+      </p:sp>
+      <p:sp>
+        <p:nvSpPr>
+          <p:cNvPr id="10" name="Textfeld 9">
+            <a:extLst>
+              <a:ext uri="{FF2B5EF4-FFF2-40B4-BE49-F238E27FC236}">
+                <a16:creationId xmlns:a16="http://schemas.microsoft.com/office/drawing/2014/main" id="{CA308E15-C497-DD95-2C72-45B457E6BCD6}"/>
+              </a:ext>
+            </a:extLst>
+          </p:cNvPr>
+          <p:cNvSpPr txBox="1"/>
+          <p:nvPr/>
+        </p:nvSpPr>
+        <p:spPr>
+          <a:xfrm>
+            <a:off x="7971282" y="3620694"/>
+            <a:ext cx="3096768" cy="338554"/>
+          </a:xfrm>
+          <a:prstGeom prst="rect">
+            <a:avLst/>
+          </a:prstGeom>
+          <a:noFill/>
+        </p:spPr>
+        <p:txBody>
+          <a:bodyPr wrap="square" rtlCol="0">
+            <a:spAutoFit/>
+          </a:bodyPr>
+          <a:lstStyle/>
+          <a:p>
+            <a:r>
+              <a:rPr lang="de-DE" sz="1600" dirty="0"/>
+              <a:t>Abnehmende Priorisierung</a:t>
+            </a:r>
           </a:p>
         </p:txBody>
       </p:sp>

</xml_diff>

<commit_message>
Parameter angepasst bei MOG2, Präsi überarbeitet
</commit_message>
<xml_diff>
--- a/Präsentationen/Meilenstein_2.pptx
+++ b/Präsentationen/Meilenstein_2.pptx
@@ -4,6 +4,9 @@
   <p:sldMasterIdLst>
     <p:sldMasterId id="2147483648" r:id="rId1"/>
   </p:sldMasterIdLst>
+  <p:notesMasterIdLst>
+    <p:notesMasterId r:id="rId20"/>
+  </p:notesMasterIdLst>
   <p:sldIdLst>
     <p:sldId id="256" r:id="rId2"/>
     <p:sldId id="257" r:id="rId3"/>
@@ -180,7 +183,7 @@
             <c:strRef>
               <c:f>Tabelle1!$A$2:$A$9</c:f>
               <c:strCache>
-                <c:ptCount val="7"/>
+                <c:ptCount val="5"/>
                 <c:pt idx="0">
                   <c:v>MOG2</c:v>
                 </c:pt>
@@ -194,13 +197,7 @@
                   <c:v>CNT</c:v>
                 </c:pt>
                 <c:pt idx="4">
-                  <c:v>GMG</c:v>
-                </c:pt>
-                <c:pt idx="5">
                   <c:v>GSOC</c:v>
-                </c:pt>
-                <c:pt idx="6">
-                  <c:v>LSBP</c:v>
                 </c:pt>
               </c:strCache>
             </c:strRef>
@@ -224,13 +221,7 @@
                   <c:v>368</c:v>
                 </c:pt>
                 <c:pt idx="4">
-                  <c:v>49</c:v>
-                </c:pt>
-                <c:pt idx="5">
                   <c:v>48</c:v>
-                </c:pt>
-                <c:pt idx="6">
-                  <c:v>22</c:v>
                 </c:pt>
               </c:numCache>
             </c:numRef>
@@ -269,7 +260,7 @@
             <c:strRef>
               <c:f>Tabelle1!$A$2:$A$9</c:f>
               <c:strCache>
-                <c:ptCount val="7"/>
+                <c:ptCount val="5"/>
                 <c:pt idx="0">
                   <c:v>MOG2</c:v>
                 </c:pt>
@@ -283,13 +274,7 @@
                   <c:v>CNT</c:v>
                 </c:pt>
                 <c:pt idx="4">
-                  <c:v>GMG</c:v>
-                </c:pt>
-                <c:pt idx="5">
                   <c:v>GSOC</c:v>
-                </c:pt>
-                <c:pt idx="6">
-                  <c:v>LSBP</c:v>
                 </c:pt>
               </c:strCache>
             </c:strRef>
@@ -333,7 +318,7 @@
             <c:strRef>
               <c:f>Tabelle1!$A$2:$A$9</c:f>
               <c:strCache>
-                <c:ptCount val="7"/>
+                <c:ptCount val="5"/>
                 <c:pt idx="0">
                   <c:v>MOG2</c:v>
                 </c:pt>
@@ -347,13 +332,7 @@
                   <c:v>CNT</c:v>
                 </c:pt>
                 <c:pt idx="4">
-                  <c:v>GMG</c:v>
-                </c:pt>
-                <c:pt idx="5">
                   <c:v>GSOC</c:v>
-                </c:pt>
-                <c:pt idx="6">
-                  <c:v>LSBP</c:v>
                 </c:pt>
               </c:strCache>
             </c:strRef>
@@ -397,7 +376,7 @@
             <c:strRef>
               <c:f>Tabelle1!$A$2:$A$9</c:f>
               <c:strCache>
-                <c:ptCount val="7"/>
+                <c:ptCount val="5"/>
                 <c:pt idx="0">
                   <c:v>MOG2</c:v>
                 </c:pt>
@@ -411,13 +390,7 @@
                   <c:v>CNT</c:v>
                 </c:pt>
                 <c:pt idx="4">
-                  <c:v>GMG</c:v>
-                </c:pt>
-                <c:pt idx="5">
                   <c:v>GSOC</c:v>
-                </c:pt>
-                <c:pt idx="6">
-                  <c:v>LSBP</c:v>
                 </c:pt>
               </c:strCache>
             </c:strRef>
@@ -441,13 +414,7 @@
                   <c:v>513</c:v>
                 </c:pt>
                 <c:pt idx="4">
-                  <c:v>60</c:v>
-                </c:pt>
-                <c:pt idx="5">
                   <c:v>50</c:v>
-                </c:pt>
-                <c:pt idx="6">
-                  <c:v>26</c:v>
                 </c:pt>
               </c:numCache>
             </c:numRef>
@@ -1194,6 +1161,481 @@
 </cs:chartStyle>
 </file>
 
+<file path=ppt/notesMasters/notesMaster1.xml><?xml version="1.0" encoding="utf-8"?>
+<p:notesMaster xmlns:a="http://schemas.openxmlformats.org/drawingml/2006/main" xmlns:r="http://schemas.openxmlformats.org/officeDocument/2006/relationships" xmlns:p="http://schemas.openxmlformats.org/presentationml/2006/main">
+  <p:cSld>
+    <p:bg>
+      <p:bgRef idx="1001">
+        <a:schemeClr val="bg1"/>
+      </p:bgRef>
+    </p:bg>
+    <p:spTree>
+      <p:nvGrpSpPr>
+        <p:cNvPr id="1" name=""/>
+        <p:cNvGrpSpPr/>
+        <p:nvPr/>
+      </p:nvGrpSpPr>
+      <p:grpSpPr>
+        <a:xfrm>
+          <a:off x="0" y="0"/>
+          <a:ext cx="0" cy="0"/>
+          <a:chOff x="0" y="0"/>
+          <a:chExt cx="0" cy="0"/>
+        </a:xfrm>
+      </p:grpSpPr>
+      <p:sp>
+        <p:nvSpPr>
+          <p:cNvPr id="2" name="Kopfzeilenplatzhalter 1"/>
+          <p:cNvSpPr>
+            <a:spLocks noGrp="1"/>
+          </p:cNvSpPr>
+          <p:nvPr>
+            <p:ph type="hdr" sz="quarter"/>
+          </p:nvPr>
+        </p:nvSpPr>
+        <p:spPr>
+          <a:xfrm>
+            <a:off x="0" y="0"/>
+            <a:ext cx="2971800" cy="458788"/>
+          </a:xfrm>
+          <a:prstGeom prst="rect">
+            <a:avLst/>
+          </a:prstGeom>
+        </p:spPr>
+        <p:txBody>
+          <a:bodyPr vert="horz" lIns="91440" tIns="45720" rIns="91440" bIns="45720" rtlCol="0"/>
+          <a:lstStyle>
+            <a:lvl1pPr algn="l">
+              <a:defRPr sz="1200"/>
+            </a:lvl1pPr>
+          </a:lstStyle>
+          <a:p>
+            <a:endParaRPr lang="de-DE"/>
+          </a:p>
+        </p:txBody>
+      </p:sp>
+      <p:sp>
+        <p:nvSpPr>
+          <p:cNvPr id="3" name="Datumsplatzhalter 2"/>
+          <p:cNvSpPr>
+            <a:spLocks noGrp="1"/>
+          </p:cNvSpPr>
+          <p:nvPr>
+            <p:ph type="dt" idx="1"/>
+          </p:nvPr>
+        </p:nvSpPr>
+        <p:spPr>
+          <a:xfrm>
+            <a:off x="3884613" y="0"/>
+            <a:ext cx="2971800" cy="458788"/>
+          </a:xfrm>
+          <a:prstGeom prst="rect">
+            <a:avLst/>
+          </a:prstGeom>
+        </p:spPr>
+        <p:txBody>
+          <a:bodyPr vert="horz" lIns="91440" tIns="45720" rIns="91440" bIns="45720" rtlCol="0"/>
+          <a:lstStyle>
+            <a:lvl1pPr algn="r">
+              <a:defRPr sz="1200"/>
+            </a:lvl1pPr>
+          </a:lstStyle>
+          <a:p>
+            <a:fld id="{9AB5892F-F280-4288-A40B-C76F70093135}" type="datetimeFigureOut">
+              <a:rPr lang="de-DE" smtClean="0"/>
+              <a:t>12.11.2024</a:t>
+            </a:fld>
+            <a:endParaRPr lang="de-DE"/>
+          </a:p>
+        </p:txBody>
+      </p:sp>
+      <p:sp>
+        <p:nvSpPr>
+          <p:cNvPr id="4" name="Folienbildplatzhalter 3"/>
+          <p:cNvSpPr>
+            <a:spLocks noGrp="1" noRot="1" noChangeAspect="1"/>
+          </p:cNvSpPr>
+          <p:nvPr>
+            <p:ph type="sldImg" idx="2"/>
+          </p:nvPr>
+        </p:nvSpPr>
+        <p:spPr>
+          <a:xfrm>
+            <a:off x="685800" y="1143000"/>
+            <a:ext cx="5486400" cy="3086100"/>
+          </a:xfrm>
+          <a:prstGeom prst="rect">
+            <a:avLst/>
+          </a:prstGeom>
+          <a:noFill/>
+          <a:ln w="12700">
+            <a:solidFill>
+              <a:prstClr val="black"/>
+            </a:solidFill>
+          </a:ln>
+        </p:spPr>
+        <p:txBody>
+          <a:bodyPr vert="horz" lIns="91440" tIns="45720" rIns="91440" bIns="45720" rtlCol="0" anchor="ctr"/>
+          <a:lstStyle/>
+          <a:p>
+            <a:endParaRPr lang="de-DE"/>
+          </a:p>
+        </p:txBody>
+      </p:sp>
+      <p:sp>
+        <p:nvSpPr>
+          <p:cNvPr id="5" name="Notizenplatzhalter 4"/>
+          <p:cNvSpPr>
+            <a:spLocks noGrp="1"/>
+          </p:cNvSpPr>
+          <p:nvPr>
+            <p:ph type="body" sz="quarter" idx="3"/>
+          </p:nvPr>
+        </p:nvSpPr>
+        <p:spPr>
+          <a:xfrm>
+            <a:off x="685800" y="4400550"/>
+            <a:ext cx="5486400" cy="3600450"/>
+          </a:xfrm>
+          <a:prstGeom prst="rect">
+            <a:avLst/>
+          </a:prstGeom>
+        </p:spPr>
+        <p:txBody>
+          <a:bodyPr vert="horz" lIns="91440" tIns="45720" rIns="91440" bIns="45720" rtlCol="0"/>
+          <a:lstStyle/>
+          <a:p>
+            <a:pPr lvl="0"/>
+            <a:r>
+              <a:rPr lang="de-DE"/>
+              <a:t>Mastertextformat bearbeiten</a:t>
+            </a:r>
+          </a:p>
+          <a:p>
+            <a:pPr lvl="1"/>
+            <a:r>
+              <a:rPr lang="de-DE"/>
+              <a:t>Zweite Ebene</a:t>
+            </a:r>
+          </a:p>
+          <a:p>
+            <a:pPr lvl="2"/>
+            <a:r>
+              <a:rPr lang="de-DE"/>
+              <a:t>Dritte Ebene</a:t>
+            </a:r>
+          </a:p>
+          <a:p>
+            <a:pPr lvl="3"/>
+            <a:r>
+              <a:rPr lang="de-DE"/>
+              <a:t>Vierte Ebene</a:t>
+            </a:r>
+          </a:p>
+          <a:p>
+            <a:pPr lvl="4"/>
+            <a:r>
+              <a:rPr lang="de-DE"/>
+              <a:t>Fünfte Ebene</a:t>
+            </a:r>
+          </a:p>
+        </p:txBody>
+      </p:sp>
+      <p:sp>
+        <p:nvSpPr>
+          <p:cNvPr id="6" name="Fußzeilenplatzhalter 5"/>
+          <p:cNvSpPr>
+            <a:spLocks noGrp="1"/>
+          </p:cNvSpPr>
+          <p:nvPr>
+            <p:ph type="ftr" sz="quarter" idx="4"/>
+          </p:nvPr>
+        </p:nvSpPr>
+        <p:spPr>
+          <a:xfrm>
+            <a:off x="0" y="8685213"/>
+            <a:ext cx="2971800" cy="458787"/>
+          </a:xfrm>
+          <a:prstGeom prst="rect">
+            <a:avLst/>
+          </a:prstGeom>
+        </p:spPr>
+        <p:txBody>
+          <a:bodyPr vert="horz" lIns="91440" tIns="45720" rIns="91440" bIns="45720" rtlCol="0" anchor="b"/>
+          <a:lstStyle>
+            <a:lvl1pPr algn="l">
+              <a:defRPr sz="1200"/>
+            </a:lvl1pPr>
+          </a:lstStyle>
+          <a:p>
+            <a:endParaRPr lang="de-DE"/>
+          </a:p>
+        </p:txBody>
+      </p:sp>
+      <p:sp>
+        <p:nvSpPr>
+          <p:cNvPr id="7" name="Foliennummernplatzhalter 6"/>
+          <p:cNvSpPr>
+            <a:spLocks noGrp="1"/>
+          </p:cNvSpPr>
+          <p:nvPr>
+            <p:ph type="sldNum" sz="quarter" idx="5"/>
+          </p:nvPr>
+        </p:nvSpPr>
+        <p:spPr>
+          <a:xfrm>
+            <a:off x="3884613" y="8685213"/>
+            <a:ext cx="2971800" cy="458787"/>
+          </a:xfrm>
+          <a:prstGeom prst="rect">
+            <a:avLst/>
+          </a:prstGeom>
+        </p:spPr>
+        <p:txBody>
+          <a:bodyPr vert="horz" lIns="91440" tIns="45720" rIns="91440" bIns="45720" rtlCol="0" anchor="b"/>
+          <a:lstStyle>
+            <a:lvl1pPr algn="r">
+              <a:defRPr sz="1200"/>
+            </a:lvl1pPr>
+          </a:lstStyle>
+          <a:p>
+            <a:fld id="{8BD93F12-32EB-4C40-8208-7724745DABAC}" type="slidenum">
+              <a:rPr lang="de-DE" smtClean="0"/>
+              <a:t>‹Nr.›</a:t>
+            </a:fld>
+            <a:endParaRPr lang="de-DE"/>
+          </a:p>
+        </p:txBody>
+      </p:sp>
+    </p:spTree>
+    <p:extLst>
+      <p:ext uri="{BB962C8B-B14F-4D97-AF65-F5344CB8AC3E}">
+        <p14:creationId xmlns:p14="http://schemas.microsoft.com/office/powerpoint/2010/main" val="372258804"/>
+      </p:ext>
+    </p:extLst>
+  </p:cSld>
+  <p:clrMap bg1="lt1" tx1="dk1" bg2="lt2" tx2="dk2" accent1="accent1" accent2="accent2" accent3="accent3" accent4="accent4" accent5="accent5" accent6="accent6" hlink="hlink" folHlink="folHlink"/>
+  <p:notesStyle>
+    <a:lvl1pPr marL="0" algn="l" defTabSz="914400" rtl="0" eaLnBrk="1" latinLnBrk="0" hangingPunct="1">
+      <a:defRPr sz="1200" kern="1200">
+        <a:solidFill>
+          <a:schemeClr val="tx1"/>
+        </a:solidFill>
+        <a:latin typeface="+mn-lt"/>
+        <a:ea typeface="+mn-ea"/>
+        <a:cs typeface="+mn-cs"/>
+      </a:defRPr>
+    </a:lvl1pPr>
+    <a:lvl2pPr marL="457200" algn="l" defTabSz="914400" rtl="0" eaLnBrk="1" latinLnBrk="0" hangingPunct="1">
+      <a:defRPr sz="1200" kern="1200">
+        <a:solidFill>
+          <a:schemeClr val="tx1"/>
+        </a:solidFill>
+        <a:latin typeface="+mn-lt"/>
+        <a:ea typeface="+mn-ea"/>
+        <a:cs typeface="+mn-cs"/>
+      </a:defRPr>
+    </a:lvl2pPr>
+    <a:lvl3pPr marL="914400" algn="l" defTabSz="914400" rtl="0" eaLnBrk="1" latinLnBrk="0" hangingPunct="1">
+      <a:defRPr sz="1200" kern="1200">
+        <a:solidFill>
+          <a:schemeClr val="tx1"/>
+        </a:solidFill>
+        <a:latin typeface="+mn-lt"/>
+        <a:ea typeface="+mn-ea"/>
+        <a:cs typeface="+mn-cs"/>
+      </a:defRPr>
+    </a:lvl3pPr>
+    <a:lvl4pPr marL="1371600" algn="l" defTabSz="914400" rtl="0" eaLnBrk="1" latinLnBrk="0" hangingPunct="1">
+      <a:defRPr sz="1200" kern="1200">
+        <a:solidFill>
+          <a:schemeClr val="tx1"/>
+        </a:solidFill>
+        <a:latin typeface="+mn-lt"/>
+        <a:ea typeface="+mn-ea"/>
+        <a:cs typeface="+mn-cs"/>
+      </a:defRPr>
+    </a:lvl4pPr>
+    <a:lvl5pPr marL="1828800" algn="l" defTabSz="914400" rtl="0" eaLnBrk="1" latinLnBrk="0" hangingPunct="1">
+      <a:defRPr sz="1200" kern="1200">
+        <a:solidFill>
+          <a:schemeClr val="tx1"/>
+        </a:solidFill>
+        <a:latin typeface="+mn-lt"/>
+        <a:ea typeface="+mn-ea"/>
+        <a:cs typeface="+mn-cs"/>
+      </a:defRPr>
+    </a:lvl5pPr>
+    <a:lvl6pPr marL="2286000" algn="l" defTabSz="914400" rtl="0" eaLnBrk="1" latinLnBrk="0" hangingPunct="1">
+      <a:defRPr sz="1200" kern="1200">
+        <a:solidFill>
+          <a:schemeClr val="tx1"/>
+        </a:solidFill>
+        <a:latin typeface="+mn-lt"/>
+        <a:ea typeface="+mn-ea"/>
+        <a:cs typeface="+mn-cs"/>
+      </a:defRPr>
+    </a:lvl6pPr>
+    <a:lvl7pPr marL="2743200" algn="l" defTabSz="914400" rtl="0" eaLnBrk="1" latinLnBrk="0" hangingPunct="1">
+      <a:defRPr sz="1200" kern="1200">
+        <a:solidFill>
+          <a:schemeClr val="tx1"/>
+        </a:solidFill>
+        <a:latin typeface="+mn-lt"/>
+        <a:ea typeface="+mn-ea"/>
+        <a:cs typeface="+mn-cs"/>
+      </a:defRPr>
+    </a:lvl7pPr>
+    <a:lvl8pPr marL="3200400" algn="l" defTabSz="914400" rtl="0" eaLnBrk="1" latinLnBrk="0" hangingPunct="1">
+      <a:defRPr sz="1200" kern="1200">
+        <a:solidFill>
+          <a:schemeClr val="tx1"/>
+        </a:solidFill>
+        <a:latin typeface="+mn-lt"/>
+        <a:ea typeface="+mn-ea"/>
+        <a:cs typeface="+mn-cs"/>
+      </a:defRPr>
+    </a:lvl8pPr>
+    <a:lvl9pPr marL="3657600" algn="l" defTabSz="914400" rtl="0" eaLnBrk="1" latinLnBrk="0" hangingPunct="1">
+      <a:defRPr sz="1200" kern="1200">
+        <a:solidFill>
+          <a:schemeClr val="tx1"/>
+        </a:solidFill>
+        <a:latin typeface="+mn-lt"/>
+        <a:ea typeface="+mn-ea"/>
+        <a:cs typeface="+mn-cs"/>
+      </a:defRPr>
+    </a:lvl9pPr>
+  </p:notesStyle>
+</p:notesMaster>
+</file>
+
+<file path=ppt/notesSlides/notesSlide1.xml><?xml version="1.0" encoding="utf-8"?>
+<p:notes xmlns:a="http://schemas.openxmlformats.org/drawingml/2006/main" xmlns:r="http://schemas.openxmlformats.org/officeDocument/2006/relationships" xmlns:p="http://schemas.openxmlformats.org/presentationml/2006/main">
+  <p:cSld>
+    <p:spTree>
+      <p:nvGrpSpPr>
+        <p:cNvPr id="1" name=""/>
+        <p:cNvGrpSpPr/>
+        <p:nvPr/>
+      </p:nvGrpSpPr>
+      <p:grpSpPr>
+        <a:xfrm>
+          <a:off x="0" y="0"/>
+          <a:ext cx="0" cy="0"/>
+          <a:chOff x="0" y="0"/>
+          <a:chExt cx="0" cy="0"/>
+        </a:xfrm>
+      </p:grpSpPr>
+      <p:sp>
+        <p:nvSpPr>
+          <p:cNvPr id="2" name="Folienbildplatzhalter 1"/>
+          <p:cNvSpPr>
+            <a:spLocks noGrp="1" noRot="1" noChangeAspect="1"/>
+          </p:cNvSpPr>
+          <p:nvPr>
+            <p:ph type="sldImg"/>
+          </p:nvPr>
+        </p:nvSpPr>
+        <p:spPr/>
+      </p:sp>
+      <p:sp>
+        <p:nvSpPr>
+          <p:cNvPr id="3" name="Notizenplatzhalter 2"/>
+          <p:cNvSpPr>
+            <a:spLocks noGrp="1"/>
+          </p:cNvSpPr>
+          <p:nvPr>
+            <p:ph type="body" idx="1"/>
+          </p:nvPr>
+        </p:nvSpPr>
+        <p:spPr/>
+        <p:txBody>
+          <a:bodyPr/>
+          <a:lstStyle/>
+          <a:p>
+            <a:r>
+              <a:rPr lang="de-DE" sz="1200" dirty="0"/>
+              <a:t>kontrastreiche Kleidung mit weißem Hintergrund</a:t>
+            </a:r>
+          </a:p>
+          <a:p>
+            <a:r>
+              <a:rPr lang="de-DE" sz="1200" dirty="0"/>
+              <a:t>Weiße/helle Kleidung mit weißem Hintergrund</a:t>
+            </a:r>
+          </a:p>
+          <a:p>
+            <a:r>
+              <a:rPr lang="de-DE" sz="1200" dirty="0"/>
+              <a:t>Langsame/schnelle Bewegungen</a:t>
+            </a:r>
+          </a:p>
+          <a:p>
+            <a:r>
+              <a:rPr lang="de-DE" sz="1200" dirty="0"/>
+              <a:t>Helle/ dunkle Umgebung</a:t>
+            </a:r>
+          </a:p>
+          <a:p>
+            <a:r>
+              <a:rPr lang="de-DE" sz="1200" dirty="0"/>
+              <a:t>Schnelle Lichtveränderungen</a:t>
+            </a:r>
+          </a:p>
+          <a:p>
+            <a:r>
+              <a:rPr lang="de-DE" sz="1200" dirty="0"/>
+              <a:t>Spiegelnder Hintergrund (Reflektion von Menschen)</a:t>
+            </a:r>
+          </a:p>
+          <a:p>
+            <a:pPr marL="0" indent="0">
+              <a:buNone/>
+            </a:pPr>
+            <a:endParaRPr lang="de-DE" sz="1200" dirty="0"/>
+          </a:p>
+          <a:p>
+            <a:endParaRPr lang="de-DE" dirty="0"/>
+          </a:p>
+        </p:txBody>
+      </p:sp>
+      <p:sp>
+        <p:nvSpPr>
+          <p:cNvPr id="4" name="Foliennummernplatzhalter 3"/>
+          <p:cNvSpPr>
+            <a:spLocks noGrp="1"/>
+          </p:cNvSpPr>
+          <p:nvPr>
+            <p:ph type="sldNum" sz="quarter" idx="5"/>
+          </p:nvPr>
+        </p:nvSpPr>
+        <p:spPr/>
+        <p:txBody>
+          <a:bodyPr/>
+          <a:lstStyle/>
+          <a:p>
+            <a:fld id="{8BD93F12-32EB-4C40-8208-7724745DABAC}" type="slidenum">
+              <a:rPr lang="de-DE" smtClean="0"/>
+              <a:t>4</a:t>
+            </a:fld>
+            <a:endParaRPr lang="de-DE"/>
+          </a:p>
+        </p:txBody>
+      </p:sp>
+    </p:spTree>
+    <p:extLst>
+      <p:ext uri="{BB962C8B-B14F-4D97-AF65-F5344CB8AC3E}">
+        <p14:creationId xmlns:p14="http://schemas.microsoft.com/office/powerpoint/2010/main" val="3322451085"/>
+      </p:ext>
+    </p:extLst>
+  </p:cSld>
+  <p:clrMapOvr>
+    <a:masterClrMapping/>
+  </p:clrMapOvr>
+</p:notes>
+</file>
+
 <file path=ppt/slideLayouts/slideLayout1.xml><?xml version="1.0" encoding="utf-8"?>
 <p:sldLayout xmlns:a="http://schemas.openxmlformats.org/drawingml/2006/main" xmlns:r="http://schemas.openxmlformats.org/officeDocument/2006/relationships" xmlns:p="http://schemas.openxmlformats.org/presentationml/2006/main" type="title" preserve="1">
   <p:cSld name="Titelfolie">
@@ -1341,7 +1783,7 @@
           <a:p>
             <a:fld id="{07F3CF67-C4D4-4073-9E88-4C8232DDB3C3}" type="datetimeFigureOut">
               <a:rPr lang="de-DE" smtClean="0"/>
-              <a:t>11.11.2024</a:t>
+              <a:t>12.11.2024</a:t>
             </a:fld>
             <a:endParaRPr lang="de-DE"/>
           </a:p>
@@ -1539,7 +1981,7 @@
           <a:p>
             <a:fld id="{07F3CF67-C4D4-4073-9E88-4C8232DDB3C3}" type="datetimeFigureOut">
               <a:rPr lang="de-DE" smtClean="0"/>
-              <a:t>11.11.2024</a:t>
+              <a:t>12.11.2024</a:t>
             </a:fld>
             <a:endParaRPr lang="de-DE"/>
           </a:p>
@@ -1747,7 +2189,7 @@
           <a:p>
             <a:fld id="{07F3CF67-C4D4-4073-9E88-4C8232DDB3C3}" type="datetimeFigureOut">
               <a:rPr lang="de-DE" smtClean="0"/>
-              <a:t>11.11.2024</a:t>
+              <a:t>12.11.2024</a:t>
             </a:fld>
             <a:endParaRPr lang="de-DE"/>
           </a:p>
@@ -1945,7 +2387,7 @@
           <a:p>
             <a:fld id="{07F3CF67-C4D4-4073-9E88-4C8232DDB3C3}" type="datetimeFigureOut">
               <a:rPr lang="de-DE" smtClean="0"/>
-              <a:t>11.11.2024</a:t>
+              <a:t>12.11.2024</a:t>
             </a:fld>
             <a:endParaRPr lang="de-DE"/>
           </a:p>
@@ -2220,7 +2662,7 @@
           <a:p>
             <a:fld id="{07F3CF67-C4D4-4073-9E88-4C8232DDB3C3}" type="datetimeFigureOut">
               <a:rPr lang="de-DE" smtClean="0"/>
-              <a:t>11.11.2024</a:t>
+              <a:t>12.11.2024</a:t>
             </a:fld>
             <a:endParaRPr lang="de-DE"/>
           </a:p>
@@ -2485,7 +2927,7 @@
           <a:p>
             <a:fld id="{07F3CF67-C4D4-4073-9E88-4C8232DDB3C3}" type="datetimeFigureOut">
               <a:rPr lang="de-DE" smtClean="0"/>
-              <a:t>11.11.2024</a:t>
+              <a:t>12.11.2024</a:t>
             </a:fld>
             <a:endParaRPr lang="de-DE"/>
           </a:p>
@@ -2897,7 +3339,7 @@
           <a:p>
             <a:fld id="{07F3CF67-C4D4-4073-9E88-4C8232DDB3C3}" type="datetimeFigureOut">
               <a:rPr lang="de-DE" smtClean="0"/>
-              <a:t>11.11.2024</a:t>
+              <a:t>12.11.2024</a:t>
             </a:fld>
             <a:endParaRPr lang="de-DE"/>
           </a:p>
@@ -3038,7 +3480,7 @@
           <a:p>
             <a:fld id="{07F3CF67-C4D4-4073-9E88-4C8232DDB3C3}" type="datetimeFigureOut">
               <a:rPr lang="de-DE" smtClean="0"/>
-              <a:t>11.11.2024</a:t>
+              <a:t>12.11.2024</a:t>
             </a:fld>
             <a:endParaRPr lang="de-DE"/>
           </a:p>
@@ -3151,7 +3593,7 @@
           <a:p>
             <a:fld id="{07F3CF67-C4D4-4073-9E88-4C8232DDB3C3}" type="datetimeFigureOut">
               <a:rPr lang="de-DE" smtClean="0"/>
-              <a:t>11.11.2024</a:t>
+              <a:t>12.11.2024</a:t>
             </a:fld>
             <a:endParaRPr lang="de-DE"/>
           </a:p>
@@ -3462,7 +3904,7 @@
           <a:p>
             <a:fld id="{07F3CF67-C4D4-4073-9E88-4C8232DDB3C3}" type="datetimeFigureOut">
               <a:rPr lang="de-DE" smtClean="0"/>
-              <a:t>11.11.2024</a:t>
+              <a:t>12.11.2024</a:t>
             </a:fld>
             <a:endParaRPr lang="de-DE"/>
           </a:p>
@@ -3750,7 +4192,7 @@
           <a:p>
             <a:fld id="{07F3CF67-C4D4-4073-9E88-4C8232DDB3C3}" type="datetimeFigureOut">
               <a:rPr lang="de-DE" smtClean="0"/>
-              <a:t>11.11.2024</a:t>
+              <a:t>12.11.2024</a:t>
             </a:fld>
             <a:endParaRPr lang="de-DE"/>
           </a:p>
@@ -3991,7 +4433,7 @@
           <a:p>
             <a:fld id="{07F3CF67-C4D4-4073-9E88-4C8232DDB3C3}" type="datetimeFigureOut">
               <a:rPr lang="de-DE" smtClean="0"/>
-              <a:t>11.11.2024</a:t>
+              <a:t>12.11.2024</a:t>
             </a:fld>
             <a:endParaRPr lang="de-DE"/>
           </a:p>
@@ -4961,1482 +5403,36 @@
           </a:p>
         </p:txBody>
       </p:sp>
-      <p:graphicFrame>
-        <p:nvGraphicFramePr>
-          <p:cNvPr id="4" name="Inhaltsplatzhalter 3">
-            <a:extLst>
-              <a:ext uri="{FF2B5EF4-FFF2-40B4-BE49-F238E27FC236}">
-                <a16:creationId xmlns:a16="http://schemas.microsoft.com/office/drawing/2014/main" id="{733E2D3C-617D-E0C3-35EB-A10F2CB9D0EF}"/>
-              </a:ext>
-            </a:extLst>
-          </p:cNvPr>
-          <p:cNvGraphicFramePr>
-            <a:graphicFrameLocks noGrp="1"/>
-          </p:cNvGraphicFramePr>
+      <p:sp>
+        <p:nvSpPr>
+          <p:cNvPr id="5" name="Inhaltsplatzhalter 4">
+            <a:extLst>
+              <a:ext uri="{FF2B5EF4-FFF2-40B4-BE49-F238E27FC236}">
+                <a16:creationId xmlns:a16="http://schemas.microsoft.com/office/drawing/2014/main" id="{3B444E68-334C-AE5E-AB45-0CC42E4286CD}"/>
+              </a:ext>
+            </a:extLst>
+          </p:cNvPr>
+          <p:cNvSpPr>
+            <a:spLocks noGrp="1"/>
+          </p:cNvSpPr>
           <p:nvPr>
             <p:ph idx="1"/>
-            <p:extLst>
-              <p:ext uri="{D42A27DB-BD31-4B8C-83A1-F6EECF244321}">
-                <p14:modId xmlns:p14="http://schemas.microsoft.com/office/powerpoint/2010/main" val="3892554834"/>
-              </p:ext>
-            </p:extLst>
-          </p:nvPr>
-        </p:nvGraphicFramePr>
-        <p:xfrm>
-          <a:off x="419100" y="2393689"/>
-          <a:ext cx="10883900" cy="4206154"/>
-        </p:xfrm>
-        <a:graphic>
-          <a:graphicData uri="http://schemas.openxmlformats.org/drawingml/2006/table">
-            <a:tbl>
-              <a:tblPr firstRow="1" bandRow="1">
-                <a:tableStyleId>{5DA37D80-6434-44D0-A028-1B22A696006F}</a:tableStyleId>
-              </a:tblPr>
-              <a:tblGrid>
-                <a:gridCol w="4876800">
-                  <a:extLst>
-                    <a:ext uri="{9D8B030D-6E8A-4147-A177-3AD203B41FA5}">
-                      <a16:colId xmlns:a16="http://schemas.microsoft.com/office/drawing/2014/main" val="2880296848"/>
-                    </a:ext>
-                  </a:extLst>
-                </a:gridCol>
-                <a:gridCol w="6007100">
-                  <a:extLst>
-                    <a:ext uri="{9D8B030D-6E8A-4147-A177-3AD203B41FA5}">
-                      <a16:colId xmlns:a16="http://schemas.microsoft.com/office/drawing/2014/main" val="2452408960"/>
-                    </a:ext>
-                  </a:extLst>
-                </a:gridCol>
-              </a:tblGrid>
-              <a:tr h="344886">
-                <a:tc>
-                  <a:txBody>
-                    <a:bodyPr/>
-                    <a:lstStyle/>
-                    <a:p>
-                      <a:r>
-                        <a:rPr lang="de-DE" sz="1400" dirty="0"/>
-                        <a:t>Methode</a:t>
-                      </a:r>
-                    </a:p>
-                  </a:txBody>
-                  <a:tcPr/>
-                </a:tc>
-                <a:tc>
-                  <a:txBody>
-                    <a:bodyPr/>
-                    <a:lstStyle/>
-                    <a:p>
-                      <a:r>
-                        <a:rPr lang="de-DE" sz="1400" dirty="0"/>
-                        <a:t>Parameter</a:t>
-                      </a:r>
-                    </a:p>
-                  </a:txBody>
-                  <a:tcPr/>
-                </a:tc>
-                <a:extLst>
-                  <a:ext uri="{0D108BD9-81ED-4DB2-BD59-A6C34878D82A}">
-                    <a16:rowId xmlns:a16="http://schemas.microsoft.com/office/drawing/2014/main" val="2954306062"/>
-                  </a:ext>
-                </a:extLst>
-              </a:tr>
-              <a:tr h="461825">
-                <a:tc>
-                  <a:txBody>
-                    <a:bodyPr/>
-                    <a:lstStyle/>
-                    <a:p>
-                      <a:r>
-                        <a:rPr lang="de-DE" sz="1400" dirty="0"/>
-                        <a:t>MOG2 (</a:t>
-                      </a:r>
-                      <a:r>
-                        <a:rPr lang="de-DE" sz="1400" dirty="0" err="1"/>
-                        <a:t>Mixture</a:t>
-                      </a:r>
-                      <a:r>
-                        <a:rPr lang="de-DE" sz="1400" dirty="0"/>
-                        <a:t> of </a:t>
-                      </a:r>
-                      <a:r>
-                        <a:rPr lang="de-DE" sz="1400" dirty="0" err="1"/>
-                        <a:t>Gaussians</a:t>
-                      </a:r>
-                      <a:r>
-                        <a:rPr lang="de-DE" sz="1400" dirty="0"/>
-                        <a:t> 2)</a:t>
-                      </a:r>
-                    </a:p>
-                  </a:txBody>
-                  <a:tcPr/>
-                </a:tc>
-                <a:tc>
-                  <a:txBody>
-                    <a:bodyPr/>
-                    <a:lstStyle/>
-                    <a:p>
-                      <a:pPr marL="0" marR="0" lvl="0" indent="0" algn="l" defTabSz="914400" rtl="0" eaLnBrk="1" fontAlgn="auto" latinLnBrk="0" hangingPunct="1">
-                        <a:lnSpc>
-                          <a:spcPct val="100000"/>
-                        </a:lnSpc>
-                        <a:spcBef>
-                          <a:spcPts val="0"/>
-                        </a:spcBef>
-                        <a:spcAft>
-                          <a:spcPts val="0"/>
-                        </a:spcAft>
-                        <a:buClrTx/>
-                        <a:buSzTx/>
-                        <a:buFontTx/>
-                        <a:buNone/>
-                        <a:tabLst/>
-                        <a:defRPr/>
-                      </a:pPr>
-                      <a:r>
-                        <a:rPr lang="de-DE" sz="1400" kern="1200" dirty="0" err="1">
-                          <a:solidFill>
-                            <a:schemeClr val="tx1"/>
-                          </a:solidFill>
-                          <a:effectLst/>
-                          <a:latin typeface="+mn-lt"/>
-                          <a:ea typeface="+mn-ea"/>
-                          <a:cs typeface="+mn-cs"/>
-                        </a:rPr>
-                        <a:t>history</a:t>
-                      </a:r>
-                      <a:r>
-                        <a:rPr lang="de-DE" sz="1400" kern="1200" dirty="0">
-                          <a:solidFill>
-                            <a:schemeClr val="tx1"/>
-                          </a:solidFill>
-                          <a:effectLst/>
-                          <a:latin typeface="+mn-lt"/>
-                          <a:ea typeface="+mn-ea"/>
-                          <a:cs typeface="+mn-cs"/>
-                        </a:rPr>
-                        <a:t>=</a:t>
-                      </a:r>
-                      <a:r>
-                        <a:rPr lang="de-DE" sz="1400" b="1" kern="1200" dirty="0">
-                          <a:solidFill>
-                            <a:schemeClr val="tx1"/>
-                          </a:solidFill>
-                          <a:effectLst/>
-                          <a:latin typeface="+mn-lt"/>
-                          <a:ea typeface="+mn-ea"/>
-                          <a:cs typeface="+mn-cs"/>
-                        </a:rPr>
-                        <a:t>170</a:t>
-                      </a:r>
-                      <a:r>
-                        <a:rPr lang="de-DE" sz="1400" dirty="0"/>
-                        <a:t>, </a:t>
-                      </a:r>
-                      <a:r>
-                        <a:rPr lang="de-DE" sz="1400" kern="1200" dirty="0" err="1">
-                          <a:solidFill>
-                            <a:schemeClr val="tx1"/>
-                          </a:solidFill>
-                          <a:effectLst/>
-                          <a:latin typeface="+mn-lt"/>
-                          <a:ea typeface="+mn-ea"/>
-                          <a:cs typeface="+mn-cs"/>
-                        </a:rPr>
-                        <a:t>varThreshold</a:t>
-                      </a:r>
-                      <a:r>
-                        <a:rPr lang="de-DE" sz="1400" kern="1200" dirty="0">
-                          <a:solidFill>
-                            <a:schemeClr val="tx1"/>
-                          </a:solidFill>
-                          <a:effectLst/>
-                          <a:latin typeface="+mn-lt"/>
-                          <a:ea typeface="+mn-ea"/>
-                          <a:cs typeface="+mn-cs"/>
-                        </a:rPr>
-                        <a:t>=</a:t>
-                      </a:r>
-                      <a:r>
-                        <a:rPr lang="de-DE" sz="1400" b="1" kern="1200" dirty="0">
-                          <a:solidFill>
-                            <a:schemeClr val="tx1"/>
-                          </a:solidFill>
-                          <a:effectLst/>
-                          <a:latin typeface="+mn-lt"/>
-                          <a:ea typeface="+mn-ea"/>
-                          <a:cs typeface="+mn-cs"/>
-                        </a:rPr>
-                        <a:t>95</a:t>
-                      </a:r>
-                      <a:r>
-                        <a:rPr lang="de-DE" sz="1400" kern="1200" dirty="0">
-                          <a:solidFill>
-                            <a:schemeClr val="tx1"/>
-                          </a:solidFill>
-                          <a:effectLst/>
-                          <a:latin typeface="+mn-lt"/>
-                          <a:ea typeface="+mn-ea"/>
-                          <a:cs typeface="+mn-cs"/>
-                        </a:rPr>
-                        <a:t>, </a:t>
-                      </a:r>
-                      <a:r>
-                        <a:rPr lang="de-DE" sz="1400" kern="1200" dirty="0" err="1">
-                          <a:solidFill>
-                            <a:schemeClr val="tx1"/>
-                          </a:solidFill>
-                          <a:effectLst/>
-                          <a:latin typeface="+mn-lt"/>
-                          <a:ea typeface="+mn-ea"/>
-                          <a:cs typeface="+mn-cs"/>
-                        </a:rPr>
-                        <a:t>detectShadows</a:t>
-                      </a:r>
-                      <a:r>
-                        <a:rPr lang="de-DE" sz="1400" kern="1200" dirty="0">
-                          <a:solidFill>
-                            <a:schemeClr val="tx1"/>
-                          </a:solidFill>
-                          <a:effectLst/>
-                          <a:latin typeface="+mn-lt"/>
-                          <a:ea typeface="+mn-ea"/>
-                          <a:cs typeface="+mn-cs"/>
-                        </a:rPr>
-                        <a:t>=</a:t>
-                      </a:r>
-                      <a:r>
-                        <a:rPr lang="de-DE" sz="1400" b="1" kern="1200" dirty="0" err="1">
-                          <a:solidFill>
-                            <a:schemeClr val="tx1"/>
-                          </a:solidFill>
-                          <a:effectLst/>
-                          <a:latin typeface="+mn-lt"/>
-                          <a:ea typeface="+mn-ea"/>
-                          <a:cs typeface="+mn-cs"/>
-                        </a:rPr>
-                        <a:t>False</a:t>
-                      </a:r>
-                      <a:r>
-                        <a:rPr lang="de-DE" sz="1400" dirty="0"/>
-                        <a:t> </a:t>
-                      </a:r>
-                    </a:p>
-                  </a:txBody>
-                  <a:tcPr/>
-                </a:tc>
-                <a:extLst>
-                  <a:ext uri="{0D108BD9-81ED-4DB2-BD59-A6C34878D82A}">
-                    <a16:rowId xmlns:a16="http://schemas.microsoft.com/office/drawing/2014/main" val="1069761896"/>
-                  </a:ext>
-                </a:extLst>
-              </a:tr>
-              <a:tr h="482600">
-                <a:tc>
-                  <a:txBody>
-                    <a:bodyPr/>
-                    <a:lstStyle/>
-                    <a:p>
-                      <a:r>
-                        <a:rPr lang="de-DE" sz="1400" dirty="0"/>
-                        <a:t>MOG </a:t>
-                      </a:r>
-                      <a:br>
-                        <a:rPr lang="de-DE" sz="1400" dirty="0"/>
-                      </a:br>
-                      <a:r>
-                        <a:rPr lang="de-DE" sz="1400" dirty="0"/>
-                        <a:t>(</a:t>
-                      </a:r>
-                      <a:r>
-                        <a:rPr lang="de-DE" sz="1400" dirty="0" err="1"/>
-                        <a:t>Mixture</a:t>
-                      </a:r>
-                      <a:r>
-                        <a:rPr lang="de-DE" sz="1400" dirty="0"/>
-                        <a:t> of </a:t>
-                      </a:r>
-                      <a:r>
-                        <a:rPr lang="de-DE" sz="1400" dirty="0" err="1"/>
-                        <a:t>Gaussians</a:t>
-                      </a:r>
-                      <a:r>
-                        <a:rPr lang="de-DE" sz="1400" dirty="0"/>
-                        <a:t>)</a:t>
-                      </a:r>
-                    </a:p>
-                  </a:txBody>
-                  <a:tcPr/>
-                </a:tc>
-                <a:tc>
-                  <a:txBody>
-                    <a:bodyPr/>
-                    <a:lstStyle/>
-                    <a:p>
-                      <a:pPr marL="0" marR="0" lvl="0" indent="0" algn="l" defTabSz="914400" rtl="0" eaLnBrk="1" fontAlgn="auto" latinLnBrk="0" hangingPunct="1">
-                        <a:lnSpc>
-                          <a:spcPct val="100000"/>
-                        </a:lnSpc>
-                        <a:spcBef>
-                          <a:spcPts val="0"/>
-                        </a:spcBef>
-                        <a:spcAft>
-                          <a:spcPts val="0"/>
-                        </a:spcAft>
-                        <a:buClrTx/>
-                        <a:buSzTx/>
-                        <a:buFontTx/>
-                        <a:buNone/>
-                        <a:tabLst/>
-                        <a:defRPr/>
-                      </a:pPr>
-                      <a:r>
-                        <a:rPr lang="en-US" sz="1400" kern="1200" dirty="0">
-                          <a:solidFill>
-                            <a:schemeClr val="tx1"/>
-                          </a:solidFill>
-                          <a:effectLst/>
-                          <a:latin typeface="+mn-lt"/>
-                          <a:ea typeface="+mn-ea"/>
-                          <a:cs typeface="+mn-cs"/>
-                        </a:rPr>
-                        <a:t>history=</a:t>
-                      </a:r>
-                      <a:r>
-                        <a:rPr lang="en-US" sz="1400" b="1" kern="1200" dirty="0">
-                          <a:solidFill>
-                            <a:schemeClr val="tx1"/>
-                          </a:solidFill>
-                          <a:effectLst/>
-                          <a:latin typeface="+mn-lt"/>
-                          <a:ea typeface="+mn-ea"/>
-                          <a:cs typeface="+mn-cs"/>
-                        </a:rPr>
-                        <a:t>170</a:t>
-                      </a:r>
-                      <a:r>
-                        <a:rPr lang="en-US" sz="1400" kern="1200" dirty="0">
-                          <a:solidFill>
-                            <a:schemeClr val="tx1"/>
-                          </a:solidFill>
-                          <a:effectLst/>
-                          <a:latin typeface="+mn-lt"/>
-                          <a:ea typeface="+mn-ea"/>
-                          <a:cs typeface="+mn-cs"/>
-                        </a:rPr>
-                        <a:t>, </a:t>
-                      </a:r>
-                      <a:r>
-                        <a:rPr lang="en-US" sz="1400" kern="1200" dirty="0" err="1">
-                          <a:solidFill>
-                            <a:schemeClr val="tx1"/>
-                          </a:solidFill>
-                          <a:effectLst/>
-                          <a:latin typeface="+mn-lt"/>
-                          <a:ea typeface="+mn-ea"/>
-                          <a:cs typeface="+mn-cs"/>
-                        </a:rPr>
-                        <a:t>nmixtures</a:t>
-                      </a:r>
-                      <a:r>
-                        <a:rPr lang="en-US" sz="1400" kern="1200" dirty="0">
-                          <a:solidFill>
-                            <a:schemeClr val="tx1"/>
-                          </a:solidFill>
-                          <a:effectLst/>
-                          <a:latin typeface="+mn-lt"/>
-                          <a:ea typeface="+mn-ea"/>
-                          <a:cs typeface="+mn-cs"/>
-                        </a:rPr>
-                        <a:t>=</a:t>
-                      </a:r>
-                      <a:r>
-                        <a:rPr lang="en-US" sz="1400" b="1" kern="1200" dirty="0">
-                          <a:solidFill>
-                            <a:schemeClr val="tx1"/>
-                          </a:solidFill>
-                          <a:effectLst/>
-                          <a:latin typeface="+mn-lt"/>
-                          <a:ea typeface="+mn-ea"/>
-                          <a:cs typeface="+mn-cs"/>
-                        </a:rPr>
-                        <a:t>5</a:t>
-                      </a:r>
-                      <a:r>
-                        <a:rPr lang="en-US" sz="1400" kern="1200" dirty="0">
-                          <a:solidFill>
-                            <a:schemeClr val="tx1"/>
-                          </a:solidFill>
-                          <a:effectLst/>
-                          <a:latin typeface="+mn-lt"/>
-                          <a:ea typeface="+mn-ea"/>
-                          <a:cs typeface="+mn-cs"/>
-                        </a:rPr>
-                        <a:t>, </a:t>
-                      </a:r>
-                      <a:r>
-                        <a:rPr lang="en-US" sz="1400" kern="1200" dirty="0" err="1">
-                          <a:solidFill>
-                            <a:schemeClr val="tx1"/>
-                          </a:solidFill>
-                          <a:effectLst/>
-                          <a:latin typeface="+mn-lt"/>
-                          <a:ea typeface="+mn-ea"/>
-                          <a:cs typeface="+mn-cs"/>
-                        </a:rPr>
-                        <a:t>backgroundRatio</a:t>
-                      </a:r>
-                      <a:r>
-                        <a:rPr lang="en-US" sz="1400" kern="1200" dirty="0">
-                          <a:solidFill>
-                            <a:schemeClr val="tx1"/>
-                          </a:solidFill>
-                          <a:effectLst/>
-                          <a:latin typeface="+mn-lt"/>
-                          <a:ea typeface="+mn-ea"/>
-                          <a:cs typeface="+mn-cs"/>
-                        </a:rPr>
-                        <a:t>=</a:t>
-                      </a:r>
-                      <a:r>
-                        <a:rPr lang="en-US" sz="1400" b="1" kern="1200" dirty="0">
-                          <a:solidFill>
-                            <a:schemeClr val="tx1"/>
-                          </a:solidFill>
-                          <a:effectLst/>
-                          <a:latin typeface="+mn-lt"/>
-                          <a:ea typeface="+mn-ea"/>
-                          <a:cs typeface="+mn-cs"/>
-                        </a:rPr>
-                        <a:t>0.5</a:t>
-                      </a:r>
-                      <a:r>
-                        <a:rPr lang="en-US" sz="1400" kern="1200" dirty="0">
-                          <a:solidFill>
-                            <a:schemeClr val="tx1"/>
-                          </a:solidFill>
-                          <a:effectLst/>
-                          <a:latin typeface="+mn-lt"/>
-                          <a:ea typeface="+mn-ea"/>
-                          <a:cs typeface="+mn-cs"/>
-                        </a:rPr>
-                        <a:t>, </a:t>
-                      </a:r>
-                      <a:r>
-                        <a:rPr lang="en-US" sz="1400" kern="1200" dirty="0" err="1">
-                          <a:solidFill>
-                            <a:schemeClr val="tx1"/>
-                          </a:solidFill>
-                          <a:effectLst/>
-                          <a:latin typeface="+mn-lt"/>
-                          <a:ea typeface="+mn-ea"/>
-                          <a:cs typeface="+mn-cs"/>
-                        </a:rPr>
-                        <a:t>noiseSigma</a:t>
-                      </a:r>
-                      <a:r>
-                        <a:rPr lang="en-US" sz="1400" kern="1200" dirty="0">
-                          <a:solidFill>
-                            <a:schemeClr val="tx1"/>
-                          </a:solidFill>
-                          <a:effectLst/>
-                          <a:latin typeface="+mn-lt"/>
-                          <a:ea typeface="+mn-ea"/>
-                          <a:cs typeface="+mn-cs"/>
-                        </a:rPr>
-                        <a:t>=</a:t>
-                      </a:r>
-                      <a:r>
-                        <a:rPr lang="en-US" sz="1400" b="1" kern="1200" dirty="0">
-                          <a:solidFill>
-                            <a:schemeClr val="tx1"/>
-                          </a:solidFill>
-                          <a:effectLst/>
-                          <a:latin typeface="+mn-lt"/>
-                          <a:ea typeface="+mn-ea"/>
-                          <a:cs typeface="+mn-cs"/>
-                        </a:rPr>
-                        <a:t>1.5</a:t>
-                      </a:r>
-                    </a:p>
-                    <a:p>
-                      <a:endParaRPr lang="de-DE" sz="1400" dirty="0"/>
-                    </a:p>
-                  </a:txBody>
-                  <a:tcPr/>
-                </a:tc>
-                <a:extLst>
-                  <a:ext uri="{0D108BD9-81ED-4DB2-BD59-A6C34878D82A}">
-                    <a16:rowId xmlns:a16="http://schemas.microsoft.com/office/drawing/2014/main" val="4114695107"/>
-                  </a:ext>
-                </a:extLst>
-              </a:tr>
-              <a:tr h="439420">
-                <a:tc>
-                  <a:txBody>
-                    <a:bodyPr/>
-                    <a:lstStyle/>
-                    <a:p>
-                      <a:r>
-                        <a:rPr lang="de-DE" sz="1400" dirty="0"/>
-                        <a:t>KNN </a:t>
-                      </a:r>
-                      <a:br>
-                        <a:rPr lang="de-DE" sz="1400" dirty="0"/>
-                      </a:br>
-                      <a:r>
-                        <a:rPr lang="de-DE" sz="1400" dirty="0"/>
-                        <a:t>(K-</a:t>
-                      </a:r>
-                      <a:r>
-                        <a:rPr lang="de-DE" sz="1400" dirty="0" err="1"/>
-                        <a:t>Nearest</a:t>
-                      </a:r>
-                      <a:r>
-                        <a:rPr lang="de-DE" sz="1400" dirty="0"/>
-                        <a:t> </a:t>
-                      </a:r>
-                      <a:r>
-                        <a:rPr lang="de-DE" sz="1400" dirty="0" err="1"/>
-                        <a:t>Neighbors</a:t>
-                      </a:r>
-                      <a:r>
-                        <a:rPr lang="de-DE" sz="1400" dirty="0"/>
-                        <a:t>)</a:t>
-                      </a:r>
-                    </a:p>
-                  </a:txBody>
-                  <a:tcPr/>
-                </a:tc>
-                <a:tc>
-                  <a:txBody>
-                    <a:bodyPr/>
-                    <a:lstStyle/>
-                    <a:p>
-                      <a:pPr marL="0" marR="0" lvl="0" indent="0" algn="l" defTabSz="914400" rtl="0" eaLnBrk="1" fontAlgn="auto" latinLnBrk="0" hangingPunct="1">
-                        <a:lnSpc>
-                          <a:spcPct val="100000"/>
-                        </a:lnSpc>
-                        <a:spcBef>
-                          <a:spcPts val="0"/>
-                        </a:spcBef>
-                        <a:spcAft>
-                          <a:spcPts val="0"/>
-                        </a:spcAft>
-                        <a:buClrTx/>
-                        <a:buSzTx/>
-                        <a:buFontTx/>
-                        <a:buNone/>
-                        <a:tabLst/>
-                        <a:defRPr/>
-                      </a:pPr>
-                      <a:r>
-                        <a:rPr lang="en-US" sz="1400" kern="1200" dirty="0">
-                          <a:solidFill>
-                            <a:schemeClr val="tx1"/>
-                          </a:solidFill>
-                          <a:effectLst/>
-                          <a:latin typeface="+mn-lt"/>
-                          <a:ea typeface="+mn-ea"/>
-                          <a:cs typeface="+mn-cs"/>
-                        </a:rPr>
-                        <a:t>history=</a:t>
-                      </a:r>
-                      <a:r>
-                        <a:rPr lang="en-US" sz="1400" b="1" kern="1200" dirty="0">
-                          <a:solidFill>
-                            <a:schemeClr val="tx1"/>
-                          </a:solidFill>
-                          <a:effectLst/>
-                          <a:latin typeface="+mn-lt"/>
-                          <a:ea typeface="+mn-ea"/>
-                          <a:cs typeface="+mn-cs"/>
-                        </a:rPr>
-                        <a:t>500</a:t>
-                      </a:r>
-                      <a:r>
-                        <a:rPr lang="en-US" sz="1400" kern="1200" dirty="0">
-                          <a:solidFill>
-                            <a:schemeClr val="tx1"/>
-                          </a:solidFill>
-                          <a:effectLst/>
-                          <a:latin typeface="+mn-lt"/>
-                          <a:ea typeface="+mn-ea"/>
-                          <a:cs typeface="+mn-cs"/>
-                        </a:rPr>
-                        <a:t>, dist2Threshold=</a:t>
-                      </a:r>
-                      <a:r>
-                        <a:rPr lang="en-US" sz="1400" b="1" kern="1200" dirty="0">
-                          <a:solidFill>
-                            <a:schemeClr val="tx1"/>
-                          </a:solidFill>
-                          <a:effectLst/>
-                          <a:latin typeface="+mn-lt"/>
-                          <a:ea typeface="+mn-ea"/>
-                          <a:cs typeface="+mn-cs"/>
-                        </a:rPr>
-                        <a:t>400</a:t>
-                      </a:r>
-                      <a:r>
-                        <a:rPr lang="en-US" sz="1400" kern="1200" dirty="0">
-                          <a:solidFill>
-                            <a:schemeClr val="tx1"/>
-                          </a:solidFill>
-                          <a:effectLst/>
-                          <a:latin typeface="+mn-lt"/>
-                          <a:ea typeface="+mn-ea"/>
-                          <a:cs typeface="+mn-cs"/>
-                        </a:rPr>
-                        <a:t>, </a:t>
-                      </a:r>
-                      <a:r>
-                        <a:rPr lang="en-US" sz="1400" kern="1200" dirty="0" err="1">
-                          <a:solidFill>
-                            <a:schemeClr val="tx1"/>
-                          </a:solidFill>
-                          <a:effectLst/>
-                          <a:latin typeface="+mn-lt"/>
-                          <a:ea typeface="+mn-ea"/>
-                          <a:cs typeface="+mn-cs"/>
-                        </a:rPr>
-                        <a:t>detectShadows</a:t>
-                      </a:r>
-                      <a:r>
-                        <a:rPr lang="en-US" sz="1400" kern="1200" dirty="0">
-                          <a:solidFill>
-                            <a:schemeClr val="tx1"/>
-                          </a:solidFill>
-                          <a:effectLst/>
-                          <a:latin typeface="+mn-lt"/>
-                          <a:ea typeface="+mn-ea"/>
-                          <a:cs typeface="+mn-cs"/>
-                        </a:rPr>
-                        <a:t>=</a:t>
-                      </a:r>
-                      <a:r>
-                        <a:rPr lang="de-DE" sz="1400" b="1" kern="1200" dirty="0" err="1">
-                          <a:solidFill>
-                            <a:schemeClr val="tx1"/>
-                          </a:solidFill>
-                          <a:effectLst/>
-                          <a:latin typeface="+mn-lt"/>
-                          <a:ea typeface="+mn-ea"/>
-                          <a:cs typeface="+mn-cs"/>
-                        </a:rPr>
-                        <a:t>False</a:t>
-                      </a:r>
-                      <a:endParaRPr lang="en-US" sz="1400" b="1" kern="1200" dirty="0">
-                        <a:solidFill>
-                          <a:schemeClr val="tx1"/>
-                        </a:solidFill>
-                        <a:effectLst/>
-                        <a:latin typeface="+mn-lt"/>
-                        <a:ea typeface="+mn-ea"/>
-                        <a:cs typeface="+mn-cs"/>
-                      </a:endParaRPr>
-                    </a:p>
-                    <a:p>
-                      <a:endParaRPr lang="de-DE" sz="1400" dirty="0"/>
-                    </a:p>
-                  </a:txBody>
-                  <a:tcPr/>
-                </a:tc>
-                <a:extLst>
-                  <a:ext uri="{0D108BD9-81ED-4DB2-BD59-A6C34878D82A}">
-                    <a16:rowId xmlns:a16="http://schemas.microsoft.com/office/drawing/2014/main" val="1824794857"/>
-                  </a:ext>
-                </a:extLst>
-              </a:tr>
-              <a:tr h="440690">
-                <a:tc>
-                  <a:txBody>
-                    <a:bodyPr/>
-                    <a:lstStyle/>
-                    <a:p>
-                      <a:r>
-                        <a:rPr lang="de-DE" sz="1400" dirty="0"/>
-                        <a:t>CNT </a:t>
-                      </a:r>
-                      <a:br>
-                        <a:rPr lang="de-DE" sz="1400" dirty="0"/>
-                      </a:br>
-                      <a:r>
-                        <a:rPr lang="de-DE" sz="1400" dirty="0"/>
-                        <a:t>(</a:t>
-                      </a:r>
-                      <a:r>
-                        <a:rPr lang="de-DE" sz="1400" dirty="0" err="1"/>
-                        <a:t>Continuous</a:t>
-                      </a:r>
-                      <a:r>
-                        <a:rPr lang="de-DE" sz="1400" dirty="0"/>
-                        <a:t> Background </a:t>
-                      </a:r>
-                      <a:r>
-                        <a:rPr lang="de-DE" sz="1400" dirty="0" err="1"/>
-                        <a:t>Subtraction</a:t>
-                      </a:r>
-                      <a:r>
-                        <a:rPr lang="de-DE" sz="1400" dirty="0"/>
-                        <a:t>)</a:t>
-                      </a:r>
-                    </a:p>
-                  </a:txBody>
-                  <a:tcPr/>
-                </a:tc>
-                <a:tc>
-                  <a:txBody>
-                    <a:bodyPr/>
-                    <a:lstStyle/>
-                    <a:p>
-                      <a:pPr marL="0" marR="0" lvl="0" indent="0" algn="l" defTabSz="914400" rtl="0" eaLnBrk="1" fontAlgn="auto" latinLnBrk="0" hangingPunct="1">
-                        <a:lnSpc>
-                          <a:spcPct val="100000"/>
-                        </a:lnSpc>
-                        <a:spcBef>
-                          <a:spcPts val="0"/>
-                        </a:spcBef>
-                        <a:spcAft>
-                          <a:spcPts val="0"/>
-                        </a:spcAft>
-                        <a:buClrTx/>
-                        <a:buSzTx/>
-                        <a:buFontTx/>
-                        <a:buNone/>
-                        <a:tabLst/>
-                        <a:defRPr/>
-                      </a:pPr>
-                      <a:r>
-                        <a:rPr lang="de-DE" sz="1400" kern="1200" dirty="0" err="1">
-                          <a:solidFill>
-                            <a:schemeClr val="tx1"/>
-                          </a:solidFill>
-                          <a:effectLst/>
-                          <a:latin typeface="+mn-lt"/>
-                          <a:ea typeface="+mn-ea"/>
-                          <a:cs typeface="+mn-cs"/>
-                        </a:rPr>
-                        <a:t>minPixelStability</a:t>
-                      </a:r>
-                      <a:r>
-                        <a:rPr lang="de-DE" sz="1400" kern="1200" dirty="0">
-                          <a:solidFill>
-                            <a:schemeClr val="tx1"/>
-                          </a:solidFill>
-                          <a:effectLst/>
-                          <a:latin typeface="+mn-lt"/>
-                          <a:ea typeface="+mn-ea"/>
-                          <a:cs typeface="+mn-cs"/>
-                        </a:rPr>
-                        <a:t>=</a:t>
-                      </a:r>
-                      <a:r>
-                        <a:rPr lang="de-DE" sz="1400" b="1" kern="1200" dirty="0">
-                          <a:solidFill>
-                            <a:schemeClr val="tx1"/>
-                          </a:solidFill>
-                          <a:effectLst/>
-                          <a:latin typeface="+mn-lt"/>
-                          <a:ea typeface="+mn-ea"/>
-                          <a:cs typeface="+mn-cs"/>
-                        </a:rPr>
-                        <a:t>15</a:t>
-                      </a:r>
-                      <a:r>
-                        <a:rPr lang="de-DE" sz="1400" kern="1200" dirty="0">
-                          <a:solidFill>
-                            <a:schemeClr val="tx1"/>
-                          </a:solidFill>
-                          <a:effectLst/>
-                          <a:latin typeface="+mn-lt"/>
-                          <a:ea typeface="+mn-ea"/>
-                          <a:cs typeface="+mn-cs"/>
-                        </a:rPr>
-                        <a:t>, </a:t>
-                      </a:r>
-                      <a:r>
-                        <a:rPr lang="de-DE" sz="1400" kern="1200" dirty="0" err="1">
-                          <a:solidFill>
-                            <a:schemeClr val="tx1"/>
-                          </a:solidFill>
-                          <a:effectLst/>
-                          <a:latin typeface="+mn-lt"/>
-                          <a:ea typeface="+mn-ea"/>
-                          <a:cs typeface="+mn-cs"/>
-                        </a:rPr>
-                        <a:t>maxPixelStability</a:t>
-                      </a:r>
-                      <a:r>
-                        <a:rPr lang="de-DE" sz="1400" kern="1200" dirty="0">
-                          <a:solidFill>
-                            <a:schemeClr val="tx1"/>
-                          </a:solidFill>
-                          <a:effectLst/>
-                          <a:latin typeface="+mn-lt"/>
-                          <a:ea typeface="+mn-ea"/>
-                          <a:cs typeface="+mn-cs"/>
-                        </a:rPr>
-                        <a:t>=</a:t>
-                      </a:r>
-                      <a:r>
-                        <a:rPr lang="de-DE" sz="1400" b="1" kern="1200" dirty="0">
-                          <a:solidFill>
-                            <a:schemeClr val="tx1"/>
-                          </a:solidFill>
-                          <a:effectLst/>
-                          <a:latin typeface="+mn-lt"/>
-                          <a:ea typeface="+mn-ea"/>
-                          <a:cs typeface="+mn-cs"/>
-                        </a:rPr>
-                        <a:t>60</a:t>
-                      </a:r>
-                      <a:r>
-                        <a:rPr lang="de-DE" sz="1400" kern="1200" dirty="0">
-                          <a:solidFill>
-                            <a:schemeClr val="tx1"/>
-                          </a:solidFill>
-                          <a:effectLst/>
-                          <a:latin typeface="+mn-lt"/>
-                          <a:ea typeface="+mn-ea"/>
-                          <a:cs typeface="+mn-cs"/>
-                        </a:rPr>
-                        <a:t>, </a:t>
-                      </a:r>
-                      <a:r>
-                        <a:rPr lang="de-DE" sz="1400" kern="1200" dirty="0" err="1">
-                          <a:solidFill>
-                            <a:schemeClr val="tx1"/>
-                          </a:solidFill>
-                          <a:effectLst/>
-                          <a:latin typeface="+mn-lt"/>
-                          <a:ea typeface="+mn-ea"/>
-                          <a:cs typeface="+mn-cs"/>
-                        </a:rPr>
-                        <a:t>isParallel</a:t>
-                      </a:r>
-                      <a:r>
-                        <a:rPr lang="de-DE" sz="1400" kern="1200" dirty="0">
-                          <a:solidFill>
-                            <a:schemeClr val="tx1"/>
-                          </a:solidFill>
-                          <a:effectLst/>
-                          <a:latin typeface="+mn-lt"/>
-                          <a:ea typeface="+mn-ea"/>
-                          <a:cs typeface="+mn-cs"/>
-                        </a:rPr>
-                        <a:t>=</a:t>
-                      </a:r>
-                      <a:r>
-                        <a:rPr lang="de-DE" sz="1400" b="1" kern="1200" dirty="0">
-                          <a:solidFill>
-                            <a:schemeClr val="tx1"/>
-                          </a:solidFill>
-                          <a:effectLst/>
-                          <a:latin typeface="+mn-lt"/>
-                          <a:ea typeface="+mn-ea"/>
-                          <a:cs typeface="+mn-cs"/>
-                        </a:rPr>
-                        <a:t>True</a:t>
-                      </a:r>
-                    </a:p>
-                    <a:p>
-                      <a:endParaRPr lang="de-DE" sz="1400" dirty="0"/>
-                    </a:p>
-                  </a:txBody>
-                  <a:tcPr/>
-                </a:tc>
-                <a:extLst>
-                  <a:ext uri="{0D108BD9-81ED-4DB2-BD59-A6C34878D82A}">
-                    <a16:rowId xmlns:a16="http://schemas.microsoft.com/office/drawing/2014/main" val="1046297743"/>
-                  </a:ext>
-                </a:extLst>
-              </a:tr>
-              <a:tr h="441960">
-                <a:tc>
-                  <a:txBody>
-                    <a:bodyPr/>
-                    <a:lstStyle/>
-                    <a:p>
-                      <a:r>
-                        <a:rPr lang="de-DE" sz="1400" dirty="0"/>
-                        <a:t>GMG </a:t>
-                      </a:r>
-                      <a:br>
-                        <a:rPr lang="de-DE" sz="1400" dirty="0"/>
-                      </a:br>
-                      <a:r>
-                        <a:rPr lang="de-DE" sz="1400" dirty="0"/>
-                        <a:t>(</a:t>
-                      </a:r>
-                      <a:r>
-                        <a:rPr lang="en-US" sz="1400" dirty="0"/>
-                        <a:t>Gaussian Mixture-based Background/Foreground Segmentation</a:t>
-                      </a:r>
-                      <a:r>
-                        <a:rPr lang="de-DE" sz="1400" dirty="0"/>
-                        <a:t>)</a:t>
-                      </a:r>
-                    </a:p>
-                  </a:txBody>
-                  <a:tcPr/>
-                </a:tc>
-                <a:tc>
-                  <a:txBody>
-                    <a:bodyPr/>
-                    <a:lstStyle/>
-                    <a:p>
-                      <a:pPr marL="0" marR="0" lvl="0" indent="0" algn="l" defTabSz="914400" rtl="0" eaLnBrk="1" fontAlgn="auto" latinLnBrk="0" hangingPunct="1">
-                        <a:lnSpc>
-                          <a:spcPct val="100000"/>
-                        </a:lnSpc>
-                        <a:spcBef>
-                          <a:spcPts val="0"/>
-                        </a:spcBef>
-                        <a:spcAft>
-                          <a:spcPts val="0"/>
-                        </a:spcAft>
-                        <a:buClrTx/>
-                        <a:buSzTx/>
-                        <a:buFontTx/>
-                        <a:buNone/>
-                        <a:tabLst/>
-                        <a:defRPr/>
-                      </a:pPr>
-                      <a:r>
-                        <a:rPr lang="de-DE" sz="1400" kern="1200" dirty="0" err="1">
-                          <a:solidFill>
-                            <a:schemeClr val="tx1"/>
-                          </a:solidFill>
-                          <a:effectLst/>
-                          <a:latin typeface="+mn-lt"/>
-                          <a:ea typeface="+mn-ea"/>
-                          <a:cs typeface="+mn-cs"/>
-                        </a:rPr>
-                        <a:t>initializationFrames</a:t>
-                      </a:r>
-                      <a:r>
-                        <a:rPr lang="de-DE" sz="1400" kern="1200" dirty="0">
-                          <a:solidFill>
-                            <a:schemeClr val="tx1"/>
-                          </a:solidFill>
-                          <a:effectLst/>
-                          <a:latin typeface="+mn-lt"/>
-                          <a:ea typeface="+mn-ea"/>
-                          <a:cs typeface="+mn-cs"/>
-                        </a:rPr>
-                        <a:t>=</a:t>
-                      </a:r>
-                      <a:r>
-                        <a:rPr lang="de-DE" sz="1400" b="1" kern="1200" dirty="0">
-                          <a:solidFill>
-                            <a:schemeClr val="tx1"/>
-                          </a:solidFill>
-                          <a:effectLst/>
-                          <a:latin typeface="+mn-lt"/>
-                          <a:ea typeface="+mn-ea"/>
-                          <a:cs typeface="+mn-cs"/>
-                        </a:rPr>
-                        <a:t>50</a:t>
-                      </a:r>
-                      <a:r>
-                        <a:rPr lang="de-DE" sz="1400" kern="1200" dirty="0">
-                          <a:solidFill>
-                            <a:schemeClr val="tx1"/>
-                          </a:solidFill>
-                          <a:effectLst/>
-                          <a:latin typeface="+mn-lt"/>
-                          <a:ea typeface="+mn-ea"/>
-                          <a:cs typeface="+mn-cs"/>
-                        </a:rPr>
-                        <a:t>, </a:t>
-                      </a:r>
-                      <a:r>
-                        <a:rPr lang="de-DE" sz="1400" kern="1200" dirty="0" err="1">
-                          <a:solidFill>
-                            <a:schemeClr val="tx1"/>
-                          </a:solidFill>
-                          <a:effectLst/>
-                          <a:latin typeface="+mn-lt"/>
-                          <a:ea typeface="+mn-ea"/>
-                          <a:cs typeface="+mn-cs"/>
-                        </a:rPr>
-                        <a:t>decisionThreshold</a:t>
-                      </a:r>
-                      <a:r>
-                        <a:rPr lang="de-DE" sz="1400" kern="1200" dirty="0">
-                          <a:solidFill>
-                            <a:schemeClr val="tx1"/>
-                          </a:solidFill>
-                          <a:effectLst/>
-                          <a:latin typeface="+mn-lt"/>
-                          <a:ea typeface="+mn-ea"/>
-                          <a:cs typeface="+mn-cs"/>
-                        </a:rPr>
-                        <a:t>=</a:t>
-                      </a:r>
-                      <a:r>
-                        <a:rPr lang="de-DE" sz="1400" b="1" kern="1200" dirty="0">
-                          <a:solidFill>
-                            <a:schemeClr val="tx1"/>
-                          </a:solidFill>
-                          <a:effectLst/>
-                          <a:latin typeface="+mn-lt"/>
-                          <a:ea typeface="+mn-ea"/>
-                          <a:cs typeface="+mn-cs"/>
-                        </a:rPr>
-                        <a:t>0.7</a:t>
-                      </a:r>
-                    </a:p>
-                    <a:p>
-                      <a:endParaRPr lang="de-DE" sz="1400" dirty="0"/>
-                    </a:p>
-                  </a:txBody>
-                  <a:tcPr/>
-                </a:tc>
-                <a:extLst>
-                  <a:ext uri="{0D108BD9-81ED-4DB2-BD59-A6C34878D82A}">
-                    <a16:rowId xmlns:a16="http://schemas.microsoft.com/office/drawing/2014/main" val="1059716208"/>
-                  </a:ext>
-                </a:extLst>
-              </a:tr>
-              <a:tr h="133003">
-                <a:tc>
-                  <a:txBody>
-                    <a:bodyPr/>
-                    <a:lstStyle/>
-                    <a:p>
-                      <a:pPr marL="0" marR="0" lvl="0" indent="0" algn="l" defTabSz="914400" rtl="0" eaLnBrk="1" fontAlgn="auto" latinLnBrk="0" hangingPunct="1">
-                        <a:lnSpc>
-                          <a:spcPct val="100000"/>
-                        </a:lnSpc>
-                        <a:spcBef>
-                          <a:spcPts val="0"/>
-                        </a:spcBef>
-                        <a:spcAft>
-                          <a:spcPts val="0"/>
-                        </a:spcAft>
-                        <a:buClrTx/>
-                        <a:buSzTx/>
-                        <a:buFontTx/>
-                        <a:buNone/>
-                        <a:tabLst/>
-                        <a:defRPr/>
-                      </a:pPr>
-                      <a:r>
-                        <a:rPr lang="de-DE" sz="1400" kern="1200" dirty="0">
-                          <a:solidFill>
-                            <a:schemeClr val="tx1"/>
-                          </a:solidFill>
-                          <a:effectLst/>
-                          <a:latin typeface="+mn-lt"/>
-                          <a:ea typeface="+mn-ea"/>
-                          <a:cs typeface="+mn-cs"/>
-                        </a:rPr>
-                        <a:t>GSOC</a:t>
-                      </a:r>
-                    </a:p>
-                    <a:p>
-                      <a:pPr marL="0" marR="0" lvl="0" indent="0" algn="l" defTabSz="914400" rtl="0" eaLnBrk="1" fontAlgn="auto" latinLnBrk="0" hangingPunct="1">
-                        <a:lnSpc>
-                          <a:spcPct val="100000"/>
-                        </a:lnSpc>
-                        <a:spcBef>
-                          <a:spcPts val="0"/>
-                        </a:spcBef>
-                        <a:spcAft>
-                          <a:spcPts val="0"/>
-                        </a:spcAft>
-                        <a:buClrTx/>
-                        <a:buSzTx/>
-                        <a:buFontTx/>
-                        <a:buNone/>
-                        <a:tabLst/>
-                        <a:defRPr/>
-                      </a:pPr>
-                      <a:r>
-                        <a:rPr lang="de-DE" sz="1400" kern="1200" dirty="0">
-                          <a:solidFill>
-                            <a:schemeClr val="tx1"/>
-                          </a:solidFill>
-                          <a:effectLst/>
-                          <a:latin typeface="+mn-lt"/>
-                          <a:ea typeface="+mn-ea"/>
-                          <a:cs typeface="+mn-cs"/>
-                        </a:rPr>
-                        <a:t>(</a:t>
-                      </a:r>
-                      <a:r>
-                        <a:rPr lang="de-DE" sz="1400" dirty="0"/>
-                        <a:t>Gradient Segmentation </a:t>
-                      </a:r>
-                      <a:r>
-                        <a:rPr lang="de-DE" sz="1400" dirty="0" err="1"/>
-                        <a:t>for</a:t>
-                      </a:r>
-                      <a:r>
-                        <a:rPr lang="de-DE" sz="1400" dirty="0"/>
-                        <a:t> </a:t>
-                      </a:r>
-                      <a:r>
-                        <a:rPr lang="de-DE" sz="1400" dirty="0" err="1"/>
-                        <a:t>Object</a:t>
-                      </a:r>
-                      <a:r>
-                        <a:rPr lang="de-DE" sz="1400" dirty="0"/>
-                        <a:t> Classification</a:t>
-                      </a:r>
-                      <a:r>
-                        <a:rPr lang="de-DE" sz="1400" kern="1200" dirty="0">
-                          <a:solidFill>
-                            <a:schemeClr val="tx1"/>
-                          </a:solidFill>
-                          <a:effectLst/>
-                          <a:latin typeface="+mn-lt"/>
-                          <a:ea typeface="+mn-ea"/>
-                          <a:cs typeface="+mn-cs"/>
-                        </a:rPr>
-                        <a:t>)</a:t>
-                      </a:r>
-                    </a:p>
-                  </a:txBody>
-                  <a:tcPr/>
-                </a:tc>
-                <a:tc>
-                  <a:txBody>
-                    <a:bodyPr/>
-                    <a:lstStyle/>
-                    <a:p>
-                      <a:pPr marL="0" marR="0" lvl="0" indent="0" algn="l" defTabSz="914400" rtl="0" eaLnBrk="1" fontAlgn="auto" latinLnBrk="0" hangingPunct="1">
-                        <a:lnSpc>
-                          <a:spcPct val="100000"/>
-                        </a:lnSpc>
-                        <a:spcBef>
-                          <a:spcPts val="0"/>
-                        </a:spcBef>
-                        <a:spcAft>
-                          <a:spcPts val="0"/>
-                        </a:spcAft>
-                        <a:buClrTx/>
-                        <a:buSzTx/>
-                        <a:buFontTx/>
-                        <a:buNone/>
-                        <a:tabLst/>
-                        <a:defRPr/>
-                      </a:pPr>
-                      <a:r>
-                        <a:rPr lang="de-DE" sz="1400" kern="1200" dirty="0">
-                          <a:solidFill>
-                            <a:schemeClr val="tx1"/>
-                          </a:solidFill>
-                          <a:effectLst/>
-                          <a:latin typeface="+mn-lt"/>
-                          <a:ea typeface="+mn-ea"/>
-                          <a:cs typeface="+mn-cs"/>
-                        </a:rPr>
-                        <a:t>mc=</a:t>
-                      </a:r>
-                      <a:r>
-                        <a:rPr lang="de-DE" sz="1400" b="1" kern="1200" dirty="0">
-                          <a:solidFill>
-                            <a:schemeClr val="tx1"/>
-                          </a:solidFill>
-                          <a:effectLst/>
-                          <a:latin typeface="+mn-lt"/>
-                          <a:ea typeface="+mn-ea"/>
-                          <a:cs typeface="+mn-cs"/>
-                        </a:rPr>
-                        <a:t>10</a:t>
-                      </a:r>
-                      <a:r>
-                        <a:rPr lang="de-DE" sz="1400" kern="1200" dirty="0">
-                          <a:solidFill>
-                            <a:schemeClr val="tx1"/>
-                          </a:solidFill>
-                          <a:effectLst/>
-                          <a:latin typeface="+mn-lt"/>
-                          <a:ea typeface="+mn-ea"/>
-                          <a:cs typeface="+mn-cs"/>
-                        </a:rPr>
-                        <a:t>, </a:t>
-                      </a:r>
-                      <a:r>
-                        <a:rPr lang="de-DE" sz="1400" kern="1200" dirty="0" err="1">
-                          <a:solidFill>
-                            <a:schemeClr val="tx1"/>
-                          </a:solidFill>
-                          <a:effectLst/>
-                          <a:latin typeface="+mn-lt"/>
-                          <a:ea typeface="+mn-ea"/>
-                          <a:cs typeface="+mn-cs"/>
-                        </a:rPr>
-                        <a:t>nSamples</a:t>
-                      </a:r>
-                      <a:r>
-                        <a:rPr lang="de-DE" sz="1400" kern="1200" dirty="0">
-                          <a:solidFill>
-                            <a:schemeClr val="tx1"/>
-                          </a:solidFill>
-                          <a:effectLst/>
-                          <a:latin typeface="+mn-lt"/>
-                          <a:ea typeface="+mn-ea"/>
-                          <a:cs typeface="+mn-cs"/>
-                        </a:rPr>
-                        <a:t>=</a:t>
-                      </a:r>
-                      <a:r>
-                        <a:rPr lang="de-DE" sz="1400" b="1" kern="1200" dirty="0">
-                          <a:solidFill>
-                            <a:schemeClr val="tx1"/>
-                          </a:solidFill>
-                          <a:effectLst/>
-                          <a:latin typeface="+mn-lt"/>
-                          <a:ea typeface="+mn-ea"/>
-                          <a:cs typeface="+mn-cs"/>
-                        </a:rPr>
-                        <a:t>20</a:t>
-                      </a:r>
-                      <a:r>
-                        <a:rPr lang="de-DE" sz="1400" kern="1200" dirty="0">
-                          <a:solidFill>
-                            <a:schemeClr val="tx1"/>
-                          </a:solidFill>
-                          <a:effectLst/>
-                          <a:latin typeface="+mn-lt"/>
-                          <a:ea typeface="+mn-ea"/>
-                          <a:cs typeface="+mn-cs"/>
-                        </a:rPr>
-                        <a:t>, </a:t>
-                      </a:r>
-                      <a:r>
-                        <a:rPr lang="de-DE" sz="1400" kern="1200" dirty="0" err="1">
-                          <a:solidFill>
-                            <a:schemeClr val="tx1"/>
-                          </a:solidFill>
-                          <a:effectLst/>
-                          <a:latin typeface="+mn-lt"/>
-                          <a:ea typeface="+mn-ea"/>
-                          <a:cs typeface="+mn-cs"/>
-                        </a:rPr>
-                        <a:t>replaceRate</a:t>
-                      </a:r>
-                      <a:r>
-                        <a:rPr lang="de-DE" sz="1400" kern="1200" dirty="0">
-                          <a:solidFill>
-                            <a:schemeClr val="tx1"/>
-                          </a:solidFill>
-                          <a:effectLst/>
-                          <a:latin typeface="+mn-lt"/>
-                          <a:ea typeface="+mn-ea"/>
-                          <a:cs typeface="+mn-cs"/>
-                        </a:rPr>
-                        <a:t>=</a:t>
-                      </a:r>
-                      <a:r>
-                        <a:rPr lang="de-DE" sz="1400" b="1" kern="1200" dirty="0">
-                          <a:solidFill>
-                            <a:schemeClr val="tx1"/>
-                          </a:solidFill>
-                          <a:effectLst/>
-                          <a:latin typeface="+mn-lt"/>
-                          <a:ea typeface="+mn-ea"/>
-                          <a:cs typeface="+mn-cs"/>
-                        </a:rPr>
-                        <a:t>0.01</a:t>
-                      </a:r>
-                    </a:p>
-                    <a:p>
-                      <a:endParaRPr lang="de-DE" sz="1400" dirty="0"/>
-                    </a:p>
-                  </a:txBody>
-                  <a:tcPr/>
-                </a:tc>
-                <a:extLst>
-                  <a:ext uri="{0D108BD9-81ED-4DB2-BD59-A6C34878D82A}">
-                    <a16:rowId xmlns:a16="http://schemas.microsoft.com/office/drawing/2014/main" val="2804086022"/>
-                  </a:ext>
-                </a:extLst>
-              </a:tr>
-              <a:tr h="595283">
-                <a:tc>
-                  <a:txBody>
-                    <a:bodyPr/>
-                    <a:lstStyle/>
-                    <a:p>
-                      <a:r>
-                        <a:rPr lang="de-DE" sz="1400" dirty="0"/>
-                        <a:t>LSBP </a:t>
-                      </a:r>
-                      <a:br>
-                        <a:rPr lang="de-DE" sz="1400" dirty="0"/>
-                      </a:br>
-                      <a:r>
-                        <a:rPr lang="de-DE" sz="1400" dirty="0"/>
-                        <a:t>(</a:t>
-                      </a:r>
-                      <a:r>
-                        <a:rPr lang="de-DE" sz="1400" dirty="0" err="1"/>
-                        <a:t>Local</a:t>
-                      </a:r>
-                      <a:r>
-                        <a:rPr lang="de-DE" sz="1400" dirty="0"/>
-                        <a:t> </a:t>
-                      </a:r>
-                      <a:r>
-                        <a:rPr lang="de-DE" sz="1400" dirty="0" err="1"/>
-                        <a:t>Sensitivity-based</a:t>
-                      </a:r>
-                      <a:r>
-                        <a:rPr lang="de-DE" sz="1400" dirty="0"/>
-                        <a:t> Background </a:t>
-                      </a:r>
-                      <a:r>
-                        <a:rPr lang="de-DE" sz="1400" dirty="0" err="1"/>
-                        <a:t>Subtraction</a:t>
-                      </a:r>
-                      <a:r>
-                        <a:rPr lang="de-DE" sz="1400" dirty="0"/>
-                        <a:t>)</a:t>
-                      </a:r>
-                    </a:p>
-                  </a:txBody>
-                  <a:tcPr/>
-                </a:tc>
-                <a:tc>
-                  <a:txBody>
-                    <a:bodyPr/>
-                    <a:lstStyle/>
-                    <a:p>
-                      <a:pPr marL="0" marR="0" lvl="0" indent="0" algn="l" defTabSz="914400" rtl="0" eaLnBrk="1" fontAlgn="auto" latinLnBrk="0" hangingPunct="1">
-                        <a:lnSpc>
-                          <a:spcPct val="100000"/>
-                        </a:lnSpc>
-                        <a:spcBef>
-                          <a:spcPts val="0"/>
-                        </a:spcBef>
-                        <a:spcAft>
-                          <a:spcPts val="0"/>
-                        </a:spcAft>
-                        <a:buClrTx/>
-                        <a:buSzTx/>
-                        <a:buFontTx/>
-                        <a:buNone/>
-                        <a:tabLst/>
-                        <a:defRPr/>
-                      </a:pPr>
-                      <a:r>
-                        <a:rPr lang="en-US" sz="1400" kern="1200" dirty="0">
-                          <a:solidFill>
-                            <a:schemeClr val="tx1"/>
-                          </a:solidFill>
-                          <a:effectLst/>
-                          <a:latin typeface="+mn-lt"/>
-                          <a:ea typeface="+mn-ea"/>
-                          <a:cs typeface="+mn-cs"/>
-                        </a:rPr>
-                        <a:t>mc=</a:t>
-                      </a:r>
-                      <a:r>
-                        <a:rPr lang="en-US" sz="1400" b="1" kern="1200" dirty="0">
-                          <a:solidFill>
-                            <a:schemeClr val="tx1"/>
-                          </a:solidFill>
-                          <a:effectLst/>
-                          <a:latin typeface="+mn-lt"/>
-                          <a:ea typeface="+mn-ea"/>
-                          <a:cs typeface="+mn-cs"/>
-                        </a:rPr>
-                        <a:t>10</a:t>
-                      </a:r>
-                      <a:r>
-                        <a:rPr lang="en-US" sz="1400" kern="1200" dirty="0">
-                          <a:solidFill>
-                            <a:schemeClr val="tx1"/>
-                          </a:solidFill>
-                          <a:effectLst/>
-                          <a:latin typeface="+mn-lt"/>
-                          <a:ea typeface="+mn-ea"/>
-                          <a:cs typeface="+mn-cs"/>
-                        </a:rPr>
-                        <a:t>, </a:t>
-                      </a:r>
-                      <a:r>
-                        <a:rPr lang="en-US" sz="1400" kern="1200" dirty="0" err="1">
-                          <a:solidFill>
-                            <a:schemeClr val="tx1"/>
-                          </a:solidFill>
-                          <a:effectLst/>
-                          <a:latin typeface="+mn-lt"/>
-                          <a:ea typeface="+mn-ea"/>
-                          <a:cs typeface="+mn-cs"/>
-                        </a:rPr>
-                        <a:t>Tlower</a:t>
-                      </a:r>
-                      <a:r>
-                        <a:rPr lang="en-US" sz="1400" kern="1200" dirty="0">
-                          <a:solidFill>
-                            <a:schemeClr val="tx1"/>
-                          </a:solidFill>
-                          <a:effectLst/>
-                          <a:latin typeface="+mn-lt"/>
-                          <a:ea typeface="+mn-ea"/>
-                          <a:cs typeface="+mn-cs"/>
-                        </a:rPr>
-                        <a:t>=</a:t>
-                      </a:r>
-                      <a:r>
-                        <a:rPr lang="en-US" sz="1400" b="1" kern="1200" dirty="0">
-                          <a:solidFill>
-                            <a:schemeClr val="tx1"/>
-                          </a:solidFill>
-                          <a:effectLst/>
-                          <a:latin typeface="+mn-lt"/>
-                          <a:ea typeface="+mn-ea"/>
-                          <a:cs typeface="+mn-cs"/>
-                        </a:rPr>
-                        <a:t>2</a:t>
-                      </a:r>
-                      <a:r>
-                        <a:rPr lang="en-US" sz="1400" kern="1200" dirty="0">
-                          <a:solidFill>
-                            <a:schemeClr val="tx1"/>
-                          </a:solidFill>
-                          <a:effectLst/>
-                          <a:latin typeface="+mn-lt"/>
-                          <a:ea typeface="+mn-ea"/>
-                          <a:cs typeface="+mn-cs"/>
-                        </a:rPr>
-                        <a:t>, Tupper=</a:t>
-                      </a:r>
-                      <a:r>
-                        <a:rPr lang="en-US" sz="1400" b="1" kern="1200" dirty="0">
-                          <a:solidFill>
-                            <a:schemeClr val="tx1"/>
-                          </a:solidFill>
-                          <a:effectLst/>
-                          <a:latin typeface="+mn-lt"/>
-                          <a:ea typeface="+mn-ea"/>
-                          <a:cs typeface="+mn-cs"/>
-                        </a:rPr>
-                        <a:t>32</a:t>
-                      </a:r>
-                    </a:p>
-                    <a:p>
-                      <a:endParaRPr lang="de-DE" sz="1400" dirty="0"/>
-                    </a:p>
-                  </a:txBody>
-                  <a:tcPr/>
-                </a:tc>
-                <a:extLst>
-                  <a:ext uri="{0D108BD9-81ED-4DB2-BD59-A6C34878D82A}">
-                    <a16:rowId xmlns:a16="http://schemas.microsoft.com/office/drawing/2014/main" val="4056653088"/>
-                  </a:ext>
-                </a:extLst>
-              </a:tr>
-            </a:tbl>
-          </a:graphicData>
-        </a:graphic>
-      </p:graphicFrame>
+          </p:nvPr>
+        </p:nvSpPr>
+        <p:spPr>
+          <a:xfrm>
+            <a:off x="411479" y="2453422"/>
+            <a:ext cx="10515600" cy="4351338"/>
+          </a:xfrm>
+        </p:spPr>
+        <p:txBody>
+          <a:bodyPr/>
+          <a:lstStyle/>
+          <a:p>
+            <a:endParaRPr lang="de-DE" dirty="0"/>
+          </a:p>
+        </p:txBody>
+      </p:sp>
     </p:spTree>
     <p:extLst>
       <p:ext uri="{BB962C8B-B14F-4D97-AF65-F5344CB8AC3E}">
@@ -7029,7 +6025,7 @@
             <p:ph idx="1"/>
             <p:extLst>
               <p:ext uri="{D42A27DB-BD31-4B8C-83A1-F6EECF244321}">
-                <p14:modId xmlns:p14="http://schemas.microsoft.com/office/powerpoint/2010/main" val="2078164110"/>
+                <p14:modId xmlns:p14="http://schemas.microsoft.com/office/powerpoint/2010/main" val="702618575"/>
               </p:ext>
             </p:extLst>
           </p:nvPr>
@@ -7044,62 +6040,6 @@
           </a:graphicData>
         </a:graphic>
       </p:graphicFrame>
-      <p:sp>
-        <p:nvSpPr>
-          <p:cNvPr id="6" name="Multiplikationszeichen 5">
-            <a:extLst>
-              <a:ext uri="{FF2B5EF4-FFF2-40B4-BE49-F238E27FC236}">
-                <a16:creationId xmlns:a16="http://schemas.microsoft.com/office/drawing/2014/main" id="{F93CE46D-FAEB-6152-3154-2753B2B586FD}"/>
-              </a:ext>
-            </a:extLst>
-          </p:cNvPr>
-          <p:cNvSpPr/>
-          <p:nvPr/>
-        </p:nvSpPr>
-        <p:spPr>
-          <a:xfrm>
-            <a:off x="4565294" y="4764520"/>
-            <a:ext cx="578679" cy="604107"/>
-          </a:xfrm>
-          <a:prstGeom prst="mathMultiply">
-            <a:avLst/>
-          </a:prstGeom>
-          <a:solidFill>
-            <a:srgbClr val="FF0000">
-              <a:alpha val="22000"/>
-            </a:srgbClr>
-          </a:solidFill>
-          <a:ln>
-            <a:solidFill>
-              <a:schemeClr val="bg1"/>
-            </a:solidFill>
-          </a:ln>
-        </p:spPr>
-        <p:style>
-          <a:lnRef idx="2">
-            <a:schemeClr val="accent1">
-              <a:shade val="15000"/>
-            </a:schemeClr>
-          </a:lnRef>
-          <a:fillRef idx="1">
-            <a:schemeClr val="accent1"/>
-          </a:fillRef>
-          <a:effectRef idx="0">
-            <a:schemeClr val="accent1"/>
-          </a:effectRef>
-          <a:fontRef idx="minor">
-            <a:schemeClr val="lt1"/>
-          </a:fontRef>
-        </p:style>
-        <p:txBody>
-          <a:bodyPr rtlCol="0" anchor="ctr"/>
-          <a:lstStyle/>
-          <a:p>
-            <a:pPr algn="ctr"/>
-            <a:endParaRPr lang="de-DE"/>
-          </a:p>
-        </p:txBody>
-      </p:sp>
     </p:spTree>
     <p:extLst>
       <p:ext uri="{BB962C8B-B14F-4D97-AF65-F5344CB8AC3E}">
@@ -9914,61 +8854,48 @@
           </a:bodyPr>
           <a:lstStyle/>
           <a:p>
+            <a:endParaRPr lang="de-DE" sz="1800" dirty="0"/>
+          </a:p>
+          <a:p>
+            <a:endParaRPr lang="de-DE" sz="1800" dirty="0"/>
+          </a:p>
+          <a:p>
+            <a:endParaRPr lang="de-DE" sz="1800" dirty="0"/>
+          </a:p>
+        </p:txBody>
+      </p:sp>
+      <p:sp>
+        <p:nvSpPr>
+          <p:cNvPr id="4" name="Textfeld 3">
+            <a:extLst>
+              <a:ext uri="{FF2B5EF4-FFF2-40B4-BE49-F238E27FC236}">
+                <a16:creationId xmlns:a16="http://schemas.microsoft.com/office/drawing/2014/main" id="{446903E4-6C6E-A998-15EB-9972A4F5D2E3}"/>
+              </a:ext>
+            </a:extLst>
+          </p:cNvPr>
+          <p:cNvSpPr txBox="1"/>
+          <p:nvPr/>
+        </p:nvSpPr>
+        <p:spPr>
+          <a:xfrm>
+            <a:off x="361666" y="2572603"/>
+            <a:ext cx="9341892" cy="369332"/>
+          </a:xfrm>
+          <a:prstGeom prst="rect">
+            <a:avLst/>
+          </a:prstGeom>
+          <a:noFill/>
+        </p:spPr>
+        <p:txBody>
+          <a:bodyPr wrap="square" rtlCol="0">
+            <a:spAutoFit/>
+          </a:bodyPr>
+          <a:lstStyle/>
+          <a:p>
             <a:r>
-              <a:rPr lang="de-DE" sz="1800" dirty="0"/>
-              <a:t>kontrastreiche Kleidung mit weißem Hintergrund</a:t>
+              <a:rPr lang="de-DE" dirty="0"/>
+              <a:t>Hier die Frames der Videos reinpacken</a:t>
             </a:r>
-          </a:p>
-          <a:p>
-            <a:r>
-              <a:rPr lang="de-DE" sz="1800" dirty="0"/>
-              <a:t>Weiße/helle Kleidung mit weißem Hintergrund</a:t>
-            </a:r>
-          </a:p>
-          <a:p>
-            <a:r>
-              <a:rPr lang="de-DE" sz="1800" dirty="0"/>
-              <a:t>Langsame/schnelle Bewegungen</a:t>
-            </a:r>
-          </a:p>
-          <a:p>
-            <a:r>
-              <a:rPr lang="de-DE" sz="1800" dirty="0"/>
-              <a:t>Bewegte Objekte</a:t>
-            </a:r>
-          </a:p>
-          <a:p>
-            <a:r>
-              <a:rPr lang="de-DE" sz="1800" dirty="0"/>
-              <a:t>Helle/ dunkle Umgebung</a:t>
-            </a:r>
-          </a:p>
-          <a:p>
-            <a:r>
-              <a:rPr lang="de-DE" sz="1800" dirty="0"/>
-              <a:t>Schnelle Lichtveränderungen</a:t>
-            </a:r>
-          </a:p>
-          <a:p>
-            <a:r>
-              <a:rPr lang="de-DE" sz="1800" dirty="0"/>
-              <a:t>Spiegelnder Hintergrund (Reflektion von Menschen)</a:t>
-            </a:r>
-          </a:p>
-          <a:p>
-            <a:pPr marL="0" indent="0">
-              <a:buNone/>
-            </a:pPr>
-            <a:endParaRPr lang="de-DE" sz="1800" dirty="0"/>
-          </a:p>
-          <a:p>
-            <a:endParaRPr lang="de-DE" sz="1800" dirty="0"/>
-          </a:p>
-          <a:p>
-            <a:endParaRPr lang="de-DE" sz="1800" dirty="0"/>
-          </a:p>
-          <a:p>
-            <a:endParaRPr lang="de-DE" sz="1800" dirty="0"/>
           </a:p>
         </p:txBody>
       </p:sp>
@@ -10594,13 +9521,13 @@
           <a:p>
             <a:r>
               <a:rPr lang="de-DE" sz="1800" dirty="0"/>
-              <a:t>Rauscharm </a:t>
+              <a:t>Anfälligkeit gegenüber Bewegung</a:t>
             </a:r>
           </a:p>
           <a:p>
             <a:r>
               <a:rPr lang="de-DE" sz="1800" dirty="0"/>
-              <a:t>Anfälligkeit gegenüber Bewegung</a:t>
+              <a:t>Rauscharm </a:t>
             </a:r>
           </a:p>
           <a:p>
@@ -11334,13 +10261,7 @@
           <a:p>
             <a:r>
               <a:rPr lang="de-DE" sz="1800" dirty="0"/>
-              <a:t>Keine Bewegung = gehört zum Hintergrund</a:t>
-            </a:r>
-          </a:p>
-          <a:p>
-            <a:r>
-              <a:rPr lang="de-DE" sz="1800" dirty="0"/>
-              <a:t>Keine schnellen Lichtänderungen</a:t>
+              <a:t>(Keine schnellen Lichtänderungen)</a:t>
             </a:r>
           </a:p>
           <a:p>
@@ -11981,4 +10902,319 @@
     </a:ext>
   </a:extLst>
 </a:theme>
+</file>
+
+<file path=ppt/theme/theme2.xml><?xml version="1.0" encoding="utf-8"?>
+<a:theme xmlns:a="http://schemas.openxmlformats.org/drawingml/2006/main" name="Office">
+  <a:themeElements>
+    <a:clrScheme name="Office">
+      <a:dk1>
+        <a:sysClr val="windowText" lastClr="000000"/>
+      </a:dk1>
+      <a:lt1>
+        <a:sysClr val="window" lastClr="FFFFFF"/>
+      </a:lt1>
+      <a:dk2>
+        <a:srgbClr val="0E2841"/>
+      </a:dk2>
+      <a:lt2>
+        <a:srgbClr val="E8E8E8"/>
+      </a:lt2>
+      <a:accent1>
+        <a:srgbClr val="156082"/>
+      </a:accent1>
+      <a:accent2>
+        <a:srgbClr val="E97132"/>
+      </a:accent2>
+      <a:accent3>
+        <a:srgbClr val="196B24"/>
+      </a:accent3>
+      <a:accent4>
+        <a:srgbClr val="0F9ED5"/>
+      </a:accent4>
+      <a:accent5>
+        <a:srgbClr val="A02B93"/>
+      </a:accent5>
+      <a:accent6>
+        <a:srgbClr val="4EA72E"/>
+      </a:accent6>
+      <a:hlink>
+        <a:srgbClr val="467886"/>
+      </a:hlink>
+      <a:folHlink>
+        <a:srgbClr val="96607D"/>
+      </a:folHlink>
+    </a:clrScheme>
+    <a:fontScheme name="Office">
+      <a:majorFont>
+        <a:latin typeface="Aptos Display" panose="02110004020202020204"/>
+        <a:ea typeface=""/>
+        <a:cs typeface=""/>
+        <a:font script="Jpan" typeface="游ゴシック Light"/>
+        <a:font script="Hang" typeface="맑은 고딕"/>
+        <a:font script="Hans" typeface="等线 Light"/>
+        <a:font script="Hant" typeface="新細明體"/>
+        <a:font script="Arab" typeface="Times New Roman"/>
+        <a:font script="Hebr" typeface="Times New Roman"/>
+        <a:font script="Thai" typeface="Angsana New"/>
+        <a:font script="Ethi" typeface="Nyala"/>
+        <a:font script="Beng" typeface="Vrinda"/>
+        <a:font script="Gujr" typeface="Shruti"/>
+        <a:font script="Khmr" typeface="MoolBoran"/>
+        <a:font script="Knda" typeface="Tunga"/>
+        <a:font script="Guru" typeface="Raavi"/>
+        <a:font script="Cans" typeface="Euphemia"/>
+        <a:font script="Cher" typeface="Plantagenet Cherokee"/>
+        <a:font script="Yiii" typeface="Microsoft Yi Baiti"/>
+        <a:font script="Tibt" typeface="Microsoft Himalaya"/>
+        <a:font script="Thaa" typeface="MV Boli"/>
+        <a:font script="Deva" typeface="Mangal"/>
+        <a:font script="Telu" typeface="Gautami"/>
+        <a:font script="Taml" typeface="Latha"/>
+        <a:font script="Syrc" typeface="Estrangelo Edessa"/>
+        <a:font script="Orya" typeface="Kalinga"/>
+        <a:font script="Mlym" typeface="Kartika"/>
+        <a:font script="Laoo" typeface="DokChampa"/>
+        <a:font script="Sinh" typeface="Iskoola Pota"/>
+        <a:font script="Mong" typeface="Mongolian Baiti"/>
+        <a:font script="Viet" typeface="Times New Roman"/>
+        <a:font script="Uigh" typeface="Microsoft Uighur"/>
+        <a:font script="Geor" typeface="Sylfaen"/>
+        <a:font script="Armn" typeface="Arial"/>
+        <a:font script="Bugi" typeface="Leelawadee UI"/>
+        <a:font script="Bopo" typeface="Microsoft JhengHei"/>
+        <a:font script="Java" typeface="Javanese Text"/>
+        <a:font script="Lisu" typeface="Segoe UI"/>
+        <a:font script="Mymr" typeface="Myanmar Text"/>
+        <a:font script="Nkoo" typeface="Ebrima"/>
+        <a:font script="Olck" typeface="Nirmala UI"/>
+        <a:font script="Osma" typeface="Ebrima"/>
+        <a:font script="Phag" typeface="Phagspa"/>
+        <a:font script="Syrn" typeface="Estrangelo Edessa"/>
+        <a:font script="Syrj" typeface="Estrangelo Edessa"/>
+        <a:font script="Syre" typeface="Estrangelo Edessa"/>
+        <a:font script="Sora" typeface="Nirmala UI"/>
+        <a:font script="Tale" typeface="Microsoft Tai Le"/>
+        <a:font script="Talu" typeface="Microsoft New Tai Lue"/>
+        <a:font script="Tfng" typeface="Ebrima"/>
+      </a:majorFont>
+      <a:minorFont>
+        <a:latin typeface="Aptos" panose="02110004020202020204"/>
+        <a:ea typeface=""/>
+        <a:cs typeface=""/>
+        <a:font script="Jpan" typeface="游ゴシック"/>
+        <a:font script="Hang" typeface="맑은 고딕"/>
+        <a:font script="Hans" typeface="等线"/>
+        <a:font script="Hant" typeface="新細明體"/>
+        <a:font script="Arab" typeface="Arial"/>
+        <a:font script="Hebr" typeface="Arial"/>
+        <a:font script="Thai" typeface="Cordia New"/>
+        <a:font script="Ethi" typeface="Nyala"/>
+        <a:font script="Beng" typeface="Vrinda"/>
+        <a:font script="Gujr" typeface="Shruti"/>
+        <a:font script="Khmr" typeface="DaunPenh"/>
+        <a:font script="Knda" typeface="Tunga"/>
+        <a:font script="Guru" typeface="Raavi"/>
+        <a:font script="Cans" typeface="Euphemia"/>
+        <a:font script="Cher" typeface="Plantagenet Cherokee"/>
+        <a:font script="Yiii" typeface="Microsoft Yi Baiti"/>
+        <a:font script="Tibt" typeface="Microsoft Himalaya"/>
+        <a:font script="Thaa" typeface="MV Boli"/>
+        <a:font script="Deva" typeface="Mangal"/>
+        <a:font script="Telu" typeface="Gautami"/>
+        <a:font script="Taml" typeface="Latha"/>
+        <a:font script="Syrc" typeface="Estrangelo Edessa"/>
+        <a:font script="Orya" typeface="Kalinga"/>
+        <a:font script="Mlym" typeface="Kartika"/>
+        <a:font script="Laoo" typeface="DokChampa"/>
+        <a:font script="Sinh" typeface="Iskoola Pota"/>
+        <a:font script="Mong" typeface="Mongolian Baiti"/>
+        <a:font script="Viet" typeface="Arial"/>
+        <a:font script="Uigh" typeface="Microsoft Uighur"/>
+        <a:font script="Geor" typeface="Sylfaen"/>
+        <a:font script="Armn" typeface="Arial"/>
+        <a:font script="Bugi" typeface="Leelawadee UI"/>
+        <a:font script="Bopo" typeface="Microsoft JhengHei"/>
+        <a:font script="Java" typeface="Javanese Text"/>
+        <a:font script="Lisu" typeface="Segoe UI"/>
+        <a:font script="Mymr" typeface="Myanmar Text"/>
+        <a:font script="Nkoo" typeface="Ebrima"/>
+        <a:font script="Olck" typeface="Nirmala UI"/>
+        <a:font script="Osma" typeface="Ebrima"/>
+        <a:font script="Phag" typeface="Phagspa"/>
+        <a:font script="Syrn" typeface="Estrangelo Edessa"/>
+        <a:font script="Syrj" typeface="Estrangelo Edessa"/>
+        <a:font script="Syre" typeface="Estrangelo Edessa"/>
+        <a:font script="Sora" typeface="Nirmala UI"/>
+        <a:font script="Tale" typeface="Microsoft Tai Le"/>
+        <a:font script="Talu" typeface="Microsoft New Tai Lue"/>
+        <a:font script="Tfng" typeface="Ebrima"/>
+      </a:minorFont>
+    </a:fontScheme>
+    <a:fmtScheme name="Office">
+      <a:fillStyleLst>
+        <a:solidFill>
+          <a:schemeClr val="phClr"/>
+        </a:solidFill>
+        <a:gradFill rotWithShape="1">
+          <a:gsLst>
+            <a:gs pos="0">
+              <a:schemeClr val="phClr">
+                <a:lumMod val="110000"/>
+                <a:satMod val="105000"/>
+                <a:tint val="67000"/>
+              </a:schemeClr>
+            </a:gs>
+            <a:gs pos="50000">
+              <a:schemeClr val="phClr">
+                <a:lumMod val="105000"/>
+                <a:satMod val="103000"/>
+                <a:tint val="73000"/>
+              </a:schemeClr>
+            </a:gs>
+            <a:gs pos="100000">
+              <a:schemeClr val="phClr">
+                <a:lumMod val="105000"/>
+                <a:satMod val="109000"/>
+                <a:tint val="81000"/>
+              </a:schemeClr>
+            </a:gs>
+          </a:gsLst>
+          <a:lin ang="5400000" scaled="0"/>
+        </a:gradFill>
+        <a:gradFill rotWithShape="1">
+          <a:gsLst>
+            <a:gs pos="0">
+              <a:schemeClr val="phClr">
+                <a:satMod val="103000"/>
+                <a:lumMod val="102000"/>
+                <a:tint val="94000"/>
+              </a:schemeClr>
+            </a:gs>
+            <a:gs pos="50000">
+              <a:schemeClr val="phClr">
+                <a:satMod val="110000"/>
+                <a:lumMod val="100000"/>
+                <a:shade val="100000"/>
+              </a:schemeClr>
+            </a:gs>
+            <a:gs pos="100000">
+              <a:schemeClr val="phClr">
+                <a:lumMod val="99000"/>
+                <a:satMod val="120000"/>
+                <a:shade val="78000"/>
+              </a:schemeClr>
+            </a:gs>
+          </a:gsLst>
+          <a:lin ang="5400000" scaled="0"/>
+        </a:gradFill>
+      </a:fillStyleLst>
+      <a:lnStyleLst>
+        <a:ln w="12700" cap="flat" cmpd="sng" algn="ctr">
+          <a:solidFill>
+            <a:schemeClr val="phClr"/>
+          </a:solidFill>
+          <a:prstDash val="solid"/>
+          <a:miter lim="800000"/>
+        </a:ln>
+        <a:ln w="19050" cap="flat" cmpd="sng" algn="ctr">
+          <a:solidFill>
+            <a:schemeClr val="phClr"/>
+          </a:solidFill>
+          <a:prstDash val="solid"/>
+          <a:miter lim="800000"/>
+        </a:ln>
+        <a:ln w="25400" cap="flat" cmpd="sng" algn="ctr">
+          <a:solidFill>
+            <a:schemeClr val="phClr"/>
+          </a:solidFill>
+          <a:prstDash val="solid"/>
+          <a:miter lim="800000"/>
+        </a:ln>
+      </a:lnStyleLst>
+      <a:effectStyleLst>
+        <a:effectStyle>
+          <a:effectLst/>
+        </a:effectStyle>
+        <a:effectStyle>
+          <a:effectLst/>
+        </a:effectStyle>
+        <a:effectStyle>
+          <a:effectLst>
+            <a:outerShdw blurRad="57150" dist="19050" dir="5400000" algn="ctr" rotWithShape="0">
+              <a:srgbClr val="000000">
+                <a:alpha val="63000"/>
+              </a:srgbClr>
+            </a:outerShdw>
+          </a:effectLst>
+        </a:effectStyle>
+      </a:effectStyleLst>
+      <a:bgFillStyleLst>
+        <a:solidFill>
+          <a:schemeClr val="phClr"/>
+        </a:solidFill>
+        <a:solidFill>
+          <a:schemeClr val="phClr">
+            <a:tint val="95000"/>
+            <a:satMod val="170000"/>
+          </a:schemeClr>
+        </a:solidFill>
+        <a:gradFill rotWithShape="1">
+          <a:gsLst>
+            <a:gs pos="0">
+              <a:schemeClr val="phClr">
+                <a:tint val="93000"/>
+                <a:satMod val="150000"/>
+                <a:shade val="98000"/>
+                <a:lumMod val="102000"/>
+              </a:schemeClr>
+            </a:gs>
+            <a:gs pos="50000">
+              <a:schemeClr val="phClr">
+                <a:tint val="98000"/>
+                <a:satMod val="130000"/>
+                <a:shade val="90000"/>
+                <a:lumMod val="103000"/>
+              </a:schemeClr>
+            </a:gs>
+            <a:gs pos="100000">
+              <a:schemeClr val="phClr">
+                <a:shade val="63000"/>
+                <a:satMod val="120000"/>
+              </a:schemeClr>
+            </a:gs>
+          </a:gsLst>
+          <a:lin ang="5400000" scaled="0"/>
+        </a:gradFill>
+      </a:bgFillStyleLst>
+    </a:fmtScheme>
+  </a:themeElements>
+  <a:objectDefaults>
+    <a:lnDef>
+      <a:spPr/>
+      <a:bodyPr/>
+      <a:lstStyle/>
+      <a:style>
+        <a:lnRef idx="2">
+          <a:schemeClr val="accent1"/>
+        </a:lnRef>
+        <a:fillRef idx="0">
+          <a:schemeClr val="accent1"/>
+        </a:fillRef>
+        <a:effectRef idx="1">
+          <a:schemeClr val="accent1"/>
+        </a:effectRef>
+        <a:fontRef idx="minor">
+          <a:schemeClr val="tx1"/>
+        </a:fontRef>
+      </a:style>
+    </a:lnDef>
+  </a:objectDefaults>
+  <a:extraClrSchemeLst/>
+  <a:extLst>
+    <a:ext uri="{05A4C25C-085E-4340-85A3-A5531E510DB2}">
+      <thm15:themeFamily xmlns:thm15="http://schemas.microsoft.com/office/thememl/2012/main" name="Office Theme" id="{2E142A2C-CD16-42D6-873A-C26D2A0506FA}" vid="{1BDDFF52-6CD6-40A5-AB3C-68EB2F1E4D0A}"/>
+    </a:ext>
+  </a:extLst>
+</a:theme>
 </file>
</xml_diff>